<commit_message>
Fix wrong console output in tags and releases
</commit_message>
<xml_diff>
--- a/slides/Tag-2_2-Tags-und-Releases_Light.pptx
+++ b/slides/Tag-2_2-Tags-und-Releases_Light.pptx
@@ -7,31 +7,29 @@
     <p:sldMasterId id="2147483897" r:id="rId3"/>
   </p:sldMasterIdLst>
   <p:notesMasterIdLst>
-    <p:notesMasterId r:id="rId23"/>
+    <p:notesMasterId r:id="rId21"/>
   </p:notesMasterIdLst>
   <p:handoutMasterIdLst>
-    <p:handoutMasterId r:id="rId24"/>
+    <p:handoutMasterId r:id="rId22"/>
   </p:handoutMasterIdLst>
   <p:sldIdLst>
-    <p:sldId id="604" r:id="rId4"/>
-    <p:sldId id="606" r:id="rId5"/>
-    <p:sldId id="726" r:id="rId6"/>
+    <p:sldId id="288" r:id="rId4"/>
+    <p:sldId id="387" r:id="rId5"/>
+    <p:sldId id="287" r:id="rId6"/>
     <p:sldId id="596" r:id="rId7"/>
-    <p:sldId id="287" r:id="rId8"/>
-    <p:sldId id="368" r:id="rId9"/>
-    <p:sldId id="420" r:id="rId10"/>
-    <p:sldId id="421" r:id="rId11"/>
-    <p:sldId id="422" r:id="rId12"/>
-    <p:sldId id="424" r:id="rId13"/>
-    <p:sldId id="423" r:id="rId14"/>
-    <p:sldId id="425" r:id="rId15"/>
-    <p:sldId id="426" r:id="rId16"/>
-    <p:sldId id="427" r:id="rId17"/>
-    <p:sldId id="597" r:id="rId18"/>
-    <p:sldId id="724" r:id="rId19"/>
-    <p:sldId id="598" r:id="rId20"/>
-    <p:sldId id="430" r:id="rId21"/>
-    <p:sldId id="725" r:id="rId22"/>
+    <p:sldId id="368" r:id="rId8"/>
+    <p:sldId id="420" r:id="rId9"/>
+    <p:sldId id="726" r:id="rId10"/>
+    <p:sldId id="424" r:id="rId11"/>
+    <p:sldId id="423" r:id="rId12"/>
+    <p:sldId id="425" r:id="rId13"/>
+    <p:sldId id="426" r:id="rId14"/>
+    <p:sldId id="427" r:id="rId15"/>
+    <p:sldId id="597" r:id="rId16"/>
+    <p:sldId id="724" r:id="rId17"/>
+    <p:sldId id="598" r:id="rId18"/>
+    <p:sldId id="430" r:id="rId19"/>
+    <p:sldId id="725" r:id="rId20"/>
   </p:sldIdLst>
   <p:sldSz cx="9144000" cy="6858000" type="screen4x3"/>
   <p:notesSz cx="6784975" cy="9921875"/>
@@ -1101,7 +1099,7 @@
                 <a:latin typeface="Arial" panose="020B0604020202020204" pitchFamily="34" charset="0"/>
               </a:rPr>
               <a:pPr/>
-              <a:t>5</a:t>
+              <a:t>3</a:t>
             </a:fld>
             <a:endParaRPr lang="de-DE" altLang="de-DE" sz="1000">
               <a:latin typeface="Arial" panose="020B0604020202020204" pitchFamily="34" charset="0"/>
@@ -1305,7 +1303,7 @@
                 <a:tabLst/>
                 <a:defRPr/>
               </a:pPr>
-              <a:t>16</a:t>
+              <a:t>14</a:t>
             </a:fld>
             <a:endParaRPr kumimoji="0" lang="de-DE" altLang="de-DE" sz="1000" b="0" i="1" u="none" strike="noStrike" kern="1200" cap="none" spc="0" normalizeH="0" baseline="0" noProof="0">
               <a:ln>
@@ -1449,7 +1447,7 @@
                 <a:tabLst/>
                 <a:defRPr/>
               </a:pPr>
-              <a:t>19</a:t>
+              <a:t>17</a:t>
             </a:fld>
             <a:endParaRPr kumimoji="0" lang="de-DE" altLang="de-DE" sz="1000" b="0" i="1" u="none" strike="noStrike" kern="1200" cap="none" spc="0" normalizeH="0" baseline="0" noProof="0">
               <a:ln>
@@ -2599,7 +2597,7 @@
                 </a:solidFill>
                 <a:latin typeface="Arial" charset="0"/>
               </a:rPr>
-              <a:t>Daniel Krämer &amp; Malte Fischer</a:t>
+              <a:t>&lt;Autor&gt;</a:t>
             </a:r>
           </a:p>
         </p:txBody>
@@ -2621,7 +2619,7 @@
         <p:spPr bwMode="auto">
           <a:xfrm>
             <a:off x="4252913" y="6424613"/>
-            <a:ext cx="2438488" cy="246221"/>
+            <a:ext cx="1163637" cy="246062"/>
           </a:xfrm>
           <a:prstGeom prst="rect">
             <a:avLst/>
@@ -2651,7 +2649,16 @@
                 </a:solidFill>
                 <a:latin typeface="Arial" charset="0"/>
               </a:rPr>
-              <a:t>Tag-2_2-Tags-und-Releases_Light.pptx</a:t>
+              <a:t>&lt;Dateiname&gt;.</a:t>
+            </a:r>
+            <a:r>
+              <a:rPr lang="de-DE" sz="1000" dirty="0" err="1">
+                <a:solidFill>
+                  <a:schemeClr val="bg1"/>
+                </a:solidFill>
+                <a:latin typeface="Arial" charset="0"/>
+              </a:rPr>
+              <a:t>ppt</a:t>
             </a:r>
             <a:endParaRPr lang="de-DE" dirty="0">
               <a:solidFill>
@@ -4697,7 +4704,7 @@
                 </a:solidFill>
                 <a:latin typeface="Arial" charset="0"/>
               </a:rPr>
-              <a:t>Daniel Krämer &amp; Malte Fischer</a:t>
+              <a:t>&lt;Autor&gt;</a:t>
             </a:r>
           </a:p>
         </p:txBody>
@@ -4719,7 +4726,7 @@
         <p:spPr bwMode="auto">
           <a:xfrm>
             <a:off x="4252913" y="6424613"/>
-            <a:ext cx="2438488" cy="246221"/>
+            <a:ext cx="1891865" cy="246221"/>
           </a:xfrm>
           <a:prstGeom prst="rect">
             <a:avLst/>
@@ -4749,7 +4756,7 @@
                 </a:solidFill>
                 <a:latin typeface="Arial" charset="0"/>
               </a:rPr>
-              <a:t>Tag-2_2-Tags-und-Releases_Light.pptx</a:t>
+              <a:t>Tag-3_2_1-GitLab-Runner.ppt</a:t>
             </a:r>
             <a:endParaRPr lang="de-DE" dirty="0">
               <a:solidFill>
@@ -5651,7 +5658,7 @@
         <p:spPr bwMode="auto">
           <a:xfrm>
             <a:off x="468313" y="2562225"/>
-            <a:ext cx="5471839" cy="938213"/>
+            <a:ext cx="4967287" cy="938213"/>
           </a:xfrm>
           <a:prstGeom prst="rect">
             <a:avLst/>
@@ -5683,24 +5690,8 @@
           <a:p>
             <a:pPr algn="l" eaLnBrk="1" hangingPunct="1"/>
             <a:r>
-              <a:rPr lang="de-DE" altLang="de-DE" sz="3200" dirty="0"/>
-              <a:t>Tag 2: Vertiefung </a:t>
-            </a:r>
-            <a:r>
-              <a:rPr lang="de-DE" altLang="de-DE" sz="3200" dirty="0" err="1"/>
-              <a:t>Git</a:t>
-            </a:r>
-            <a:r>
-              <a:rPr lang="de-DE" altLang="de-DE" sz="3200" dirty="0"/>
-              <a:t>-Workflow, CI/CD &amp; </a:t>
-            </a:r>
-            <a:r>
-              <a:rPr lang="de-DE" altLang="de-DE" sz="3200" dirty="0" err="1"/>
-              <a:t>GitLab</a:t>
-            </a:r>
-            <a:r>
-              <a:rPr lang="de-DE" altLang="de-DE" sz="3200" dirty="0"/>
-              <a:t> CI </a:t>
+              <a:rPr lang="de-DE" altLang="de-DE" dirty="0"/>
+              <a:t>Tags und Releases</a:t>
             </a:r>
           </a:p>
         </p:txBody>
@@ -5723,8 +5714,8 @@
         </p:nvSpPr>
         <p:spPr bwMode="auto">
           <a:xfrm>
-            <a:off x="468312" y="4462463"/>
-            <a:ext cx="4190603" cy="622300"/>
+            <a:off x="468313" y="4462463"/>
+            <a:ext cx="2159000" cy="622300"/>
           </a:xfrm>
           <a:prstGeom prst="rect">
             <a:avLst/>
@@ -5759,8 +5750,8 @@
               <a:buNone/>
             </a:pPr>
             <a:r>
-              <a:rPr lang="de-DE" altLang="de-DE" sz="1600" dirty="0"/>
-              <a:t>18.06.2024, Daniel Krämer &amp; Malte Fischer</a:t>
+              <a:rPr lang="de-DE" altLang="de-DE" sz="1600"/>
+              <a:t>&lt;Datum, Autor&gt;</a:t>
             </a:r>
           </a:p>
         </p:txBody>
@@ -5913,54 +5904,18 @@
           </a:lstStyle>
           <a:p>
             <a:pPr eaLnBrk="1" hangingPunct="1"/>
-            <a:endParaRPr lang="de-DE" altLang="de-DE" sz="4400" dirty="0">
-              <a:solidFill>
-                <a:schemeClr val="tx2"/>
-              </a:solidFill>
-              <a:latin typeface="Arial" panose="020B0604020202020204" pitchFamily="34" charset="0"/>
-            </a:endParaRPr>
+            <a:r>
+              <a:rPr lang="de-DE" altLang="de-DE" sz="4400">
+                <a:solidFill>
+                  <a:schemeClr val="tx2"/>
+                </a:solidFill>
+                <a:latin typeface="Arial" panose="020B0604020202020204" pitchFamily="34" charset="0"/>
+              </a:rPr>
+              <a:t>&lt;Kundenlogo&gt;</a:t>
+            </a:r>
           </a:p>
         </p:txBody>
       </p:sp>
-      <p:pic>
-        <p:nvPicPr>
-          <p:cNvPr id="3" name="Grafik 2">
-            <a:extLst>
-              <a:ext uri="{FF2B5EF4-FFF2-40B4-BE49-F238E27FC236}">
-                <a16:creationId xmlns:a16="http://schemas.microsoft.com/office/drawing/2014/main" id="{F795EC6A-86ED-78D6-3916-EC81E8315965}"/>
-              </a:ext>
-            </a:extLst>
-          </p:cNvPr>
-          <p:cNvPicPr>
-            <a:picLocks noChangeAspect="1"/>
-          </p:cNvPicPr>
-          <p:nvPr/>
-        </p:nvPicPr>
-        <p:blipFill>
-          <a:blip r:embed="rId2">
-            <a:extLst>
-              <a:ext uri="{28A0092B-C50C-407E-A947-70E740481C1C}">
-                <a14:useLocalDpi xmlns:a14="http://schemas.microsoft.com/office/drawing/2010/main" val="0"/>
-              </a:ext>
-              <a:ext uri="{96DAC541-7B7A-43D3-8B79-37D633B846F1}">
-                <asvg:svgBlip xmlns:asvg="http://schemas.microsoft.com/office/drawing/2016/SVG/main" r:embed="rId3"/>
-              </a:ext>
-            </a:extLst>
-          </a:blip>
-          <a:stretch>
-            <a:fillRect/>
-          </a:stretch>
-        </p:blipFill>
-        <p:spPr>
-          <a:xfrm>
-            <a:off x="309959" y="263970"/>
-            <a:ext cx="4348957" cy="1508822"/>
-          </a:xfrm>
-          <a:prstGeom prst="rect">
-            <a:avLst/>
-          </a:prstGeom>
-        </p:spPr>
-      </p:pic>
     </p:spTree>
   </p:cSld>
   <p:clrMapOvr>
@@ -6013,8 +5968,52 @@
           <a:lstStyle/>
           <a:p>
             <a:r>
+              <a:rPr lang="de-DE" altLang="de-DE" dirty="0" err="1">
+                <a:latin typeface="Consolas" panose="020B0609020204030204" pitchFamily="49" charset="0"/>
+              </a:rPr>
+              <a:t>git</a:t>
+            </a:r>
+            <a:r>
+              <a:rPr lang="de-DE" altLang="de-DE" dirty="0">
+                <a:latin typeface="Consolas" panose="020B0609020204030204" pitchFamily="49" charset="0"/>
+              </a:rPr>
+              <a:t> </a:t>
+            </a:r>
+            <a:r>
+              <a:rPr lang="de-DE" altLang="de-DE" dirty="0" err="1">
+                <a:latin typeface="Consolas" panose="020B0609020204030204" pitchFamily="49" charset="0"/>
+              </a:rPr>
+              <a:t>checkout</a:t>
+            </a:r>
+            <a:r>
+              <a:rPr lang="de-DE" altLang="de-DE" dirty="0">
+                <a:latin typeface="Consolas" panose="020B0609020204030204" pitchFamily="49" charset="0"/>
+              </a:rPr>
+              <a:t> –b &lt;</a:t>
+            </a:r>
+            <a:r>
+              <a:rPr lang="de-DE" altLang="de-DE" dirty="0" err="1">
+                <a:latin typeface="Consolas" panose="020B0609020204030204" pitchFamily="49" charset="0"/>
+              </a:rPr>
+              <a:t>branch</a:t>
+            </a:r>
+            <a:r>
+              <a:rPr lang="de-DE" altLang="de-DE" dirty="0">
+                <a:latin typeface="Consolas" panose="020B0609020204030204" pitchFamily="49" charset="0"/>
+              </a:rPr>
+              <a:t>-name&gt; &lt;tag-name&gt; </a:t>
+            </a:r>
+            <a:r>
               <a:rPr lang="de-DE" altLang="de-DE" dirty="0"/>
-              <a:t>Rückwirkendes Tagging ist mit Angabe der Commit-ID möglich</a:t>
+              <a:t>ermöglicht Erstellen eines </a:t>
+            </a:r>
+            <a:r>
+              <a:rPr lang="de-DE" altLang="de-DE" dirty="0" err="1"/>
+              <a:t>Branches</a:t>
+            </a:r>
+            <a:r>
+              <a:rPr lang="de-DE" altLang="de-DE" dirty="0"/>
+              <a:t> abzweigend vom getaggten Commit</a:t>
             </a:r>
           </a:p>
           <a:p>
@@ -6039,17 +6038,8 @@
               <a:rPr lang="en-US" altLang="de-DE" sz="1200" dirty="0">
                 <a:latin typeface="Consolas" panose="020B0609020204030204" pitchFamily="49" charset="0"/>
               </a:rPr>
-              <a:t>$ git log --</a:t>
-            </a:r>
-            <a:r>
-              <a:rPr lang="en-US" altLang="de-DE" sz="1200" dirty="0" err="1">
-                <a:latin typeface="Consolas" panose="020B0609020204030204" pitchFamily="49" charset="0"/>
-              </a:rPr>
-              <a:t>oneline</a:t>
-            </a:r>
-            <a:endParaRPr lang="en-US" altLang="de-DE" sz="1200" dirty="0">
-              <a:latin typeface="Consolas" panose="020B0609020204030204" pitchFamily="49" charset="0"/>
-            </a:endParaRPr>
+              <a:t>$ git checkout -b hotfix release-v0.0.1</a:t>
+            </a:r>
           </a:p>
           <a:p>
             <a:pPr marL="457200" lvl="1" indent="0">
@@ -6062,8 +6052,30 @@
               <a:rPr lang="en-US" altLang="de-DE" sz="1200" dirty="0">
                 <a:latin typeface="Consolas" panose="020B0609020204030204" pitchFamily="49" charset="0"/>
               </a:rPr>
-              <a:t>89c1108 (HEAD -&gt; main, tag: release-v0.0.2) Add release2_file</a:t>
-            </a:r>
+              <a:t>Switched to a new branch 'hotfix‘</a:t>
+            </a:r>
+            <a:endParaRPr lang="de-DE" altLang="de-DE" sz="1200" dirty="0">
+              <a:latin typeface="Consolas" panose="020B0609020204030204" pitchFamily="49" charset="0"/>
+            </a:endParaRPr>
+          </a:p>
+          <a:p>
+            <a:r>
+              <a:rPr lang="de-DE" altLang="de-DE" dirty="0"/>
+              <a:t>Löschen eines Tags ist mit </a:t>
+            </a:r>
+            <a:r>
+              <a:rPr lang="de-DE" altLang="de-DE" dirty="0" err="1">
+                <a:latin typeface="Consolas" panose="020B0609020204030204" pitchFamily="49" charset="0"/>
+              </a:rPr>
+              <a:t>git</a:t>
+            </a:r>
+            <a:r>
+              <a:rPr lang="de-DE" altLang="de-DE" dirty="0">
+                <a:latin typeface="Consolas" panose="020B0609020204030204" pitchFamily="49" charset="0"/>
+              </a:rPr>
+              <a:t> tag -d &lt;tag-name&gt;</a:t>
+            </a:r>
+            <a:endParaRPr lang="de-DE" altLang="de-DE" dirty="0"/>
           </a:p>
           <a:p>
             <a:pPr marL="457200" lvl="1" indent="0">
@@ -6072,18 +6084,6 @@
               </a:spcBef>
               <a:buNone/>
             </a:pPr>
-            <a:r>
-              <a:rPr lang="en-US" altLang="de-DE" sz="1200" dirty="0">
-                <a:latin typeface="Consolas" panose="020B0609020204030204" pitchFamily="49" charset="0"/>
-              </a:rPr>
-              <a:t>c3a059e (tag: release-v0.0.1) Add </a:t>
-            </a:r>
-            <a:r>
-              <a:rPr lang="en-US" altLang="de-DE" sz="1200" dirty="0" err="1">
-                <a:latin typeface="Consolas" panose="020B0609020204030204" pitchFamily="49" charset="0"/>
-              </a:rPr>
-              <a:t>final_file</a:t>
-            </a:r>
             <a:endParaRPr lang="en-US" altLang="de-DE" sz="1200" dirty="0">
               <a:latin typeface="Consolas" panose="020B0609020204030204" pitchFamily="49" charset="0"/>
             </a:endParaRPr>
@@ -6099,7 +6099,7 @@
               <a:rPr lang="en-US" altLang="de-DE" sz="1200" dirty="0">
                 <a:latin typeface="Consolas" panose="020B0609020204030204" pitchFamily="49" charset="0"/>
               </a:rPr>
-              <a:t>a908be7 Add file3</a:t>
+              <a:t>$ git tag -d release-v0.0.0</a:t>
             </a:r>
           </a:p>
           <a:p>
@@ -6113,177 +6113,11 @@
               <a:rPr lang="en-US" altLang="de-DE" sz="1200" dirty="0">
                 <a:latin typeface="Consolas" panose="020B0609020204030204" pitchFamily="49" charset="0"/>
               </a:rPr>
-              <a:t>722eaf0 Add file from main</a:t>
-            </a:r>
-          </a:p>
-          <a:p>
-            <a:pPr marL="457200" lvl="1" indent="0">
-              <a:spcBef>
-                <a:spcPts val="0"/>
-              </a:spcBef>
-              <a:buNone/>
-            </a:pPr>
-            <a:r>
-              <a:rPr lang="en-US" altLang="de-DE" sz="1200" dirty="0">
-                <a:latin typeface="Consolas" panose="020B0609020204030204" pitchFamily="49" charset="0"/>
-              </a:rPr>
-              <a:t>c61ef14 Initial commit</a:t>
-            </a:r>
-          </a:p>
-          <a:p>
-            <a:pPr marL="457200" lvl="1" indent="0">
-              <a:spcBef>
-                <a:spcPts val="0"/>
-              </a:spcBef>
-              <a:buNone/>
-            </a:pPr>
-            <a:endParaRPr lang="en-US" altLang="de-DE" sz="1200" dirty="0">
-              <a:latin typeface="Consolas" panose="020B0609020204030204" pitchFamily="49" charset="0"/>
-            </a:endParaRPr>
-          </a:p>
-          <a:p>
-            <a:pPr marL="457200" lvl="1" indent="0">
-              <a:spcBef>
-                <a:spcPts val="0"/>
-              </a:spcBef>
-              <a:buNone/>
-            </a:pPr>
-            <a:r>
-              <a:rPr lang="en-US" altLang="de-DE" sz="1200" dirty="0">
-                <a:latin typeface="Consolas" panose="020B0609020204030204" pitchFamily="49" charset="0"/>
-              </a:rPr>
-              <a:t>$ git tag release-v0.0.0 a908be7</a:t>
-            </a:r>
-          </a:p>
-          <a:p>
-            <a:pPr marL="457200" lvl="1" indent="0">
-              <a:spcBef>
-                <a:spcPts val="0"/>
-              </a:spcBef>
-              <a:buNone/>
-            </a:pPr>
-            <a:endParaRPr lang="en-US" altLang="de-DE" sz="1200" dirty="0">
-              <a:latin typeface="Consolas" panose="020B0609020204030204" pitchFamily="49" charset="0"/>
-            </a:endParaRPr>
-          </a:p>
-          <a:p>
-            <a:pPr marL="457200" lvl="1" indent="0">
-              <a:spcBef>
-                <a:spcPts val="0"/>
-              </a:spcBef>
-              <a:buNone/>
-            </a:pPr>
-            <a:r>
-              <a:rPr lang="en-US" altLang="de-DE" sz="1200" dirty="0">
-                <a:latin typeface="Consolas" panose="020B0609020204030204" pitchFamily="49" charset="0"/>
-              </a:rPr>
-              <a:t>$ git log --</a:t>
-            </a:r>
-            <a:r>
-              <a:rPr lang="en-US" altLang="de-DE" sz="1200" dirty="0" err="1">
-                <a:latin typeface="Consolas" panose="020B0609020204030204" pitchFamily="49" charset="0"/>
-              </a:rPr>
-              <a:t>oneline</a:t>
-            </a:r>
-            <a:endParaRPr lang="en-US" altLang="de-DE" sz="1200" dirty="0">
-              <a:latin typeface="Consolas" panose="020B0609020204030204" pitchFamily="49" charset="0"/>
-            </a:endParaRPr>
-          </a:p>
-          <a:p>
-            <a:pPr marL="457200" lvl="1" indent="0">
-              <a:spcBef>
-                <a:spcPts val="0"/>
-              </a:spcBef>
-              <a:buNone/>
-            </a:pPr>
-            <a:r>
-              <a:rPr lang="en-US" altLang="de-DE" sz="1200" dirty="0">
-                <a:latin typeface="Consolas" panose="020B0609020204030204" pitchFamily="49" charset="0"/>
-              </a:rPr>
-              <a:t>89c1108 (HEAD -&gt; main, tag: release-v0.0.2) Add release2_file</a:t>
-            </a:r>
-          </a:p>
-          <a:p>
-            <a:pPr marL="457200" lvl="1" indent="0">
-              <a:spcBef>
-                <a:spcPts val="0"/>
-              </a:spcBef>
-              <a:buNone/>
-            </a:pPr>
-            <a:r>
-              <a:rPr lang="en-US" altLang="de-DE" sz="1200" dirty="0">
-                <a:latin typeface="Consolas" panose="020B0609020204030204" pitchFamily="49" charset="0"/>
-              </a:rPr>
-              <a:t>c3a059e (tag: release-v0.0.1) Add </a:t>
-            </a:r>
-            <a:r>
-              <a:rPr lang="en-US" altLang="de-DE" sz="1200" dirty="0" err="1">
-                <a:latin typeface="Consolas" panose="020B0609020204030204" pitchFamily="49" charset="0"/>
-              </a:rPr>
-              <a:t>final_file</a:t>
-            </a:r>
-            <a:endParaRPr lang="en-US" altLang="de-DE" sz="1200" dirty="0">
-              <a:latin typeface="Consolas" panose="020B0609020204030204" pitchFamily="49" charset="0"/>
-            </a:endParaRPr>
-          </a:p>
-          <a:p>
-            <a:pPr marL="457200" lvl="1" indent="0">
-              <a:spcBef>
-                <a:spcPts val="0"/>
-              </a:spcBef>
-              <a:buNone/>
-            </a:pPr>
-            <a:r>
-              <a:rPr lang="en-US" altLang="de-DE" sz="1200" dirty="0">
-                <a:latin typeface="Consolas" panose="020B0609020204030204" pitchFamily="49" charset="0"/>
-              </a:rPr>
-              <a:t>a908be7 (tag: release-v0.0.0) Add file3</a:t>
-            </a:r>
-          </a:p>
-          <a:p>
-            <a:pPr marL="457200" lvl="1" indent="0">
-              <a:spcBef>
-                <a:spcPts val="0"/>
-              </a:spcBef>
-              <a:buNone/>
-            </a:pPr>
-            <a:r>
-              <a:rPr lang="en-US" altLang="de-DE" sz="1200" dirty="0">
-                <a:latin typeface="Consolas" panose="020B0609020204030204" pitchFamily="49" charset="0"/>
-              </a:rPr>
-              <a:t>722eaf0 Add file from main</a:t>
-            </a:r>
-          </a:p>
-          <a:p>
-            <a:pPr marL="457200" lvl="1" indent="0">
-              <a:spcBef>
-                <a:spcPts val="0"/>
-              </a:spcBef>
-              <a:buNone/>
-            </a:pPr>
-            <a:r>
-              <a:rPr lang="en-US" altLang="de-DE" sz="1200" dirty="0">
-                <a:latin typeface="Consolas" panose="020B0609020204030204" pitchFamily="49" charset="0"/>
-              </a:rPr>
-              <a:t>c61ef14 Initial commit</a:t>
+              <a:t>Deleted tag 'release-v0.0.0' (was a908be7)</a:t>
             </a:r>
             <a:endParaRPr lang="de-DE" altLang="de-DE" sz="1200" dirty="0">
               <a:latin typeface="Consolas" panose="020B0609020204030204" pitchFamily="49" charset="0"/>
             </a:endParaRPr>
-          </a:p>
-          <a:p>
-            <a:pPr marL="457200" lvl="1" indent="0">
-              <a:spcBef>
-                <a:spcPts val="0"/>
-              </a:spcBef>
-              <a:buNone/>
-            </a:pPr>
-            <a:endParaRPr lang="de-DE" altLang="de-DE" sz="1200" dirty="0">
-              <a:latin typeface="Consolas" panose="020B0609020204030204" pitchFamily="49" charset="0"/>
-            </a:endParaRPr>
-          </a:p>
-          <a:p>
-            <a:endParaRPr lang="de-DE" altLang="de-DE" dirty="0"/>
           </a:p>
         </p:txBody>
       </p:sp>
@@ -6327,7 +6161,7 @@
     </p:spTree>
     <p:extLst>
       <p:ext uri="{BB962C8B-B14F-4D97-AF65-F5344CB8AC3E}">
-        <p14:creationId xmlns:p14="http://schemas.microsoft.com/office/powerpoint/2010/main" val="1475861676"/>
+        <p14:creationId xmlns:p14="http://schemas.microsoft.com/office/powerpoint/2010/main" val="1311074186"/>
       </p:ext>
     </p:extLst>
   </p:cSld>
@@ -6380,314 +6214,101 @@
           <a:bodyPr/>
           <a:lstStyle/>
           <a:p>
-            <a:r>
-              <a:rPr lang="de-DE" altLang="de-DE" dirty="0" err="1">
-                <a:latin typeface="Consolas" panose="020B0609020204030204" pitchFamily="49" charset="0"/>
-              </a:rPr>
-              <a:t>git</a:t>
-            </a:r>
-            <a:r>
-              <a:rPr lang="de-DE" altLang="de-DE" dirty="0">
-                <a:latin typeface="Consolas" panose="020B0609020204030204" pitchFamily="49" charset="0"/>
-              </a:rPr>
-              <a:t> </a:t>
-            </a:r>
-            <a:r>
-              <a:rPr lang="de-DE" altLang="de-DE" dirty="0" err="1">
-                <a:latin typeface="Consolas" panose="020B0609020204030204" pitchFamily="49" charset="0"/>
-              </a:rPr>
-              <a:t>checkout</a:t>
-            </a:r>
-            <a:r>
-              <a:rPr lang="de-DE" altLang="de-DE" dirty="0">
-                <a:latin typeface="Consolas" panose="020B0609020204030204" pitchFamily="49" charset="0"/>
-              </a:rPr>
-              <a:t> &lt;tag-name&gt; </a:t>
-            </a:r>
+            <a:pPr marL="0" indent="0">
+              <a:buNone/>
+            </a:pPr>
+            <a:r>
+              <a:rPr lang="de-DE" altLang="de-DE" b="1" dirty="0" err="1"/>
+              <a:t>Annotated</a:t>
+            </a:r>
+            <a:r>
+              <a:rPr lang="de-DE" altLang="de-DE" b="1" dirty="0"/>
+              <a:t> und Lightweight Tags</a:t>
+            </a:r>
+          </a:p>
+          <a:p>
             <a:r>
               <a:rPr lang="de-DE" altLang="de-DE" dirty="0"/>
-              <a:t>ermöglicht Auschecken eines getaggten Commit</a:t>
-            </a:r>
-          </a:p>
-          <a:p>
-            <a:pPr marL="457200" lvl="1" indent="0">
-              <a:spcBef>
-                <a:spcPts val="0"/>
-              </a:spcBef>
-              <a:buNone/>
-            </a:pPr>
-            <a:endParaRPr lang="en-US" altLang="de-DE" sz="1200" dirty="0">
-              <a:latin typeface="Consolas" panose="020B0609020204030204" pitchFamily="49" charset="0"/>
-            </a:endParaRPr>
-          </a:p>
-          <a:p>
-            <a:pPr marL="457200" lvl="1" indent="0">
-              <a:spcBef>
-                <a:spcPts val="0"/>
-              </a:spcBef>
-              <a:buNone/>
-            </a:pPr>
-            <a:r>
-              <a:rPr lang="en-US" altLang="de-DE" sz="1200" dirty="0">
-                <a:latin typeface="Consolas" panose="020B0609020204030204" pitchFamily="49" charset="0"/>
-              </a:rPr>
-              <a:t>$ git checkout release-v0.0.1</a:t>
-            </a:r>
-          </a:p>
-          <a:p>
-            <a:pPr marL="457200" lvl="1" indent="0">
-              <a:spcBef>
-                <a:spcPts val="0"/>
-              </a:spcBef>
-              <a:buNone/>
-            </a:pPr>
-            <a:r>
-              <a:rPr lang="en-US" altLang="de-DE" sz="1200" dirty="0">
-                <a:latin typeface="Consolas" panose="020B0609020204030204" pitchFamily="49" charset="0"/>
-              </a:rPr>
-              <a:t>Note: switching to 'release-v0.0.1'.</a:t>
-            </a:r>
-          </a:p>
-          <a:p>
-            <a:pPr marL="457200" lvl="1" indent="0">
-              <a:spcBef>
-                <a:spcPts val="0"/>
-              </a:spcBef>
-              <a:buNone/>
-            </a:pPr>
-            <a:endParaRPr lang="en-US" altLang="de-DE" sz="1200" dirty="0">
-              <a:latin typeface="Consolas" panose="020B0609020204030204" pitchFamily="49" charset="0"/>
-            </a:endParaRPr>
-          </a:p>
-          <a:p>
-            <a:pPr marL="457200" lvl="1" indent="0">
-              <a:spcBef>
-                <a:spcPts val="0"/>
-              </a:spcBef>
-              <a:buNone/>
-            </a:pPr>
-            <a:r>
-              <a:rPr lang="en-US" altLang="de-DE" sz="1200" dirty="0">
-                <a:latin typeface="Consolas" panose="020B0609020204030204" pitchFamily="49" charset="0"/>
-              </a:rPr>
-              <a:t>You are in 'detached HEAD' state. You can look around, make experimental</a:t>
-            </a:r>
-          </a:p>
-          <a:p>
-            <a:pPr marL="457200" lvl="1" indent="0">
-              <a:spcBef>
-                <a:spcPts val="0"/>
-              </a:spcBef>
-              <a:buNone/>
-            </a:pPr>
-            <a:r>
-              <a:rPr lang="en-US" altLang="de-DE" sz="1200" dirty="0">
-                <a:latin typeface="Consolas" panose="020B0609020204030204" pitchFamily="49" charset="0"/>
-              </a:rPr>
-              <a:t>changes and commit them, and you can discard any commits you make in this</a:t>
-            </a:r>
-          </a:p>
-          <a:p>
-            <a:pPr marL="457200" lvl="1" indent="0">
-              <a:spcBef>
-                <a:spcPts val="0"/>
-              </a:spcBef>
-              <a:buNone/>
-            </a:pPr>
-            <a:r>
-              <a:rPr lang="en-US" altLang="de-DE" sz="1200" dirty="0">
-                <a:latin typeface="Consolas" panose="020B0609020204030204" pitchFamily="49" charset="0"/>
-              </a:rPr>
-              <a:t>state without impacting any branches by switching back to a branch.</a:t>
-            </a:r>
-          </a:p>
-          <a:p>
-            <a:pPr marL="457200" lvl="1" indent="0">
-              <a:spcBef>
-                <a:spcPts val="0"/>
-              </a:spcBef>
-              <a:buNone/>
-            </a:pPr>
-            <a:endParaRPr lang="en-US" altLang="de-DE" sz="1200" dirty="0">
-              <a:latin typeface="Consolas" panose="020B0609020204030204" pitchFamily="49" charset="0"/>
-            </a:endParaRPr>
-          </a:p>
-          <a:p>
-            <a:pPr marL="457200" lvl="1" indent="0">
-              <a:spcBef>
-                <a:spcPts val="0"/>
-              </a:spcBef>
-              <a:buNone/>
-            </a:pPr>
-            <a:r>
-              <a:rPr lang="en-US" altLang="de-DE" sz="1200" dirty="0">
-                <a:latin typeface="Consolas" panose="020B0609020204030204" pitchFamily="49" charset="0"/>
-              </a:rPr>
-              <a:t>If you want to create a new branch to retain commits you create, you may</a:t>
-            </a:r>
-          </a:p>
-          <a:p>
-            <a:pPr marL="457200" lvl="1" indent="0">
-              <a:spcBef>
-                <a:spcPts val="0"/>
-              </a:spcBef>
-              <a:buNone/>
-            </a:pPr>
-            <a:r>
-              <a:rPr lang="en-US" altLang="de-DE" sz="1200" dirty="0">
-                <a:latin typeface="Consolas" panose="020B0609020204030204" pitchFamily="49" charset="0"/>
-              </a:rPr>
-              <a:t>do so (now or later) by using -c with the switch command. Example:</a:t>
-            </a:r>
-          </a:p>
-          <a:p>
-            <a:pPr marL="457200" lvl="1" indent="0">
-              <a:spcBef>
-                <a:spcPts val="0"/>
-              </a:spcBef>
-              <a:buNone/>
-            </a:pPr>
-            <a:endParaRPr lang="en-US" altLang="de-DE" sz="1200" dirty="0">
-              <a:latin typeface="Consolas" panose="020B0609020204030204" pitchFamily="49" charset="0"/>
-            </a:endParaRPr>
-          </a:p>
-          <a:p>
-            <a:pPr marL="457200" lvl="1" indent="0">
-              <a:spcBef>
-                <a:spcPts val="0"/>
-              </a:spcBef>
-              <a:buNone/>
-            </a:pPr>
-            <a:r>
-              <a:rPr lang="en-US" altLang="de-DE" sz="1200" dirty="0">
-                <a:latin typeface="Consolas" panose="020B0609020204030204" pitchFamily="49" charset="0"/>
-              </a:rPr>
-              <a:t>  git switch -c &lt;new-branch-name&gt;</a:t>
-            </a:r>
-          </a:p>
-          <a:p>
-            <a:pPr marL="457200" lvl="1" indent="0">
-              <a:spcBef>
-                <a:spcPts val="0"/>
-              </a:spcBef>
-              <a:buNone/>
-            </a:pPr>
-            <a:endParaRPr lang="en-US" altLang="de-DE" sz="1200" dirty="0">
-              <a:latin typeface="Consolas" panose="020B0609020204030204" pitchFamily="49" charset="0"/>
-            </a:endParaRPr>
-          </a:p>
-          <a:p>
-            <a:pPr marL="457200" lvl="1" indent="0">
-              <a:spcBef>
-                <a:spcPts val="0"/>
-              </a:spcBef>
-              <a:buNone/>
-            </a:pPr>
-            <a:r>
-              <a:rPr lang="en-US" altLang="de-DE" sz="1200" dirty="0">
-                <a:latin typeface="Consolas" panose="020B0609020204030204" pitchFamily="49" charset="0"/>
-              </a:rPr>
-              <a:t>Or undo this operation with:</a:t>
-            </a:r>
-          </a:p>
-          <a:p>
-            <a:pPr marL="457200" lvl="1" indent="0">
-              <a:spcBef>
-                <a:spcPts val="0"/>
-              </a:spcBef>
-              <a:buNone/>
-            </a:pPr>
-            <a:endParaRPr lang="en-US" altLang="de-DE" sz="1200" dirty="0">
-              <a:latin typeface="Consolas" panose="020B0609020204030204" pitchFamily="49" charset="0"/>
-            </a:endParaRPr>
-          </a:p>
-          <a:p>
-            <a:pPr marL="457200" lvl="1" indent="0">
-              <a:spcBef>
-                <a:spcPts val="0"/>
-              </a:spcBef>
-              <a:buNone/>
-            </a:pPr>
-            <a:r>
-              <a:rPr lang="en-US" altLang="de-DE" sz="1200" dirty="0">
-                <a:latin typeface="Consolas" panose="020B0609020204030204" pitchFamily="49" charset="0"/>
-              </a:rPr>
-              <a:t>  git switch -</a:t>
-            </a:r>
-          </a:p>
-          <a:p>
-            <a:pPr marL="457200" lvl="1" indent="0">
-              <a:spcBef>
-                <a:spcPts val="0"/>
-              </a:spcBef>
-              <a:buNone/>
-            </a:pPr>
-            <a:endParaRPr lang="en-US" altLang="de-DE" sz="1200" dirty="0">
-              <a:latin typeface="Consolas" panose="020B0609020204030204" pitchFamily="49" charset="0"/>
-            </a:endParaRPr>
-          </a:p>
-          <a:p>
-            <a:pPr marL="457200" lvl="1" indent="0">
-              <a:spcBef>
-                <a:spcPts val="0"/>
-              </a:spcBef>
-              <a:buNone/>
-            </a:pPr>
-            <a:r>
-              <a:rPr lang="en-US" altLang="de-DE" sz="1200" dirty="0">
-                <a:latin typeface="Consolas" panose="020B0609020204030204" pitchFamily="49" charset="0"/>
-              </a:rPr>
-              <a:t>Turn off this advice by setting config variable </a:t>
-            </a:r>
-            <a:r>
-              <a:rPr lang="en-US" altLang="de-DE" sz="1200" dirty="0" err="1">
-                <a:latin typeface="Consolas" panose="020B0609020204030204" pitchFamily="49" charset="0"/>
-              </a:rPr>
-              <a:t>advice.detachedHead</a:t>
-            </a:r>
-            <a:r>
-              <a:rPr lang="en-US" altLang="de-DE" sz="1200" dirty="0">
-                <a:latin typeface="Consolas" panose="020B0609020204030204" pitchFamily="49" charset="0"/>
-              </a:rPr>
-              <a:t> to false</a:t>
-            </a:r>
-          </a:p>
-          <a:p>
-            <a:pPr marL="457200" lvl="1" indent="0">
-              <a:spcBef>
-                <a:spcPts val="0"/>
-              </a:spcBef>
-              <a:buNone/>
-            </a:pPr>
-            <a:endParaRPr lang="en-US" altLang="de-DE" sz="1200" dirty="0">
-              <a:latin typeface="Consolas" panose="020B0609020204030204" pitchFamily="49" charset="0"/>
-            </a:endParaRPr>
-          </a:p>
-          <a:p>
-            <a:pPr marL="457200" lvl="1" indent="0">
-              <a:spcBef>
-                <a:spcPts val="0"/>
-              </a:spcBef>
-              <a:buNone/>
-            </a:pPr>
-            <a:r>
-              <a:rPr lang="en-US" altLang="de-DE" sz="1200" dirty="0">
-                <a:latin typeface="Consolas" panose="020B0609020204030204" pitchFamily="49" charset="0"/>
-              </a:rPr>
-              <a:t>HEAD is now at c3a059e Add </a:t>
-            </a:r>
-            <a:r>
-              <a:rPr lang="en-US" altLang="de-DE" sz="1200" dirty="0" err="1">
-                <a:latin typeface="Consolas" panose="020B0609020204030204" pitchFamily="49" charset="0"/>
-              </a:rPr>
-              <a:t>final_file</a:t>
-            </a:r>
-            <a:endParaRPr lang="de-DE" altLang="de-DE" sz="1200" dirty="0">
-              <a:latin typeface="Consolas" panose="020B0609020204030204" pitchFamily="49" charset="0"/>
-            </a:endParaRPr>
-          </a:p>
-          <a:p>
-            <a:endParaRPr lang="de-DE" altLang="de-DE" dirty="0"/>
+              <a:t>Lightweight Tags geben Commit nur ein Alias</a:t>
+            </a:r>
+          </a:p>
+          <a:p>
+            <a:r>
+              <a:rPr lang="de-DE" altLang="de-DE" dirty="0" err="1"/>
+              <a:t>Annotated</a:t>
+            </a:r>
+            <a:r>
+              <a:rPr lang="de-DE" altLang="de-DE" dirty="0"/>
+              <a:t> Tags enthalten mehr Informationen</a:t>
+            </a:r>
+          </a:p>
+          <a:p>
+            <a:pPr lvl="1"/>
+            <a:r>
+              <a:rPr lang="de-DE" altLang="de-DE" dirty="0"/>
+              <a:t>Tagger Name</a:t>
+            </a:r>
+          </a:p>
+          <a:p>
+            <a:pPr lvl="1"/>
+            <a:r>
+              <a:rPr lang="de-DE" altLang="de-DE" dirty="0"/>
+              <a:t>Tagger E-Mail</a:t>
+            </a:r>
+          </a:p>
+          <a:p>
+            <a:pPr lvl="1"/>
+            <a:r>
+              <a:rPr lang="de-DE" altLang="de-DE" dirty="0"/>
+              <a:t>Datum</a:t>
+            </a:r>
+          </a:p>
+          <a:p>
+            <a:pPr lvl="1"/>
+            <a:r>
+              <a:rPr lang="de-DE" altLang="de-DE" dirty="0"/>
+              <a:t>Tagging Message</a:t>
+            </a:r>
+          </a:p>
+          <a:p>
+            <a:pPr lvl="1"/>
+            <a:r>
+              <a:rPr lang="de-DE" altLang="de-DE" dirty="0"/>
+              <a:t>Checksumme</a:t>
+            </a:r>
+          </a:p>
+          <a:p>
+            <a:pPr lvl="1"/>
+            <a:r>
+              <a:rPr lang="de-DE" altLang="de-DE" dirty="0"/>
+              <a:t>Signierung</a:t>
+            </a:r>
+          </a:p>
+          <a:p>
+            <a:r>
+              <a:rPr lang="de-DE" altLang="de-DE" dirty="0" err="1"/>
+              <a:t>Annotated</a:t>
+            </a:r>
+            <a:r>
+              <a:rPr lang="de-DE" altLang="de-DE" dirty="0"/>
+              <a:t> Tags sinnvoll bei </a:t>
+            </a:r>
+            <a:r>
+              <a:rPr lang="de-DE" altLang="de-DE" dirty="0" err="1"/>
+              <a:t>Mulit</a:t>
+            </a:r>
+            <a:r>
+              <a:rPr lang="de-DE" altLang="de-DE" dirty="0"/>
+              <a:t>-Developer oder </a:t>
+            </a:r>
+            <a:r>
+              <a:rPr lang="de-DE" altLang="de-DE" dirty="0" err="1"/>
+              <a:t>Mulit</a:t>
+            </a:r>
+            <a:r>
+              <a:rPr lang="de-DE" altLang="de-DE" dirty="0"/>
+              <a:t>-Repository Umgebungen</a:t>
+            </a:r>
           </a:p>
         </p:txBody>
       </p:sp>
@@ -6731,7 +6352,7 @@
     </p:spTree>
     <p:extLst>
       <p:ext uri="{BB962C8B-B14F-4D97-AF65-F5344CB8AC3E}">
-        <p14:creationId xmlns:p14="http://schemas.microsoft.com/office/powerpoint/2010/main" val="1904022772"/>
+        <p14:creationId xmlns:p14="http://schemas.microsoft.com/office/powerpoint/2010/main" val="968504568"/>
       </p:ext>
     </p:extLst>
   </p:cSld>
@@ -6785,6 +6406,23 @@
           <a:lstStyle/>
           <a:p>
             <a:r>
+              <a:rPr lang="de-DE" altLang="de-DE" dirty="0" err="1"/>
+              <a:t>Annotated</a:t>
+            </a:r>
+            <a:r>
+              <a:rPr lang="de-DE" altLang="de-DE" dirty="0"/>
+              <a:t> Tag erstellen</a:t>
+            </a:r>
+          </a:p>
+          <a:p>
+            <a:pPr marL="0" indent="0">
+              <a:buNone/>
+            </a:pPr>
+            <a:r>
+              <a:rPr lang="de-DE" altLang="de-DE" dirty="0"/>
+              <a:t>	</a:t>
+            </a:r>
+            <a:r>
               <a:rPr lang="de-DE" altLang="de-DE" dirty="0" err="1">
                 <a:latin typeface="Consolas" panose="020B0609020204030204" pitchFamily="49" charset="0"/>
               </a:rPr>
@@ -6794,44 +6432,16 @@
               <a:rPr lang="de-DE" altLang="de-DE" dirty="0">
                 <a:latin typeface="Consolas" panose="020B0609020204030204" pitchFamily="49" charset="0"/>
               </a:rPr>
-              <a:t> </a:t>
-            </a:r>
-            <a:r>
-              <a:rPr lang="de-DE" altLang="de-DE" dirty="0" err="1">
-                <a:latin typeface="Consolas" panose="020B0609020204030204" pitchFamily="49" charset="0"/>
-              </a:rPr>
-              <a:t>checkout</a:t>
-            </a:r>
-            <a:r>
-              <a:rPr lang="de-DE" altLang="de-DE" dirty="0">
-                <a:latin typeface="Consolas" panose="020B0609020204030204" pitchFamily="49" charset="0"/>
-              </a:rPr>
-              <a:t> –b &lt;</a:t>
-            </a:r>
-            <a:r>
-              <a:rPr lang="de-DE" altLang="de-DE" dirty="0" err="1">
-                <a:latin typeface="Consolas" panose="020B0609020204030204" pitchFamily="49" charset="0"/>
-              </a:rPr>
-              <a:t>branch</a:t>
-            </a:r>
-            <a:r>
-              <a:rPr lang="de-DE" altLang="de-DE" dirty="0">
-                <a:latin typeface="Consolas" panose="020B0609020204030204" pitchFamily="49" charset="0"/>
-              </a:rPr>
-              <a:t>-name&gt; &lt;tag-name&gt; </a:t>
-            </a:r>
-            <a:r>
-              <a:rPr lang="de-DE" altLang="de-DE" dirty="0"/>
-              <a:t>ermöglicht Erstellen eines </a:t>
-            </a:r>
-            <a:r>
-              <a:rPr lang="de-DE" altLang="de-DE" dirty="0" err="1"/>
-              <a:t>Branches</a:t>
-            </a:r>
-            <a:r>
-              <a:rPr lang="de-DE" altLang="de-DE" dirty="0"/>
-              <a:t> abzweigend vom getaggten Commit</a:t>
-            </a:r>
+              <a:t> tag -a &lt;tag-name&gt;</a:t>
+            </a:r>
+          </a:p>
+          <a:p>
+            <a:pPr marL="457200" lvl="1" indent="0">
+              <a:buNone/>
+            </a:pPr>
+            <a:endParaRPr lang="de-DE" altLang="de-DE" sz="1200" dirty="0">
+              <a:latin typeface="Consolas" panose="020B0609020204030204" pitchFamily="49" charset="0"/>
+            </a:endParaRPr>
           </a:p>
           <a:p>
             <a:pPr marL="457200" lvl="1" indent="0">
@@ -6840,9 +6450,36 @@
               </a:spcBef>
               <a:buNone/>
             </a:pPr>
-            <a:endParaRPr lang="en-US" altLang="de-DE" sz="1200" dirty="0">
-              <a:latin typeface="Consolas" panose="020B0609020204030204" pitchFamily="49" charset="0"/>
-            </a:endParaRPr>
+            <a:r>
+              <a:rPr lang="de-DE" altLang="de-DE" sz="1200" dirty="0">
+                <a:latin typeface="Consolas" panose="020B0609020204030204" pitchFamily="49" charset="0"/>
+              </a:rPr>
+              <a:t>$ </a:t>
+            </a:r>
+            <a:r>
+              <a:rPr lang="de-DE" altLang="de-DE" sz="1200" dirty="0" err="1">
+                <a:latin typeface="Consolas" panose="020B0609020204030204" pitchFamily="49" charset="0"/>
+              </a:rPr>
+              <a:t>git</a:t>
+            </a:r>
+            <a:r>
+              <a:rPr lang="de-DE" altLang="de-DE" sz="1200" dirty="0">
+                <a:latin typeface="Consolas" panose="020B0609020204030204" pitchFamily="49" charset="0"/>
+              </a:rPr>
+              <a:t> tag -a release-v1.0.0 -m "</a:t>
+            </a:r>
+            <a:r>
+              <a:rPr lang="de-DE" altLang="de-DE" sz="1200" dirty="0" err="1">
+                <a:latin typeface="Consolas" panose="020B0609020204030204" pitchFamily="49" charset="0"/>
+              </a:rPr>
+              <a:t>Latest</a:t>
+            </a:r>
+            <a:r>
+              <a:rPr lang="de-DE" altLang="de-DE" sz="1200" dirty="0">
+                <a:latin typeface="Consolas" panose="020B0609020204030204" pitchFamily="49" charset="0"/>
+              </a:rPr>
+              <a:t> v1 release"</a:t>
+            </a:r>
           </a:p>
           <a:p>
             <a:pPr marL="457200" lvl="1" indent="0">
@@ -6851,12 +6488,9 @@
               </a:spcBef>
               <a:buNone/>
             </a:pPr>
-            <a:r>
-              <a:rPr lang="en-US" altLang="de-DE" sz="1200" dirty="0">
-                <a:latin typeface="Consolas" panose="020B0609020204030204" pitchFamily="49" charset="0"/>
-              </a:rPr>
-              <a:t>$ git checkout -b hotfix release-v0.0.1</a:t>
-            </a:r>
+            <a:endParaRPr lang="de-DE" altLang="de-DE" sz="1200" dirty="0">
+              <a:latin typeface="Consolas" panose="020B0609020204030204" pitchFamily="49" charset="0"/>
+            </a:endParaRPr>
           </a:p>
           <a:p>
             <a:pPr marL="457200" lvl="1" indent="0">
@@ -6866,33 +6500,35 @@
               <a:buNone/>
             </a:pPr>
             <a:r>
-              <a:rPr lang="en-US" altLang="de-DE" sz="1200" dirty="0">
-                <a:latin typeface="Consolas" panose="020B0609020204030204" pitchFamily="49" charset="0"/>
-              </a:rPr>
-              <a:t>Switched to a new branch 'hotfix‘</a:t>
-            </a:r>
-            <a:endParaRPr lang="de-DE" altLang="de-DE" sz="1200" dirty="0">
-              <a:latin typeface="Consolas" panose="020B0609020204030204" pitchFamily="49" charset="0"/>
-            </a:endParaRPr>
-          </a:p>
-          <a:p>
-            <a:r>
-              <a:rPr lang="de-DE" altLang="de-DE" dirty="0"/>
-              <a:t>Löschen eines Tags ist mit </a:t>
-            </a:r>
-            <a:r>
-              <a:rPr lang="de-DE" altLang="de-DE" dirty="0" err="1">
+              <a:rPr lang="de-DE" altLang="de-DE" sz="1200" dirty="0">
+                <a:latin typeface="Consolas" panose="020B0609020204030204" pitchFamily="49" charset="0"/>
+              </a:rPr>
+              <a:t>$ </a:t>
+            </a:r>
+            <a:r>
+              <a:rPr lang="de-DE" altLang="de-DE" sz="1200" dirty="0" err="1">
                 <a:latin typeface="Consolas" panose="020B0609020204030204" pitchFamily="49" charset="0"/>
               </a:rPr>
               <a:t>git</a:t>
             </a:r>
             <a:r>
-              <a:rPr lang="de-DE" altLang="de-DE" dirty="0">
-                <a:latin typeface="Consolas" panose="020B0609020204030204" pitchFamily="49" charset="0"/>
-              </a:rPr>
-              <a:t> tag -d &lt;tag-name&gt;</a:t>
-            </a:r>
-            <a:endParaRPr lang="de-DE" altLang="de-DE" dirty="0"/>
+              <a:rPr lang="de-DE" altLang="de-DE" sz="1200" dirty="0">
+                <a:latin typeface="Consolas" panose="020B0609020204030204" pitchFamily="49" charset="0"/>
+              </a:rPr>
+              <a:t> </a:t>
+            </a:r>
+            <a:r>
+              <a:rPr lang="de-DE" altLang="de-DE" sz="1200" dirty="0" err="1">
+                <a:latin typeface="Consolas" panose="020B0609020204030204" pitchFamily="49" charset="0"/>
+              </a:rPr>
+              <a:t>show</a:t>
+            </a:r>
+            <a:r>
+              <a:rPr lang="de-DE" altLang="de-DE" sz="1200" dirty="0">
+                <a:latin typeface="Consolas" panose="020B0609020204030204" pitchFamily="49" charset="0"/>
+              </a:rPr>
+              <a:t> release-v1.0.0</a:t>
+            </a:r>
           </a:p>
           <a:p>
             <a:pPr marL="457200" lvl="1" indent="0">
@@ -6901,9 +6537,12 @@
               </a:spcBef>
               <a:buNone/>
             </a:pPr>
-            <a:endParaRPr lang="en-US" altLang="de-DE" sz="1200" dirty="0">
-              <a:latin typeface="Consolas" panose="020B0609020204030204" pitchFamily="49" charset="0"/>
-            </a:endParaRPr>
+            <a:r>
+              <a:rPr lang="de-DE" altLang="de-DE" sz="1200" dirty="0">
+                <a:latin typeface="Consolas" panose="020B0609020204030204" pitchFamily="49" charset="0"/>
+              </a:rPr>
+              <a:t>tag release-v1.0.0</a:t>
+            </a:r>
           </a:p>
           <a:p>
             <a:pPr marL="457200" lvl="1" indent="0">
@@ -6913,10 +6552,10 @@
               <a:buNone/>
             </a:pPr>
             <a:r>
-              <a:rPr lang="en-US" altLang="de-DE" sz="1200" dirty="0">
-                <a:latin typeface="Consolas" panose="020B0609020204030204" pitchFamily="49" charset="0"/>
-              </a:rPr>
-              <a:t>$ git tag -d release-v0.0.0</a:t>
+              <a:rPr lang="de-DE" altLang="de-DE" sz="1200" dirty="0">
+                <a:latin typeface="Consolas" panose="020B0609020204030204" pitchFamily="49" charset="0"/>
+              </a:rPr>
+              <a:t>Tagger: Christopher Keutner &lt;christopher.keutner@alumni.fh-aachen.de&gt;</a:t>
             </a:r>
           </a:p>
           <a:p>
@@ -6927,14 +6566,272 @@
               <a:buNone/>
             </a:pPr>
             <a:r>
-              <a:rPr lang="en-US" altLang="de-DE" sz="1200" dirty="0">
-                <a:latin typeface="Consolas" panose="020B0609020204030204" pitchFamily="49" charset="0"/>
-              </a:rPr>
-              <a:t>Deleted tag 'release-v0.0.0' (was a908be7)</a:t>
-            </a:r>
+              <a:rPr lang="de-DE" altLang="de-DE" sz="1200" dirty="0">
+                <a:latin typeface="Consolas" panose="020B0609020204030204" pitchFamily="49" charset="0"/>
+              </a:rPr>
+              <a:t>Date:   Tue May 28 15:13:44 2024 +0200</a:t>
+            </a:r>
+          </a:p>
+          <a:p>
+            <a:pPr marL="457200" lvl="1" indent="0">
+              <a:spcBef>
+                <a:spcPts val="0"/>
+              </a:spcBef>
+              <a:buNone/>
+            </a:pPr>
             <a:endParaRPr lang="de-DE" altLang="de-DE" sz="1200" dirty="0">
               <a:latin typeface="Consolas" panose="020B0609020204030204" pitchFamily="49" charset="0"/>
             </a:endParaRPr>
+          </a:p>
+          <a:p>
+            <a:pPr marL="457200" lvl="1" indent="0">
+              <a:spcBef>
+                <a:spcPts val="0"/>
+              </a:spcBef>
+              <a:buNone/>
+            </a:pPr>
+            <a:r>
+              <a:rPr lang="de-DE" altLang="de-DE" sz="1200" dirty="0" err="1">
+                <a:latin typeface="Consolas" panose="020B0609020204030204" pitchFamily="49" charset="0"/>
+              </a:rPr>
+              <a:t>Latest</a:t>
+            </a:r>
+            <a:r>
+              <a:rPr lang="de-DE" altLang="de-DE" sz="1200" dirty="0">
+                <a:latin typeface="Consolas" panose="020B0609020204030204" pitchFamily="49" charset="0"/>
+              </a:rPr>
+              <a:t> v1 release</a:t>
+            </a:r>
+          </a:p>
+          <a:p>
+            <a:pPr marL="457200" lvl="1" indent="0">
+              <a:spcBef>
+                <a:spcPts val="0"/>
+              </a:spcBef>
+              <a:buNone/>
+            </a:pPr>
+            <a:endParaRPr lang="de-DE" altLang="de-DE" sz="1200" dirty="0">
+              <a:latin typeface="Consolas" panose="020B0609020204030204" pitchFamily="49" charset="0"/>
+            </a:endParaRPr>
+          </a:p>
+          <a:p>
+            <a:pPr marL="457200" lvl="1" indent="0">
+              <a:spcBef>
+                <a:spcPts val="0"/>
+              </a:spcBef>
+              <a:buNone/>
+            </a:pPr>
+            <a:r>
+              <a:rPr lang="de-DE" altLang="de-DE" sz="1200" dirty="0" err="1">
+                <a:latin typeface="Consolas" panose="020B0609020204030204" pitchFamily="49" charset="0"/>
+              </a:rPr>
+              <a:t>commit</a:t>
+            </a:r>
+            <a:r>
+              <a:rPr lang="de-DE" altLang="de-DE" sz="1200" dirty="0">
+                <a:latin typeface="Consolas" panose="020B0609020204030204" pitchFamily="49" charset="0"/>
+              </a:rPr>
+              <a:t> 11f6b62f8bc7a3403ceae4e8923d7a54abab7b6d (HEAD -&gt; </a:t>
+            </a:r>
+            <a:r>
+              <a:rPr lang="de-DE" altLang="de-DE" sz="1200" dirty="0" err="1">
+                <a:latin typeface="Consolas" panose="020B0609020204030204" pitchFamily="49" charset="0"/>
+              </a:rPr>
+              <a:t>main</a:t>
+            </a:r>
+            <a:r>
+              <a:rPr lang="de-DE" altLang="de-DE" sz="1200" dirty="0">
+                <a:latin typeface="Consolas" panose="020B0609020204030204" pitchFamily="49" charset="0"/>
+              </a:rPr>
+              <a:t>, tag: release-v1.0.0)</a:t>
+            </a:r>
+          </a:p>
+          <a:p>
+            <a:pPr marL="457200" lvl="1" indent="0">
+              <a:spcBef>
+                <a:spcPts val="0"/>
+              </a:spcBef>
+              <a:buNone/>
+            </a:pPr>
+            <a:r>
+              <a:rPr lang="de-DE" altLang="de-DE" sz="1200" dirty="0" err="1">
+                <a:latin typeface="Consolas" panose="020B0609020204030204" pitchFamily="49" charset="0"/>
+              </a:rPr>
+              <a:t>Author</a:t>
+            </a:r>
+            <a:r>
+              <a:rPr lang="de-DE" altLang="de-DE" sz="1200" dirty="0">
+                <a:latin typeface="Consolas" panose="020B0609020204030204" pitchFamily="49" charset="0"/>
+              </a:rPr>
+              <a:t>: Christopher Keutner &lt;christopher.keutner@alumni.fh-aachen.de&gt;</a:t>
+            </a:r>
+          </a:p>
+          <a:p>
+            <a:pPr marL="457200" lvl="1" indent="0">
+              <a:spcBef>
+                <a:spcPts val="0"/>
+              </a:spcBef>
+              <a:buNone/>
+            </a:pPr>
+            <a:r>
+              <a:rPr lang="de-DE" altLang="de-DE" sz="1200" dirty="0">
+                <a:latin typeface="Consolas" panose="020B0609020204030204" pitchFamily="49" charset="0"/>
+              </a:rPr>
+              <a:t>Date:   Tue May 28 15:13:10 2024 +0200</a:t>
+            </a:r>
+          </a:p>
+          <a:p>
+            <a:pPr marL="457200" lvl="1" indent="0">
+              <a:spcBef>
+                <a:spcPts val="0"/>
+              </a:spcBef>
+              <a:buNone/>
+            </a:pPr>
+            <a:endParaRPr lang="de-DE" altLang="de-DE" sz="1200" dirty="0">
+              <a:latin typeface="Consolas" panose="020B0609020204030204" pitchFamily="49" charset="0"/>
+            </a:endParaRPr>
+          </a:p>
+          <a:p>
+            <a:pPr marL="457200" lvl="1" indent="0">
+              <a:spcBef>
+                <a:spcPts val="0"/>
+              </a:spcBef>
+              <a:buNone/>
+            </a:pPr>
+            <a:r>
+              <a:rPr lang="de-DE" altLang="de-DE" sz="1200" dirty="0">
+                <a:latin typeface="Consolas" panose="020B0609020204030204" pitchFamily="49" charset="0"/>
+              </a:rPr>
+              <a:t>    Add </a:t>
+            </a:r>
+            <a:r>
+              <a:rPr lang="de-DE" altLang="de-DE" sz="1200" dirty="0" err="1">
+                <a:latin typeface="Consolas" panose="020B0609020204030204" pitchFamily="49" charset="0"/>
+              </a:rPr>
+              <a:t>new</a:t>
+            </a:r>
+            <a:r>
+              <a:rPr lang="de-DE" altLang="de-DE" sz="1200" dirty="0">
+                <a:latin typeface="Consolas" panose="020B0609020204030204" pitchFamily="49" charset="0"/>
+              </a:rPr>
+              <a:t> </a:t>
+            </a:r>
+            <a:r>
+              <a:rPr lang="de-DE" altLang="de-DE" sz="1200" dirty="0" err="1">
+                <a:latin typeface="Consolas" panose="020B0609020204030204" pitchFamily="49" charset="0"/>
+              </a:rPr>
+              <a:t>file</a:t>
+            </a:r>
+            <a:endParaRPr lang="de-DE" altLang="de-DE" sz="1200" dirty="0">
+              <a:latin typeface="Consolas" panose="020B0609020204030204" pitchFamily="49" charset="0"/>
+            </a:endParaRPr>
+          </a:p>
+          <a:p>
+            <a:pPr marL="457200" lvl="1" indent="0">
+              <a:spcBef>
+                <a:spcPts val="0"/>
+              </a:spcBef>
+              <a:buNone/>
+            </a:pPr>
+            <a:endParaRPr lang="de-DE" altLang="de-DE" sz="1200" dirty="0">
+              <a:latin typeface="Consolas" panose="020B0609020204030204" pitchFamily="49" charset="0"/>
+            </a:endParaRPr>
+          </a:p>
+          <a:p>
+            <a:pPr marL="457200" lvl="1" indent="0">
+              <a:spcBef>
+                <a:spcPts val="0"/>
+              </a:spcBef>
+              <a:buNone/>
+            </a:pPr>
+            <a:r>
+              <a:rPr lang="de-DE" altLang="de-DE" sz="1200" dirty="0" err="1">
+                <a:latin typeface="Consolas" panose="020B0609020204030204" pitchFamily="49" charset="0"/>
+              </a:rPr>
+              <a:t>diff</a:t>
+            </a:r>
+            <a:r>
+              <a:rPr lang="de-DE" altLang="de-DE" sz="1200" dirty="0">
+                <a:latin typeface="Consolas" panose="020B0609020204030204" pitchFamily="49" charset="0"/>
+              </a:rPr>
+              <a:t> --</a:t>
+            </a:r>
+            <a:r>
+              <a:rPr lang="de-DE" altLang="de-DE" sz="1200" dirty="0" err="1">
+                <a:latin typeface="Consolas" panose="020B0609020204030204" pitchFamily="49" charset="0"/>
+              </a:rPr>
+              <a:t>git</a:t>
+            </a:r>
+            <a:r>
+              <a:rPr lang="de-DE" altLang="de-DE" sz="1200" dirty="0">
+                <a:latin typeface="Consolas" panose="020B0609020204030204" pitchFamily="49" charset="0"/>
+              </a:rPr>
+              <a:t> a/file8.txt b/file8.txt</a:t>
+            </a:r>
+          </a:p>
+          <a:p>
+            <a:pPr marL="457200" lvl="1" indent="0">
+              <a:spcBef>
+                <a:spcPts val="0"/>
+              </a:spcBef>
+              <a:buNone/>
+            </a:pPr>
+            <a:r>
+              <a:rPr lang="de-DE" altLang="de-DE" sz="1200" dirty="0" err="1">
+                <a:latin typeface="Consolas" panose="020B0609020204030204" pitchFamily="49" charset="0"/>
+              </a:rPr>
+              <a:t>new</a:t>
+            </a:r>
+            <a:r>
+              <a:rPr lang="de-DE" altLang="de-DE" sz="1200" dirty="0">
+                <a:latin typeface="Consolas" panose="020B0609020204030204" pitchFamily="49" charset="0"/>
+              </a:rPr>
+              <a:t> </a:t>
+            </a:r>
+            <a:r>
+              <a:rPr lang="de-DE" altLang="de-DE" sz="1200" dirty="0" err="1">
+                <a:latin typeface="Consolas" panose="020B0609020204030204" pitchFamily="49" charset="0"/>
+              </a:rPr>
+              <a:t>file</a:t>
+            </a:r>
+            <a:r>
+              <a:rPr lang="de-DE" altLang="de-DE" sz="1200" dirty="0">
+                <a:latin typeface="Consolas" panose="020B0609020204030204" pitchFamily="49" charset="0"/>
+              </a:rPr>
+              <a:t> </a:t>
+            </a:r>
+            <a:r>
+              <a:rPr lang="de-DE" altLang="de-DE" sz="1200" dirty="0" err="1">
+                <a:latin typeface="Consolas" panose="020B0609020204030204" pitchFamily="49" charset="0"/>
+              </a:rPr>
+              <a:t>mode</a:t>
+            </a:r>
+            <a:r>
+              <a:rPr lang="de-DE" altLang="de-DE" sz="1200" dirty="0">
+                <a:latin typeface="Consolas" panose="020B0609020204030204" pitchFamily="49" charset="0"/>
+              </a:rPr>
+              <a:t> 100644</a:t>
+            </a:r>
+          </a:p>
+          <a:p>
+            <a:pPr marL="457200" lvl="1" indent="0">
+              <a:spcBef>
+                <a:spcPts val="0"/>
+              </a:spcBef>
+              <a:buNone/>
+            </a:pPr>
+            <a:r>
+              <a:rPr lang="de-DE" altLang="de-DE" sz="1200" dirty="0" err="1">
+                <a:latin typeface="Consolas" panose="020B0609020204030204" pitchFamily="49" charset="0"/>
+              </a:rPr>
+              <a:t>index</a:t>
+            </a:r>
+            <a:r>
+              <a:rPr lang="de-DE" altLang="de-DE" sz="1200" dirty="0">
+                <a:latin typeface="Consolas" panose="020B0609020204030204" pitchFamily="49" charset="0"/>
+              </a:rPr>
+              <a:t> 0000000..e69de29</a:t>
+            </a:r>
           </a:p>
         </p:txBody>
       </p:sp>
@@ -6978,7 +6875,7 @@
     </p:spTree>
     <p:extLst>
       <p:ext uri="{BB962C8B-B14F-4D97-AF65-F5344CB8AC3E}">
-        <p14:creationId xmlns:p14="http://schemas.microsoft.com/office/powerpoint/2010/main" val="1311074186"/>
+        <p14:creationId xmlns:p14="http://schemas.microsoft.com/office/powerpoint/2010/main" val="641179957"/>
       </p:ext>
     </p:extLst>
   </p:cSld>
@@ -6989,720 +6886,6 @@
 </file>
 
 <file path=ppt/slides/slide13.xml><?xml version="1.0" encoding="utf-8"?>
-<p:sld xmlns:a="http://schemas.openxmlformats.org/drawingml/2006/main" xmlns:r="http://schemas.openxmlformats.org/officeDocument/2006/relationships" xmlns:p="http://schemas.openxmlformats.org/presentationml/2006/main">
-  <p:cSld>
-    <p:spTree>
-      <p:nvGrpSpPr>
-        <p:cNvPr id="1" name=""/>
-        <p:cNvGrpSpPr/>
-        <p:nvPr/>
-      </p:nvGrpSpPr>
-      <p:grpSpPr>
-        <a:xfrm>
-          <a:off x="0" y="0"/>
-          <a:ext cx="0" cy="0"/>
-          <a:chOff x="0" y="0"/>
-          <a:chExt cx="0" cy="0"/>
-        </a:xfrm>
-      </p:grpSpPr>
-      <p:sp>
-        <p:nvSpPr>
-          <p:cNvPr id="6146" name="Inhaltsplatzhalter 18">
-            <a:extLst>
-              <a:ext uri="{FF2B5EF4-FFF2-40B4-BE49-F238E27FC236}">
-                <a16:creationId xmlns:a16="http://schemas.microsoft.com/office/drawing/2014/main" id="{BE3C4C95-FD5D-27F0-ED0C-AB8113CAC9F1}"/>
-              </a:ext>
-            </a:extLst>
-          </p:cNvPr>
-          <p:cNvSpPr>
-            <a:spLocks noGrp="1"/>
-          </p:cNvSpPr>
-          <p:nvPr>
-            <p:ph idx="1"/>
-          </p:nvPr>
-        </p:nvSpPr>
-        <p:spPr>
-          <a:xfrm>
-            <a:off x="303214" y="981075"/>
-            <a:ext cx="8517258" cy="5400675"/>
-          </a:xfrm>
-        </p:spPr>
-        <p:txBody>
-          <a:bodyPr/>
-          <a:lstStyle/>
-          <a:p>
-            <a:pPr marL="0" indent="0">
-              <a:buNone/>
-            </a:pPr>
-            <a:r>
-              <a:rPr lang="de-DE" altLang="de-DE" b="1" dirty="0" err="1"/>
-              <a:t>Annotated</a:t>
-            </a:r>
-            <a:r>
-              <a:rPr lang="de-DE" altLang="de-DE" b="1" dirty="0"/>
-              <a:t> und Lightweight Tags</a:t>
-            </a:r>
-          </a:p>
-          <a:p>
-            <a:r>
-              <a:rPr lang="de-DE" altLang="de-DE" dirty="0"/>
-              <a:t>Lightweight Tags geben Commit nur ein Alias</a:t>
-            </a:r>
-          </a:p>
-          <a:p>
-            <a:r>
-              <a:rPr lang="de-DE" altLang="de-DE" dirty="0" err="1"/>
-              <a:t>Annotated</a:t>
-            </a:r>
-            <a:r>
-              <a:rPr lang="de-DE" altLang="de-DE" dirty="0"/>
-              <a:t> Tags enthalten mehr Informationen</a:t>
-            </a:r>
-          </a:p>
-          <a:p>
-            <a:pPr lvl="1"/>
-            <a:r>
-              <a:rPr lang="de-DE" altLang="de-DE" dirty="0"/>
-              <a:t>Tagger Name</a:t>
-            </a:r>
-          </a:p>
-          <a:p>
-            <a:pPr lvl="1"/>
-            <a:r>
-              <a:rPr lang="de-DE" altLang="de-DE" dirty="0"/>
-              <a:t>Tagger E-Mail</a:t>
-            </a:r>
-          </a:p>
-          <a:p>
-            <a:pPr lvl="1"/>
-            <a:r>
-              <a:rPr lang="de-DE" altLang="de-DE" dirty="0"/>
-              <a:t>Datum</a:t>
-            </a:r>
-          </a:p>
-          <a:p>
-            <a:pPr lvl="1"/>
-            <a:r>
-              <a:rPr lang="de-DE" altLang="de-DE" dirty="0"/>
-              <a:t>Tagging Message</a:t>
-            </a:r>
-          </a:p>
-          <a:p>
-            <a:pPr lvl="1"/>
-            <a:r>
-              <a:rPr lang="de-DE" altLang="de-DE" dirty="0"/>
-              <a:t>Checksumme</a:t>
-            </a:r>
-          </a:p>
-          <a:p>
-            <a:pPr lvl="1"/>
-            <a:r>
-              <a:rPr lang="de-DE" altLang="de-DE" dirty="0"/>
-              <a:t>Signierung</a:t>
-            </a:r>
-          </a:p>
-          <a:p>
-            <a:r>
-              <a:rPr lang="de-DE" altLang="de-DE" dirty="0" err="1"/>
-              <a:t>Annotated</a:t>
-            </a:r>
-            <a:r>
-              <a:rPr lang="de-DE" altLang="de-DE" dirty="0"/>
-              <a:t> Tags sinnvoll bei </a:t>
-            </a:r>
-            <a:r>
-              <a:rPr lang="de-DE" altLang="de-DE" dirty="0" err="1"/>
-              <a:t>Mulit</a:t>
-            </a:r>
-            <a:r>
-              <a:rPr lang="de-DE" altLang="de-DE" dirty="0"/>
-              <a:t>-Developer oder </a:t>
-            </a:r>
-            <a:r>
-              <a:rPr lang="de-DE" altLang="de-DE" dirty="0" err="1"/>
-              <a:t>Mulit</a:t>
-            </a:r>
-            <a:r>
-              <a:rPr lang="de-DE" altLang="de-DE" dirty="0"/>
-              <a:t>-Repository Umgebungen</a:t>
-            </a:r>
-          </a:p>
-        </p:txBody>
-      </p:sp>
-      <p:sp>
-        <p:nvSpPr>
-          <p:cNvPr id="6147" name="Rectangle 1062">
-            <a:extLst>
-              <a:ext uri="{FF2B5EF4-FFF2-40B4-BE49-F238E27FC236}">
-                <a16:creationId xmlns:a16="http://schemas.microsoft.com/office/drawing/2014/main" id="{C46E9340-3256-8D55-A265-94F2F41E288E}"/>
-              </a:ext>
-            </a:extLst>
-          </p:cNvPr>
-          <p:cNvSpPr>
-            <a:spLocks noGrp="1" noChangeArrowheads="1"/>
-          </p:cNvSpPr>
-          <p:nvPr>
-            <p:ph type="title"/>
-          </p:nvPr>
-        </p:nvSpPr>
-        <p:spPr>
-          <a:xfrm>
-            <a:off x="285750" y="142875"/>
-            <a:ext cx="5654675" cy="706438"/>
-          </a:xfrm>
-        </p:spPr>
-        <p:txBody>
-          <a:bodyPr/>
-          <a:lstStyle/>
-          <a:p>
-            <a:r>
-              <a:rPr lang="de-DE" altLang="de-DE" dirty="0" err="1"/>
-              <a:t>Git</a:t>
-            </a:r>
-            <a:r>
-              <a:rPr lang="de-DE" altLang="de-DE" dirty="0"/>
-              <a:t> – Tags </a:t>
-            </a:r>
-          </a:p>
-        </p:txBody>
-      </p:sp>
-    </p:spTree>
-    <p:extLst>
-      <p:ext uri="{BB962C8B-B14F-4D97-AF65-F5344CB8AC3E}">
-        <p14:creationId xmlns:p14="http://schemas.microsoft.com/office/powerpoint/2010/main" val="968504568"/>
-      </p:ext>
-    </p:extLst>
-  </p:cSld>
-  <p:clrMapOvr>
-    <a:masterClrMapping/>
-  </p:clrMapOvr>
-</p:sld>
-</file>
-
-<file path=ppt/slides/slide14.xml><?xml version="1.0" encoding="utf-8"?>
-<p:sld xmlns:a="http://schemas.openxmlformats.org/drawingml/2006/main" xmlns:r="http://schemas.openxmlformats.org/officeDocument/2006/relationships" xmlns:p="http://schemas.openxmlformats.org/presentationml/2006/main">
-  <p:cSld>
-    <p:spTree>
-      <p:nvGrpSpPr>
-        <p:cNvPr id="1" name=""/>
-        <p:cNvGrpSpPr/>
-        <p:nvPr/>
-      </p:nvGrpSpPr>
-      <p:grpSpPr>
-        <a:xfrm>
-          <a:off x="0" y="0"/>
-          <a:ext cx="0" cy="0"/>
-          <a:chOff x="0" y="0"/>
-          <a:chExt cx="0" cy="0"/>
-        </a:xfrm>
-      </p:grpSpPr>
-      <p:sp>
-        <p:nvSpPr>
-          <p:cNvPr id="6146" name="Inhaltsplatzhalter 18">
-            <a:extLst>
-              <a:ext uri="{FF2B5EF4-FFF2-40B4-BE49-F238E27FC236}">
-                <a16:creationId xmlns:a16="http://schemas.microsoft.com/office/drawing/2014/main" id="{BE3C4C95-FD5D-27F0-ED0C-AB8113CAC9F1}"/>
-              </a:ext>
-            </a:extLst>
-          </p:cNvPr>
-          <p:cNvSpPr>
-            <a:spLocks noGrp="1"/>
-          </p:cNvSpPr>
-          <p:nvPr>
-            <p:ph idx="1"/>
-          </p:nvPr>
-        </p:nvSpPr>
-        <p:spPr>
-          <a:xfrm>
-            <a:off x="303214" y="981075"/>
-            <a:ext cx="8517258" cy="5400675"/>
-          </a:xfrm>
-        </p:spPr>
-        <p:txBody>
-          <a:bodyPr/>
-          <a:lstStyle/>
-          <a:p>
-            <a:r>
-              <a:rPr lang="de-DE" altLang="de-DE" dirty="0" err="1"/>
-              <a:t>Annotated</a:t>
-            </a:r>
-            <a:r>
-              <a:rPr lang="de-DE" altLang="de-DE" dirty="0"/>
-              <a:t> Tag erstellen</a:t>
-            </a:r>
-          </a:p>
-          <a:p>
-            <a:pPr marL="0" indent="0">
-              <a:buNone/>
-            </a:pPr>
-            <a:r>
-              <a:rPr lang="de-DE" altLang="de-DE" dirty="0"/>
-              <a:t>	</a:t>
-            </a:r>
-            <a:r>
-              <a:rPr lang="de-DE" altLang="de-DE" dirty="0" err="1">
-                <a:latin typeface="Consolas" panose="020B0609020204030204" pitchFamily="49" charset="0"/>
-              </a:rPr>
-              <a:t>git</a:t>
-            </a:r>
-            <a:r>
-              <a:rPr lang="de-DE" altLang="de-DE" dirty="0">
-                <a:latin typeface="Consolas" panose="020B0609020204030204" pitchFamily="49" charset="0"/>
-              </a:rPr>
-              <a:t> tag -a &lt;tag-name&gt;</a:t>
-            </a:r>
-          </a:p>
-          <a:p>
-            <a:pPr marL="457200" lvl="1" indent="0">
-              <a:buNone/>
-            </a:pPr>
-            <a:endParaRPr lang="de-DE" altLang="de-DE" sz="1200" dirty="0">
-              <a:latin typeface="Consolas" panose="020B0609020204030204" pitchFamily="49" charset="0"/>
-            </a:endParaRPr>
-          </a:p>
-          <a:p>
-            <a:pPr marL="457200" lvl="1" indent="0">
-              <a:spcBef>
-                <a:spcPts val="0"/>
-              </a:spcBef>
-              <a:buNone/>
-            </a:pPr>
-            <a:r>
-              <a:rPr lang="de-DE" altLang="de-DE" sz="1200" dirty="0">
-                <a:latin typeface="Consolas" panose="020B0609020204030204" pitchFamily="49" charset="0"/>
-              </a:rPr>
-              <a:t>$ </a:t>
-            </a:r>
-            <a:r>
-              <a:rPr lang="de-DE" altLang="de-DE" sz="1200" dirty="0" err="1">
-                <a:latin typeface="Consolas" panose="020B0609020204030204" pitchFamily="49" charset="0"/>
-              </a:rPr>
-              <a:t>git</a:t>
-            </a:r>
-            <a:r>
-              <a:rPr lang="de-DE" altLang="de-DE" sz="1200" dirty="0">
-                <a:latin typeface="Consolas" panose="020B0609020204030204" pitchFamily="49" charset="0"/>
-              </a:rPr>
-              <a:t> tag -a release-v1.0.0 -m "</a:t>
-            </a:r>
-            <a:r>
-              <a:rPr lang="de-DE" altLang="de-DE" sz="1200" dirty="0" err="1">
-                <a:latin typeface="Consolas" panose="020B0609020204030204" pitchFamily="49" charset="0"/>
-              </a:rPr>
-              <a:t>Latest</a:t>
-            </a:r>
-            <a:r>
-              <a:rPr lang="de-DE" altLang="de-DE" sz="1200" dirty="0">
-                <a:latin typeface="Consolas" panose="020B0609020204030204" pitchFamily="49" charset="0"/>
-              </a:rPr>
-              <a:t> v1 release"</a:t>
-            </a:r>
-          </a:p>
-          <a:p>
-            <a:pPr marL="457200" lvl="1" indent="0">
-              <a:spcBef>
-                <a:spcPts val="0"/>
-              </a:spcBef>
-              <a:buNone/>
-            </a:pPr>
-            <a:endParaRPr lang="de-DE" altLang="de-DE" sz="1200" dirty="0">
-              <a:latin typeface="Consolas" panose="020B0609020204030204" pitchFamily="49" charset="0"/>
-            </a:endParaRPr>
-          </a:p>
-          <a:p>
-            <a:pPr marL="457200" lvl="1" indent="0">
-              <a:spcBef>
-                <a:spcPts val="0"/>
-              </a:spcBef>
-              <a:buNone/>
-            </a:pPr>
-            <a:r>
-              <a:rPr lang="de-DE" altLang="de-DE" sz="1200" dirty="0">
-                <a:latin typeface="Consolas" panose="020B0609020204030204" pitchFamily="49" charset="0"/>
-              </a:rPr>
-              <a:t>$ </a:t>
-            </a:r>
-            <a:r>
-              <a:rPr lang="de-DE" altLang="de-DE" sz="1200" dirty="0" err="1">
-                <a:latin typeface="Consolas" panose="020B0609020204030204" pitchFamily="49" charset="0"/>
-              </a:rPr>
-              <a:t>git</a:t>
-            </a:r>
-            <a:r>
-              <a:rPr lang="de-DE" altLang="de-DE" sz="1200" dirty="0">
-                <a:latin typeface="Consolas" panose="020B0609020204030204" pitchFamily="49" charset="0"/>
-              </a:rPr>
-              <a:t> </a:t>
-            </a:r>
-            <a:r>
-              <a:rPr lang="de-DE" altLang="de-DE" sz="1200" dirty="0" err="1">
-                <a:latin typeface="Consolas" panose="020B0609020204030204" pitchFamily="49" charset="0"/>
-              </a:rPr>
-              <a:t>show</a:t>
-            </a:r>
-            <a:r>
-              <a:rPr lang="de-DE" altLang="de-DE" sz="1200" dirty="0">
-                <a:latin typeface="Consolas" panose="020B0609020204030204" pitchFamily="49" charset="0"/>
-              </a:rPr>
-              <a:t> release-v1.0.0</a:t>
-            </a:r>
-          </a:p>
-          <a:p>
-            <a:pPr marL="457200" lvl="1" indent="0">
-              <a:spcBef>
-                <a:spcPts val="0"/>
-              </a:spcBef>
-              <a:buNone/>
-            </a:pPr>
-            <a:r>
-              <a:rPr lang="de-DE" altLang="de-DE" sz="1200" dirty="0">
-                <a:latin typeface="Consolas" panose="020B0609020204030204" pitchFamily="49" charset="0"/>
-              </a:rPr>
-              <a:t>tag release-v1.0.0</a:t>
-            </a:r>
-          </a:p>
-          <a:p>
-            <a:pPr marL="457200" lvl="1" indent="0">
-              <a:spcBef>
-                <a:spcPts val="0"/>
-              </a:spcBef>
-              <a:buNone/>
-            </a:pPr>
-            <a:r>
-              <a:rPr lang="de-DE" altLang="de-DE" sz="1200" dirty="0">
-                <a:latin typeface="Consolas" panose="020B0609020204030204" pitchFamily="49" charset="0"/>
-              </a:rPr>
-              <a:t>Tagger: Christopher Keutner &lt;christopher.keutner@alumni.fh-aachen.de&gt;</a:t>
-            </a:r>
-          </a:p>
-          <a:p>
-            <a:pPr marL="457200" lvl="1" indent="0">
-              <a:spcBef>
-                <a:spcPts val="0"/>
-              </a:spcBef>
-              <a:buNone/>
-            </a:pPr>
-            <a:r>
-              <a:rPr lang="de-DE" altLang="de-DE" sz="1200" dirty="0">
-                <a:latin typeface="Consolas" panose="020B0609020204030204" pitchFamily="49" charset="0"/>
-              </a:rPr>
-              <a:t>Date:   Tue May 28 15:13:44 2024 +0200</a:t>
-            </a:r>
-          </a:p>
-          <a:p>
-            <a:pPr marL="457200" lvl="1" indent="0">
-              <a:spcBef>
-                <a:spcPts val="0"/>
-              </a:spcBef>
-              <a:buNone/>
-            </a:pPr>
-            <a:endParaRPr lang="de-DE" altLang="de-DE" sz="1200" dirty="0">
-              <a:latin typeface="Consolas" panose="020B0609020204030204" pitchFamily="49" charset="0"/>
-            </a:endParaRPr>
-          </a:p>
-          <a:p>
-            <a:pPr marL="457200" lvl="1" indent="0">
-              <a:spcBef>
-                <a:spcPts val="0"/>
-              </a:spcBef>
-              <a:buNone/>
-            </a:pPr>
-            <a:r>
-              <a:rPr lang="de-DE" altLang="de-DE" sz="1200" dirty="0" err="1">
-                <a:latin typeface="Consolas" panose="020B0609020204030204" pitchFamily="49" charset="0"/>
-              </a:rPr>
-              <a:t>Latest</a:t>
-            </a:r>
-            <a:r>
-              <a:rPr lang="de-DE" altLang="de-DE" sz="1200" dirty="0">
-                <a:latin typeface="Consolas" panose="020B0609020204030204" pitchFamily="49" charset="0"/>
-              </a:rPr>
-              <a:t> v1 release</a:t>
-            </a:r>
-          </a:p>
-          <a:p>
-            <a:pPr marL="457200" lvl="1" indent="0">
-              <a:spcBef>
-                <a:spcPts val="0"/>
-              </a:spcBef>
-              <a:buNone/>
-            </a:pPr>
-            <a:endParaRPr lang="de-DE" altLang="de-DE" sz="1200" dirty="0">
-              <a:latin typeface="Consolas" panose="020B0609020204030204" pitchFamily="49" charset="0"/>
-            </a:endParaRPr>
-          </a:p>
-          <a:p>
-            <a:pPr marL="457200" lvl="1" indent="0">
-              <a:spcBef>
-                <a:spcPts val="0"/>
-              </a:spcBef>
-              <a:buNone/>
-            </a:pPr>
-            <a:r>
-              <a:rPr lang="de-DE" altLang="de-DE" sz="1200" dirty="0" err="1">
-                <a:latin typeface="Consolas" panose="020B0609020204030204" pitchFamily="49" charset="0"/>
-              </a:rPr>
-              <a:t>commit</a:t>
-            </a:r>
-            <a:r>
-              <a:rPr lang="de-DE" altLang="de-DE" sz="1200" dirty="0">
-                <a:latin typeface="Consolas" panose="020B0609020204030204" pitchFamily="49" charset="0"/>
-              </a:rPr>
-              <a:t> 11f6b62f8bc7a3403ceae4e8923d7a54abab7b6d (HEAD -&gt; </a:t>
-            </a:r>
-            <a:r>
-              <a:rPr lang="de-DE" altLang="de-DE" sz="1200" dirty="0" err="1">
-                <a:latin typeface="Consolas" panose="020B0609020204030204" pitchFamily="49" charset="0"/>
-              </a:rPr>
-              <a:t>main</a:t>
-            </a:r>
-            <a:r>
-              <a:rPr lang="de-DE" altLang="de-DE" sz="1200" dirty="0">
-                <a:latin typeface="Consolas" panose="020B0609020204030204" pitchFamily="49" charset="0"/>
-              </a:rPr>
-              <a:t>, tag: release-v1.0.0)</a:t>
-            </a:r>
-          </a:p>
-          <a:p>
-            <a:pPr marL="457200" lvl="1" indent="0">
-              <a:spcBef>
-                <a:spcPts val="0"/>
-              </a:spcBef>
-              <a:buNone/>
-            </a:pPr>
-            <a:r>
-              <a:rPr lang="de-DE" altLang="de-DE" sz="1200" dirty="0" err="1">
-                <a:latin typeface="Consolas" panose="020B0609020204030204" pitchFamily="49" charset="0"/>
-              </a:rPr>
-              <a:t>Author</a:t>
-            </a:r>
-            <a:r>
-              <a:rPr lang="de-DE" altLang="de-DE" sz="1200" dirty="0">
-                <a:latin typeface="Consolas" panose="020B0609020204030204" pitchFamily="49" charset="0"/>
-              </a:rPr>
-              <a:t>: Christopher Keutner &lt;christopher.keutner@alumni.fh-aachen.de&gt;</a:t>
-            </a:r>
-          </a:p>
-          <a:p>
-            <a:pPr marL="457200" lvl="1" indent="0">
-              <a:spcBef>
-                <a:spcPts val="0"/>
-              </a:spcBef>
-              <a:buNone/>
-            </a:pPr>
-            <a:r>
-              <a:rPr lang="de-DE" altLang="de-DE" sz="1200" dirty="0">
-                <a:latin typeface="Consolas" panose="020B0609020204030204" pitchFamily="49" charset="0"/>
-              </a:rPr>
-              <a:t>Date:   Tue May 28 15:13:10 2024 +0200</a:t>
-            </a:r>
-          </a:p>
-          <a:p>
-            <a:pPr marL="457200" lvl="1" indent="0">
-              <a:spcBef>
-                <a:spcPts val="0"/>
-              </a:spcBef>
-              <a:buNone/>
-            </a:pPr>
-            <a:endParaRPr lang="de-DE" altLang="de-DE" sz="1200" dirty="0">
-              <a:latin typeface="Consolas" panose="020B0609020204030204" pitchFamily="49" charset="0"/>
-            </a:endParaRPr>
-          </a:p>
-          <a:p>
-            <a:pPr marL="457200" lvl="1" indent="0">
-              <a:spcBef>
-                <a:spcPts val="0"/>
-              </a:spcBef>
-              <a:buNone/>
-            </a:pPr>
-            <a:r>
-              <a:rPr lang="de-DE" altLang="de-DE" sz="1200" dirty="0">
-                <a:latin typeface="Consolas" panose="020B0609020204030204" pitchFamily="49" charset="0"/>
-              </a:rPr>
-              <a:t>    Add </a:t>
-            </a:r>
-            <a:r>
-              <a:rPr lang="de-DE" altLang="de-DE" sz="1200" dirty="0" err="1">
-                <a:latin typeface="Consolas" panose="020B0609020204030204" pitchFamily="49" charset="0"/>
-              </a:rPr>
-              <a:t>new</a:t>
-            </a:r>
-            <a:r>
-              <a:rPr lang="de-DE" altLang="de-DE" sz="1200" dirty="0">
-                <a:latin typeface="Consolas" panose="020B0609020204030204" pitchFamily="49" charset="0"/>
-              </a:rPr>
-              <a:t> </a:t>
-            </a:r>
-            <a:r>
-              <a:rPr lang="de-DE" altLang="de-DE" sz="1200" dirty="0" err="1">
-                <a:latin typeface="Consolas" panose="020B0609020204030204" pitchFamily="49" charset="0"/>
-              </a:rPr>
-              <a:t>file</a:t>
-            </a:r>
-            <a:endParaRPr lang="de-DE" altLang="de-DE" sz="1200" dirty="0">
-              <a:latin typeface="Consolas" panose="020B0609020204030204" pitchFamily="49" charset="0"/>
-            </a:endParaRPr>
-          </a:p>
-          <a:p>
-            <a:pPr marL="457200" lvl="1" indent="0">
-              <a:spcBef>
-                <a:spcPts val="0"/>
-              </a:spcBef>
-              <a:buNone/>
-            </a:pPr>
-            <a:endParaRPr lang="de-DE" altLang="de-DE" sz="1200" dirty="0">
-              <a:latin typeface="Consolas" panose="020B0609020204030204" pitchFamily="49" charset="0"/>
-            </a:endParaRPr>
-          </a:p>
-          <a:p>
-            <a:pPr marL="457200" lvl="1" indent="0">
-              <a:spcBef>
-                <a:spcPts val="0"/>
-              </a:spcBef>
-              <a:buNone/>
-            </a:pPr>
-            <a:r>
-              <a:rPr lang="de-DE" altLang="de-DE" sz="1200" dirty="0" err="1">
-                <a:latin typeface="Consolas" panose="020B0609020204030204" pitchFamily="49" charset="0"/>
-              </a:rPr>
-              <a:t>diff</a:t>
-            </a:r>
-            <a:r>
-              <a:rPr lang="de-DE" altLang="de-DE" sz="1200" dirty="0">
-                <a:latin typeface="Consolas" panose="020B0609020204030204" pitchFamily="49" charset="0"/>
-              </a:rPr>
-              <a:t> --</a:t>
-            </a:r>
-            <a:r>
-              <a:rPr lang="de-DE" altLang="de-DE" sz="1200" dirty="0" err="1">
-                <a:latin typeface="Consolas" panose="020B0609020204030204" pitchFamily="49" charset="0"/>
-              </a:rPr>
-              <a:t>git</a:t>
-            </a:r>
-            <a:r>
-              <a:rPr lang="de-DE" altLang="de-DE" sz="1200" dirty="0">
-                <a:latin typeface="Consolas" panose="020B0609020204030204" pitchFamily="49" charset="0"/>
-              </a:rPr>
-              <a:t> a/file8.txt b/file8.txt</a:t>
-            </a:r>
-          </a:p>
-          <a:p>
-            <a:pPr marL="457200" lvl="1" indent="0">
-              <a:spcBef>
-                <a:spcPts val="0"/>
-              </a:spcBef>
-              <a:buNone/>
-            </a:pPr>
-            <a:r>
-              <a:rPr lang="de-DE" altLang="de-DE" sz="1200" dirty="0" err="1">
-                <a:latin typeface="Consolas" panose="020B0609020204030204" pitchFamily="49" charset="0"/>
-              </a:rPr>
-              <a:t>new</a:t>
-            </a:r>
-            <a:r>
-              <a:rPr lang="de-DE" altLang="de-DE" sz="1200" dirty="0">
-                <a:latin typeface="Consolas" panose="020B0609020204030204" pitchFamily="49" charset="0"/>
-              </a:rPr>
-              <a:t> </a:t>
-            </a:r>
-            <a:r>
-              <a:rPr lang="de-DE" altLang="de-DE" sz="1200" dirty="0" err="1">
-                <a:latin typeface="Consolas" panose="020B0609020204030204" pitchFamily="49" charset="0"/>
-              </a:rPr>
-              <a:t>file</a:t>
-            </a:r>
-            <a:r>
-              <a:rPr lang="de-DE" altLang="de-DE" sz="1200" dirty="0">
-                <a:latin typeface="Consolas" panose="020B0609020204030204" pitchFamily="49" charset="0"/>
-              </a:rPr>
-              <a:t> </a:t>
-            </a:r>
-            <a:r>
-              <a:rPr lang="de-DE" altLang="de-DE" sz="1200" dirty="0" err="1">
-                <a:latin typeface="Consolas" panose="020B0609020204030204" pitchFamily="49" charset="0"/>
-              </a:rPr>
-              <a:t>mode</a:t>
-            </a:r>
-            <a:r>
-              <a:rPr lang="de-DE" altLang="de-DE" sz="1200" dirty="0">
-                <a:latin typeface="Consolas" panose="020B0609020204030204" pitchFamily="49" charset="0"/>
-              </a:rPr>
-              <a:t> 100644</a:t>
-            </a:r>
-          </a:p>
-          <a:p>
-            <a:pPr marL="457200" lvl="1" indent="0">
-              <a:spcBef>
-                <a:spcPts val="0"/>
-              </a:spcBef>
-              <a:buNone/>
-            </a:pPr>
-            <a:r>
-              <a:rPr lang="de-DE" altLang="de-DE" sz="1200" dirty="0" err="1">
-                <a:latin typeface="Consolas" panose="020B0609020204030204" pitchFamily="49" charset="0"/>
-              </a:rPr>
-              <a:t>index</a:t>
-            </a:r>
-            <a:r>
-              <a:rPr lang="de-DE" altLang="de-DE" sz="1200" dirty="0">
-                <a:latin typeface="Consolas" panose="020B0609020204030204" pitchFamily="49" charset="0"/>
-              </a:rPr>
-              <a:t> 0000000..e69de29</a:t>
-            </a:r>
-          </a:p>
-        </p:txBody>
-      </p:sp>
-      <p:sp>
-        <p:nvSpPr>
-          <p:cNvPr id="6147" name="Rectangle 1062">
-            <a:extLst>
-              <a:ext uri="{FF2B5EF4-FFF2-40B4-BE49-F238E27FC236}">
-                <a16:creationId xmlns:a16="http://schemas.microsoft.com/office/drawing/2014/main" id="{C46E9340-3256-8D55-A265-94F2F41E288E}"/>
-              </a:ext>
-            </a:extLst>
-          </p:cNvPr>
-          <p:cNvSpPr>
-            <a:spLocks noGrp="1" noChangeArrowheads="1"/>
-          </p:cNvSpPr>
-          <p:nvPr>
-            <p:ph type="title"/>
-          </p:nvPr>
-        </p:nvSpPr>
-        <p:spPr>
-          <a:xfrm>
-            <a:off x="285750" y="142875"/>
-            <a:ext cx="5654675" cy="706438"/>
-          </a:xfrm>
-        </p:spPr>
-        <p:txBody>
-          <a:bodyPr/>
-          <a:lstStyle/>
-          <a:p>
-            <a:r>
-              <a:rPr lang="de-DE" altLang="de-DE" dirty="0" err="1"/>
-              <a:t>Git</a:t>
-            </a:r>
-            <a:r>
-              <a:rPr lang="de-DE" altLang="de-DE" dirty="0"/>
-              <a:t> – Tags </a:t>
-            </a:r>
-          </a:p>
-        </p:txBody>
-      </p:sp>
-    </p:spTree>
-    <p:extLst>
-      <p:ext uri="{BB962C8B-B14F-4D97-AF65-F5344CB8AC3E}">
-        <p14:creationId xmlns:p14="http://schemas.microsoft.com/office/powerpoint/2010/main" val="641179957"/>
-      </p:ext>
-    </p:extLst>
-  </p:cSld>
-  <p:clrMapOvr>
-    <a:masterClrMapping/>
-  </p:clrMapOvr>
-</p:sld>
-</file>
-
-<file path=ppt/slides/slide15.xml><?xml version="1.0" encoding="utf-8"?>
 <p:sld xmlns:a="http://schemas.openxmlformats.org/drawingml/2006/main" xmlns:r="http://schemas.openxmlformats.org/officeDocument/2006/relationships" xmlns:p="http://schemas.openxmlformats.org/presentationml/2006/main">
   <p:cSld>
     <p:spTree>
@@ -7782,7 +6965,7 @@
 </p:sld>
 </file>
 
-<file path=ppt/slides/slide16.xml><?xml version="1.0" encoding="utf-8"?>
+<file path=ppt/slides/slide14.xml><?xml version="1.0" encoding="utf-8"?>
 <p:sld xmlns:a="http://schemas.openxmlformats.org/drawingml/2006/main" xmlns:r="http://schemas.openxmlformats.org/officeDocument/2006/relationships" xmlns:p="http://schemas.openxmlformats.org/presentationml/2006/main">
   <p:cSld>
     <p:spTree>
@@ -7917,7 +7100,7 @@
 </p:sld>
 </file>
 
-<file path=ppt/slides/slide17.xml><?xml version="1.0" encoding="utf-8"?>
+<file path=ppt/slides/slide15.xml><?xml version="1.0" encoding="utf-8"?>
 <p:sld xmlns:a="http://schemas.openxmlformats.org/drawingml/2006/main" xmlns:r="http://schemas.openxmlformats.org/officeDocument/2006/relationships" xmlns:p="http://schemas.openxmlformats.org/presentationml/2006/main">
   <p:cSld>
     <p:spTree>
@@ -7992,7 +7175,7 @@
 </p:sld>
 </file>
 
-<file path=ppt/slides/slide18.xml><?xml version="1.0" encoding="utf-8"?>
+<file path=ppt/slides/slide16.xml><?xml version="1.0" encoding="utf-8"?>
 <p:sld xmlns:a="http://schemas.openxmlformats.org/drawingml/2006/main" xmlns:r="http://schemas.openxmlformats.org/officeDocument/2006/relationships" xmlns:p="http://schemas.openxmlformats.org/presentationml/2006/main">
   <p:cSld>
     <p:spTree>
@@ -8174,7 +7357,7 @@
 </p:sld>
 </file>
 
-<file path=ppt/slides/slide19.xml><?xml version="1.0" encoding="utf-8"?>
+<file path=ppt/slides/slide17.xml><?xml version="1.0" encoding="utf-8"?>
 <p:sld xmlns:a="http://schemas.openxmlformats.org/drawingml/2006/main" xmlns:r="http://schemas.openxmlformats.org/officeDocument/2006/relationships" xmlns:p="http://schemas.openxmlformats.org/presentationml/2006/main">
   <p:cSld>
     <p:spTree>
@@ -8351,6 +7534,13 @@
               <a:buFont typeface="Arial" panose="020B0604020202020204" pitchFamily="34" charset="0"/>
               <a:buChar char="•"/>
             </a:pPr>
+            <a:endParaRPr lang="de-DE" altLang="de-DE" sz="1800" b="1" dirty="0"/>
+          </a:p>
+          <a:p>
+            <a:pPr>
+              <a:buFont typeface="Arial" panose="020B0604020202020204" pitchFamily="34" charset="0"/>
+              <a:buChar char="•"/>
+            </a:pPr>
             <a:r>
               <a:rPr lang="de-DE" altLang="de-DE" sz="1800" b="1" dirty="0"/>
               <a:t>Tag 1 – Einführung in </a:t>
@@ -8403,6 +7593,14 @@
               <a:rPr lang="de-DE" altLang="de-DE" sz="1400" dirty="0" err="1"/>
               <a:t>Git</a:t>
             </a:r>
+            <a:r>
+              <a:rPr lang="de-DE" altLang="de-DE" sz="1400" dirty="0"/>
+              <a:t> und </a:t>
+            </a:r>
+            <a:r>
+              <a:rPr lang="de-DE" altLang="de-DE" sz="1400" dirty="0" err="1"/>
+              <a:t>GitLab</a:t>
+            </a:r>
             <a:endParaRPr lang="de-DE" altLang="de-DE" sz="1400" dirty="0"/>
           </a:p>
           <a:p>
@@ -8424,7 +7622,7 @@
             </a:r>
             <a:r>
               <a:rPr lang="de-DE" altLang="de-DE" sz="1400" dirty="0"/>
-              <a:t> und </a:t>
+              <a:t> &amp; </a:t>
             </a:r>
             <a:r>
               <a:rPr lang="de-DE" altLang="de-DE" sz="1400" dirty="0" err="1"/>
@@ -8446,7 +7644,7 @@
             </a:r>
             <a:r>
               <a:rPr lang="de-DE" altLang="de-DE" sz="1400" dirty="0"/>
-              <a:t> Remote</a:t>
+              <a:t>-Workflow im Team</a:t>
             </a:r>
           </a:p>
           <a:p>
@@ -8454,15 +7652,30 @@
               <a:buFont typeface="Arial" panose="020B0604020202020204" pitchFamily="34" charset="0"/>
               <a:buChar char="•"/>
             </a:pPr>
-            <a:r>
-              <a:rPr lang="de-DE" altLang="de-DE" sz="1400" dirty="0"/>
-              <a:t>Grundlagen von </a:t>
-            </a:r>
-            <a:r>
-              <a:rPr lang="de-DE" altLang="de-DE" sz="1400" dirty="0" err="1"/>
-              <a:t>GitLab</a:t>
-            </a:r>
             <a:endParaRPr lang="de-DE" altLang="de-DE" sz="1400" dirty="0"/>
+          </a:p>
+          <a:p>
+            <a:pPr>
+              <a:buFont typeface="Arial" panose="020B0604020202020204" pitchFamily="34" charset="0"/>
+              <a:buChar char="•"/>
+            </a:pPr>
+            <a:r>
+              <a:rPr lang="de-DE" altLang="de-DE" sz="1800" b="1" dirty="0"/>
+              <a:t>Tag 2 – Vertiefung </a:t>
+            </a:r>
+            <a:r>
+              <a:rPr lang="de-DE" altLang="de-DE" sz="1800" b="1" dirty="0" err="1"/>
+              <a:t>Git</a:t>
+            </a:r>
+            <a:r>
+              <a:rPr lang="de-DE" altLang="de-DE" sz="1800" b="1" dirty="0"/>
+              <a:t>-Workflow, CI/CD &amp; </a:t>
+            </a:r>
+            <a:r>
+              <a:rPr lang="de-DE" altLang="de-DE" sz="1800" b="1" dirty="0" err="1"/>
+              <a:t>GitOps</a:t>
+            </a:r>
+            <a:endParaRPr lang="de-DE" altLang="de-DE" sz="1800" b="1" dirty="0"/>
           </a:p>
           <a:p>
             <a:pPr lvl="1">
@@ -8471,12 +7684,67 @@
             </a:pPr>
             <a:r>
               <a:rPr lang="de-DE" altLang="de-DE" sz="1400" dirty="0" err="1"/>
-              <a:t>Git</a:t>
+              <a:t>Gitflow</a:t>
             </a:r>
             <a:r>
               <a:rPr lang="de-DE" altLang="de-DE" sz="1400" dirty="0"/>
-              <a:t>-Workflow im Team</a:t>
-            </a:r>
+              <a:t>-Workflow</a:t>
+            </a:r>
+          </a:p>
+          <a:p>
+            <a:pPr lvl="1">
+              <a:buFont typeface="Arial" panose="020B0604020202020204" pitchFamily="34" charset="0"/>
+              <a:buChar char="•"/>
+            </a:pPr>
+            <a:r>
+              <a:rPr lang="de-DE" altLang="de-DE" sz="1400" dirty="0"/>
+              <a:t>Tags, Releases &amp; deren Verwaltung</a:t>
+            </a:r>
+          </a:p>
+          <a:p>
+            <a:pPr lvl="1">
+              <a:buFont typeface="Arial" panose="020B0604020202020204" pitchFamily="34" charset="0"/>
+              <a:buChar char="•"/>
+            </a:pPr>
+            <a:r>
+              <a:rPr lang="de-DE" altLang="de-DE" sz="1400" dirty="0"/>
+              <a:t>Einführung in </a:t>
+            </a:r>
+            <a:r>
+              <a:rPr lang="de-DE" altLang="de-DE" sz="1400" dirty="0" err="1"/>
+              <a:t>GitLab</a:t>
+            </a:r>
+            <a:r>
+              <a:rPr lang="de-DE" altLang="de-DE" sz="1400" dirty="0"/>
+              <a:t> CI/CD &amp; </a:t>
+            </a:r>
+            <a:r>
+              <a:rPr lang="de-DE" altLang="de-DE" sz="1400" dirty="0" err="1"/>
+              <a:t>gitlab.yml</a:t>
+            </a:r>
+            <a:endParaRPr lang="de-DE" altLang="de-DE" sz="1400" dirty="0"/>
+          </a:p>
+          <a:p>
+            <a:pPr lvl="1">
+              <a:buFont typeface="Arial" panose="020B0604020202020204" pitchFamily="34" charset="0"/>
+              <a:buChar char="•"/>
+            </a:pPr>
+            <a:r>
+              <a:rPr lang="de-DE" altLang="de-DE" sz="1400" dirty="0"/>
+              <a:t>Grundlagen von </a:t>
+            </a:r>
+            <a:r>
+              <a:rPr lang="de-DE" altLang="de-DE" sz="1400" dirty="0" err="1"/>
+              <a:t>GitOps</a:t>
+            </a:r>
+            <a:endParaRPr lang="de-DE" altLang="de-DE" sz="1400" dirty="0"/>
+          </a:p>
+          <a:p>
+            <a:pPr lvl="1">
+              <a:buFont typeface="Arial" panose="020B0604020202020204" pitchFamily="34" charset="0"/>
+              <a:buChar char="•"/>
+            </a:pPr>
+            <a:endParaRPr lang="de-DE" altLang="de-DE" sz="1400" dirty="0"/>
           </a:p>
           <a:p>
             <a:pPr>
@@ -8485,15 +7753,7 @@
             </a:pPr>
             <a:r>
               <a:rPr lang="de-DE" altLang="de-DE" sz="1800" b="1" dirty="0"/>
-              <a:t>Tag 2 – Vertiefung </a:t>
-            </a:r>
-            <a:r>
-              <a:rPr lang="de-DE" altLang="de-DE" sz="1800" b="1" dirty="0" err="1"/>
-              <a:t>Git</a:t>
-            </a:r>
-            <a:r>
-              <a:rPr lang="de-DE" altLang="de-DE" sz="1800" b="1" dirty="0"/>
-              <a:t>-Workflow, CI/CD &amp; </a:t>
+              <a:t>Tag 3 – Docker in der Entwicklung, </a:t>
             </a:r>
             <a:r>
               <a:rPr lang="de-DE" altLang="de-DE" sz="1800" b="1" dirty="0" err="1"/>
@@ -8501,7 +7761,15 @@
             </a:r>
             <a:r>
               <a:rPr lang="de-DE" altLang="de-DE" sz="1800" b="1" dirty="0"/>
-              <a:t> CI </a:t>
+              <a:t> CI und </a:t>
+            </a:r>
+            <a:r>
+              <a:rPr lang="de-DE" altLang="de-DE" sz="1800" b="1" dirty="0" err="1"/>
+              <a:t>Deployment</a:t>
+            </a:r>
+            <a:r>
+              <a:rPr lang="de-DE" altLang="de-DE" sz="1800" b="1" dirty="0"/>
+              <a:t>-Strategien</a:t>
             </a:r>
           </a:p>
           <a:p>
@@ -8510,12 +7778,8 @@
               <a:buChar char="•"/>
             </a:pPr>
             <a:r>
-              <a:rPr lang="de-DE" altLang="de-DE" sz="1400" dirty="0" err="1"/>
-              <a:t>Gitflow</a:t>
-            </a:r>
-            <a:r>
               <a:rPr lang="de-DE" altLang="de-DE" sz="1400" dirty="0"/>
-              <a:t>-Workflow</a:t>
+              <a:t>Lokale Entwicklung mit Docker</a:t>
             </a:r>
           </a:p>
           <a:p>
@@ -8524,8 +7788,12 @@
               <a:buChar char="•"/>
             </a:pPr>
             <a:r>
+              <a:rPr lang="de-DE" altLang="de-DE" sz="1400" dirty="0" err="1"/>
+              <a:t>GitLab</a:t>
+            </a:r>
+            <a:r>
               <a:rPr lang="de-DE" altLang="de-DE" sz="1400" dirty="0"/>
-              <a:t>Tags, Releases &amp; deren Verwaltung</a:t>
+              <a:t>-Runner &amp; Docker-Registry</a:t>
             </a:r>
           </a:p>
           <a:p>
@@ -8534,12 +7802,16 @@
               <a:buChar char="•"/>
             </a:pPr>
             <a:r>
+              <a:rPr lang="de-DE" altLang="de-DE" sz="1400" dirty="0"/>
+              <a:t>Erstellen von Release- und </a:t>
+            </a:r>
+            <a:r>
               <a:rPr lang="de-DE" altLang="de-DE" sz="1400" dirty="0" err="1"/>
-              <a:t>GitLab</a:t>
+              <a:t>Tagged</a:t>
             </a:r>
             <a:r>
               <a:rPr lang="de-DE" altLang="de-DE" sz="1400" dirty="0"/>
-              <a:t>-Runner</a:t>
+              <a:t>-Images</a:t>
             </a:r>
           </a:p>
           <a:p>
@@ -8549,107 +7821,6 @@
             </a:pPr>
             <a:r>
               <a:rPr lang="de-DE" altLang="de-DE" sz="1400" dirty="0"/>
-              <a:t>Einführung in </a:t>
-            </a:r>
-            <a:r>
-              <a:rPr lang="de-DE" altLang="de-DE" sz="1400" dirty="0" err="1"/>
-              <a:t>GitLab</a:t>
-            </a:r>
-            <a:r>
-              <a:rPr lang="de-DE" altLang="de-DE" sz="1400" dirty="0"/>
-              <a:t> CI/CD &amp; </a:t>
-            </a:r>
-            <a:r>
-              <a:rPr lang="de-DE" altLang="de-DE" sz="1400" dirty="0" err="1"/>
-              <a:t>gitlab.yml</a:t>
-            </a:r>
-            <a:endParaRPr lang="de-DE" altLang="de-DE" sz="1400" dirty="0"/>
-          </a:p>
-          <a:p>
-            <a:pPr>
-              <a:buFont typeface="Arial" panose="020B0604020202020204" pitchFamily="34" charset="0"/>
-              <a:buChar char="•"/>
-            </a:pPr>
-            <a:r>
-              <a:rPr lang="de-DE" altLang="de-DE" sz="1800" b="1" dirty="0"/>
-              <a:t>Tag 3 – </a:t>
-            </a:r>
-            <a:r>
-              <a:rPr lang="de-DE" altLang="de-DE" sz="1800" b="1" dirty="0" err="1"/>
-              <a:t>GitOps</a:t>
-            </a:r>
-            <a:r>
-              <a:rPr lang="de-DE" altLang="de-DE" sz="1800" b="1" dirty="0"/>
-              <a:t>, Docker in der Entwicklung und </a:t>
-            </a:r>
-            <a:r>
-              <a:rPr lang="de-DE" altLang="de-DE" sz="1800" b="1" dirty="0" err="1"/>
-              <a:t>Deployment</a:t>
-            </a:r>
-            <a:r>
-              <a:rPr lang="de-DE" altLang="de-DE" sz="1800" b="1" dirty="0"/>
-              <a:t>-Strategien</a:t>
-            </a:r>
-          </a:p>
-          <a:p>
-            <a:pPr lvl="1">
-              <a:buFont typeface="Arial" panose="020B0604020202020204" pitchFamily="34" charset="0"/>
-              <a:buChar char="•"/>
-            </a:pPr>
-            <a:r>
-              <a:rPr lang="de-DE" altLang="de-DE" sz="1400" dirty="0" err="1"/>
-              <a:t>GitOps</a:t>
-            </a:r>
-            <a:r>
-              <a:rPr lang="de-DE" altLang="de-DE" sz="1400" dirty="0"/>
-              <a:t> Grundlagen</a:t>
-            </a:r>
-          </a:p>
-          <a:p>
-            <a:pPr lvl="1">
-              <a:buFont typeface="Arial" panose="020B0604020202020204" pitchFamily="34" charset="0"/>
-              <a:buChar char="•"/>
-            </a:pPr>
-            <a:r>
-              <a:rPr lang="de-DE" altLang="de-DE" sz="1400" dirty="0"/>
-              <a:t>Lokale Entwicklung mit Docker</a:t>
-            </a:r>
-          </a:p>
-          <a:p>
-            <a:pPr lvl="1">
-              <a:buFont typeface="Arial" panose="020B0604020202020204" pitchFamily="34" charset="0"/>
-              <a:buChar char="•"/>
-            </a:pPr>
-            <a:r>
-              <a:rPr lang="de-DE" altLang="de-DE" sz="1400" dirty="0"/>
-              <a:t>Container/Docker-Registry</a:t>
-            </a:r>
-          </a:p>
-          <a:p>
-            <a:pPr lvl="1">
-              <a:buFont typeface="Arial" panose="020B0604020202020204" pitchFamily="34" charset="0"/>
-              <a:buChar char="•"/>
-            </a:pPr>
-            <a:r>
-              <a:rPr lang="de-DE" altLang="de-DE" sz="1400" dirty="0"/>
-              <a:t>Erstellen von Release- und </a:t>
-            </a:r>
-            <a:r>
-              <a:rPr lang="de-DE" altLang="de-DE" sz="1400" dirty="0" err="1"/>
-              <a:t>Tagged</a:t>
-            </a:r>
-            <a:r>
-              <a:rPr lang="de-DE" altLang="de-DE" sz="1400" dirty="0"/>
-              <a:t>-Images</a:t>
-            </a:r>
-          </a:p>
-          <a:p>
-            <a:pPr lvl="1">
-              <a:buFont typeface="Arial" panose="020B0604020202020204" pitchFamily="34" charset="0"/>
-              <a:buChar char="•"/>
-            </a:pPr>
-            <a:r>
-              <a:rPr lang="de-DE" altLang="de-DE" sz="1400" dirty="0"/>
               <a:t>Möglichkeiten des </a:t>
             </a:r>
             <a:r>
@@ -8659,16 +7830,6 @@
             <a:r>
               <a:rPr lang="de-DE" altLang="de-DE" sz="1400" dirty="0"/>
               <a:t> &amp; Verwaltung von Konfiguration</a:t>
-            </a:r>
-          </a:p>
-          <a:p>
-            <a:pPr lvl="1">
-              <a:buFont typeface="Arial" panose="020B0604020202020204" pitchFamily="34" charset="0"/>
-              <a:buChar char="•"/>
-            </a:pPr>
-            <a:r>
-              <a:rPr lang="de-DE" altLang="de-DE" sz="1400" dirty="0"/>
-              <a:t>Abschlussübung &amp; Diskussion</a:t>
             </a:r>
           </a:p>
           <a:p>
@@ -8722,498 +7883,6 @@
 </file>
 
 <file path=ppt/slides/slide3.xml><?xml version="1.0" encoding="utf-8"?>
-<p:sld xmlns:a="http://schemas.openxmlformats.org/drawingml/2006/main" xmlns:r="http://schemas.openxmlformats.org/officeDocument/2006/relationships" xmlns:p="http://schemas.openxmlformats.org/presentationml/2006/main">
-  <p:cSld>
-    <p:spTree>
-      <p:nvGrpSpPr>
-        <p:cNvPr id="1" name=""/>
-        <p:cNvGrpSpPr/>
-        <p:nvPr/>
-      </p:nvGrpSpPr>
-      <p:grpSpPr>
-        <a:xfrm>
-          <a:off x="0" y="0"/>
-          <a:ext cx="0" cy="0"/>
-          <a:chOff x="0" y="0"/>
-          <a:chExt cx="0" cy="0"/>
-        </a:xfrm>
-      </p:grpSpPr>
-      <p:sp>
-        <p:nvSpPr>
-          <p:cNvPr id="6146" name="Inhaltsplatzhalter 18">
-            <a:extLst>
-              <a:ext uri="{FF2B5EF4-FFF2-40B4-BE49-F238E27FC236}">
-                <a16:creationId xmlns:a16="http://schemas.microsoft.com/office/drawing/2014/main" id="{BE3C4C95-FD5D-27F0-ED0C-AB8113CAC9F1}"/>
-              </a:ext>
-            </a:extLst>
-          </p:cNvPr>
-          <p:cNvSpPr>
-            <a:spLocks noGrp="1"/>
-          </p:cNvSpPr>
-          <p:nvPr>
-            <p:ph idx="1"/>
-          </p:nvPr>
-        </p:nvSpPr>
-        <p:spPr/>
-        <p:txBody>
-          <a:bodyPr/>
-          <a:lstStyle/>
-          <a:p>
-            <a:pPr>
-              <a:buFont typeface="Arial" panose="020B0604020202020204" pitchFamily="34" charset="0"/>
-              <a:buChar char="•"/>
-            </a:pPr>
-            <a:r>
-              <a:rPr lang="de-DE" altLang="de-DE" sz="1800" b="1" dirty="0"/>
-              <a:t>Tag 1 – Einführung in </a:t>
-            </a:r>
-            <a:r>
-              <a:rPr lang="de-DE" altLang="de-DE" sz="1800" b="1" dirty="0" err="1"/>
-              <a:t>Git</a:t>
-            </a:r>
-            <a:r>
-              <a:rPr lang="de-DE" altLang="de-DE" sz="1800" b="1" dirty="0"/>
-              <a:t> und </a:t>
-            </a:r>
-            <a:r>
-              <a:rPr lang="de-DE" altLang="de-DE" sz="1800" b="1" dirty="0" err="1"/>
-              <a:t>GitLab</a:t>
-            </a:r>
-            <a:r>
-              <a:rPr lang="de-DE" altLang="de-DE" sz="1800" b="1" dirty="0"/>
-              <a:t>, </a:t>
-            </a:r>
-            <a:r>
-              <a:rPr lang="de-DE" altLang="de-DE" sz="1800" b="1" dirty="0" err="1"/>
-              <a:t>Git</a:t>
-            </a:r>
-            <a:r>
-              <a:rPr lang="de-DE" altLang="de-DE" sz="1800" b="1" dirty="0"/>
-              <a:t>-Workflow im Team</a:t>
-            </a:r>
-          </a:p>
-          <a:p>
-            <a:pPr lvl="1">
-              <a:buFont typeface="Arial" panose="020B0604020202020204" pitchFamily="34" charset="0"/>
-              <a:buChar char="•"/>
-            </a:pPr>
-            <a:r>
-              <a:rPr lang="de-DE" altLang="de-DE" sz="1400" dirty="0"/>
-              <a:t>Einführung &amp; Kursüberblick</a:t>
-            </a:r>
-          </a:p>
-          <a:p>
-            <a:pPr lvl="1">
-              <a:buFont typeface="Arial" panose="020B0604020202020204" pitchFamily="34" charset="0"/>
-              <a:buChar char="•"/>
-            </a:pPr>
-            <a:r>
-              <a:rPr lang="de-DE" altLang="de-DE" sz="1400" dirty="0"/>
-              <a:t>Grundlagen von </a:t>
-            </a:r>
-            <a:r>
-              <a:rPr lang="de-DE" altLang="de-DE" sz="1400" dirty="0" err="1"/>
-              <a:t>Git</a:t>
-            </a:r>
-            <a:endParaRPr lang="de-DE" altLang="de-DE" sz="1400" dirty="0"/>
-          </a:p>
-          <a:p>
-            <a:pPr lvl="1">
-              <a:buFont typeface="Arial" panose="020B0604020202020204" pitchFamily="34" charset="0"/>
-              <a:buChar char="•"/>
-            </a:pPr>
-            <a:r>
-              <a:rPr lang="de-DE" altLang="de-DE" sz="1400" dirty="0" err="1"/>
-              <a:t>Git</a:t>
-            </a:r>
-            <a:r>
-              <a:rPr lang="de-DE" altLang="de-DE" sz="1400" dirty="0"/>
-              <a:t> </a:t>
-            </a:r>
-            <a:r>
-              <a:rPr lang="de-DE" altLang="de-DE" sz="1400" dirty="0" err="1"/>
-              <a:t>Rebase</a:t>
-            </a:r>
-            <a:r>
-              <a:rPr lang="de-DE" altLang="de-DE" sz="1400" dirty="0"/>
-              <a:t> und </a:t>
-            </a:r>
-            <a:r>
-              <a:rPr lang="de-DE" altLang="de-DE" sz="1400" dirty="0" err="1"/>
-              <a:t>Merge</a:t>
-            </a:r>
-            <a:r>
-              <a:rPr lang="de-DE" altLang="de-DE" sz="1400" dirty="0"/>
-              <a:t>-Strategien</a:t>
-            </a:r>
-          </a:p>
-          <a:p>
-            <a:pPr lvl="1">
-              <a:buFont typeface="Arial" panose="020B0604020202020204" pitchFamily="34" charset="0"/>
-              <a:buChar char="•"/>
-            </a:pPr>
-            <a:r>
-              <a:rPr lang="de-DE" altLang="de-DE" sz="1400" dirty="0" err="1"/>
-              <a:t>Git</a:t>
-            </a:r>
-            <a:r>
-              <a:rPr lang="de-DE" altLang="de-DE" sz="1400" dirty="0"/>
-              <a:t> Remote</a:t>
-            </a:r>
-          </a:p>
-          <a:p>
-            <a:pPr lvl="1">
-              <a:buFont typeface="Arial" panose="020B0604020202020204" pitchFamily="34" charset="0"/>
-              <a:buChar char="•"/>
-            </a:pPr>
-            <a:r>
-              <a:rPr lang="de-DE" altLang="de-DE" sz="1400" dirty="0"/>
-              <a:t>Grundlagen von </a:t>
-            </a:r>
-            <a:r>
-              <a:rPr lang="de-DE" altLang="de-DE" sz="1400" dirty="0" err="1"/>
-              <a:t>GitLab</a:t>
-            </a:r>
-            <a:endParaRPr lang="de-DE" altLang="de-DE" sz="1400" dirty="0"/>
-          </a:p>
-          <a:p>
-            <a:pPr lvl="1">
-              <a:buFont typeface="Arial" panose="020B0604020202020204" pitchFamily="34" charset="0"/>
-              <a:buChar char="•"/>
-            </a:pPr>
-            <a:r>
-              <a:rPr lang="de-DE" altLang="de-DE" sz="1400" dirty="0" err="1"/>
-              <a:t>Git</a:t>
-            </a:r>
-            <a:r>
-              <a:rPr lang="de-DE" altLang="de-DE" sz="1400" dirty="0"/>
-              <a:t>-Workflow im Team</a:t>
-            </a:r>
-          </a:p>
-          <a:p>
-            <a:pPr>
-              <a:buFont typeface="Arial" panose="020B0604020202020204" pitchFamily="34" charset="0"/>
-              <a:buChar char="•"/>
-            </a:pPr>
-            <a:r>
-              <a:rPr lang="de-DE" altLang="de-DE" sz="1800" b="1" dirty="0"/>
-              <a:t>Tag 2 – Vertiefung </a:t>
-            </a:r>
-            <a:r>
-              <a:rPr lang="de-DE" altLang="de-DE" sz="1800" b="1" dirty="0" err="1"/>
-              <a:t>Git</a:t>
-            </a:r>
-            <a:r>
-              <a:rPr lang="de-DE" altLang="de-DE" sz="1800" b="1" dirty="0"/>
-              <a:t>-Workflow, CI/CD &amp; </a:t>
-            </a:r>
-            <a:r>
-              <a:rPr lang="de-DE" altLang="de-DE" sz="1800" b="1" dirty="0" err="1"/>
-              <a:t>GitLab</a:t>
-            </a:r>
-            <a:r>
-              <a:rPr lang="de-DE" altLang="de-DE" sz="1800" b="1" dirty="0"/>
-              <a:t> CI </a:t>
-            </a:r>
-          </a:p>
-          <a:p>
-            <a:pPr lvl="1">
-              <a:buFont typeface="Arial" panose="020B0604020202020204" pitchFamily="34" charset="0"/>
-              <a:buChar char="•"/>
-            </a:pPr>
-            <a:r>
-              <a:rPr lang="de-DE" altLang="de-DE" sz="1400" dirty="0" err="1"/>
-              <a:t>Gitflow</a:t>
-            </a:r>
-            <a:r>
-              <a:rPr lang="de-DE" altLang="de-DE" sz="1400" dirty="0"/>
-              <a:t>-Workflow</a:t>
-            </a:r>
-          </a:p>
-          <a:p>
-            <a:pPr lvl="1">
-              <a:buFont typeface="Arial" panose="020B0604020202020204" pitchFamily="34" charset="0"/>
-              <a:buChar char="•"/>
-            </a:pPr>
-            <a:r>
-              <a:rPr lang="de-DE" altLang="de-DE" sz="1400" u="sng" dirty="0"/>
-              <a:t>Tags, Releases &amp; deren Verwaltung</a:t>
-            </a:r>
-          </a:p>
-          <a:p>
-            <a:pPr lvl="1">
-              <a:buFont typeface="Arial" panose="020B0604020202020204" pitchFamily="34" charset="0"/>
-              <a:buChar char="•"/>
-            </a:pPr>
-            <a:r>
-              <a:rPr lang="de-DE" altLang="de-DE" sz="1400" dirty="0" err="1"/>
-              <a:t>GitLab</a:t>
-            </a:r>
-            <a:r>
-              <a:rPr lang="de-DE" altLang="de-DE" sz="1400" dirty="0"/>
-              <a:t>-Runner</a:t>
-            </a:r>
-          </a:p>
-          <a:p>
-            <a:pPr lvl="1">
-              <a:buFont typeface="Arial" panose="020B0604020202020204" pitchFamily="34" charset="0"/>
-              <a:buChar char="•"/>
-            </a:pPr>
-            <a:r>
-              <a:rPr lang="de-DE" altLang="de-DE" sz="1400" dirty="0"/>
-              <a:t>Einführung in </a:t>
-            </a:r>
-            <a:r>
-              <a:rPr lang="de-DE" altLang="de-DE" sz="1400" dirty="0" err="1"/>
-              <a:t>GitLab</a:t>
-            </a:r>
-            <a:r>
-              <a:rPr lang="de-DE" altLang="de-DE" sz="1400" dirty="0"/>
-              <a:t> CI/CD &amp; </a:t>
-            </a:r>
-            <a:r>
-              <a:rPr lang="de-DE" altLang="de-DE" sz="1400" dirty="0" err="1"/>
-              <a:t>gitlab.yml</a:t>
-            </a:r>
-            <a:endParaRPr lang="de-DE" altLang="de-DE" sz="1400" dirty="0"/>
-          </a:p>
-          <a:p>
-            <a:pPr>
-              <a:buFont typeface="Arial" panose="020B0604020202020204" pitchFamily="34" charset="0"/>
-              <a:buChar char="•"/>
-            </a:pPr>
-            <a:r>
-              <a:rPr lang="de-DE" altLang="de-DE" sz="1800" b="1" dirty="0"/>
-              <a:t>Tag 3 – </a:t>
-            </a:r>
-            <a:r>
-              <a:rPr lang="de-DE" altLang="de-DE" sz="1800" b="1" dirty="0" err="1"/>
-              <a:t>GitOps</a:t>
-            </a:r>
-            <a:r>
-              <a:rPr lang="de-DE" altLang="de-DE" sz="1800" b="1" dirty="0"/>
-              <a:t>, Docker in der Entwicklung und </a:t>
-            </a:r>
-            <a:r>
-              <a:rPr lang="de-DE" altLang="de-DE" sz="1800" b="1" dirty="0" err="1"/>
-              <a:t>Deployment</a:t>
-            </a:r>
-            <a:r>
-              <a:rPr lang="de-DE" altLang="de-DE" sz="1800" b="1" dirty="0"/>
-              <a:t>-Strategien</a:t>
-            </a:r>
-          </a:p>
-          <a:p>
-            <a:pPr lvl="1">
-              <a:buFont typeface="Arial" panose="020B0604020202020204" pitchFamily="34" charset="0"/>
-              <a:buChar char="•"/>
-            </a:pPr>
-            <a:r>
-              <a:rPr lang="de-DE" altLang="de-DE" sz="1400" dirty="0" err="1"/>
-              <a:t>GitOps</a:t>
-            </a:r>
-            <a:r>
-              <a:rPr lang="de-DE" altLang="de-DE" sz="1400" dirty="0"/>
-              <a:t> Grundlagen</a:t>
-            </a:r>
-          </a:p>
-          <a:p>
-            <a:pPr lvl="1">
-              <a:buFont typeface="Arial" panose="020B0604020202020204" pitchFamily="34" charset="0"/>
-              <a:buChar char="•"/>
-            </a:pPr>
-            <a:r>
-              <a:rPr lang="de-DE" altLang="de-DE" sz="1400" dirty="0"/>
-              <a:t>Lokale Entwicklung mit Docker</a:t>
-            </a:r>
-          </a:p>
-          <a:p>
-            <a:pPr lvl="1">
-              <a:buFont typeface="Arial" panose="020B0604020202020204" pitchFamily="34" charset="0"/>
-              <a:buChar char="•"/>
-            </a:pPr>
-            <a:r>
-              <a:rPr lang="de-DE" altLang="de-DE" sz="1400" dirty="0"/>
-              <a:t>Container/Docker-Registry</a:t>
-            </a:r>
-          </a:p>
-          <a:p>
-            <a:pPr lvl="1">
-              <a:buFont typeface="Arial" panose="020B0604020202020204" pitchFamily="34" charset="0"/>
-              <a:buChar char="•"/>
-            </a:pPr>
-            <a:r>
-              <a:rPr lang="de-DE" altLang="de-DE" sz="1400" dirty="0"/>
-              <a:t>Erstellen von Release- und </a:t>
-            </a:r>
-            <a:r>
-              <a:rPr lang="de-DE" altLang="de-DE" sz="1400" dirty="0" err="1"/>
-              <a:t>Tagged</a:t>
-            </a:r>
-            <a:r>
-              <a:rPr lang="de-DE" altLang="de-DE" sz="1400" dirty="0"/>
-              <a:t>-Images</a:t>
-            </a:r>
-          </a:p>
-          <a:p>
-            <a:pPr lvl="1">
-              <a:buFont typeface="Arial" panose="020B0604020202020204" pitchFamily="34" charset="0"/>
-              <a:buChar char="•"/>
-            </a:pPr>
-            <a:r>
-              <a:rPr lang="de-DE" altLang="de-DE" sz="1400" dirty="0"/>
-              <a:t>Möglichkeiten des </a:t>
-            </a:r>
-            <a:r>
-              <a:rPr lang="de-DE" altLang="de-DE" sz="1400" dirty="0" err="1"/>
-              <a:t>Deployments</a:t>
-            </a:r>
-            <a:r>
-              <a:rPr lang="de-DE" altLang="de-DE" sz="1400" dirty="0"/>
-              <a:t> &amp; Verwaltung von Konfiguration</a:t>
-            </a:r>
-          </a:p>
-          <a:p>
-            <a:pPr lvl="1">
-              <a:buFont typeface="Arial" panose="020B0604020202020204" pitchFamily="34" charset="0"/>
-              <a:buChar char="•"/>
-            </a:pPr>
-            <a:r>
-              <a:rPr lang="de-DE" altLang="de-DE" sz="1400" dirty="0"/>
-              <a:t>Abschlussübung &amp; Diskussion</a:t>
-            </a:r>
-          </a:p>
-          <a:p>
-            <a:pPr lvl="1">
-              <a:buFont typeface="Arial" panose="020B0604020202020204" pitchFamily="34" charset="0"/>
-              <a:buChar char="•"/>
-            </a:pPr>
-            <a:endParaRPr lang="de-DE" altLang="de-DE" sz="1400" dirty="0"/>
-          </a:p>
-        </p:txBody>
-      </p:sp>
-      <p:sp>
-        <p:nvSpPr>
-          <p:cNvPr id="6147" name="Rectangle 1062">
-            <a:extLst>
-              <a:ext uri="{FF2B5EF4-FFF2-40B4-BE49-F238E27FC236}">
-                <a16:creationId xmlns:a16="http://schemas.microsoft.com/office/drawing/2014/main" id="{C46E9340-3256-8D55-A265-94F2F41E288E}"/>
-              </a:ext>
-            </a:extLst>
-          </p:cNvPr>
-          <p:cNvSpPr>
-            <a:spLocks noGrp="1" noChangeArrowheads="1"/>
-          </p:cNvSpPr>
-          <p:nvPr>
-            <p:ph type="title"/>
-          </p:nvPr>
-        </p:nvSpPr>
-        <p:spPr>
-          <a:xfrm>
-            <a:off x="285750" y="142875"/>
-            <a:ext cx="5654675" cy="706438"/>
-          </a:xfrm>
-        </p:spPr>
-        <p:txBody>
-          <a:bodyPr/>
-          <a:lstStyle/>
-          <a:p>
-            <a:r>
-              <a:rPr lang="de-DE" altLang="de-DE" dirty="0"/>
-              <a:t>Agenda</a:t>
-            </a:r>
-          </a:p>
-        </p:txBody>
-      </p:sp>
-    </p:spTree>
-    <p:extLst>
-      <p:ext uri="{BB962C8B-B14F-4D97-AF65-F5344CB8AC3E}">
-        <p14:creationId xmlns:p14="http://schemas.microsoft.com/office/powerpoint/2010/main" val="1235500680"/>
-      </p:ext>
-    </p:extLst>
-  </p:cSld>
-  <p:clrMapOvr>
-    <a:masterClrMapping/>
-  </p:clrMapOvr>
-</p:sld>
-</file>
-
-<file path=ppt/slides/slide4.xml><?xml version="1.0" encoding="utf-8"?>
-<p:sld xmlns:a="http://schemas.openxmlformats.org/drawingml/2006/main" xmlns:r="http://schemas.openxmlformats.org/officeDocument/2006/relationships" xmlns:p="http://schemas.openxmlformats.org/presentationml/2006/main">
-  <p:cSld>
-    <p:spTree>
-      <p:nvGrpSpPr>
-        <p:cNvPr id="1" name=""/>
-        <p:cNvGrpSpPr/>
-        <p:nvPr/>
-      </p:nvGrpSpPr>
-      <p:grpSpPr>
-        <a:xfrm>
-          <a:off x="0" y="0"/>
-          <a:ext cx="0" cy="0"/>
-          <a:chOff x="0" y="0"/>
-          <a:chExt cx="0" cy="0"/>
-        </a:xfrm>
-      </p:grpSpPr>
-      <p:sp>
-        <p:nvSpPr>
-          <p:cNvPr id="2" name="Titel 1"/>
-          <p:cNvSpPr>
-            <a:spLocks noGrp="1"/>
-          </p:cNvSpPr>
-          <p:nvPr>
-            <p:ph type="title"/>
-          </p:nvPr>
-        </p:nvSpPr>
-        <p:spPr/>
-        <p:txBody>
-          <a:bodyPr/>
-          <a:lstStyle/>
-          <a:p>
-            <a:r>
-              <a:rPr lang="de-DE" cap="none" dirty="0"/>
-              <a:t>Tags</a:t>
-            </a:r>
-          </a:p>
-        </p:txBody>
-      </p:sp>
-      <p:sp>
-        <p:nvSpPr>
-          <p:cNvPr id="3" name="Untertitel 2"/>
-          <p:cNvSpPr>
-            <a:spLocks noGrp="1"/>
-          </p:cNvSpPr>
-          <p:nvPr>
-            <p:ph type="body" idx="1"/>
-          </p:nvPr>
-        </p:nvSpPr>
-        <p:spPr/>
-        <p:txBody>
-          <a:bodyPr/>
-          <a:lstStyle/>
-          <a:p>
-            <a:r>
-              <a:rPr lang="de-DE" dirty="0" err="1"/>
-              <a:t>Git</a:t>
-            </a:r>
-            <a:endParaRPr lang="de-DE" dirty="0"/>
-          </a:p>
-        </p:txBody>
-      </p:sp>
-    </p:spTree>
-    <p:extLst>
-      <p:ext uri="{BB962C8B-B14F-4D97-AF65-F5344CB8AC3E}">
-        <p14:creationId xmlns:p14="http://schemas.microsoft.com/office/powerpoint/2010/main" val="3092047359"/>
-      </p:ext>
-    </p:extLst>
-  </p:cSld>
-  <p:clrMapOvr>
-    <a:masterClrMapping/>
-  </p:clrMapOvr>
-</p:sld>
-</file>
-
-<file path=ppt/slides/slide5.xml><?xml version="1.0" encoding="utf-8"?>
 <p:sld xmlns:a="http://schemas.openxmlformats.org/drawingml/2006/main" xmlns:r="http://schemas.openxmlformats.org/officeDocument/2006/relationships" xmlns:p="http://schemas.openxmlformats.org/presentationml/2006/main">
   <p:cSld>
     <p:spTree>
@@ -9257,8 +7926,8 @@
           <a:lstStyle/>
           <a:p>
             <a:r>
-              <a:rPr lang="de-DE" altLang="de-DE" dirty="0"/>
-              <a:t>Tags &amp; Releases</a:t>
+              <a:rPr lang="de-DE" altLang="de-DE"/>
+              <a:t>Inhalt</a:t>
             </a:r>
           </a:p>
         </p:txBody>
@@ -9289,18 +7958,6 @@
           <a:bodyPr/>
           <a:lstStyle/>
           <a:p>
-            <a:pPr marL="0" indent="0">
-              <a:spcBef>
-                <a:spcPts val="300"/>
-              </a:spcBef>
-              <a:buNone/>
-            </a:pPr>
-            <a:r>
-              <a:rPr lang="de-DE" altLang="de-DE" b="1" dirty="0"/>
-              <a:t>Inhalt</a:t>
-            </a:r>
-          </a:p>
-          <a:p>
             <a:pPr>
               <a:spcBef>
                 <a:spcPts val="300"/>
@@ -9413,6 +8070,212 @@
         </p:txBody>
       </p:sp>
     </p:spTree>
+  </p:cSld>
+  <p:clrMapOvr>
+    <a:masterClrMapping/>
+  </p:clrMapOvr>
+</p:sld>
+</file>
+
+<file path=ppt/slides/slide4.xml><?xml version="1.0" encoding="utf-8"?>
+<p:sld xmlns:a="http://schemas.openxmlformats.org/drawingml/2006/main" xmlns:r="http://schemas.openxmlformats.org/officeDocument/2006/relationships" xmlns:p="http://schemas.openxmlformats.org/presentationml/2006/main">
+  <p:cSld>
+    <p:spTree>
+      <p:nvGrpSpPr>
+        <p:cNvPr id="1" name=""/>
+        <p:cNvGrpSpPr/>
+        <p:nvPr/>
+      </p:nvGrpSpPr>
+      <p:grpSpPr>
+        <a:xfrm>
+          <a:off x="0" y="0"/>
+          <a:ext cx="0" cy="0"/>
+          <a:chOff x="0" y="0"/>
+          <a:chExt cx="0" cy="0"/>
+        </a:xfrm>
+      </p:grpSpPr>
+      <p:sp>
+        <p:nvSpPr>
+          <p:cNvPr id="2" name="Titel 1"/>
+          <p:cNvSpPr>
+            <a:spLocks noGrp="1"/>
+          </p:cNvSpPr>
+          <p:nvPr>
+            <p:ph type="title"/>
+          </p:nvPr>
+        </p:nvSpPr>
+        <p:spPr/>
+        <p:txBody>
+          <a:bodyPr/>
+          <a:lstStyle/>
+          <a:p>
+            <a:r>
+              <a:rPr lang="de-DE" cap="none" dirty="0"/>
+              <a:t>Tags</a:t>
+            </a:r>
+          </a:p>
+        </p:txBody>
+      </p:sp>
+      <p:sp>
+        <p:nvSpPr>
+          <p:cNvPr id="3" name="Untertitel 2"/>
+          <p:cNvSpPr>
+            <a:spLocks noGrp="1"/>
+          </p:cNvSpPr>
+          <p:nvPr>
+            <p:ph type="body" idx="1"/>
+          </p:nvPr>
+        </p:nvSpPr>
+        <p:spPr/>
+        <p:txBody>
+          <a:bodyPr/>
+          <a:lstStyle/>
+          <a:p>
+            <a:r>
+              <a:rPr lang="de-DE" dirty="0" err="1"/>
+              <a:t>Git</a:t>
+            </a:r>
+            <a:endParaRPr lang="de-DE" dirty="0"/>
+          </a:p>
+        </p:txBody>
+      </p:sp>
+    </p:spTree>
+    <p:extLst>
+      <p:ext uri="{BB962C8B-B14F-4D97-AF65-F5344CB8AC3E}">
+        <p14:creationId xmlns:p14="http://schemas.microsoft.com/office/powerpoint/2010/main" val="3092047359"/>
+      </p:ext>
+    </p:extLst>
+  </p:cSld>
+  <p:clrMapOvr>
+    <a:masterClrMapping/>
+  </p:clrMapOvr>
+</p:sld>
+</file>
+
+<file path=ppt/slides/slide5.xml><?xml version="1.0" encoding="utf-8"?>
+<p:sld xmlns:a="http://schemas.openxmlformats.org/drawingml/2006/main" xmlns:r="http://schemas.openxmlformats.org/officeDocument/2006/relationships" xmlns:p="http://schemas.openxmlformats.org/presentationml/2006/main">
+  <p:cSld>
+    <p:spTree>
+      <p:nvGrpSpPr>
+        <p:cNvPr id="1" name=""/>
+        <p:cNvGrpSpPr/>
+        <p:nvPr/>
+      </p:nvGrpSpPr>
+      <p:grpSpPr>
+        <a:xfrm>
+          <a:off x="0" y="0"/>
+          <a:ext cx="0" cy="0"/>
+          <a:chOff x="0" y="0"/>
+          <a:chExt cx="0" cy="0"/>
+        </a:xfrm>
+      </p:grpSpPr>
+      <p:sp>
+        <p:nvSpPr>
+          <p:cNvPr id="6146" name="Inhaltsplatzhalter 18">
+            <a:extLst>
+              <a:ext uri="{FF2B5EF4-FFF2-40B4-BE49-F238E27FC236}">
+                <a16:creationId xmlns:a16="http://schemas.microsoft.com/office/drawing/2014/main" id="{BE3C4C95-FD5D-27F0-ED0C-AB8113CAC9F1}"/>
+              </a:ext>
+            </a:extLst>
+          </p:cNvPr>
+          <p:cNvSpPr>
+            <a:spLocks noGrp="1"/>
+          </p:cNvSpPr>
+          <p:nvPr>
+            <p:ph idx="1"/>
+          </p:nvPr>
+        </p:nvSpPr>
+        <p:spPr>
+          <a:xfrm>
+            <a:off x="303214" y="981075"/>
+            <a:ext cx="8517258" cy="5400675"/>
+          </a:xfrm>
+        </p:spPr>
+        <p:txBody>
+          <a:bodyPr/>
+          <a:lstStyle/>
+          <a:p>
+            <a:r>
+              <a:rPr lang="de-DE" altLang="de-DE" dirty="0"/>
+              <a:t>Tagging ist wichtiges Konzept der </a:t>
+            </a:r>
+            <a:r>
+              <a:rPr lang="de-DE" altLang="de-DE" dirty="0" err="1"/>
+              <a:t>Versionverwaltung</a:t>
+            </a:r>
+            <a:endParaRPr lang="de-DE" altLang="de-DE" dirty="0"/>
+          </a:p>
+          <a:p>
+            <a:r>
+              <a:rPr lang="de-DE" altLang="de-DE" dirty="0"/>
+              <a:t>Wird verwendet, um spezifischen Entwicklungsstand zu markieren und mit Label zu versehen</a:t>
+            </a:r>
+          </a:p>
+          <a:p>
+            <a:r>
+              <a:rPr lang="de-DE" altLang="de-DE" dirty="0"/>
+              <a:t>Entwicklungsstand wird als „</a:t>
+            </a:r>
+            <a:r>
+              <a:rPr lang="de-DE" altLang="de-DE" dirty="0" err="1"/>
+              <a:t>snapshot</a:t>
+            </a:r>
+            <a:r>
+              <a:rPr lang="de-DE" altLang="de-DE" dirty="0"/>
+              <a:t>“ bezeichnet</a:t>
+            </a:r>
+          </a:p>
+          <a:p>
+            <a:r>
+              <a:rPr lang="de-DE" altLang="de-DE" dirty="0"/>
+              <a:t>Einsatz häufig, um Releases in Projekt zu markieren </a:t>
+            </a:r>
+          </a:p>
+        </p:txBody>
+      </p:sp>
+      <p:sp>
+        <p:nvSpPr>
+          <p:cNvPr id="6147" name="Rectangle 1062">
+            <a:extLst>
+              <a:ext uri="{FF2B5EF4-FFF2-40B4-BE49-F238E27FC236}">
+                <a16:creationId xmlns:a16="http://schemas.microsoft.com/office/drawing/2014/main" id="{C46E9340-3256-8D55-A265-94F2F41E288E}"/>
+              </a:ext>
+            </a:extLst>
+          </p:cNvPr>
+          <p:cNvSpPr>
+            <a:spLocks noGrp="1" noChangeArrowheads="1"/>
+          </p:cNvSpPr>
+          <p:nvPr>
+            <p:ph type="title"/>
+          </p:nvPr>
+        </p:nvSpPr>
+        <p:spPr>
+          <a:xfrm>
+            <a:off x="285750" y="142875"/>
+            <a:ext cx="5654675" cy="706438"/>
+          </a:xfrm>
+        </p:spPr>
+        <p:txBody>
+          <a:bodyPr/>
+          <a:lstStyle/>
+          <a:p>
+            <a:r>
+              <a:rPr lang="de-DE" altLang="de-DE" dirty="0" err="1"/>
+              <a:t>Git</a:t>
+            </a:r>
+            <a:r>
+              <a:rPr lang="de-DE" altLang="de-DE" dirty="0"/>
+              <a:t> – Tags </a:t>
+            </a:r>
+          </a:p>
+        </p:txBody>
+      </p:sp>
+    </p:spTree>
+    <p:extLst>
+      <p:ext uri="{BB962C8B-B14F-4D97-AF65-F5344CB8AC3E}">
+        <p14:creationId xmlns:p14="http://schemas.microsoft.com/office/powerpoint/2010/main" val="3020803649"/>
+      </p:ext>
+    </p:extLst>
   </p:cSld>
   <p:clrMapOvr>
     <a:masterClrMapping/>
@@ -9464,39 +8327,274 @@
           <a:lstStyle/>
           <a:p>
             <a:r>
+              <a:rPr lang="de-DE" altLang="de-DE" dirty="0" err="1">
+                <a:latin typeface="Consolas" panose="020B0609020204030204" pitchFamily="49" charset="0"/>
+              </a:rPr>
+              <a:t>git</a:t>
+            </a:r>
+            <a:r>
+              <a:rPr lang="de-DE" altLang="de-DE" dirty="0">
+                <a:latin typeface="Consolas" panose="020B0609020204030204" pitchFamily="49" charset="0"/>
+              </a:rPr>
+              <a:t> tag &lt;tag-name&gt; </a:t>
+            </a:r>
+            <a:r>
               <a:rPr lang="de-DE" altLang="de-DE" dirty="0"/>
-              <a:t>Tagging ist wichtiges Konzept der </a:t>
+              <a:t>um zum letzten </a:t>
             </a:r>
             <a:r>
               <a:rPr lang="de-DE" altLang="de-DE" dirty="0" err="1"/>
-              <a:t>Versionverwaltung</a:t>
-            </a:r>
-            <a:endParaRPr lang="de-DE" altLang="de-DE" dirty="0"/>
-          </a:p>
-          <a:p>
+              <a:t>Commits</a:t>
+            </a:r>
             <a:r>
               <a:rPr lang="de-DE" altLang="de-DE" dirty="0"/>
-              <a:t>Wird verwendet, um spezifischen Entwicklungsstand zu markieren und mit Label zu versehen</a:t>
-            </a:r>
-          </a:p>
-          <a:p>
+              <a:t> des aktiven </a:t>
+            </a:r>
+            <a:r>
+              <a:rPr lang="de-DE" altLang="de-DE" dirty="0" err="1"/>
+              <a:t>Branches</a:t>
+            </a:r>
             <a:r>
               <a:rPr lang="de-DE" altLang="de-DE" dirty="0"/>
-              <a:t>Entwicklungsstand wird als „</a:t>
-            </a:r>
-            <a:r>
-              <a:rPr lang="de-DE" altLang="de-DE" dirty="0" err="1"/>
-              <a:t>snapshot</a:t>
-            </a:r>
+              <a:t> ein Tag hinzuzufügen</a:t>
+            </a:r>
+          </a:p>
+          <a:p>
+            <a:pPr marL="457200" lvl="1" indent="0">
+              <a:spcBef>
+                <a:spcPts val="0"/>
+              </a:spcBef>
+              <a:buNone/>
+            </a:pPr>
+            <a:endParaRPr lang="en-US" altLang="de-DE" sz="1200" dirty="0">
+              <a:latin typeface="Consolas" panose="020B0609020204030204" pitchFamily="49" charset="0"/>
+            </a:endParaRPr>
+          </a:p>
+          <a:p>
+            <a:pPr marL="457200" lvl="1" indent="0">
+              <a:spcBef>
+                <a:spcPts val="0"/>
+              </a:spcBef>
+              <a:buNone/>
+            </a:pPr>
+            <a:r>
+              <a:rPr lang="en-US" altLang="de-DE" sz="1200" dirty="0">
+                <a:latin typeface="Consolas" panose="020B0609020204030204" pitchFamily="49" charset="0"/>
+              </a:rPr>
+              <a:t>$ git log --</a:t>
+            </a:r>
+            <a:r>
+              <a:rPr lang="en-US" altLang="de-DE" sz="1200" dirty="0" err="1">
+                <a:latin typeface="Consolas" panose="020B0609020204030204" pitchFamily="49" charset="0"/>
+              </a:rPr>
+              <a:t>oneline</a:t>
+            </a:r>
+            <a:endParaRPr lang="en-US" altLang="de-DE" sz="1200" dirty="0">
+              <a:latin typeface="Consolas" panose="020B0609020204030204" pitchFamily="49" charset="0"/>
+            </a:endParaRPr>
+          </a:p>
+          <a:p>
+            <a:pPr marL="457200" lvl="1" indent="0">
+              <a:spcBef>
+                <a:spcPts val="0"/>
+              </a:spcBef>
+              <a:buNone/>
+            </a:pPr>
+            <a:r>
+              <a:rPr lang="en-US" altLang="de-DE" sz="1200" dirty="0">
+                <a:latin typeface="Consolas" panose="020B0609020204030204" pitchFamily="49" charset="0"/>
+              </a:rPr>
+              <a:t>c3a059e (HEAD -&gt; main) Add </a:t>
+            </a:r>
+            <a:r>
+              <a:rPr lang="en-US" altLang="de-DE" sz="1200" dirty="0" err="1">
+                <a:latin typeface="Consolas" panose="020B0609020204030204" pitchFamily="49" charset="0"/>
+              </a:rPr>
+              <a:t>final_file</a:t>
+            </a:r>
+            <a:endParaRPr lang="en-US" altLang="de-DE" sz="1200" dirty="0">
+              <a:latin typeface="Consolas" panose="020B0609020204030204" pitchFamily="49" charset="0"/>
+            </a:endParaRPr>
+          </a:p>
+          <a:p>
+            <a:pPr marL="457200" lvl="1" indent="0">
+              <a:spcBef>
+                <a:spcPts val="0"/>
+              </a:spcBef>
+              <a:buNone/>
+            </a:pPr>
+            <a:r>
+              <a:rPr lang="en-US" altLang="de-DE" sz="1200" dirty="0">
+                <a:latin typeface="Consolas" panose="020B0609020204030204" pitchFamily="49" charset="0"/>
+              </a:rPr>
+              <a:t>a908be7 Add file3</a:t>
+            </a:r>
+          </a:p>
+          <a:p>
+            <a:pPr marL="457200" lvl="1" indent="0">
+              <a:spcBef>
+                <a:spcPts val="0"/>
+              </a:spcBef>
+              <a:buNone/>
+            </a:pPr>
+            <a:r>
+              <a:rPr lang="en-US" altLang="de-DE" sz="1200" dirty="0">
+                <a:latin typeface="Consolas" panose="020B0609020204030204" pitchFamily="49" charset="0"/>
+              </a:rPr>
+              <a:t>722eaf0 Add file from main</a:t>
+            </a:r>
+          </a:p>
+          <a:p>
+            <a:pPr marL="457200" lvl="1" indent="0">
+              <a:spcBef>
+                <a:spcPts val="0"/>
+              </a:spcBef>
+              <a:buNone/>
+            </a:pPr>
+            <a:r>
+              <a:rPr lang="en-US" altLang="de-DE" sz="1200" dirty="0">
+                <a:latin typeface="Consolas" panose="020B0609020204030204" pitchFamily="49" charset="0"/>
+              </a:rPr>
+              <a:t>c61ef14 Initial commit</a:t>
+            </a:r>
+          </a:p>
+          <a:p>
+            <a:pPr marL="457200" lvl="1" indent="0">
+              <a:spcBef>
+                <a:spcPts val="0"/>
+              </a:spcBef>
+              <a:buNone/>
+            </a:pPr>
+            <a:endParaRPr lang="en-US" altLang="de-DE" sz="1200" dirty="0">
+              <a:latin typeface="Consolas" panose="020B0609020204030204" pitchFamily="49" charset="0"/>
+            </a:endParaRPr>
+          </a:p>
+          <a:p>
+            <a:pPr marL="457200" lvl="1" indent="0">
+              <a:spcBef>
+                <a:spcPts val="0"/>
+              </a:spcBef>
+              <a:buNone/>
+            </a:pPr>
+            <a:r>
+              <a:rPr lang="en-US" altLang="de-DE" sz="1200" dirty="0">
+                <a:latin typeface="Consolas" panose="020B0609020204030204" pitchFamily="49" charset="0"/>
+              </a:rPr>
+              <a:t>$ git tag "release-v0.0.1"</a:t>
+            </a:r>
+          </a:p>
+          <a:p>
+            <a:pPr marL="457200" lvl="1" indent="0">
+              <a:spcBef>
+                <a:spcPts val="0"/>
+              </a:spcBef>
+              <a:buNone/>
+            </a:pPr>
+            <a:endParaRPr lang="en-US" altLang="de-DE" sz="1200" dirty="0">
+              <a:latin typeface="Consolas" panose="020B0609020204030204" pitchFamily="49" charset="0"/>
+            </a:endParaRPr>
+          </a:p>
+          <a:p>
+            <a:pPr marL="457200" lvl="1" indent="0">
+              <a:spcBef>
+                <a:spcPts val="0"/>
+              </a:spcBef>
+              <a:buNone/>
+            </a:pPr>
+            <a:r>
+              <a:rPr lang="en-US" altLang="de-DE" sz="1200" dirty="0">
+                <a:latin typeface="Consolas" panose="020B0609020204030204" pitchFamily="49" charset="0"/>
+              </a:rPr>
+              <a:t>$ git log --</a:t>
+            </a:r>
+            <a:r>
+              <a:rPr lang="en-US" altLang="de-DE" sz="1200" dirty="0" err="1">
+                <a:latin typeface="Consolas" panose="020B0609020204030204" pitchFamily="49" charset="0"/>
+              </a:rPr>
+              <a:t>oneline</a:t>
+            </a:r>
+            <a:endParaRPr lang="en-US" altLang="de-DE" sz="1200" dirty="0">
+              <a:latin typeface="Consolas" panose="020B0609020204030204" pitchFamily="49" charset="0"/>
+            </a:endParaRPr>
+          </a:p>
+          <a:p>
+            <a:pPr marL="457200" lvl="1" indent="0">
+              <a:spcBef>
+                <a:spcPts val="0"/>
+              </a:spcBef>
+              <a:buNone/>
+            </a:pPr>
+            <a:r>
+              <a:rPr lang="en-US" altLang="de-DE" sz="1200" dirty="0">
+                <a:latin typeface="Consolas" panose="020B0609020204030204" pitchFamily="49" charset="0"/>
+              </a:rPr>
+              <a:t>c3a059e (HEAD -&gt; main, tag: release-v0.0.1) Add </a:t>
+            </a:r>
+            <a:r>
+              <a:rPr lang="en-US" altLang="de-DE" sz="1200" dirty="0" err="1">
+                <a:latin typeface="Consolas" panose="020B0609020204030204" pitchFamily="49" charset="0"/>
+              </a:rPr>
+              <a:t>final_file</a:t>
+            </a:r>
+            <a:endParaRPr lang="en-US" altLang="de-DE" sz="1200" dirty="0">
+              <a:latin typeface="Consolas" panose="020B0609020204030204" pitchFamily="49" charset="0"/>
+            </a:endParaRPr>
+          </a:p>
+          <a:p>
+            <a:pPr marL="457200" lvl="1" indent="0">
+              <a:spcBef>
+                <a:spcPts val="0"/>
+              </a:spcBef>
+              <a:buNone/>
+            </a:pPr>
+            <a:r>
+              <a:rPr lang="en-US" altLang="de-DE" sz="1200" dirty="0">
+                <a:latin typeface="Consolas" panose="020B0609020204030204" pitchFamily="49" charset="0"/>
+              </a:rPr>
+              <a:t>a908be7 Add file3</a:t>
+            </a:r>
+          </a:p>
+          <a:p>
+            <a:pPr marL="457200" lvl="1" indent="0">
+              <a:spcBef>
+                <a:spcPts val="0"/>
+              </a:spcBef>
+              <a:buNone/>
+            </a:pPr>
+            <a:r>
+              <a:rPr lang="en-US" altLang="de-DE" sz="1200" dirty="0">
+                <a:latin typeface="Consolas" panose="020B0609020204030204" pitchFamily="49" charset="0"/>
+              </a:rPr>
+              <a:t>722eaf0 Add file from main</a:t>
+            </a:r>
+          </a:p>
+          <a:p>
+            <a:pPr marL="457200" lvl="1" indent="0">
+              <a:spcBef>
+                <a:spcPts val="0"/>
+              </a:spcBef>
+              <a:buNone/>
+            </a:pPr>
+            <a:r>
+              <a:rPr lang="en-US" altLang="de-DE" sz="1200" dirty="0">
+                <a:latin typeface="Consolas" panose="020B0609020204030204" pitchFamily="49" charset="0"/>
+              </a:rPr>
+              <a:t>c61ef14 Initial commit</a:t>
+            </a:r>
+            <a:endParaRPr lang="de-DE" altLang="de-DE" sz="1200" dirty="0">
+              <a:latin typeface="Consolas" panose="020B0609020204030204" pitchFamily="49" charset="0"/>
+            </a:endParaRPr>
+          </a:p>
+          <a:p>
             <a:r>
               <a:rPr lang="de-DE" altLang="de-DE" dirty="0"/>
-              <a:t>“ bezeichnet</a:t>
+              <a:t>Fügt leichtgewichtigen Tag hinzu</a:t>
             </a:r>
           </a:p>
           <a:p>
             <a:r>
               <a:rPr lang="de-DE" altLang="de-DE" dirty="0"/>
-              <a:t>Einsatz häufig, um Releases in Projekt zu markieren </a:t>
+              <a:t>Tag wird an allen Files im Repository gesetzt</a:t>
             </a:r>
           </a:p>
         </p:txBody>
@@ -9541,7 +8639,7 @@
     </p:spTree>
     <p:extLst>
       <p:ext uri="{BB962C8B-B14F-4D97-AF65-F5344CB8AC3E}">
-        <p14:creationId xmlns:p14="http://schemas.microsoft.com/office/powerpoint/2010/main" val="3020803649"/>
+        <p14:creationId xmlns:p14="http://schemas.microsoft.com/office/powerpoint/2010/main" val="95346933"/>
       </p:ext>
     </p:extLst>
   </p:cSld>
@@ -9604,27 +8702,11 @@
               <a:rPr lang="de-DE" altLang="de-DE" dirty="0">
                 <a:latin typeface="Consolas" panose="020B0609020204030204" pitchFamily="49" charset="0"/>
               </a:rPr>
-              <a:t> tag &lt;tag-name&gt; </a:t>
+              <a:t> tag </a:t>
             </a:r>
             <a:r>
               <a:rPr lang="de-DE" altLang="de-DE" dirty="0"/>
-              <a:t>um zum letzten </a:t>
-            </a:r>
-            <a:r>
-              <a:rPr lang="de-DE" altLang="de-DE" dirty="0" err="1"/>
-              <a:t>Commits</a:t>
-            </a:r>
-            <a:r>
-              <a:rPr lang="de-DE" altLang="de-DE" dirty="0"/>
-              <a:t> des aktiven </a:t>
-            </a:r>
-            <a:r>
-              <a:rPr lang="de-DE" altLang="de-DE" dirty="0" err="1"/>
-              <a:t>Branches</a:t>
-            </a:r>
-            <a:r>
-              <a:rPr lang="de-DE" altLang="de-DE" dirty="0"/>
-              <a:t> ein Tag hinzuzufügen</a:t>
+              <a:t>zeigt alle Tags im aktuellen Projekt</a:t>
             </a:r>
           </a:p>
           <a:p>
@@ -9649,17 +8731,8 @@
               <a:rPr lang="en-US" altLang="de-DE" sz="1200" dirty="0">
                 <a:latin typeface="Consolas" panose="020B0609020204030204" pitchFamily="49" charset="0"/>
               </a:rPr>
-              <a:t>$ git log --</a:t>
-            </a:r>
-            <a:r>
-              <a:rPr lang="en-US" altLang="de-DE" sz="1200" dirty="0" err="1">
-                <a:latin typeface="Consolas" panose="020B0609020204030204" pitchFamily="49" charset="0"/>
-              </a:rPr>
-              <a:t>oneline</a:t>
-            </a:r>
-            <a:endParaRPr lang="en-US" altLang="de-DE" sz="1200" dirty="0">
-              <a:latin typeface="Consolas" panose="020B0609020204030204" pitchFamily="49" charset="0"/>
-            </a:endParaRPr>
+              <a:t>$ git tag</a:t>
+            </a:r>
           </a:p>
           <a:p>
             <a:pPr marL="457200" lvl="1" indent="0">
@@ -9672,17 +8745,8 @@
               <a:rPr lang="en-US" altLang="de-DE" sz="1200" dirty="0">
                 <a:latin typeface="Consolas" panose="020B0609020204030204" pitchFamily="49" charset="0"/>
               </a:rPr>
-              <a:t>c3a059e (HEAD -&gt; main) Add </a:t>
-            </a:r>
-            <a:r>
-              <a:rPr lang="en-US" altLang="de-DE" sz="1200" dirty="0" err="1">
-                <a:latin typeface="Consolas" panose="020B0609020204030204" pitchFamily="49" charset="0"/>
-              </a:rPr>
-              <a:t>final_file</a:t>
-            </a:r>
-            <a:endParaRPr lang="en-US" altLang="de-DE" sz="1200" dirty="0">
-              <a:latin typeface="Consolas" panose="020B0609020204030204" pitchFamily="49" charset="0"/>
-            </a:endParaRPr>
+              <a:t>release-v0.0.1</a:t>
+            </a:r>
           </a:p>
           <a:p>
             <a:pPr marL="457200" lvl="1" indent="0">
@@ -9695,7 +8759,7 @@
               <a:rPr lang="en-US" altLang="de-DE" sz="1200" dirty="0">
                 <a:latin typeface="Consolas" panose="020B0609020204030204" pitchFamily="49" charset="0"/>
               </a:rPr>
-              <a:t>a908be7 Add file3</a:t>
+              <a:t>release-v0.0.2</a:t>
             </a:r>
           </a:p>
           <a:p>
@@ -9709,7 +8773,40 @@
               <a:rPr lang="en-US" altLang="de-DE" sz="1200" dirty="0">
                 <a:latin typeface="Consolas" panose="020B0609020204030204" pitchFamily="49" charset="0"/>
               </a:rPr>
-              <a:t>722eaf0 Add file from main</a:t>
+              <a:t>release-v1.0.0</a:t>
+            </a:r>
+            <a:endParaRPr lang="de-DE" altLang="de-DE" dirty="0">
+              <a:latin typeface="Consolas" panose="020B0609020204030204" pitchFamily="49" charset="0"/>
+            </a:endParaRPr>
+          </a:p>
+          <a:p>
+            <a:r>
+              <a:rPr lang="de-DE" altLang="de-DE" dirty="0" err="1">
+                <a:latin typeface="Consolas" panose="020B0609020204030204" pitchFamily="49" charset="0"/>
+              </a:rPr>
+              <a:t>git</a:t>
+            </a:r>
+            <a:r>
+              <a:rPr lang="de-DE" altLang="de-DE" dirty="0">
+                <a:latin typeface="Consolas" panose="020B0609020204030204" pitchFamily="49" charset="0"/>
+              </a:rPr>
+              <a:t> </a:t>
+            </a:r>
+            <a:r>
+              <a:rPr lang="de-DE" altLang="de-DE" dirty="0" err="1">
+                <a:latin typeface="Consolas" panose="020B0609020204030204" pitchFamily="49" charset="0"/>
+              </a:rPr>
+              <a:t>show</a:t>
+            </a:r>
+            <a:r>
+              <a:rPr lang="de-DE" altLang="de-DE" dirty="0">
+                <a:latin typeface="Consolas" panose="020B0609020204030204" pitchFamily="49" charset="0"/>
+              </a:rPr>
+              <a:t> &lt;tag-name&gt; </a:t>
+            </a:r>
+            <a:r>
+              <a:rPr lang="de-DE" altLang="de-DE" dirty="0"/>
+              <a:t>zeigt den Commit zum angegebenen Tag</a:t>
             </a:r>
           </a:p>
           <a:p>
@@ -9719,12 +8816,9 @@
               </a:spcBef>
               <a:buNone/>
             </a:pPr>
-            <a:r>
-              <a:rPr lang="en-US" altLang="de-DE" sz="1200" dirty="0">
-                <a:latin typeface="Consolas" panose="020B0609020204030204" pitchFamily="49" charset="0"/>
-              </a:rPr>
-              <a:t>c61ef14 Initial commit</a:t>
-            </a:r>
+            <a:endParaRPr lang="de-DE" altLang="de-DE" sz="1200" dirty="0">
+              <a:latin typeface="Consolas" panose="020B0609020204030204" pitchFamily="49" charset="0"/>
+            </a:endParaRPr>
           </a:p>
           <a:p>
             <a:pPr marL="457200" lvl="1" indent="0">
@@ -9733,9 +8827,36 @@
               </a:spcBef>
               <a:buNone/>
             </a:pPr>
-            <a:endParaRPr lang="en-US" altLang="de-DE" sz="1200" dirty="0">
-              <a:latin typeface="Consolas" panose="020B0609020204030204" pitchFamily="49" charset="0"/>
-            </a:endParaRPr>
+            <a:r>
+              <a:rPr lang="de-DE" altLang="de-DE" sz="1200" dirty="0">
+                <a:latin typeface="Consolas" panose="020B0609020204030204" pitchFamily="49" charset="0"/>
+              </a:rPr>
+              <a:t>$ </a:t>
+            </a:r>
+            <a:r>
+              <a:rPr lang="de-DE" altLang="de-DE" sz="1200" dirty="0" err="1">
+                <a:latin typeface="Consolas" panose="020B0609020204030204" pitchFamily="49" charset="0"/>
+              </a:rPr>
+              <a:t>git</a:t>
+            </a:r>
+            <a:r>
+              <a:rPr lang="de-DE" altLang="de-DE" sz="1200" dirty="0">
+                <a:latin typeface="Consolas" panose="020B0609020204030204" pitchFamily="49" charset="0"/>
+              </a:rPr>
+              <a:t> </a:t>
+            </a:r>
+            <a:r>
+              <a:rPr lang="de-DE" altLang="de-DE" sz="1200" dirty="0" err="1">
+                <a:latin typeface="Consolas" panose="020B0609020204030204" pitchFamily="49" charset="0"/>
+              </a:rPr>
+              <a:t>show</a:t>
+            </a:r>
+            <a:r>
+              <a:rPr lang="de-DE" altLang="de-DE" sz="1200" dirty="0">
+                <a:latin typeface="Consolas" panose="020B0609020204030204" pitchFamily="49" charset="0"/>
+              </a:rPr>
+              <a:t> release-v0.0.1</a:t>
+            </a:r>
           </a:p>
           <a:p>
             <a:pPr marL="457200" lvl="1" indent="0">
@@ -9745,10 +8866,16 @@
               <a:buNone/>
             </a:pPr>
             <a:r>
-              <a:rPr lang="en-US" altLang="de-DE" sz="1200" dirty="0">
-                <a:latin typeface="Consolas" panose="020B0609020204030204" pitchFamily="49" charset="0"/>
-              </a:rPr>
-              <a:t>$ git tag "release-v0.0.1"</a:t>
+              <a:rPr lang="de-DE" altLang="de-DE" sz="1200" dirty="0" err="1">
+                <a:latin typeface="Consolas" panose="020B0609020204030204" pitchFamily="49" charset="0"/>
+              </a:rPr>
+              <a:t>commit</a:t>
+            </a:r>
+            <a:r>
+              <a:rPr lang="de-DE" altLang="de-DE" sz="1200" dirty="0">
+                <a:latin typeface="Consolas" panose="020B0609020204030204" pitchFamily="49" charset="0"/>
+              </a:rPr>
+              <a:t> c3a059e2d6e4acfdca1295104b4d6a55f8bd00e4 (tag: release-v0.0.1)</a:t>
             </a:r>
           </a:p>
           <a:p>
@@ -9758,9 +8885,30 @@
               </a:spcBef>
               <a:buNone/>
             </a:pPr>
-            <a:endParaRPr lang="en-US" altLang="de-DE" sz="1200" dirty="0">
-              <a:latin typeface="Consolas" panose="020B0609020204030204" pitchFamily="49" charset="0"/>
-            </a:endParaRPr>
+            <a:r>
+              <a:rPr lang="de-DE" altLang="de-DE" sz="1200" dirty="0" err="1">
+                <a:latin typeface="Consolas" panose="020B0609020204030204" pitchFamily="49" charset="0"/>
+              </a:rPr>
+              <a:t>Author</a:t>
+            </a:r>
+            <a:r>
+              <a:rPr lang="de-DE" altLang="de-DE" sz="1200" dirty="0">
+                <a:latin typeface="Consolas" panose="020B0609020204030204" pitchFamily="49" charset="0"/>
+              </a:rPr>
+              <a:t>: </a:t>
+            </a:r>
+            <a:r>
+              <a:rPr lang="de-DE" altLang="de-DE" sz="1200" dirty="0" err="1">
+                <a:latin typeface="Consolas" panose="020B0609020204030204" pitchFamily="49" charset="0"/>
+              </a:rPr>
+              <a:t>Example</a:t>
+            </a:r>
+            <a:r>
+              <a:rPr lang="de-DE" altLang="de-DE" sz="1200" dirty="0">
+                <a:latin typeface="Consolas" panose="020B0609020204030204" pitchFamily="49" charset="0"/>
+              </a:rPr>
+              <a:t> User &lt;example.user@example.de&gt;</a:t>
+            </a:r>
           </a:p>
           <a:p>
             <a:pPr marL="457200" lvl="1" indent="0">
@@ -9770,20 +8918,11 @@
               <a:buNone/>
             </a:pPr>
             <a:r>
-              <a:rPr lang="en-US" altLang="de-DE" sz="1200" dirty="0">
-                <a:latin typeface="Consolas" panose="020B0609020204030204" pitchFamily="49" charset="0"/>
-              </a:rPr>
-              <a:t>$ git log --</a:t>
-            </a:r>
-            <a:r>
-              <a:rPr lang="en-US" altLang="de-DE" sz="1200" dirty="0" err="1">
-                <a:latin typeface="Consolas" panose="020B0609020204030204" pitchFamily="49" charset="0"/>
-              </a:rPr>
-              <a:t>oneline</a:t>
-            </a:r>
-            <a:endParaRPr lang="en-US" altLang="de-DE" sz="1200" dirty="0">
-              <a:latin typeface="Consolas" panose="020B0609020204030204" pitchFamily="49" charset="0"/>
-            </a:endParaRPr>
+              <a:rPr lang="de-DE" altLang="de-DE" sz="1200" dirty="0">
+                <a:latin typeface="Consolas" panose="020B0609020204030204" pitchFamily="49" charset="0"/>
+              </a:rPr>
+              <a:t>Date:   Tue May 28 14:47:28 2024 +0200</a:t>
+            </a:r>
           </a:p>
           <a:p>
             <a:pPr marL="457200" lvl="1" indent="0">
@@ -9792,19 +8931,7 @@
               </a:spcBef>
               <a:buNone/>
             </a:pPr>
-            <a:r>
-              <a:rPr lang="en-US" altLang="de-DE" sz="1200" dirty="0">
-                <a:latin typeface="Consolas" panose="020B0609020204030204" pitchFamily="49" charset="0"/>
-              </a:rPr>
-              <a:t>c3a059e (HEAD -&gt; main, tag: release-v0.0.1) Add </a:t>
-            </a:r>
-            <a:r>
-              <a:rPr lang="en-US" altLang="de-DE" sz="1200" dirty="0" err="1">
-                <a:latin typeface="Consolas" panose="020B0609020204030204" pitchFamily="49" charset="0"/>
-              </a:rPr>
-              <a:t>final_file</a:t>
-            </a:r>
-            <a:endParaRPr lang="en-US" altLang="de-DE" sz="1200" dirty="0">
+            <a:endParaRPr lang="de-DE" altLang="de-DE" sz="1200" dirty="0">
               <a:latin typeface="Consolas" panose="020B0609020204030204" pitchFamily="49" charset="0"/>
             </a:endParaRPr>
           </a:p>
@@ -9816,11 +8943,20 @@
               <a:buNone/>
             </a:pPr>
             <a:r>
-              <a:rPr lang="en-US" altLang="de-DE" sz="1200" dirty="0">
-                <a:latin typeface="Consolas" panose="020B0609020204030204" pitchFamily="49" charset="0"/>
-              </a:rPr>
-              <a:t>a908be7 Add file3</a:t>
-            </a:r>
+              <a:rPr lang="de-DE" altLang="de-DE" sz="1200" dirty="0">
+                <a:latin typeface="Consolas" panose="020B0609020204030204" pitchFamily="49" charset="0"/>
+              </a:rPr>
+              <a:t>    Add </a:t>
+            </a:r>
+            <a:r>
+              <a:rPr lang="de-DE" altLang="de-DE" sz="1200" dirty="0" err="1">
+                <a:latin typeface="Consolas" panose="020B0609020204030204" pitchFamily="49" charset="0"/>
+              </a:rPr>
+              <a:t>final_file</a:t>
+            </a:r>
+            <a:endParaRPr lang="de-DE" altLang="de-DE" sz="1200" dirty="0">
+              <a:latin typeface="Consolas" panose="020B0609020204030204" pitchFamily="49" charset="0"/>
+            </a:endParaRPr>
           </a:p>
           <a:p>
             <a:pPr marL="457200" lvl="1" indent="0">
@@ -9829,12 +8965,9 @@
               </a:spcBef>
               <a:buNone/>
             </a:pPr>
-            <a:r>
-              <a:rPr lang="en-US" altLang="de-DE" sz="1200" dirty="0">
-                <a:latin typeface="Consolas" panose="020B0609020204030204" pitchFamily="49" charset="0"/>
-              </a:rPr>
-              <a:t>722eaf0 Add file from main</a:t>
-            </a:r>
+            <a:endParaRPr lang="de-DE" altLang="de-DE" sz="1200" dirty="0">
+              <a:latin typeface="Consolas" panose="020B0609020204030204" pitchFamily="49" charset="0"/>
+            </a:endParaRPr>
           </a:p>
           <a:p>
             <a:pPr marL="457200" lvl="1" indent="0">
@@ -9844,25 +8977,92 @@
               <a:buNone/>
             </a:pPr>
             <a:r>
-              <a:rPr lang="en-US" altLang="de-DE" sz="1200" dirty="0">
-                <a:latin typeface="Consolas" panose="020B0609020204030204" pitchFamily="49" charset="0"/>
-              </a:rPr>
-              <a:t>c61ef14 Initial commit</a:t>
-            </a:r>
-            <a:endParaRPr lang="de-DE" altLang="de-DE" sz="1200" dirty="0">
-              <a:latin typeface="Consolas" panose="020B0609020204030204" pitchFamily="49" charset="0"/>
-            </a:endParaRPr>
-          </a:p>
-          <a:p>
-            <a:r>
-              <a:rPr lang="de-DE" altLang="de-DE" dirty="0"/>
-              <a:t>Fügt leichtgewichtigen Tag hinzu</a:t>
-            </a:r>
-          </a:p>
-          <a:p>
-            <a:r>
-              <a:rPr lang="de-DE" altLang="de-DE" dirty="0"/>
-              <a:t>Tag wird an allen Files im Repository gesetzt</a:t>
+              <a:rPr lang="de-DE" altLang="de-DE" sz="1200" dirty="0" err="1">
+                <a:latin typeface="Consolas" panose="020B0609020204030204" pitchFamily="49" charset="0"/>
+              </a:rPr>
+              <a:t>diff</a:t>
+            </a:r>
+            <a:r>
+              <a:rPr lang="de-DE" altLang="de-DE" sz="1200" dirty="0">
+                <a:latin typeface="Consolas" panose="020B0609020204030204" pitchFamily="49" charset="0"/>
+              </a:rPr>
+              <a:t> --</a:t>
+            </a:r>
+            <a:r>
+              <a:rPr lang="de-DE" altLang="de-DE" sz="1200" dirty="0" err="1">
+                <a:latin typeface="Consolas" panose="020B0609020204030204" pitchFamily="49" charset="0"/>
+              </a:rPr>
+              <a:t>git</a:t>
+            </a:r>
+            <a:r>
+              <a:rPr lang="de-DE" altLang="de-DE" sz="1200" dirty="0">
+                <a:latin typeface="Consolas" panose="020B0609020204030204" pitchFamily="49" charset="0"/>
+              </a:rPr>
+              <a:t> a/final_file.txt b/final_file.txt</a:t>
+            </a:r>
+          </a:p>
+          <a:p>
+            <a:pPr marL="457200" lvl="1" indent="0">
+              <a:spcBef>
+                <a:spcPts val="0"/>
+              </a:spcBef>
+              <a:buNone/>
+            </a:pPr>
+            <a:r>
+              <a:rPr lang="de-DE" altLang="de-DE" sz="1200" dirty="0" err="1">
+                <a:latin typeface="Consolas" panose="020B0609020204030204" pitchFamily="49" charset="0"/>
+              </a:rPr>
+              <a:t>new</a:t>
+            </a:r>
+            <a:r>
+              <a:rPr lang="de-DE" altLang="de-DE" sz="1200" dirty="0">
+                <a:latin typeface="Consolas" panose="020B0609020204030204" pitchFamily="49" charset="0"/>
+              </a:rPr>
+              <a:t> </a:t>
+            </a:r>
+            <a:r>
+              <a:rPr lang="de-DE" altLang="de-DE" sz="1200" dirty="0" err="1">
+                <a:latin typeface="Consolas" panose="020B0609020204030204" pitchFamily="49" charset="0"/>
+              </a:rPr>
+              <a:t>file</a:t>
+            </a:r>
+            <a:r>
+              <a:rPr lang="de-DE" altLang="de-DE" sz="1200" dirty="0">
+                <a:latin typeface="Consolas" panose="020B0609020204030204" pitchFamily="49" charset="0"/>
+              </a:rPr>
+              <a:t> </a:t>
+            </a:r>
+            <a:r>
+              <a:rPr lang="de-DE" altLang="de-DE" sz="1200" dirty="0" err="1">
+                <a:latin typeface="Consolas" panose="020B0609020204030204" pitchFamily="49" charset="0"/>
+              </a:rPr>
+              <a:t>mode</a:t>
+            </a:r>
+            <a:r>
+              <a:rPr lang="de-DE" altLang="de-DE" sz="1200" dirty="0">
+                <a:latin typeface="Consolas" panose="020B0609020204030204" pitchFamily="49" charset="0"/>
+              </a:rPr>
+              <a:t> 100644</a:t>
+            </a:r>
+          </a:p>
+          <a:p>
+            <a:pPr marL="457200" lvl="1" indent="0">
+              <a:spcBef>
+                <a:spcPts val="0"/>
+              </a:spcBef>
+              <a:buNone/>
+            </a:pPr>
+            <a:r>
+              <a:rPr lang="de-DE" altLang="de-DE" sz="1200" dirty="0" err="1">
+                <a:latin typeface="Consolas" panose="020B0609020204030204" pitchFamily="49" charset="0"/>
+              </a:rPr>
+              <a:t>index</a:t>
+            </a:r>
+            <a:r>
+              <a:rPr lang="de-DE" altLang="de-DE" sz="1200" dirty="0">
+                <a:latin typeface="Consolas" panose="020B0609020204030204" pitchFamily="49" charset="0"/>
+              </a:rPr>
+              <a:t> 0000000..e69de29</a:t>
             </a:r>
           </a:p>
         </p:txBody>
@@ -9907,7 +9107,7 @@
     </p:spTree>
     <p:extLst>
       <p:ext uri="{BB962C8B-B14F-4D97-AF65-F5344CB8AC3E}">
-        <p14:creationId xmlns:p14="http://schemas.microsoft.com/office/powerpoint/2010/main" val="95346933"/>
+        <p14:creationId xmlns:p14="http://schemas.microsoft.com/office/powerpoint/2010/main" val="3268422799"/>
       </p:ext>
     </p:extLst>
   </p:cSld>
@@ -9961,20 +9161,8 @@
           <a:lstStyle/>
           <a:p>
             <a:r>
-              <a:rPr lang="de-DE" altLang="de-DE" dirty="0" err="1">
-                <a:latin typeface="Consolas" panose="020B0609020204030204" pitchFamily="49" charset="0"/>
-              </a:rPr>
-              <a:t>git</a:t>
-            </a:r>
-            <a:r>
-              <a:rPr lang="de-DE" altLang="de-DE" dirty="0">
-                <a:latin typeface="Consolas" panose="020B0609020204030204" pitchFamily="49" charset="0"/>
-              </a:rPr>
-              <a:t> tag </a:t>
-            </a:r>
-            <a:r>
               <a:rPr lang="de-DE" altLang="de-DE" dirty="0"/>
-              <a:t>zeigt alle Tags im aktuellen Projekt</a:t>
+              <a:t>Rückwirkendes Tagging ist mit Angabe der Commit-ID möglich</a:t>
             </a:r>
           </a:p>
           <a:p>
@@ -10112,7 +9300,7 @@
               <a:rPr lang="en-US" altLang="de-DE" sz="1200" dirty="0">
                 <a:latin typeface="Consolas" panose="020B0609020204030204" pitchFamily="49" charset="0"/>
               </a:rPr>
-              <a:t>$ git tag release-0.0.0 a908be7</a:t>
+              <a:t>$ git tag release-v0.0.0 a908be7</a:t>
             </a:r>
           </a:p>
           <a:p>
@@ -10197,7 +9385,7 @@
               <a:rPr lang="en-US" altLang="de-DE" sz="1200" dirty="0">
                 <a:latin typeface="Consolas" panose="020B0609020204030204" pitchFamily="49" charset="0"/>
               </a:rPr>
-              <a:t>a908be7 (tag: release-0.0.0) Add file3</a:t>
+              <a:t>a908be7 (tag: release-v0.0.0) Add file3</a:t>
             </a:r>
           </a:p>
           <a:p>
@@ -10232,9 +9420,17 @@
             </a:endParaRPr>
           </a:p>
           <a:p>
-            <a:pPr marL="0" indent="0">
+            <a:pPr marL="457200" lvl="1" indent="0">
+              <a:spcBef>
+                <a:spcPts val="0"/>
+              </a:spcBef>
               <a:buNone/>
             </a:pPr>
+            <a:endParaRPr lang="de-DE" altLang="de-DE" sz="1200" dirty="0">
+              <a:latin typeface="Consolas" panose="020B0609020204030204" pitchFamily="49" charset="0"/>
+            </a:endParaRPr>
+          </a:p>
+          <a:p>
             <a:endParaRPr lang="de-DE" altLang="de-DE" dirty="0"/>
           </a:p>
         </p:txBody>
@@ -10279,7 +9475,7 @@
     </p:spTree>
     <p:extLst>
       <p:ext uri="{BB962C8B-B14F-4D97-AF65-F5344CB8AC3E}">
-        <p14:creationId xmlns:p14="http://schemas.microsoft.com/office/powerpoint/2010/main" val="1109548834"/>
+        <p14:creationId xmlns:p14="http://schemas.microsoft.com/office/powerpoint/2010/main" val="1475861676"/>
       </p:ext>
     </p:extLst>
   </p:cSld>
@@ -10348,7 +9544,7 @@
               <a:rPr lang="de-DE" altLang="de-DE" dirty="0" err="1">
                 <a:latin typeface="Consolas" panose="020B0609020204030204" pitchFamily="49" charset="0"/>
               </a:rPr>
-              <a:t>show</a:t>
+              <a:t>checkout</a:t>
             </a:r>
             <a:r>
               <a:rPr lang="de-DE" altLang="de-DE" dirty="0">
@@ -10358,7 +9554,7 @@
             </a:r>
             <a:r>
               <a:rPr lang="de-DE" altLang="de-DE" dirty="0"/>
-              <a:t>zeigt den Commit zum angegebenen Tag</a:t>
+              <a:t>ermöglicht Auschecken eines getaggten Commit</a:t>
             </a:r>
           </a:p>
           <a:p>
@@ -10368,7 +9564,7 @@
               </a:spcBef>
               <a:buNone/>
             </a:pPr>
-            <a:endParaRPr lang="de-DE" altLang="de-DE" sz="1200" dirty="0">
+            <a:endParaRPr lang="en-US" altLang="de-DE" sz="1200" dirty="0">
               <a:latin typeface="Consolas" panose="020B0609020204030204" pitchFamily="49" charset="0"/>
             </a:endParaRPr>
           </a:p>
@@ -10380,34 +9576,10 @@
               <a:buNone/>
             </a:pPr>
             <a:r>
-              <a:rPr lang="de-DE" altLang="de-DE" sz="1200" dirty="0">
-                <a:latin typeface="Consolas" panose="020B0609020204030204" pitchFamily="49" charset="0"/>
-              </a:rPr>
-              <a:t>$ </a:t>
-            </a:r>
-            <a:r>
-              <a:rPr lang="de-DE" altLang="de-DE" sz="1200" dirty="0" err="1">
-                <a:latin typeface="Consolas" panose="020B0609020204030204" pitchFamily="49" charset="0"/>
-              </a:rPr>
-              <a:t>git</a:t>
-            </a:r>
-            <a:r>
-              <a:rPr lang="de-DE" altLang="de-DE" sz="1200" dirty="0">
-                <a:latin typeface="Consolas" panose="020B0609020204030204" pitchFamily="49" charset="0"/>
-              </a:rPr>
-              <a:t> </a:t>
-            </a:r>
-            <a:r>
-              <a:rPr lang="de-DE" altLang="de-DE" sz="1200" dirty="0" err="1">
-                <a:latin typeface="Consolas" panose="020B0609020204030204" pitchFamily="49" charset="0"/>
-              </a:rPr>
-              <a:t>show</a:t>
-            </a:r>
-            <a:r>
-              <a:rPr lang="de-DE" altLang="de-DE" sz="1200" dirty="0">
-                <a:latin typeface="Consolas" panose="020B0609020204030204" pitchFamily="49" charset="0"/>
-              </a:rPr>
-              <a:t> release-v0.0.1</a:t>
+              <a:rPr lang="en-US" altLang="de-DE" sz="1200" dirty="0">
+                <a:latin typeface="Consolas" panose="020B0609020204030204" pitchFamily="49" charset="0"/>
+              </a:rPr>
+              <a:t>$ git checkout release-v0.0.1</a:t>
             </a:r>
           </a:p>
           <a:p>
@@ -10418,16 +9590,10 @@
               <a:buNone/>
             </a:pPr>
             <a:r>
-              <a:rPr lang="de-DE" altLang="de-DE" sz="1200" dirty="0" err="1">
-                <a:latin typeface="Consolas" panose="020B0609020204030204" pitchFamily="49" charset="0"/>
-              </a:rPr>
-              <a:t>commit</a:t>
-            </a:r>
-            <a:r>
-              <a:rPr lang="de-DE" altLang="de-DE" sz="1200" dirty="0">
-                <a:latin typeface="Consolas" panose="020B0609020204030204" pitchFamily="49" charset="0"/>
-              </a:rPr>
-              <a:t> c3a059e2d6e4acfdca1295104b4d6a55f8bd00e4 (tag: release-v0.0.1)</a:t>
+              <a:rPr lang="en-US" altLang="de-DE" sz="1200" dirty="0">
+                <a:latin typeface="Consolas" panose="020B0609020204030204" pitchFamily="49" charset="0"/>
+              </a:rPr>
+              <a:t>Note: switching to 'release-v0.0.1'.</a:t>
             </a:r>
           </a:p>
           <a:p>
@@ -10437,30 +9603,9 @@
               </a:spcBef>
               <a:buNone/>
             </a:pPr>
-            <a:r>
-              <a:rPr lang="de-DE" altLang="de-DE" sz="1200" dirty="0" err="1">
-                <a:latin typeface="Consolas" panose="020B0609020204030204" pitchFamily="49" charset="0"/>
-              </a:rPr>
-              <a:t>Author</a:t>
-            </a:r>
-            <a:r>
-              <a:rPr lang="de-DE" altLang="de-DE" sz="1200" dirty="0">
-                <a:latin typeface="Consolas" panose="020B0609020204030204" pitchFamily="49" charset="0"/>
-              </a:rPr>
-              <a:t>: </a:t>
-            </a:r>
-            <a:r>
-              <a:rPr lang="de-DE" altLang="de-DE" sz="1200" dirty="0" err="1">
-                <a:latin typeface="Consolas" panose="020B0609020204030204" pitchFamily="49" charset="0"/>
-              </a:rPr>
-              <a:t>Example</a:t>
-            </a:r>
-            <a:r>
-              <a:rPr lang="de-DE" altLang="de-DE" sz="1200" dirty="0">
-                <a:latin typeface="Consolas" panose="020B0609020204030204" pitchFamily="49" charset="0"/>
-              </a:rPr>
-              <a:t> User &lt;example.user@example.de&gt;</a:t>
-            </a:r>
+            <a:endParaRPr lang="en-US" altLang="de-DE" sz="1200" dirty="0">
+              <a:latin typeface="Consolas" panose="020B0609020204030204" pitchFamily="49" charset="0"/>
+            </a:endParaRPr>
           </a:p>
           <a:p>
             <a:pPr marL="457200" lvl="1" indent="0">
@@ -10470,10 +9615,10 @@
               <a:buNone/>
             </a:pPr>
             <a:r>
-              <a:rPr lang="de-DE" altLang="de-DE" sz="1200" dirty="0">
-                <a:latin typeface="Consolas" panose="020B0609020204030204" pitchFamily="49" charset="0"/>
-              </a:rPr>
-              <a:t>Date:   Tue May 28 14:47:28 2024 +0200</a:t>
+              <a:rPr lang="en-US" altLang="de-DE" sz="1200" dirty="0">
+                <a:latin typeface="Consolas" panose="020B0609020204030204" pitchFamily="49" charset="0"/>
+              </a:rPr>
+              <a:t>You are in 'detached HEAD' state. You can look around, make experimental</a:t>
             </a:r>
           </a:p>
           <a:p>
@@ -10483,9 +9628,12 @@
               </a:spcBef>
               <a:buNone/>
             </a:pPr>
-            <a:endParaRPr lang="de-DE" altLang="de-DE" sz="1200" dirty="0">
-              <a:latin typeface="Consolas" panose="020B0609020204030204" pitchFamily="49" charset="0"/>
-            </a:endParaRPr>
+            <a:r>
+              <a:rPr lang="en-US" altLang="de-DE" sz="1200" dirty="0">
+                <a:latin typeface="Consolas" panose="020B0609020204030204" pitchFamily="49" charset="0"/>
+              </a:rPr>
+              <a:t>changes and commit them, and you can discard any commits you make in this</a:t>
+            </a:r>
           </a:p>
           <a:p>
             <a:pPr marL="457200" lvl="1" indent="0">
@@ -10495,20 +9643,11 @@
               <a:buNone/>
             </a:pPr>
             <a:r>
-              <a:rPr lang="de-DE" altLang="de-DE" sz="1200" dirty="0">
-                <a:latin typeface="Consolas" panose="020B0609020204030204" pitchFamily="49" charset="0"/>
-              </a:rPr>
-              <a:t>    Add </a:t>
-            </a:r>
-            <a:r>
-              <a:rPr lang="de-DE" altLang="de-DE" sz="1200" dirty="0" err="1">
-                <a:latin typeface="Consolas" panose="020B0609020204030204" pitchFamily="49" charset="0"/>
-              </a:rPr>
-              <a:t>final_file</a:t>
-            </a:r>
-            <a:endParaRPr lang="de-DE" altLang="de-DE" sz="1200" dirty="0">
-              <a:latin typeface="Consolas" panose="020B0609020204030204" pitchFamily="49" charset="0"/>
-            </a:endParaRPr>
+              <a:rPr lang="en-US" altLang="de-DE" sz="1200" dirty="0">
+                <a:latin typeface="Consolas" panose="020B0609020204030204" pitchFamily="49" charset="0"/>
+              </a:rPr>
+              <a:t>state without impacting any branches by switching back to a branch.</a:t>
+            </a:r>
           </a:p>
           <a:p>
             <a:pPr marL="457200" lvl="1" indent="0">
@@ -10517,7 +9656,7 @@
               </a:spcBef>
               <a:buNone/>
             </a:pPr>
-            <a:endParaRPr lang="de-DE" altLang="de-DE" sz="1200" dirty="0">
+            <a:endParaRPr lang="en-US" altLang="de-DE" sz="1200" dirty="0">
               <a:latin typeface="Consolas" panose="020B0609020204030204" pitchFamily="49" charset="0"/>
             </a:endParaRPr>
           </a:p>
@@ -10529,28 +9668,10 @@
               <a:buNone/>
             </a:pPr>
             <a:r>
-              <a:rPr lang="de-DE" altLang="de-DE" sz="1200" dirty="0" err="1">
-                <a:latin typeface="Consolas" panose="020B0609020204030204" pitchFamily="49" charset="0"/>
-              </a:rPr>
-              <a:t>diff</a:t>
-            </a:r>
-            <a:r>
-              <a:rPr lang="de-DE" altLang="de-DE" sz="1200" dirty="0">
-                <a:latin typeface="Consolas" panose="020B0609020204030204" pitchFamily="49" charset="0"/>
-              </a:rPr>
-              <a:t> --</a:t>
-            </a:r>
-            <a:r>
-              <a:rPr lang="de-DE" altLang="de-DE" sz="1200" dirty="0" err="1">
-                <a:latin typeface="Consolas" panose="020B0609020204030204" pitchFamily="49" charset="0"/>
-              </a:rPr>
-              <a:t>git</a:t>
-            </a:r>
-            <a:r>
-              <a:rPr lang="de-DE" altLang="de-DE" sz="1200" dirty="0">
-                <a:latin typeface="Consolas" panose="020B0609020204030204" pitchFamily="49" charset="0"/>
-              </a:rPr>
-              <a:t> a/final_file.txt b/final_file.txt</a:t>
+              <a:rPr lang="en-US" altLang="de-DE" sz="1200" dirty="0">
+                <a:latin typeface="Consolas" panose="020B0609020204030204" pitchFamily="49" charset="0"/>
+              </a:rPr>
+              <a:t>If you want to create a new branch to retain commits you create, you may</a:t>
             </a:r>
           </a:p>
           <a:p>
@@ -10561,40 +9682,10 @@
               <a:buNone/>
             </a:pPr>
             <a:r>
-              <a:rPr lang="de-DE" altLang="de-DE" sz="1200" dirty="0" err="1">
-                <a:latin typeface="Consolas" panose="020B0609020204030204" pitchFamily="49" charset="0"/>
-              </a:rPr>
-              <a:t>new</a:t>
-            </a:r>
-            <a:r>
-              <a:rPr lang="de-DE" altLang="de-DE" sz="1200" dirty="0">
-                <a:latin typeface="Consolas" panose="020B0609020204030204" pitchFamily="49" charset="0"/>
-              </a:rPr>
-              <a:t> </a:t>
-            </a:r>
-            <a:r>
-              <a:rPr lang="de-DE" altLang="de-DE" sz="1200" dirty="0" err="1">
-                <a:latin typeface="Consolas" panose="020B0609020204030204" pitchFamily="49" charset="0"/>
-              </a:rPr>
-              <a:t>file</a:t>
-            </a:r>
-            <a:r>
-              <a:rPr lang="de-DE" altLang="de-DE" sz="1200" dirty="0">
-                <a:latin typeface="Consolas" panose="020B0609020204030204" pitchFamily="49" charset="0"/>
-              </a:rPr>
-              <a:t> </a:t>
-            </a:r>
-            <a:r>
-              <a:rPr lang="de-DE" altLang="de-DE" sz="1200" dirty="0" err="1">
-                <a:latin typeface="Consolas" panose="020B0609020204030204" pitchFamily="49" charset="0"/>
-              </a:rPr>
-              <a:t>mode</a:t>
-            </a:r>
-            <a:r>
-              <a:rPr lang="de-DE" altLang="de-DE" sz="1200" dirty="0">
-                <a:latin typeface="Consolas" panose="020B0609020204030204" pitchFamily="49" charset="0"/>
-              </a:rPr>
-              <a:t> 100644</a:t>
+              <a:rPr lang="en-US" altLang="de-DE" sz="1200" dirty="0">
+                <a:latin typeface="Consolas" panose="020B0609020204030204" pitchFamily="49" charset="0"/>
+              </a:rPr>
+              <a:t>do so (now or later) by using -c with the switch command. Example:</a:t>
             </a:r>
           </a:p>
           <a:p>
@@ -10604,18 +9695,144 @@
               </a:spcBef>
               <a:buNone/>
             </a:pPr>
-            <a:r>
-              <a:rPr lang="de-DE" altLang="de-DE" sz="1200" dirty="0" err="1">
-                <a:latin typeface="Consolas" panose="020B0609020204030204" pitchFamily="49" charset="0"/>
-              </a:rPr>
-              <a:t>index</a:t>
-            </a:r>
-            <a:r>
-              <a:rPr lang="de-DE" altLang="de-DE" sz="1200" dirty="0">
-                <a:latin typeface="Consolas" panose="020B0609020204030204" pitchFamily="49" charset="0"/>
-              </a:rPr>
-              <a:t> 0000000..e69de29</a:t>
-            </a:r>
+            <a:endParaRPr lang="en-US" altLang="de-DE" sz="1200" dirty="0">
+              <a:latin typeface="Consolas" panose="020B0609020204030204" pitchFamily="49" charset="0"/>
+            </a:endParaRPr>
+          </a:p>
+          <a:p>
+            <a:pPr marL="457200" lvl="1" indent="0">
+              <a:spcBef>
+                <a:spcPts val="0"/>
+              </a:spcBef>
+              <a:buNone/>
+            </a:pPr>
+            <a:r>
+              <a:rPr lang="en-US" altLang="de-DE" sz="1200" dirty="0">
+                <a:latin typeface="Consolas" panose="020B0609020204030204" pitchFamily="49" charset="0"/>
+              </a:rPr>
+              <a:t>  git switch -c &lt;new-branch-name&gt;</a:t>
+            </a:r>
+          </a:p>
+          <a:p>
+            <a:pPr marL="457200" lvl="1" indent="0">
+              <a:spcBef>
+                <a:spcPts val="0"/>
+              </a:spcBef>
+              <a:buNone/>
+            </a:pPr>
+            <a:endParaRPr lang="en-US" altLang="de-DE" sz="1200" dirty="0">
+              <a:latin typeface="Consolas" panose="020B0609020204030204" pitchFamily="49" charset="0"/>
+            </a:endParaRPr>
+          </a:p>
+          <a:p>
+            <a:pPr marL="457200" lvl="1" indent="0">
+              <a:spcBef>
+                <a:spcPts val="0"/>
+              </a:spcBef>
+              <a:buNone/>
+            </a:pPr>
+            <a:r>
+              <a:rPr lang="en-US" altLang="de-DE" sz="1200" dirty="0">
+                <a:latin typeface="Consolas" panose="020B0609020204030204" pitchFamily="49" charset="0"/>
+              </a:rPr>
+              <a:t>Or undo this operation with:</a:t>
+            </a:r>
+          </a:p>
+          <a:p>
+            <a:pPr marL="457200" lvl="1" indent="0">
+              <a:spcBef>
+                <a:spcPts val="0"/>
+              </a:spcBef>
+              <a:buNone/>
+            </a:pPr>
+            <a:endParaRPr lang="en-US" altLang="de-DE" sz="1200" dirty="0">
+              <a:latin typeface="Consolas" panose="020B0609020204030204" pitchFamily="49" charset="0"/>
+            </a:endParaRPr>
+          </a:p>
+          <a:p>
+            <a:pPr marL="457200" lvl="1" indent="0">
+              <a:spcBef>
+                <a:spcPts val="0"/>
+              </a:spcBef>
+              <a:buNone/>
+            </a:pPr>
+            <a:r>
+              <a:rPr lang="en-US" altLang="de-DE" sz="1200" dirty="0">
+                <a:latin typeface="Consolas" panose="020B0609020204030204" pitchFamily="49" charset="0"/>
+              </a:rPr>
+              <a:t>  git switch -</a:t>
+            </a:r>
+          </a:p>
+          <a:p>
+            <a:pPr marL="457200" lvl="1" indent="0">
+              <a:spcBef>
+                <a:spcPts val="0"/>
+              </a:spcBef>
+              <a:buNone/>
+            </a:pPr>
+            <a:endParaRPr lang="en-US" altLang="de-DE" sz="1200" dirty="0">
+              <a:latin typeface="Consolas" panose="020B0609020204030204" pitchFamily="49" charset="0"/>
+            </a:endParaRPr>
+          </a:p>
+          <a:p>
+            <a:pPr marL="457200" lvl="1" indent="0">
+              <a:spcBef>
+                <a:spcPts val="0"/>
+              </a:spcBef>
+              <a:buNone/>
+            </a:pPr>
+            <a:r>
+              <a:rPr lang="en-US" altLang="de-DE" sz="1200" dirty="0">
+                <a:latin typeface="Consolas" panose="020B0609020204030204" pitchFamily="49" charset="0"/>
+              </a:rPr>
+              <a:t>Turn off this advice by setting config variable </a:t>
+            </a:r>
+            <a:r>
+              <a:rPr lang="en-US" altLang="de-DE" sz="1200" dirty="0" err="1">
+                <a:latin typeface="Consolas" panose="020B0609020204030204" pitchFamily="49" charset="0"/>
+              </a:rPr>
+              <a:t>advice.detachedHead</a:t>
+            </a:r>
+            <a:r>
+              <a:rPr lang="en-US" altLang="de-DE" sz="1200" dirty="0">
+                <a:latin typeface="Consolas" panose="020B0609020204030204" pitchFamily="49" charset="0"/>
+              </a:rPr>
+              <a:t> to false</a:t>
+            </a:r>
+          </a:p>
+          <a:p>
+            <a:pPr marL="457200" lvl="1" indent="0">
+              <a:spcBef>
+                <a:spcPts val="0"/>
+              </a:spcBef>
+              <a:buNone/>
+            </a:pPr>
+            <a:endParaRPr lang="en-US" altLang="de-DE" sz="1200" dirty="0">
+              <a:latin typeface="Consolas" panose="020B0609020204030204" pitchFamily="49" charset="0"/>
+            </a:endParaRPr>
+          </a:p>
+          <a:p>
+            <a:pPr marL="457200" lvl="1" indent="0">
+              <a:spcBef>
+                <a:spcPts val="0"/>
+              </a:spcBef>
+              <a:buNone/>
+            </a:pPr>
+            <a:r>
+              <a:rPr lang="en-US" altLang="de-DE" sz="1200" dirty="0">
+                <a:latin typeface="Consolas" panose="020B0609020204030204" pitchFamily="49" charset="0"/>
+              </a:rPr>
+              <a:t>HEAD is now at c3a059e Add </a:t>
+            </a:r>
+            <a:r>
+              <a:rPr lang="en-US" altLang="de-DE" sz="1200" dirty="0" err="1">
+                <a:latin typeface="Consolas" panose="020B0609020204030204" pitchFamily="49" charset="0"/>
+              </a:rPr>
+              <a:t>final_file</a:t>
+            </a:r>
+            <a:endParaRPr lang="de-DE" altLang="de-DE" sz="1200" dirty="0">
+              <a:latin typeface="Consolas" panose="020B0609020204030204" pitchFamily="49" charset="0"/>
+            </a:endParaRPr>
           </a:p>
           <a:p>
             <a:endParaRPr lang="de-DE" altLang="de-DE" dirty="0"/>
@@ -10662,7 +9879,7 @@
     </p:spTree>
     <p:extLst>
       <p:ext uri="{BB962C8B-B14F-4D97-AF65-F5344CB8AC3E}">
-        <p14:creationId xmlns:p14="http://schemas.microsoft.com/office/powerpoint/2010/main" val="1126642407"/>
+        <p14:creationId xmlns:p14="http://schemas.microsoft.com/office/powerpoint/2010/main" val="1904022772"/>
       </p:ext>
     </p:extLst>
   </p:cSld>

</xml_diff>

<commit_message>
Fix faults in day 2 slides
</commit_message>
<xml_diff>
--- a/slides/Tag-2_2-Tags-und-Releases_Light.pptx
+++ b/slides/Tag-2_2-Tags-und-Releases_Light.pptx
@@ -7,29 +7,30 @@
     <p:sldMasterId id="2147483897" r:id="rId3"/>
   </p:sldMasterIdLst>
   <p:notesMasterIdLst>
-    <p:notesMasterId r:id="rId21"/>
+    <p:notesMasterId r:id="rId22"/>
   </p:notesMasterIdLst>
   <p:handoutMasterIdLst>
-    <p:handoutMasterId r:id="rId22"/>
+    <p:handoutMasterId r:id="rId23"/>
   </p:handoutMasterIdLst>
   <p:sldIdLst>
-    <p:sldId id="288" r:id="rId4"/>
-    <p:sldId id="387" r:id="rId5"/>
-    <p:sldId id="287" r:id="rId6"/>
+    <p:sldId id="604" r:id="rId4"/>
+    <p:sldId id="606" r:id="rId5"/>
+    <p:sldId id="726" r:id="rId6"/>
     <p:sldId id="596" r:id="rId7"/>
-    <p:sldId id="368" r:id="rId8"/>
-    <p:sldId id="420" r:id="rId9"/>
-    <p:sldId id="726" r:id="rId10"/>
-    <p:sldId id="424" r:id="rId11"/>
-    <p:sldId id="423" r:id="rId12"/>
-    <p:sldId id="425" r:id="rId13"/>
-    <p:sldId id="426" r:id="rId14"/>
-    <p:sldId id="427" r:id="rId15"/>
-    <p:sldId id="597" r:id="rId16"/>
-    <p:sldId id="724" r:id="rId17"/>
-    <p:sldId id="598" r:id="rId18"/>
-    <p:sldId id="430" r:id="rId19"/>
-    <p:sldId id="725" r:id="rId20"/>
+    <p:sldId id="287" r:id="rId8"/>
+    <p:sldId id="368" r:id="rId9"/>
+    <p:sldId id="420" r:id="rId10"/>
+    <p:sldId id="421" r:id="rId11"/>
+    <p:sldId id="424" r:id="rId12"/>
+    <p:sldId id="423" r:id="rId13"/>
+    <p:sldId id="425" r:id="rId14"/>
+    <p:sldId id="426" r:id="rId15"/>
+    <p:sldId id="427" r:id="rId16"/>
+    <p:sldId id="597" r:id="rId17"/>
+    <p:sldId id="724" r:id="rId18"/>
+    <p:sldId id="598" r:id="rId19"/>
+    <p:sldId id="430" r:id="rId20"/>
+    <p:sldId id="725" r:id="rId21"/>
   </p:sldIdLst>
   <p:sldSz cx="9144000" cy="6858000" type="screen4x3"/>
   <p:notesSz cx="6784975" cy="9921875"/>
@@ -1099,7 +1100,7 @@
                 <a:latin typeface="Arial" panose="020B0604020202020204" pitchFamily="34" charset="0"/>
               </a:rPr>
               <a:pPr/>
-              <a:t>3</a:t>
+              <a:t>5</a:t>
             </a:fld>
             <a:endParaRPr lang="de-DE" altLang="de-DE" sz="1000">
               <a:latin typeface="Arial" panose="020B0604020202020204" pitchFamily="34" charset="0"/>
@@ -1303,7 +1304,7 @@
                 <a:tabLst/>
                 <a:defRPr/>
               </a:pPr>
-              <a:t>14</a:t>
+              <a:t>15</a:t>
             </a:fld>
             <a:endParaRPr kumimoji="0" lang="de-DE" altLang="de-DE" sz="1000" b="0" i="1" u="none" strike="noStrike" kern="1200" cap="none" spc="0" normalizeH="0" baseline="0" noProof="0">
               <a:ln>
@@ -1447,7 +1448,7 @@
                 <a:tabLst/>
                 <a:defRPr/>
               </a:pPr>
-              <a:t>17</a:t>
+              <a:t>18</a:t>
             </a:fld>
             <a:endParaRPr kumimoji="0" lang="de-DE" altLang="de-DE" sz="1000" b="0" i="1" u="none" strike="noStrike" kern="1200" cap="none" spc="0" normalizeH="0" baseline="0" noProof="0">
               <a:ln>
@@ -2597,7 +2598,7 @@
                 </a:solidFill>
                 <a:latin typeface="Arial" charset="0"/>
               </a:rPr>
-              <a:t>&lt;Autor&gt;</a:t>
+              <a:t>Daniel Krämer &amp; Malte Fischer</a:t>
             </a:r>
           </a:p>
         </p:txBody>
@@ -2619,7 +2620,7 @@
         <p:spPr bwMode="auto">
           <a:xfrm>
             <a:off x="4252913" y="6424613"/>
-            <a:ext cx="1163637" cy="246062"/>
+            <a:ext cx="2438488" cy="246221"/>
           </a:xfrm>
           <a:prstGeom prst="rect">
             <a:avLst/>
@@ -2649,16 +2650,7 @@
                 </a:solidFill>
                 <a:latin typeface="Arial" charset="0"/>
               </a:rPr>
-              <a:t>&lt;Dateiname&gt;.</a:t>
-            </a:r>
-            <a:r>
-              <a:rPr lang="de-DE" sz="1000" dirty="0" err="1">
-                <a:solidFill>
-                  <a:schemeClr val="bg1"/>
-                </a:solidFill>
-                <a:latin typeface="Arial" charset="0"/>
-              </a:rPr>
-              <a:t>ppt</a:t>
+              <a:t>Tag-2_2-Tags-und-Releases_Light.pptx</a:t>
             </a:r>
             <a:endParaRPr lang="de-DE" dirty="0">
               <a:solidFill>
@@ -4704,7 +4696,7 @@
                 </a:solidFill>
                 <a:latin typeface="Arial" charset="0"/>
               </a:rPr>
-              <a:t>&lt;Autor&gt;</a:t>
+              <a:t>Daniel Krämer &amp; Malte Fischer</a:t>
             </a:r>
           </a:p>
         </p:txBody>
@@ -4726,7 +4718,7 @@
         <p:spPr bwMode="auto">
           <a:xfrm>
             <a:off x="4252913" y="6424613"/>
-            <a:ext cx="1891865" cy="246221"/>
+            <a:ext cx="2438488" cy="246221"/>
           </a:xfrm>
           <a:prstGeom prst="rect">
             <a:avLst/>
@@ -4756,7 +4748,7 @@
                 </a:solidFill>
                 <a:latin typeface="Arial" charset="0"/>
               </a:rPr>
-              <a:t>Tag-3_2_1-GitLab-Runner.ppt</a:t>
+              <a:t>Tag-2_2-Tags-und-Releases_Light.pptx</a:t>
             </a:r>
             <a:endParaRPr lang="de-DE" dirty="0">
               <a:solidFill>
@@ -5658,7 +5650,7 @@
         <p:spPr bwMode="auto">
           <a:xfrm>
             <a:off x="468313" y="2562225"/>
-            <a:ext cx="4967287" cy="938213"/>
+            <a:ext cx="5471839" cy="938213"/>
           </a:xfrm>
           <a:prstGeom prst="rect">
             <a:avLst/>
@@ -5690,8 +5682,24 @@
           <a:p>
             <a:pPr algn="l" eaLnBrk="1" hangingPunct="1"/>
             <a:r>
-              <a:rPr lang="de-DE" altLang="de-DE" dirty="0"/>
-              <a:t>Tags und Releases</a:t>
+              <a:rPr lang="de-DE" altLang="de-DE" sz="3200" dirty="0"/>
+              <a:t>Tag 2: Vertiefung </a:t>
+            </a:r>
+            <a:r>
+              <a:rPr lang="de-DE" altLang="de-DE" sz="3200" dirty="0" err="1"/>
+              <a:t>Git</a:t>
+            </a:r>
+            <a:r>
+              <a:rPr lang="de-DE" altLang="de-DE" sz="3200" dirty="0"/>
+              <a:t>-Workflow, CI/CD &amp; </a:t>
+            </a:r>
+            <a:r>
+              <a:rPr lang="de-DE" altLang="de-DE" sz="3200" dirty="0" err="1"/>
+              <a:t>GitLab</a:t>
+            </a:r>
+            <a:r>
+              <a:rPr lang="de-DE" altLang="de-DE" sz="3200" dirty="0"/>
+              <a:t> CI </a:t>
             </a:r>
           </a:p>
         </p:txBody>
@@ -5714,8 +5722,8 @@
         </p:nvSpPr>
         <p:spPr bwMode="auto">
           <a:xfrm>
-            <a:off x="468313" y="4462463"/>
-            <a:ext cx="2159000" cy="622300"/>
+            <a:off x="468312" y="4462463"/>
+            <a:ext cx="4190603" cy="622300"/>
           </a:xfrm>
           <a:prstGeom prst="rect">
             <a:avLst/>
@@ -5750,8 +5758,8 @@
               <a:buNone/>
             </a:pPr>
             <a:r>
-              <a:rPr lang="de-DE" altLang="de-DE" sz="1600"/>
-              <a:t>&lt;Datum, Autor&gt;</a:t>
+              <a:rPr lang="de-DE" altLang="de-DE" sz="1600" dirty="0"/>
+              <a:t>18.06.2024, Daniel Krämer &amp; Malte Fischer</a:t>
             </a:r>
           </a:p>
         </p:txBody>
@@ -5904,18 +5912,54 @@
           </a:lstStyle>
           <a:p>
             <a:pPr eaLnBrk="1" hangingPunct="1"/>
-            <a:r>
-              <a:rPr lang="de-DE" altLang="de-DE" sz="4400">
-                <a:solidFill>
-                  <a:schemeClr val="tx2"/>
-                </a:solidFill>
-                <a:latin typeface="Arial" panose="020B0604020202020204" pitchFamily="34" charset="0"/>
-              </a:rPr>
-              <a:t>&lt;Kundenlogo&gt;</a:t>
-            </a:r>
+            <a:endParaRPr lang="de-DE" altLang="de-DE" sz="4400" dirty="0">
+              <a:solidFill>
+                <a:schemeClr val="tx2"/>
+              </a:solidFill>
+              <a:latin typeface="Arial" panose="020B0604020202020204" pitchFamily="34" charset="0"/>
+            </a:endParaRPr>
           </a:p>
         </p:txBody>
       </p:sp>
+      <p:pic>
+        <p:nvPicPr>
+          <p:cNvPr id="3" name="Grafik 2">
+            <a:extLst>
+              <a:ext uri="{FF2B5EF4-FFF2-40B4-BE49-F238E27FC236}">
+                <a16:creationId xmlns:a16="http://schemas.microsoft.com/office/drawing/2014/main" id="{F795EC6A-86ED-78D6-3916-EC81E8315965}"/>
+              </a:ext>
+            </a:extLst>
+          </p:cNvPr>
+          <p:cNvPicPr>
+            <a:picLocks noChangeAspect="1"/>
+          </p:cNvPicPr>
+          <p:nvPr/>
+        </p:nvPicPr>
+        <p:blipFill>
+          <a:blip r:embed="rId2">
+            <a:extLst>
+              <a:ext uri="{28A0092B-C50C-407E-A947-70E740481C1C}">
+                <a14:useLocalDpi xmlns:a14="http://schemas.microsoft.com/office/drawing/2010/main" val="0"/>
+              </a:ext>
+              <a:ext uri="{96DAC541-7B7A-43D3-8B79-37D633B846F1}">
+                <asvg:svgBlip xmlns:asvg="http://schemas.microsoft.com/office/drawing/2016/SVG/main" r:embed="rId3"/>
+              </a:ext>
+            </a:extLst>
+          </a:blip>
+          <a:stretch>
+            <a:fillRect/>
+          </a:stretch>
+        </p:blipFill>
+        <p:spPr>
+          <a:xfrm>
+            <a:off x="309959" y="263970"/>
+            <a:ext cx="4348957" cy="1508822"/>
+          </a:xfrm>
+          <a:prstGeom prst="rect">
+            <a:avLst/>
+          </a:prstGeom>
+        </p:spPr>
+      </p:pic>
     </p:spTree>
   </p:cSld>
   <p:clrMapOvr>
@@ -5989,31 +6033,11 @@
               <a:rPr lang="de-DE" altLang="de-DE" dirty="0">
                 <a:latin typeface="Consolas" panose="020B0609020204030204" pitchFamily="49" charset="0"/>
               </a:rPr>
-              <a:t> –b &lt;</a:t>
-            </a:r>
-            <a:r>
-              <a:rPr lang="de-DE" altLang="de-DE" dirty="0" err="1">
-                <a:latin typeface="Consolas" panose="020B0609020204030204" pitchFamily="49" charset="0"/>
-              </a:rPr>
-              <a:t>branch</a:t>
-            </a:r>
-            <a:r>
-              <a:rPr lang="de-DE" altLang="de-DE" dirty="0">
-                <a:latin typeface="Consolas" panose="020B0609020204030204" pitchFamily="49" charset="0"/>
-              </a:rPr>
-              <a:t>-name&gt; &lt;tag-name&gt; </a:t>
+              <a:t> &lt;tag-name&gt; </a:t>
             </a:r>
             <a:r>
               <a:rPr lang="de-DE" altLang="de-DE" dirty="0"/>
-              <a:t>ermöglicht Erstellen eines </a:t>
-            </a:r>
-            <a:r>
-              <a:rPr lang="de-DE" altLang="de-DE" dirty="0" err="1"/>
-              <a:t>Branches</a:t>
-            </a:r>
-            <a:r>
-              <a:rPr lang="de-DE" altLang="de-DE" dirty="0"/>
-              <a:t> abzweigend vom getaggten Commit</a:t>
+              <a:t>ermöglicht Auschecken eines getaggten Commit</a:t>
             </a:r>
           </a:p>
           <a:p>
@@ -6038,7 +6062,7 @@
               <a:rPr lang="en-US" altLang="de-DE" sz="1200" dirty="0">
                 <a:latin typeface="Consolas" panose="020B0609020204030204" pitchFamily="49" charset="0"/>
               </a:rPr>
-              <a:t>$ git checkout -b hotfix release-v0.0.1</a:t>
+              <a:t>$ git checkout release-v0.0.1</a:t>
             </a:r>
           </a:p>
           <a:p>
@@ -6052,30 +6076,8 @@
               <a:rPr lang="en-US" altLang="de-DE" sz="1200" dirty="0">
                 <a:latin typeface="Consolas" panose="020B0609020204030204" pitchFamily="49" charset="0"/>
               </a:rPr>
-              <a:t>Switched to a new branch 'hotfix‘</a:t>
-            </a:r>
-            <a:endParaRPr lang="de-DE" altLang="de-DE" sz="1200" dirty="0">
-              <a:latin typeface="Consolas" panose="020B0609020204030204" pitchFamily="49" charset="0"/>
-            </a:endParaRPr>
-          </a:p>
-          <a:p>
-            <a:r>
-              <a:rPr lang="de-DE" altLang="de-DE" dirty="0"/>
-              <a:t>Löschen eines Tags ist mit </a:t>
-            </a:r>
-            <a:r>
-              <a:rPr lang="de-DE" altLang="de-DE" dirty="0" err="1">
-                <a:latin typeface="Consolas" panose="020B0609020204030204" pitchFamily="49" charset="0"/>
-              </a:rPr>
-              <a:t>git</a:t>
-            </a:r>
-            <a:r>
-              <a:rPr lang="de-DE" altLang="de-DE" dirty="0">
-                <a:latin typeface="Consolas" panose="020B0609020204030204" pitchFamily="49" charset="0"/>
-              </a:rPr>
-              <a:t> tag -d &lt;tag-name&gt;</a:t>
-            </a:r>
-            <a:endParaRPr lang="de-DE" altLang="de-DE" dirty="0"/>
+              <a:t>Note: switching to 'release-v0.0.1'.</a:t>
+            </a:r>
           </a:p>
           <a:p>
             <a:pPr marL="457200" lvl="1" indent="0">
@@ -6099,7 +6101,7 @@
               <a:rPr lang="en-US" altLang="de-DE" sz="1200" dirty="0">
                 <a:latin typeface="Consolas" panose="020B0609020204030204" pitchFamily="49" charset="0"/>
               </a:rPr>
-              <a:t>$ git tag -d release-v0.0.0</a:t>
+              <a:t>You are in 'detached HEAD' state. You can look around, make experimental</a:t>
             </a:r>
           </a:p>
           <a:p>
@@ -6113,11 +6115,210 @@
               <a:rPr lang="en-US" altLang="de-DE" sz="1200" dirty="0">
                 <a:latin typeface="Consolas" panose="020B0609020204030204" pitchFamily="49" charset="0"/>
               </a:rPr>
-              <a:t>Deleted tag 'release-v0.0.0' (was a908be7)</a:t>
+              <a:t>changes and commit them, and you can discard any commits you make in this</a:t>
+            </a:r>
+          </a:p>
+          <a:p>
+            <a:pPr marL="457200" lvl="1" indent="0">
+              <a:spcBef>
+                <a:spcPts val="0"/>
+              </a:spcBef>
+              <a:buNone/>
+            </a:pPr>
+            <a:r>
+              <a:rPr lang="en-US" altLang="de-DE" sz="1200" dirty="0">
+                <a:latin typeface="Consolas" panose="020B0609020204030204" pitchFamily="49" charset="0"/>
+              </a:rPr>
+              <a:t>state without impacting any branches by switching back to a branch.</a:t>
+            </a:r>
+          </a:p>
+          <a:p>
+            <a:pPr marL="457200" lvl="1" indent="0">
+              <a:spcBef>
+                <a:spcPts val="0"/>
+              </a:spcBef>
+              <a:buNone/>
+            </a:pPr>
+            <a:endParaRPr lang="en-US" altLang="de-DE" sz="1200" dirty="0">
+              <a:latin typeface="Consolas" panose="020B0609020204030204" pitchFamily="49" charset="0"/>
+            </a:endParaRPr>
+          </a:p>
+          <a:p>
+            <a:pPr marL="457200" lvl="1" indent="0">
+              <a:spcBef>
+                <a:spcPts val="0"/>
+              </a:spcBef>
+              <a:buNone/>
+            </a:pPr>
+            <a:r>
+              <a:rPr lang="en-US" altLang="de-DE" sz="1200" dirty="0">
+                <a:latin typeface="Consolas" panose="020B0609020204030204" pitchFamily="49" charset="0"/>
+              </a:rPr>
+              <a:t>If you want to create a new branch to retain commits you create, you may</a:t>
+            </a:r>
+          </a:p>
+          <a:p>
+            <a:pPr marL="457200" lvl="1" indent="0">
+              <a:spcBef>
+                <a:spcPts val="0"/>
+              </a:spcBef>
+              <a:buNone/>
+            </a:pPr>
+            <a:r>
+              <a:rPr lang="en-US" altLang="de-DE" sz="1200" dirty="0">
+                <a:latin typeface="Consolas" panose="020B0609020204030204" pitchFamily="49" charset="0"/>
+              </a:rPr>
+              <a:t>do so (now or later) by using -c with the switch command. Example:</a:t>
+            </a:r>
+          </a:p>
+          <a:p>
+            <a:pPr marL="457200" lvl="1" indent="0">
+              <a:spcBef>
+                <a:spcPts val="0"/>
+              </a:spcBef>
+              <a:buNone/>
+            </a:pPr>
+            <a:endParaRPr lang="en-US" altLang="de-DE" sz="1200" dirty="0">
+              <a:latin typeface="Consolas" panose="020B0609020204030204" pitchFamily="49" charset="0"/>
+            </a:endParaRPr>
+          </a:p>
+          <a:p>
+            <a:pPr marL="457200" lvl="1" indent="0">
+              <a:spcBef>
+                <a:spcPts val="0"/>
+              </a:spcBef>
+              <a:buNone/>
+            </a:pPr>
+            <a:r>
+              <a:rPr lang="en-US" altLang="de-DE" sz="1200" dirty="0">
+                <a:latin typeface="Consolas" panose="020B0609020204030204" pitchFamily="49" charset="0"/>
+              </a:rPr>
+              <a:t>  git switch -c &lt;new-branch-name&gt;</a:t>
+            </a:r>
+          </a:p>
+          <a:p>
+            <a:pPr marL="457200" lvl="1" indent="0">
+              <a:spcBef>
+                <a:spcPts val="0"/>
+              </a:spcBef>
+              <a:buNone/>
+            </a:pPr>
+            <a:endParaRPr lang="en-US" altLang="de-DE" sz="1200" dirty="0">
+              <a:latin typeface="Consolas" panose="020B0609020204030204" pitchFamily="49" charset="0"/>
+            </a:endParaRPr>
+          </a:p>
+          <a:p>
+            <a:pPr marL="457200" lvl="1" indent="0">
+              <a:spcBef>
+                <a:spcPts val="0"/>
+              </a:spcBef>
+              <a:buNone/>
+            </a:pPr>
+            <a:r>
+              <a:rPr lang="en-US" altLang="de-DE" sz="1200" dirty="0">
+                <a:latin typeface="Consolas" panose="020B0609020204030204" pitchFamily="49" charset="0"/>
+              </a:rPr>
+              <a:t>Or undo this operation with:</a:t>
+            </a:r>
+          </a:p>
+          <a:p>
+            <a:pPr marL="457200" lvl="1" indent="0">
+              <a:spcBef>
+                <a:spcPts val="0"/>
+              </a:spcBef>
+              <a:buNone/>
+            </a:pPr>
+            <a:endParaRPr lang="en-US" altLang="de-DE" sz="1200" dirty="0">
+              <a:latin typeface="Consolas" panose="020B0609020204030204" pitchFamily="49" charset="0"/>
+            </a:endParaRPr>
+          </a:p>
+          <a:p>
+            <a:pPr marL="457200" lvl="1" indent="0">
+              <a:spcBef>
+                <a:spcPts val="0"/>
+              </a:spcBef>
+              <a:buNone/>
+            </a:pPr>
+            <a:r>
+              <a:rPr lang="en-US" altLang="de-DE" sz="1200" dirty="0">
+                <a:latin typeface="Consolas" panose="020B0609020204030204" pitchFamily="49" charset="0"/>
+              </a:rPr>
+              <a:t>  git switch -</a:t>
+            </a:r>
+          </a:p>
+          <a:p>
+            <a:pPr marL="457200" lvl="1" indent="0">
+              <a:spcBef>
+                <a:spcPts val="0"/>
+              </a:spcBef>
+              <a:buNone/>
+            </a:pPr>
+            <a:endParaRPr lang="en-US" altLang="de-DE" sz="1200" dirty="0">
+              <a:latin typeface="Consolas" panose="020B0609020204030204" pitchFamily="49" charset="0"/>
+            </a:endParaRPr>
+          </a:p>
+          <a:p>
+            <a:pPr marL="457200" lvl="1" indent="0">
+              <a:spcBef>
+                <a:spcPts val="0"/>
+              </a:spcBef>
+              <a:buNone/>
+            </a:pPr>
+            <a:r>
+              <a:rPr lang="en-US" altLang="de-DE" sz="1200" dirty="0">
+                <a:latin typeface="Consolas" panose="020B0609020204030204" pitchFamily="49" charset="0"/>
+              </a:rPr>
+              <a:t>Turn off this advice by setting config variable </a:t>
+            </a:r>
+            <a:r>
+              <a:rPr lang="en-US" altLang="de-DE" sz="1200" dirty="0" err="1">
+                <a:latin typeface="Consolas" panose="020B0609020204030204" pitchFamily="49" charset="0"/>
+              </a:rPr>
+              <a:t>advice.detachedHead</a:t>
+            </a:r>
+            <a:r>
+              <a:rPr lang="en-US" altLang="de-DE" sz="1200" dirty="0">
+                <a:latin typeface="Consolas" panose="020B0609020204030204" pitchFamily="49" charset="0"/>
+              </a:rPr>
+              <a:t> to false</a:t>
+            </a:r>
+          </a:p>
+          <a:p>
+            <a:pPr marL="457200" lvl="1" indent="0">
+              <a:spcBef>
+                <a:spcPts val="0"/>
+              </a:spcBef>
+              <a:buNone/>
+            </a:pPr>
+            <a:endParaRPr lang="en-US" altLang="de-DE" sz="1200" dirty="0">
+              <a:latin typeface="Consolas" panose="020B0609020204030204" pitchFamily="49" charset="0"/>
+            </a:endParaRPr>
+          </a:p>
+          <a:p>
+            <a:pPr marL="457200" lvl="1" indent="0">
+              <a:spcBef>
+                <a:spcPts val="0"/>
+              </a:spcBef>
+              <a:buNone/>
+            </a:pPr>
+            <a:r>
+              <a:rPr lang="en-US" altLang="de-DE" sz="1200" dirty="0">
+                <a:latin typeface="Consolas" panose="020B0609020204030204" pitchFamily="49" charset="0"/>
+              </a:rPr>
+              <a:t>HEAD is now at c3a059e Add </a:t>
+            </a:r>
+            <a:r>
+              <a:rPr lang="en-US" altLang="de-DE" sz="1200" dirty="0" err="1">
+                <a:latin typeface="Consolas" panose="020B0609020204030204" pitchFamily="49" charset="0"/>
+              </a:rPr>
+              <a:t>final_file</a:t>
             </a:r>
             <a:endParaRPr lang="de-DE" altLang="de-DE" sz="1200" dirty="0">
               <a:latin typeface="Consolas" panose="020B0609020204030204" pitchFamily="49" charset="0"/>
             </a:endParaRPr>
+          </a:p>
+          <a:p>
+            <a:endParaRPr lang="de-DE" altLang="de-DE" dirty="0"/>
           </a:p>
         </p:txBody>
       </p:sp>
@@ -6161,7 +6362,7 @@
     </p:spTree>
     <p:extLst>
       <p:ext uri="{BB962C8B-B14F-4D97-AF65-F5344CB8AC3E}">
-        <p14:creationId xmlns:p14="http://schemas.microsoft.com/office/powerpoint/2010/main" val="1311074186"/>
+        <p14:creationId xmlns:p14="http://schemas.microsoft.com/office/powerpoint/2010/main" val="1904022772"/>
       </p:ext>
     </p:extLst>
   </p:cSld>
@@ -6214,101 +6415,157 @@
           <a:bodyPr/>
           <a:lstStyle/>
           <a:p>
-            <a:pPr marL="0" indent="0">
+            <a:r>
+              <a:rPr lang="de-DE" altLang="de-DE" dirty="0" err="1">
+                <a:latin typeface="Consolas" panose="020B0609020204030204" pitchFamily="49" charset="0"/>
+              </a:rPr>
+              <a:t>git</a:t>
+            </a:r>
+            <a:r>
+              <a:rPr lang="de-DE" altLang="de-DE" dirty="0">
+                <a:latin typeface="Consolas" panose="020B0609020204030204" pitchFamily="49" charset="0"/>
+              </a:rPr>
+              <a:t> </a:t>
+            </a:r>
+            <a:r>
+              <a:rPr lang="de-DE" altLang="de-DE" dirty="0" err="1">
+                <a:latin typeface="Consolas" panose="020B0609020204030204" pitchFamily="49" charset="0"/>
+              </a:rPr>
+              <a:t>checkout</a:t>
+            </a:r>
+            <a:r>
+              <a:rPr lang="de-DE" altLang="de-DE" dirty="0">
+                <a:latin typeface="Consolas" panose="020B0609020204030204" pitchFamily="49" charset="0"/>
+              </a:rPr>
+              <a:t> –b &lt;</a:t>
+            </a:r>
+            <a:r>
+              <a:rPr lang="de-DE" altLang="de-DE" dirty="0" err="1">
+                <a:latin typeface="Consolas" panose="020B0609020204030204" pitchFamily="49" charset="0"/>
+              </a:rPr>
+              <a:t>branch</a:t>
+            </a:r>
+            <a:r>
+              <a:rPr lang="de-DE" altLang="de-DE" dirty="0">
+                <a:latin typeface="Consolas" panose="020B0609020204030204" pitchFamily="49" charset="0"/>
+              </a:rPr>
+              <a:t>-name&gt; &lt;tag-name&gt; </a:t>
+            </a:r>
+            <a:r>
+              <a:rPr lang="de-DE" altLang="de-DE" dirty="0"/>
+              <a:t>ermöglicht Erstellen eines </a:t>
+            </a:r>
+            <a:r>
+              <a:rPr lang="de-DE" altLang="de-DE" dirty="0" err="1"/>
+              <a:t>Branches</a:t>
+            </a:r>
+            <a:r>
+              <a:rPr lang="de-DE" altLang="de-DE" dirty="0"/>
+              <a:t> abzweigend vom getaggten Commit</a:t>
+            </a:r>
+          </a:p>
+          <a:p>
+            <a:pPr marL="457200" lvl="1" indent="0">
+              <a:spcBef>
+                <a:spcPts val="0"/>
+              </a:spcBef>
               <a:buNone/>
             </a:pPr>
-            <a:r>
-              <a:rPr lang="de-DE" altLang="de-DE" b="1" dirty="0" err="1"/>
-              <a:t>Annotated</a:t>
-            </a:r>
-            <a:r>
-              <a:rPr lang="de-DE" altLang="de-DE" b="1" dirty="0"/>
-              <a:t> und Lightweight Tags</a:t>
-            </a:r>
+            <a:endParaRPr lang="en-US" altLang="de-DE" sz="1200" dirty="0">
+              <a:latin typeface="Consolas" panose="020B0609020204030204" pitchFamily="49" charset="0"/>
+            </a:endParaRPr>
+          </a:p>
+          <a:p>
+            <a:pPr marL="457200" lvl="1" indent="0">
+              <a:spcBef>
+                <a:spcPts val="0"/>
+              </a:spcBef>
+              <a:buNone/>
+            </a:pPr>
+            <a:r>
+              <a:rPr lang="en-US" altLang="de-DE" sz="1200" dirty="0">
+                <a:latin typeface="Consolas" panose="020B0609020204030204" pitchFamily="49" charset="0"/>
+              </a:rPr>
+              <a:t>$ git checkout -b hotfix release-v0.0.1</a:t>
+            </a:r>
+          </a:p>
+          <a:p>
+            <a:pPr marL="457200" lvl="1" indent="0">
+              <a:spcBef>
+                <a:spcPts val="0"/>
+              </a:spcBef>
+              <a:buNone/>
+            </a:pPr>
+            <a:r>
+              <a:rPr lang="en-US" altLang="de-DE" sz="1200" dirty="0">
+                <a:latin typeface="Consolas" panose="020B0609020204030204" pitchFamily="49" charset="0"/>
+              </a:rPr>
+              <a:t>Switched to a new branch 'hotfix‘</a:t>
+            </a:r>
+            <a:endParaRPr lang="de-DE" altLang="de-DE" sz="1200" dirty="0">
+              <a:latin typeface="Consolas" panose="020B0609020204030204" pitchFamily="49" charset="0"/>
+            </a:endParaRPr>
           </a:p>
           <a:p>
             <a:r>
               <a:rPr lang="de-DE" altLang="de-DE" dirty="0"/>
-              <a:t>Lightweight Tags geben Commit nur ein Alias</a:t>
-            </a:r>
-          </a:p>
-          <a:p>
-            <a:r>
-              <a:rPr lang="de-DE" altLang="de-DE" dirty="0" err="1"/>
-              <a:t>Annotated</a:t>
-            </a:r>
-            <a:r>
-              <a:rPr lang="de-DE" altLang="de-DE" dirty="0"/>
-              <a:t> Tags enthalten mehr Informationen</a:t>
-            </a:r>
-          </a:p>
-          <a:p>
-            <a:pPr lvl="1"/>
-            <a:r>
-              <a:rPr lang="de-DE" altLang="de-DE" dirty="0"/>
-              <a:t>Tagger Name</a:t>
-            </a:r>
-          </a:p>
-          <a:p>
-            <a:pPr lvl="1"/>
-            <a:r>
-              <a:rPr lang="de-DE" altLang="de-DE" dirty="0"/>
-              <a:t>Tagger E-Mail</a:t>
-            </a:r>
-          </a:p>
-          <a:p>
-            <a:pPr lvl="1"/>
-            <a:r>
-              <a:rPr lang="de-DE" altLang="de-DE" dirty="0"/>
-              <a:t>Datum</a:t>
-            </a:r>
-          </a:p>
-          <a:p>
-            <a:pPr lvl="1"/>
-            <a:r>
-              <a:rPr lang="de-DE" altLang="de-DE" dirty="0"/>
-              <a:t>Tagging Message</a:t>
-            </a:r>
-          </a:p>
-          <a:p>
-            <a:pPr lvl="1"/>
-            <a:r>
-              <a:rPr lang="de-DE" altLang="de-DE" dirty="0"/>
-              <a:t>Checksumme</a:t>
-            </a:r>
-          </a:p>
-          <a:p>
-            <a:pPr lvl="1"/>
-            <a:r>
-              <a:rPr lang="de-DE" altLang="de-DE" dirty="0"/>
-              <a:t>Signierung</a:t>
-            </a:r>
-          </a:p>
-          <a:p>
-            <a:r>
-              <a:rPr lang="de-DE" altLang="de-DE" dirty="0" err="1"/>
-              <a:t>Annotated</a:t>
-            </a:r>
-            <a:r>
-              <a:rPr lang="de-DE" altLang="de-DE" dirty="0"/>
-              <a:t> Tags sinnvoll bei </a:t>
-            </a:r>
-            <a:r>
-              <a:rPr lang="de-DE" altLang="de-DE" dirty="0" err="1"/>
-              <a:t>Mulit</a:t>
-            </a:r>
-            <a:r>
-              <a:rPr lang="de-DE" altLang="de-DE" dirty="0"/>
-              <a:t>-Developer oder </a:t>
-            </a:r>
-            <a:r>
-              <a:rPr lang="de-DE" altLang="de-DE" dirty="0" err="1"/>
-              <a:t>Mulit</a:t>
-            </a:r>
-            <a:r>
-              <a:rPr lang="de-DE" altLang="de-DE" dirty="0"/>
-              <a:t>-Repository Umgebungen</a:t>
-            </a:r>
+              <a:t>Löschen eines Tags ist mit </a:t>
+            </a:r>
+            <a:r>
+              <a:rPr lang="de-DE" altLang="de-DE" dirty="0" err="1">
+                <a:latin typeface="Consolas" panose="020B0609020204030204" pitchFamily="49" charset="0"/>
+              </a:rPr>
+              <a:t>git</a:t>
+            </a:r>
+            <a:r>
+              <a:rPr lang="de-DE" altLang="de-DE" dirty="0">
+                <a:latin typeface="Consolas" panose="020B0609020204030204" pitchFamily="49" charset="0"/>
+              </a:rPr>
+              <a:t> tag -d &lt;tag-name&gt;</a:t>
+            </a:r>
+            <a:endParaRPr lang="de-DE" altLang="de-DE" dirty="0"/>
+          </a:p>
+          <a:p>
+            <a:pPr marL="457200" lvl="1" indent="0">
+              <a:spcBef>
+                <a:spcPts val="0"/>
+              </a:spcBef>
+              <a:buNone/>
+            </a:pPr>
+            <a:endParaRPr lang="en-US" altLang="de-DE" sz="1200" dirty="0">
+              <a:latin typeface="Consolas" panose="020B0609020204030204" pitchFamily="49" charset="0"/>
+            </a:endParaRPr>
+          </a:p>
+          <a:p>
+            <a:pPr marL="457200" lvl="1" indent="0">
+              <a:spcBef>
+                <a:spcPts val="0"/>
+              </a:spcBef>
+              <a:buNone/>
+            </a:pPr>
+            <a:r>
+              <a:rPr lang="en-US" altLang="de-DE" sz="1200" dirty="0">
+                <a:latin typeface="Consolas" panose="020B0609020204030204" pitchFamily="49" charset="0"/>
+              </a:rPr>
+              <a:t>$ git tag -d release-v0.0.0</a:t>
+            </a:r>
+          </a:p>
+          <a:p>
+            <a:pPr marL="457200" lvl="1" indent="0">
+              <a:spcBef>
+                <a:spcPts val="0"/>
+              </a:spcBef>
+              <a:buNone/>
+            </a:pPr>
+            <a:r>
+              <a:rPr lang="en-US" altLang="de-DE" sz="1200" dirty="0">
+                <a:latin typeface="Consolas" panose="020B0609020204030204" pitchFamily="49" charset="0"/>
+              </a:rPr>
+              <a:t>Deleted tag 'release-v0.0.0' (was a908be7)</a:t>
+            </a:r>
+            <a:endParaRPr lang="de-DE" altLang="de-DE" sz="1200" dirty="0">
+              <a:latin typeface="Consolas" panose="020B0609020204030204" pitchFamily="49" charset="0"/>
+            </a:endParaRPr>
           </a:p>
         </p:txBody>
       </p:sp>
@@ -6352,7 +6609,7 @@
     </p:spTree>
     <p:extLst>
       <p:ext uri="{BB962C8B-B14F-4D97-AF65-F5344CB8AC3E}">
-        <p14:creationId xmlns:p14="http://schemas.microsoft.com/office/powerpoint/2010/main" val="968504568"/>
+        <p14:creationId xmlns:p14="http://schemas.microsoft.com/office/powerpoint/2010/main" val="1311074186"/>
       </p:ext>
     </p:extLst>
   </p:cSld>
@@ -6405,432 +6662,100 @@
           <a:bodyPr/>
           <a:lstStyle/>
           <a:p>
+            <a:pPr marL="0" indent="0">
+              <a:buNone/>
+            </a:pPr>
+            <a:r>
+              <a:rPr lang="de-DE" altLang="de-DE" b="1" dirty="0" err="1"/>
+              <a:t>Annotated</a:t>
+            </a:r>
+            <a:r>
+              <a:rPr lang="de-DE" altLang="de-DE" b="1" dirty="0"/>
+              <a:t> und Lightweight Tags</a:t>
+            </a:r>
+          </a:p>
+          <a:p>
+            <a:r>
+              <a:rPr lang="de-DE" altLang="de-DE" dirty="0"/>
+              <a:t>Lightweight Tags geben Commit nur ein Alias</a:t>
+            </a:r>
+          </a:p>
+          <a:p>
             <a:r>
               <a:rPr lang="de-DE" altLang="de-DE" dirty="0" err="1"/>
               <a:t>Annotated</a:t>
             </a:r>
             <a:r>
               <a:rPr lang="de-DE" altLang="de-DE" dirty="0"/>
-              <a:t> Tag erstellen</a:t>
-            </a:r>
-          </a:p>
-          <a:p>
-            <a:pPr marL="0" indent="0">
-              <a:buNone/>
-            </a:pPr>
+              <a:t> Tags enthalten mehr Informationen</a:t>
+            </a:r>
+          </a:p>
+          <a:p>
+            <a:pPr lvl="1"/>
             <a:r>
               <a:rPr lang="de-DE" altLang="de-DE" dirty="0"/>
-              <a:t>	</a:t>
-            </a:r>
-            <a:r>
-              <a:rPr lang="de-DE" altLang="de-DE" dirty="0" err="1">
-                <a:latin typeface="Consolas" panose="020B0609020204030204" pitchFamily="49" charset="0"/>
-              </a:rPr>
-              <a:t>git</a:t>
-            </a:r>
-            <a:r>
-              <a:rPr lang="de-DE" altLang="de-DE" dirty="0">
-                <a:latin typeface="Consolas" panose="020B0609020204030204" pitchFamily="49" charset="0"/>
-              </a:rPr>
-              <a:t> tag -a &lt;tag-name&gt;</a:t>
-            </a:r>
-          </a:p>
-          <a:p>
-            <a:pPr marL="457200" lvl="1" indent="0">
-              <a:buNone/>
-            </a:pPr>
-            <a:endParaRPr lang="de-DE" altLang="de-DE" sz="1200" dirty="0">
-              <a:latin typeface="Consolas" panose="020B0609020204030204" pitchFamily="49" charset="0"/>
-            </a:endParaRPr>
-          </a:p>
-          <a:p>
-            <a:pPr marL="457200" lvl="1" indent="0">
-              <a:spcBef>
-                <a:spcPts val="0"/>
-              </a:spcBef>
-              <a:buNone/>
-            </a:pPr>
-            <a:r>
-              <a:rPr lang="de-DE" altLang="de-DE" sz="1200" dirty="0">
-                <a:latin typeface="Consolas" panose="020B0609020204030204" pitchFamily="49" charset="0"/>
-              </a:rPr>
-              <a:t>$ </a:t>
-            </a:r>
-            <a:r>
-              <a:rPr lang="de-DE" altLang="de-DE" sz="1200" dirty="0" err="1">
-                <a:latin typeface="Consolas" panose="020B0609020204030204" pitchFamily="49" charset="0"/>
-              </a:rPr>
-              <a:t>git</a:t>
-            </a:r>
-            <a:r>
-              <a:rPr lang="de-DE" altLang="de-DE" sz="1200" dirty="0">
-                <a:latin typeface="Consolas" panose="020B0609020204030204" pitchFamily="49" charset="0"/>
-              </a:rPr>
-              <a:t> tag -a release-v1.0.0 -m "</a:t>
-            </a:r>
-            <a:r>
-              <a:rPr lang="de-DE" altLang="de-DE" sz="1200" dirty="0" err="1">
-                <a:latin typeface="Consolas" panose="020B0609020204030204" pitchFamily="49" charset="0"/>
-              </a:rPr>
-              <a:t>Latest</a:t>
-            </a:r>
-            <a:r>
-              <a:rPr lang="de-DE" altLang="de-DE" sz="1200" dirty="0">
-                <a:latin typeface="Consolas" panose="020B0609020204030204" pitchFamily="49" charset="0"/>
-              </a:rPr>
-              <a:t> v1 release"</a:t>
-            </a:r>
-          </a:p>
-          <a:p>
-            <a:pPr marL="457200" lvl="1" indent="0">
-              <a:spcBef>
-                <a:spcPts val="0"/>
-              </a:spcBef>
-              <a:buNone/>
-            </a:pPr>
-            <a:endParaRPr lang="de-DE" altLang="de-DE" sz="1200" dirty="0">
-              <a:latin typeface="Consolas" panose="020B0609020204030204" pitchFamily="49" charset="0"/>
-            </a:endParaRPr>
-          </a:p>
-          <a:p>
-            <a:pPr marL="457200" lvl="1" indent="0">
-              <a:spcBef>
-                <a:spcPts val="0"/>
-              </a:spcBef>
-              <a:buNone/>
-            </a:pPr>
-            <a:r>
-              <a:rPr lang="de-DE" altLang="de-DE" sz="1200" dirty="0">
-                <a:latin typeface="Consolas" panose="020B0609020204030204" pitchFamily="49" charset="0"/>
-              </a:rPr>
-              <a:t>$ </a:t>
-            </a:r>
-            <a:r>
-              <a:rPr lang="de-DE" altLang="de-DE" sz="1200" dirty="0" err="1">
-                <a:latin typeface="Consolas" panose="020B0609020204030204" pitchFamily="49" charset="0"/>
-              </a:rPr>
-              <a:t>git</a:t>
-            </a:r>
-            <a:r>
-              <a:rPr lang="de-DE" altLang="de-DE" sz="1200" dirty="0">
-                <a:latin typeface="Consolas" panose="020B0609020204030204" pitchFamily="49" charset="0"/>
-              </a:rPr>
-              <a:t> </a:t>
-            </a:r>
-            <a:r>
-              <a:rPr lang="de-DE" altLang="de-DE" sz="1200" dirty="0" err="1">
-                <a:latin typeface="Consolas" panose="020B0609020204030204" pitchFamily="49" charset="0"/>
-              </a:rPr>
-              <a:t>show</a:t>
-            </a:r>
-            <a:r>
-              <a:rPr lang="de-DE" altLang="de-DE" sz="1200" dirty="0">
-                <a:latin typeface="Consolas" panose="020B0609020204030204" pitchFamily="49" charset="0"/>
-              </a:rPr>
-              <a:t> release-v1.0.0</a:t>
-            </a:r>
-          </a:p>
-          <a:p>
-            <a:pPr marL="457200" lvl="1" indent="0">
-              <a:spcBef>
-                <a:spcPts val="0"/>
-              </a:spcBef>
-              <a:buNone/>
-            </a:pPr>
-            <a:r>
-              <a:rPr lang="de-DE" altLang="de-DE" sz="1200" dirty="0">
-                <a:latin typeface="Consolas" panose="020B0609020204030204" pitchFamily="49" charset="0"/>
-              </a:rPr>
-              <a:t>tag release-v1.0.0</a:t>
-            </a:r>
-          </a:p>
-          <a:p>
-            <a:pPr marL="457200" lvl="1" indent="0">
-              <a:spcBef>
-                <a:spcPts val="0"/>
-              </a:spcBef>
-              <a:buNone/>
-            </a:pPr>
-            <a:r>
-              <a:rPr lang="de-DE" altLang="de-DE" sz="1200" dirty="0">
-                <a:latin typeface="Consolas" panose="020B0609020204030204" pitchFamily="49" charset="0"/>
-              </a:rPr>
-              <a:t>Tagger: Christopher Keutner &lt;christopher.keutner@alumni.fh-aachen.de&gt;</a:t>
-            </a:r>
-          </a:p>
-          <a:p>
-            <a:pPr marL="457200" lvl="1" indent="0">
-              <a:spcBef>
-                <a:spcPts val="0"/>
-              </a:spcBef>
-              <a:buNone/>
-            </a:pPr>
-            <a:r>
-              <a:rPr lang="de-DE" altLang="de-DE" sz="1200" dirty="0">
-                <a:latin typeface="Consolas" panose="020B0609020204030204" pitchFamily="49" charset="0"/>
-              </a:rPr>
-              <a:t>Date:   Tue May 28 15:13:44 2024 +0200</a:t>
-            </a:r>
-          </a:p>
-          <a:p>
-            <a:pPr marL="457200" lvl="1" indent="0">
-              <a:spcBef>
-                <a:spcPts val="0"/>
-              </a:spcBef>
-              <a:buNone/>
-            </a:pPr>
-            <a:endParaRPr lang="de-DE" altLang="de-DE" sz="1200" dirty="0">
-              <a:latin typeface="Consolas" panose="020B0609020204030204" pitchFamily="49" charset="0"/>
-            </a:endParaRPr>
-          </a:p>
-          <a:p>
-            <a:pPr marL="457200" lvl="1" indent="0">
-              <a:spcBef>
-                <a:spcPts val="0"/>
-              </a:spcBef>
-              <a:buNone/>
-            </a:pPr>
-            <a:r>
-              <a:rPr lang="de-DE" altLang="de-DE" sz="1200" dirty="0" err="1">
-                <a:latin typeface="Consolas" panose="020B0609020204030204" pitchFamily="49" charset="0"/>
-              </a:rPr>
-              <a:t>Latest</a:t>
-            </a:r>
-            <a:r>
-              <a:rPr lang="de-DE" altLang="de-DE" sz="1200" dirty="0">
-                <a:latin typeface="Consolas" panose="020B0609020204030204" pitchFamily="49" charset="0"/>
-              </a:rPr>
-              <a:t> v1 release</a:t>
-            </a:r>
-          </a:p>
-          <a:p>
-            <a:pPr marL="457200" lvl="1" indent="0">
-              <a:spcBef>
-                <a:spcPts val="0"/>
-              </a:spcBef>
-              <a:buNone/>
-            </a:pPr>
-            <a:endParaRPr lang="de-DE" altLang="de-DE" sz="1200" dirty="0">
-              <a:latin typeface="Consolas" panose="020B0609020204030204" pitchFamily="49" charset="0"/>
-            </a:endParaRPr>
-          </a:p>
-          <a:p>
-            <a:pPr marL="457200" lvl="1" indent="0">
-              <a:spcBef>
-                <a:spcPts val="0"/>
-              </a:spcBef>
-              <a:buNone/>
-            </a:pPr>
-            <a:r>
-              <a:rPr lang="de-DE" altLang="de-DE" sz="1200" dirty="0" err="1">
-                <a:latin typeface="Consolas" panose="020B0609020204030204" pitchFamily="49" charset="0"/>
-              </a:rPr>
-              <a:t>commit</a:t>
-            </a:r>
-            <a:r>
-              <a:rPr lang="de-DE" altLang="de-DE" sz="1200" dirty="0">
-                <a:latin typeface="Consolas" panose="020B0609020204030204" pitchFamily="49" charset="0"/>
-              </a:rPr>
-              <a:t> 11f6b62f8bc7a3403ceae4e8923d7a54abab7b6d (HEAD -&gt; </a:t>
-            </a:r>
-            <a:r>
-              <a:rPr lang="de-DE" altLang="de-DE" sz="1200" dirty="0" err="1">
-                <a:latin typeface="Consolas" panose="020B0609020204030204" pitchFamily="49" charset="0"/>
-              </a:rPr>
-              <a:t>main</a:t>
-            </a:r>
-            <a:r>
-              <a:rPr lang="de-DE" altLang="de-DE" sz="1200" dirty="0">
-                <a:latin typeface="Consolas" panose="020B0609020204030204" pitchFamily="49" charset="0"/>
-              </a:rPr>
-              <a:t>, tag: release-v1.0.0)</a:t>
-            </a:r>
-          </a:p>
-          <a:p>
-            <a:pPr marL="457200" lvl="1" indent="0">
-              <a:spcBef>
-                <a:spcPts val="0"/>
-              </a:spcBef>
-              <a:buNone/>
-            </a:pPr>
-            <a:r>
-              <a:rPr lang="de-DE" altLang="de-DE" sz="1200" dirty="0" err="1">
-                <a:latin typeface="Consolas" panose="020B0609020204030204" pitchFamily="49" charset="0"/>
-              </a:rPr>
-              <a:t>Author</a:t>
-            </a:r>
-            <a:r>
-              <a:rPr lang="de-DE" altLang="de-DE" sz="1200" dirty="0">
-                <a:latin typeface="Consolas" panose="020B0609020204030204" pitchFamily="49" charset="0"/>
-              </a:rPr>
-              <a:t>: Christopher Keutner &lt;christopher.keutner@alumni.fh-aachen.de&gt;</a:t>
-            </a:r>
-          </a:p>
-          <a:p>
-            <a:pPr marL="457200" lvl="1" indent="0">
-              <a:spcBef>
-                <a:spcPts val="0"/>
-              </a:spcBef>
-              <a:buNone/>
-            </a:pPr>
-            <a:r>
-              <a:rPr lang="de-DE" altLang="de-DE" sz="1200" dirty="0">
-                <a:latin typeface="Consolas" panose="020B0609020204030204" pitchFamily="49" charset="0"/>
-              </a:rPr>
-              <a:t>Date:   Tue May 28 15:13:10 2024 +0200</a:t>
-            </a:r>
-          </a:p>
-          <a:p>
-            <a:pPr marL="457200" lvl="1" indent="0">
-              <a:spcBef>
-                <a:spcPts val="0"/>
-              </a:spcBef>
-              <a:buNone/>
-            </a:pPr>
-            <a:endParaRPr lang="de-DE" altLang="de-DE" sz="1200" dirty="0">
-              <a:latin typeface="Consolas" panose="020B0609020204030204" pitchFamily="49" charset="0"/>
-            </a:endParaRPr>
-          </a:p>
-          <a:p>
-            <a:pPr marL="457200" lvl="1" indent="0">
-              <a:spcBef>
-                <a:spcPts val="0"/>
-              </a:spcBef>
-              <a:buNone/>
-            </a:pPr>
-            <a:r>
-              <a:rPr lang="de-DE" altLang="de-DE" sz="1200" dirty="0">
-                <a:latin typeface="Consolas" panose="020B0609020204030204" pitchFamily="49" charset="0"/>
-              </a:rPr>
-              <a:t>    Add </a:t>
-            </a:r>
-            <a:r>
-              <a:rPr lang="de-DE" altLang="de-DE" sz="1200" dirty="0" err="1">
-                <a:latin typeface="Consolas" panose="020B0609020204030204" pitchFamily="49" charset="0"/>
-              </a:rPr>
-              <a:t>new</a:t>
-            </a:r>
-            <a:r>
-              <a:rPr lang="de-DE" altLang="de-DE" sz="1200" dirty="0">
-                <a:latin typeface="Consolas" panose="020B0609020204030204" pitchFamily="49" charset="0"/>
-              </a:rPr>
-              <a:t> </a:t>
-            </a:r>
-            <a:r>
-              <a:rPr lang="de-DE" altLang="de-DE" sz="1200" dirty="0" err="1">
-                <a:latin typeface="Consolas" panose="020B0609020204030204" pitchFamily="49" charset="0"/>
-              </a:rPr>
-              <a:t>file</a:t>
-            </a:r>
-            <a:endParaRPr lang="de-DE" altLang="de-DE" sz="1200" dirty="0">
-              <a:latin typeface="Consolas" panose="020B0609020204030204" pitchFamily="49" charset="0"/>
-            </a:endParaRPr>
-          </a:p>
-          <a:p>
-            <a:pPr marL="457200" lvl="1" indent="0">
-              <a:spcBef>
-                <a:spcPts val="0"/>
-              </a:spcBef>
-              <a:buNone/>
-            </a:pPr>
-            <a:endParaRPr lang="de-DE" altLang="de-DE" sz="1200" dirty="0">
-              <a:latin typeface="Consolas" panose="020B0609020204030204" pitchFamily="49" charset="0"/>
-            </a:endParaRPr>
-          </a:p>
-          <a:p>
-            <a:pPr marL="457200" lvl="1" indent="0">
-              <a:spcBef>
-                <a:spcPts val="0"/>
-              </a:spcBef>
-              <a:buNone/>
-            </a:pPr>
-            <a:r>
-              <a:rPr lang="de-DE" altLang="de-DE" sz="1200" dirty="0" err="1">
-                <a:latin typeface="Consolas" panose="020B0609020204030204" pitchFamily="49" charset="0"/>
-              </a:rPr>
-              <a:t>diff</a:t>
-            </a:r>
-            <a:r>
-              <a:rPr lang="de-DE" altLang="de-DE" sz="1200" dirty="0">
-                <a:latin typeface="Consolas" panose="020B0609020204030204" pitchFamily="49" charset="0"/>
-              </a:rPr>
-              <a:t> --</a:t>
-            </a:r>
-            <a:r>
-              <a:rPr lang="de-DE" altLang="de-DE" sz="1200" dirty="0" err="1">
-                <a:latin typeface="Consolas" panose="020B0609020204030204" pitchFamily="49" charset="0"/>
-              </a:rPr>
-              <a:t>git</a:t>
-            </a:r>
-            <a:r>
-              <a:rPr lang="de-DE" altLang="de-DE" sz="1200" dirty="0">
-                <a:latin typeface="Consolas" panose="020B0609020204030204" pitchFamily="49" charset="0"/>
-              </a:rPr>
-              <a:t> a/file8.txt b/file8.txt</a:t>
-            </a:r>
-          </a:p>
-          <a:p>
-            <a:pPr marL="457200" lvl="1" indent="0">
-              <a:spcBef>
-                <a:spcPts val="0"/>
-              </a:spcBef>
-              <a:buNone/>
-            </a:pPr>
-            <a:r>
-              <a:rPr lang="de-DE" altLang="de-DE" sz="1200" dirty="0" err="1">
-                <a:latin typeface="Consolas" panose="020B0609020204030204" pitchFamily="49" charset="0"/>
-              </a:rPr>
-              <a:t>new</a:t>
-            </a:r>
-            <a:r>
-              <a:rPr lang="de-DE" altLang="de-DE" sz="1200" dirty="0">
-                <a:latin typeface="Consolas" panose="020B0609020204030204" pitchFamily="49" charset="0"/>
-              </a:rPr>
-              <a:t> </a:t>
-            </a:r>
-            <a:r>
-              <a:rPr lang="de-DE" altLang="de-DE" sz="1200" dirty="0" err="1">
-                <a:latin typeface="Consolas" panose="020B0609020204030204" pitchFamily="49" charset="0"/>
-              </a:rPr>
-              <a:t>file</a:t>
-            </a:r>
-            <a:r>
-              <a:rPr lang="de-DE" altLang="de-DE" sz="1200" dirty="0">
-                <a:latin typeface="Consolas" panose="020B0609020204030204" pitchFamily="49" charset="0"/>
-              </a:rPr>
-              <a:t> </a:t>
-            </a:r>
-            <a:r>
-              <a:rPr lang="de-DE" altLang="de-DE" sz="1200" dirty="0" err="1">
-                <a:latin typeface="Consolas" panose="020B0609020204030204" pitchFamily="49" charset="0"/>
-              </a:rPr>
-              <a:t>mode</a:t>
-            </a:r>
-            <a:r>
-              <a:rPr lang="de-DE" altLang="de-DE" sz="1200" dirty="0">
-                <a:latin typeface="Consolas" panose="020B0609020204030204" pitchFamily="49" charset="0"/>
-              </a:rPr>
-              <a:t> 100644</a:t>
-            </a:r>
-          </a:p>
-          <a:p>
-            <a:pPr marL="457200" lvl="1" indent="0">
-              <a:spcBef>
-                <a:spcPts val="0"/>
-              </a:spcBef>
-              <a:buNone/>
-            </a:pPr>
-            <a:r>
-              <a:rPr lang="de-DE" altLang="de-DE" sz="1200" dirty="0" err="1">
-                <a:latin typeface="Consolas" panose="020B0609020204030204" pitchFamily="49" charset="0"/>
-              </a:rPr>
-              <a:t>index</a:t>
-            </a:r>
-            <a:r>
-              <a:rPr lang="de-DE" altLang="de-DE" sz="1200" dirty="0">
-                <a:latin typeface="Consolas" panose="020B0609020204030204" pitchFamily="49" charset="0"/>
-              </a:rPr>
-              <a:t> 0000000..e69de29</a:t>
+              <a:t>Tagger Name</a:t>
+            </a:r>
+          </a:p>
+          <a:p>
+            <a:pPr lvl="1"/>
+            <a:r>
+              <a:rPr lang="de-DE" altLang="de-DE" dirty="0"/>
+              <a:t>Tagger E-Mail</a:t>
+            </a:r>
+          </a:p>
+          <a:p>
+            <a:pPr lvl="1"/>
+            <a:r>
+              <a:rPr lang="de-DE" altLang="de-DE" dirty="0"/>
+              <a:t>Datum</a:t>
+            </a:r>
+          </a:p>
+          <a:p>
+            <a:pPr lvl="1"/>
+            <a:r>
+              <a:rPr lang="de-DE" altLang="de-DE" dirty="0"/>
+              <a:t>Tagging Message</a:t>
+            </a:r>
+          </a:p>
+          <a:p>
+            <a:pPr lvl="1"/>
+            <a:r>
+              <a:rPr lang="de-DE" altLang="de-DE" dirty="0"/>
+              <a:t>Checksumme</a:t>
+            </a:r>
+          </a:p>
+          <a:p>
+            <a:pPr lvl="1"/>
+            <a:r>
+              <a:rPr lang="de-DE" altLang="de-DE" dirty="0"/>
+              <a:t>Signierung</a:t>
+            </a:r>
+          </a:p>
+          <a:p>
+            <a:r>
+              <a:rPr lang="de-DE" altLang="de-DE" dirty="0" err="1"/>
+              <a:t>Annotated</a:t>
+            </a:r>
+            <a:r>
+              <a:rPr lang="de-DE" altLang="de-DE" dirty="0"/>
+              <a:t> Tags sinnvoll bei </a:t>
+            </a:r>
+            <a:r>
+              <a:rPr lang="de-DE" altLang="de-DE" dirty="0" err="1"/>
+              <a:t>Mulit</a:t>
+            </a:r>
+            <a:r>
+              <a:rPr lang="de-DE" altLang="de-DE" dirty="0"/>
+              <a:t>-Developer oder </a:t>
+            </a:r>
+            <a:r>
+              <a:rPr lang="de-DE" altLang="de-DE" dirty="0" err="1"/>
+              <a:t>Mulit</a:t>
+            </a:r>
+            <a:r>
+              <a:rPr lang="de-DE" altLang="de-DE" dirty="0"/>
+              <a:t>-Repository Umgebungen</a:t>
             </a:r>
           </a:p>
         </p:txBody>
@@ -6875,6 +6800,529 @@
     </p:spTree>
     <p:extLst>
       <p:ext uri="{BB962C8B-B14F-4D97-AF65-F5344CB8AC3E}">
+        <p14:creationId xmlns:p14="http://schemas.microsoft.com/office/powerpoint/2010/main" val="968504568"/>
+      </p:ext>
+    </p:extLst>
+  </p:cSld>
+  <p:clrMapOvr>
+    <a:masterClrMapping/>
+  </p:clrMapOvr>
+</p:sld>
+</file>
+
+<file path=ppt/slides/slide13.xml><?xml version="1.0" encoding="utf-8"?>
+<p:sld xmlns:a="http://schemas.openxmlformats.org/drawingml/2006/main" xmlns:r="http://schemas.openxmlformats.org/officeDocument/2006/relationships" xmlns:p="http://schemas.openxmlformats.org/presentationml/2006/main">
+  <p:cSld>
+    <p:spTree>
+      <p:nvGrpSpPr>
+        <p:cNvPr id="1" name=""/>
+        <p:cNvGrpSpPr/>
+        <p:nvPr/>
+      </p:nvGrpSpPr>
+      <p:grpSpPr>
+        <a:xfrm>
+          <a:off x="0" y="0"/>
+          <a:ext cx="0" cy="0"/>
+          <a:chOff x="0" y="0"/>
+          <a:chExt cx="0" cy="0"/>
+        </a:xfrm>
+      </p:grpSpPr>
+      <p:sp>
+        <p:nvSpPr>
+          <p:cNvPr id="6146" name="Inhaltsplatzhalter 18">
+            <a:extLst>
+              <a:ext uri="{FF2B5EF4-FFF2-40B4-BE49-F238E27FC236}">
+                <a16:creationId xmlns:a16="http://schemas.microsoft.com/office/drawing/2014/main" id="{BE3C4C95-FD5D-27F0-ED0C-AB8113CAC9F1}"/>
+              </a:ext>
+            </a:extLst>
+          </p:cNvPr>
+          <p:cNvSpPr>
+            <a:spLocks noGrp="1"/>
+          </p:cNvSpPr>
+          <p:nvPr>
+            <p:ph idx="1"/>
+          </p:nvPr>
+        </p:nvSpPr>
+        <p:spPr>
+          <a:xfrm>
+            <a:off x="303214" y="981075"/>
+            <a:ext cx="8517258" cy="5400675"/>
+          </a:xfrm>
+        </p:spPr>
+        <p:txBody>
+          <a:bodyPr/>
+          <a:lstStyle/>
+          <a:p>
+            <a:r>
+              <a:rPr lang="de-DE" altLang="de-DE" dirty="0" err="1"/>
+              <a:t>Annotated</a:t>
+            </a:r>
+            <a:r>
+              <a:rPr lang="de-DE" altLang="de-DE" dirty="0"/>
+              <a:t> Tag erstellen</a:t>
+            </a:r>
+          </a:p>
+          <a:p>
+            <a:pPr marL="0" indent="0">
+              <a:buNone/>
+            </a:pPr>
+            <a:r>
+              <a:rPr lang="de-DE" altLang="de-DE" dirty="0"/>
+              <a:t>	</a:t>
+            </a:r>
+            <a:r>
+              <a:rPr lang="de-DE" altLang="de-DE" dirty="0" err="1">
+                <a:latin typeface="Consolas" panose="020B0609020204030204" pitchFamily="49" charset="0"/>
+              </a:rPr>
+              <a:t>git</a:t>
+            </a:r>
+            <a:r>
+              <a:rPr lang="de-DE" altLang="de-DE" dirty="0">
+                <a:latin typeface="Consolas" panose="020B0609020204030204" pitchFamily="49" charset="0"/>
+              </a:rPr>
+              <a:t> tag -a &lt;tag-name&gt;</a:t>
+            </a:r>
+          </a:p>
+          <a:p>
+            <a:pPr marL="457200" lvl="1" indent="0">
+              <a:buNone/>
+            </a:pPr>
+            <a:endParaRPr lang="de-DE" altLang="de-DE" sz="1200" dirty="0">
+              <a:latin typeface="Consolas" panose="020B0609020204030204" pitchFamily="49" charset="0"/>
+            </a:endParaRPr>
+          </a:p>
+          <a:p>
+            <a:pPr marL="457200" lvl="1" indent="0">
+              <a:spcBef>
+                <a:spcPts val="0"/>
+              </a:spcBef>
+              <a:buNone/>
+            </a:pPr>
+            <a:r>
+              <a:rPr lang="de-DE" altLang="de-DE" sz="1200" dirty="0">
+                <a:latin typeface="Consolas" panose="020B0609020204030204" pitchFamily="49" charset="0"/>
+              </a:rPr>
+              <a:t>$ </a:t>
+            </a:r>
+            <a:r>
+              <a:rPr lang="de-DE" altLang="de-DE" sz="1200" dirty="0" err="1">
+                <a:latin typeface="Consolas" panose="020B0609020204030204" pitchFamily="49" charset="0"/>
+              </a:rPr>
+              <a:t>git</a:t>
+            </a:r>
+            <a:r>
+              <a:rPr lang="de-DE" altLang="de-DE" sz="1200" dirty="0">
+                <a:latin typeface="Consolas" panose="020B0609020204030204" pitchFamily="49" charset="0"/>
+              </a:rPr>
+              <a:t> tag -a release-v1.0.0 -m "</a:t>
+            </a:r>
+            <a:r>
+              <a:rPr lang="de-DE" altLang="de-DE" sz="1200" dirty="0" err="1">
+                <a:latin typeface="Consolas" panose="020B0609020204030204" pitchFamily="49" charset="0"/>
+              </a:rPr>
+              <a:t>Latest</a:t>
+            </a:r>
+            <a:r>
+              <a:rPr lang="de-DE" altLang="de-DE" sz="1200" dirty="0">
+                <a:latin typeface="Consolas" panose="020B0609020204030204" pitchFamily="49" charset="0"/>
+              </a:rPr>
+              <a:t> v1 release"</a:t>
+            </a:r>
+          </a:p>
+          <a:p>
+            <a:pPr marL="457200" lvl="1" indent="0">
+              <a:spcBef>
+                <a:spcPts val="0"/>
+              </a:spcBef>
+              <a:buNone/>
+            </a:pPr>
+            <a:endParaRPr lang="de-DE" altLang="de-DE" sz="1200" dirty="0">
+              <a:latin typeface="Consolas" panose="020B0609020204030204" pitchFamily="49" charset="0"/>
+            </a:endParaRPr>
+          </a:p>
+          <a:p>
+            <a:pPr marL="457200" lvl="1" indent="0">
+              <a:spcBef>
+                <a:spcPts val="0"/>
+              </a:spcBef>
+              <a:buNone/>
+            </a:pPr>
+            <a:r>
+              <a:rPr lang="de-DE" altLang="de-DE" sz="1200" dirty="0">
+                <a:latin typeface="Consolas" panose="020B0609020204030204" pitchFamily="49" charset="0"/>
+              </a:rPr>
+              <a:t>$ </a:t>
+            </a:r>
+            <a:r>
+              <a:rPr lang="de-DE" altLang="de-DE" sz="1200" dirty="0" err="1">
+                <a:latin typeface="Consolas" panose="020B0609020204030204" pitchFamily="49" charset="0"/>
+              </a:rPr>
+              <a:t>git</a:t>
+            </a:r>
+            <a:r>
+              <a:rPr lang="de-DE" altLang="de-DE" sz="1200" dirty="0">
+                <a:latin typeface="Consolas" panose="020B0609020204030204" pitchFamily="49" charset="0"/>
+              </a:rPr>
+              <a:t> </a:t>
+            </a:r>
+            <a:r>
+              <a:rPr lang="de-DE" altLang="de-DE" sz="1200" dirty="0" err="1">
+                <a:latin typeface="Consolas" panose="020B0609020204030204" pitchFamily="49" charset="0"/>
+              </a:rPr>
+              <a:t>show</a:t>
+            </a:r>
+            <a:r>
+              <a:rPr lang="de-DE" altLang="de-DE" sz="1200" dirty="0">
+                <a:latin typeface="Consolas" panose="020B0609020204030204" pitchFamily="49" charset="0"/>
+              </a:rPr>
+              <a:t> release-v1.0.0</a:t>
+            </a:r>
+          </a:p>
+          <a:p>
+            <a:pPr marL="457200" lvl="1" indent="0">
+              <a:spcBef>
+                <a:spcPts val="0"/>
+              </a:spcBef>
+              <a:buNone/>
+            </a:pPr>
+            <a:r>
+              <a:rPr lang="de-DE" altLang="de-DE" sz="1200" dirty="0">
+                <a:latin typeface="Consolas" panose="020B0609020204030204" pitchFamily="49" charset="0"/>
+              </a:rPr>
+              <a:t>tag release-v1.0.0</a:t>
+            </a:r>
+          </a:p>
+          <a:p>
+            <a:pPr marL="457200" lvl="1" indent="0">
+              <a:spcBef>
+                <a:spcPts val="0"/>
+              </a:spcBef>
+              <a:buNone/>
+            </a:pPr>
+            <a:r>
+              <a:rPr lang="de-DE" altLang="de-DE" sz="1200" dirty="0">
+                <a:latin typeface="Consolas" panose="020B0609020204030204" pitchFamily="49" charset="0"/>
+              </a:rPr>
+              <a:t>Tagger: Christopher Keutner &lt;christopher.keutner@alumni.fh-aachen.de&gt;</a:t>
+            </a:r>
+          </a:p>
+          <a:p>
+            <a:pPr marL="457200" lvl="1" indent="0">
+              <a:spcBef>
+                <a:spcPts val="0"/>
+              </a:spcBef>
+              <a:buNone/>
+            </a:pPr>
+            <a:r>
+              <a:rPr lang="de-DE" altLang="de-DE" sz="1200" dirty="0">
+                <a:latin typeface="Consolas" panose="020B0609020204030204" pitchFamily="49" charset="0"/>
+              </a:rPr>
+              <a:t>Date:   Tue May 28 15:13:44 2024 +0200</a:t>
+            </a:r>
+          </a:p>
+          <a:p>
+            <a:pPr marL="457200" lvl="1" indent="0">
+              <a:spcBef>
+                <a:spcPts val="0"/>
+              </a:spcBef>
+              <a:buNone/>
+            </a:pPr>
+            <a:endParaRPr lang="de-DE" altLang="de-DE" sz="1200" dirty="0">
+              <a:latin typeface="Consolas" panose="020B0609020204030204" pitchFamily="49" charset="0"/>
+            </a:endParaRPr>
+          </a:p>
+          <a:p>
+            <a:pPr marL="457200" lvl="1" indent="0">
+              <a:spcBef>
+                <a:spcPts val="0"/>
+              </a:spcBef>
+              <a:buNone/>
+            </a:pPr>
+            <a:r>
+              <a:rPr lang="de-DE" altLang="de-DE" sz="1200" dirty="0" err="1">
+                <a:latin typeface="Consolas" panose="020B0609020204030204" pitchFamily="49" charset="0"/>
+              </a:rPr>
+              <a:t>Latest</a:t>
+            </a:r>
+            <a:r>
+              <a:rPr lang="de-DE" altLang="de-DE" sz="1200" dirty="0">
+                <a:latin typeface="Consolas" panose="020B0609020204030204" pitchFamily="49" charset="0"/>
+              </a:rPr>
+              <a:t> v1 release</a:t>
+            </a:r>
+          </a:p>
+          <a:p>
+            <a:pPr marL="457200" lvl="1" indent="0">
+              <a:spcBef>
+                <a:spcPts val="0"/>
+              </a:spcBef>
+              <a:buNone/>
+            </a:pPr>
+            <a:endParaRPr lang="de-DE" altLang="de-DE" sz="1200" dirty="0">
+              <a:latin typeface="Consolas" panose="020B0609020204030204" pitchFamily="49" charset="0"/>
+            </a:endParaRPr>
+          </a:p>
+          <a:p>
+            <a:pPr marL="457200" lvl="1" indent="0">
+              <a:spcBef>
+                <a:spcPts val="0"/>
+              </a:spcBef>
+              <a:buNone/>
+            </a:pPr>
+            <a:r>
+              <a:rPr lang="de-DE" altLang="de-DE" sz="1200" dirty="0" err="1">
+                <a:latin typeface="Consolas" panose="020B0609020204030204" pitchFamily="49" charset="0"/>
+              </a:rPr>
+              <a:t>commit</a:t>
+            </a:r>
+            <a:r>
+              <a:rPr lang="de-DE" altLang="de-DE" sz="1200" dirty="0">
+                <a:latin typeface="Consolas" panose="020B0609020204030204" pitchFamily="49" charset="0"/>
+              </a:rPr>
+              <a:t> 11f6b62f8bc7a3403ceae4e8923d7a54abab7b6d (HEAD -&gt; </a:t>
+            </a:r>
+            <a:r>
+              <a:rPr lang="de-DE" altLang="de-DE" sz="1200" dirty="0" err="1">
+                <a:latin typeface="Consolas" panose="020B0609020204030204" pitchFamily="49" charset="0"/>
+              </a:rPr>
+              <a:t>main</a:t>
+            </a:r>
+            <a:r>
+              <a:rPr lang="de-DE" altLang="de-DE" sz="1200" dirty="0">
+                <a:latin typeface="Consolas" panose="020B0609020204030204" pitchFamily="49" charset="0"/>
+              </a:rPr>
+              <a:t>, tag: release-v1.0.0)</a:t>
+            </a:r>
+          </a:p>
+          <a:p>
+            <a:pPr marL="457200" lvl="1" indent="0">
+              <a:spcBef>
+                <a:spcPts val="0"/>
+              </a:spcBef>
+              <a:buNone/>
+            </a:pPr>
+            <a:r>
+              <a:rPr lang="de-DE" altLang="de-DE" sz="1200" dirty="0" err="1">
+                <a:latin typeface="Consolas" panose="020B0609020204030204" pitchFamily="49" charset="0"/>
+              </a:rPr>
+              <a:t>Author</a:t>
+            </a:r>
+            <a:r>
+              <a:rPr lang="de-DE" altLang="de-DE" sz="1200" dirty="0">
+                <a:latin typeface="Consolas" panose="020B0609020204030204" pitchFamily="49" charset="0"/>
+              </a:rPr>
+              <a:t>: Christopher Keutner &lt;christopher.keutner@alumni.fh-aachen.de&gt;</a:t>
+            </a:r>
+          </a:p>
+          <a:p>
+            <a:pPr marL="457200" lvl="1" indent="0">
+              <a:spcBef>
+                <a:spcPts val="0"/>
+              </a:spcBef>
+              <a:buNone/>
+            </a:pPr>
+            <a:r>
+              <a:rPr lang="de-DE" altLang="de-DE" sz="1200" dirty="0">
+                <a:latin typeface="Consolas" panose="020B0609020204030204" pitchFamily="49" charset="0"/>
+              </a:rPr>
+              <a:t>Date:   Tue May 28 15:13:10 2024 +0200</a:t>
+            </a:r>
+          </a:p>
+          <a:p>
+            <a:pPr marL="457200" lvl="1" indent="0">
+              <a:spcBef>
+                <a:spcPts val="0"/>
+              </a:spcBef>
+              <a:buNone/>
+            </a:pPr>
+            <a:endParaRPr lang="de-DE" altLang="de-DE" sz="1200" dirty="0">
+              <a:latin typeface="Consolas" panose="020B0609020204030204" pitchFamily="49" charset="0"/>
+            </a:endParaRPr>
+          </a:p>
+          <a:p>
+            <a:pPr marL="457200" lvl="1" indent="0">
+              <a:spcBef>
+                <a:spcPts val="0"/>
+              </a:spcBef>
+              <a:buNone/>
+            </a:pPr>
+            <a:r>
+              <a:rPr lang="de-DE" altLang="de-DE" sz="1200" dirty="0">
+                <a:latin typeface="Consolas" panose="020B0609020204030204" pitchFamily="49" charset="0"/>
+              </a:rPr>
+              <a:t>    Add </a:t>
+            </a:r>
+            <a:r>
+              <a:rPr lang="de-DE" altLang="de-DE" sz="1200" dirty="0" err="1">
+                <a:latin typeface="Consolas" panose="020B0609020204030204" pitchFamily="49" charset="0"/>
+              </a:rPr>
+              <a:t>new</a:t>
+            </a:r>
+            <a:r>
+              <a:rPr lang="de-DE" altLang="de-DE" sz="1200" dirty="0">
+                <a:latin typeface="Consolas" panose="020B0609020204030204" pitchFamily="49" charset="0"/>
+              </a:rPr>
+              <a:t> </a:t>
+            </a:r>
+            <a:r>
+              <a:rPr lang="de-DE" altLang="de-DE" sz="1200" dirty="0" err="1">
+                <a:latin typeface="Consolas" panose="020B0609020204030204" pitchFamily="49" charset="0"/>
+              </a:rPr>
+              <a:t>file</a:t>
+            </a:r>
+            <a:endParaRPr lang="de-DE" altLang="de-DE" sz="1200" dirty="0">
+              <a:latin typeface="Consolas" panose="020B0609020204030204" pitchFamily="49" charset="0"/>
+            </a:endParaRPr>
+          </a:p>
+          <a:p>
+            <a:pPr marL="457200" lvl="1" indent="0">
+              <a:spcBef>
+                <a:spcPts val="0"/>
+              </a:spcBef>
+              <a:buNone/>
+            </a:pPr>
+            <a:endParaRPr lang="de-DE" altLang="de-DE" sz="1200" dirty="0">
+              <a:latin typeface="Consolas" panose="020B0609020204030204" pitchFamily="49" charset="0"/>
+            </a:endParaRPr>
+          </a:p>
+          <a:p>
+            <a:pPr marL="457200" lvl="1" indent="0">
+              <a:spcBef>
+                <a:spcPts val="0"/>
+              </a:spcBef>
+              <a:buNone/>
+            </a:pPr>
+            <a:r>
+              <a:rPr lang="de-DE" altLang="de-DE" sz="1200" dirty="0" err="1">
+                <a:latin typeface="Consolas" panose="020B0609020204030204" pitchFamily="49" charset="0"/>
+              </a:rPr>
+              <a:t>diff</a:t>
+            </a:r>
+            <a:r>
+              <a:rPr lang="de-DE" altLang="de-DE" sz="1200" dirty="0">
+                <a:latin typeface="Consolas" panose="020B0609020204030204" pitchFamily="49" charset="0"/>
+              </a:rPr>
+              <a:t> --</a:t>
+            </a:r>
+            <a:r>
+              <a:rPr lang="de-DE" altLang="de-DE" sz="1200" dirty="0" err="1">
+                <a:latin typeface="Consolas" panose="020B0609020204030204" pitchFamily="49" charset="0"/>
+              </a:rPr>
+              <a:t>git</a:t>
+            </a:r>
+            <a:r>
+              <a:rPr lang="de-DE" altLang="de-DE" sz="1200" dirty="0">
+                <a:latin typeface="Consolas" panose="020B0609020204030204" pitchFamily="49" charset="0"/>
+              </a:rPr>
+              <a:t> a/file8.txt b/file8.txt</a:t>
+            </a:r>
+          </a:p>
+          <a:p>
+            <a:pPr marL="457200" lvl="1" indent="0">
+              <a:spcBef>
+                <a:spcPts val="0"/>
+              </a:spcBef>
+              <a:buNone/>
+            </a:pPr>
+            <a:r>
+              <a:rPr lang="de-DE" altLang="de-DE" sz="1200" dirty="0" err="1">
+                <a:latin typeface="Consolas" panose="020B0609020204030204" pitchFamily="49" charset="0"/>
+              </a:rPr>
+              <a:t>new</a:t>
+            </a:r>
+            <a:r>
+              <a:rPr lang="de-DE" altLang="de-DE" sz="1200" dirty="0">
+                <a:latin typeface="Consolas" panose="020B0609020204030204" pitchFamily="49" charset="0"/>
+              </a:rPr>
+              <a:t> </a:t>
+            </a:r>
+            <a:r>
+              <a:rPr lang="de-DE" altLang="de-DE" sz="1200" dirty="0" err="1">
+                <a:latin typeface="Consolas" panose="020B0609020204030204" pitchFamily="49" charset="0"/>
+              </a:rPr>
+              <a:t>file</a:t>
+            </a:r>
+            <a:r>
+              <a:rPr lang="de-DE" altLang="de-DE" sz="1200" dirty="0">
+                <a:latin typeface="Consolas" panose="020B0609020204030204" pitchFamily="49" charset="0"/>
+              </a:rPr>
+              <a:t> </a:t>
+            </a:r>
+            <a:r>
+              <a:rPr lang="de-DE" altLang="de-DE" sz="1200" dirty="0" err="1">
+                <a:latin typeface="Consolas" panose="020B0609020204030204" pitchFamily="49" charset="0"/>
+              </a:rPr>
+              <a:t>mode</a:t>
+            </a:r>
+            <a:r>
+              <a:rPr lang="de-DE" altLang="de-DE" sz="1200" dirty="0">
+                <a:latin typeface="Consolas" panose="020B0609020204030204" pitchFamily="49" charset="0"/>
+              </a:rPr>
+              <a:t> 100644</a:t>
+            </a:r>
+          </a:p>
+          <a:p>
+            <a:pPr marL="457200" lvl="1" indent="0">
+              <a:spcBef>
+                <a:spcPts val="0"/>
+              </a:spcBef>
+              <a:buNone/>
+            </a:pPr>
+            <a:r>
+              <a:rPr lang="de-DE" altLang="de-DE" sz="1200" dirty="0" err="1">
+                <a:latin typeface="Consolas" panose="020B0609020204030204" pitchFamily="49" charset="0"/>
+              </a:rPr>
+              <a:t>index</a:t>
+            </a:r>
+            <a:r>
+              <a:rPr lang="de-DE" altLang="de-DE" sz="1200" dirty="0">
+                <a:latin typeface="Consolas" panose="020B0609020204030204" pitchFamily="49" charset="0"/>
+              </a:rPr>
+              <a:t> 0000000..e69de29</a:t>
+            </a:r>
+          </a:p>
+        </p:txBody>
+      </p:sp>
+      <p:sp>
+        <p:nvSpPr>
+          <p:cNvPr id="6147" name="Rectangle 1062">
+            <a:extLst>
+              <a:ext uri="{FF2B5EF4-FFF2-40B4-BE49-F238E27FC236}">
+                <a16:creationId xmlns:a16="http://schemas.microsoft.com/office/drawing/2014/main" id="{C46E9340-3256-8D55-A265-94F2F41E288E}"/>
+              </a:ext>
+            </a:extLst>
+          </p:cNvPr>
+          <p:cNvSpPr>
+            <a:spLocks noGrp="1" noChangeArrowheads="1"/>
+          </p:cNvSpPr>
+          <p:nvPr>
+            <p:ph type="title"/>
+          </p:nvPr>
+        </p:nvSpPr>
+        <p:spPr>
+          <a:xfrm>
+            <a:off x="285750" y="142875"/>
+            <a:ext cx="5654675" cy="706438"/>
+          </a:xfrm>
+        </p:spPr>
+        <p:txBody>
+          <a:bodyPr/>
+          <a:lstStyle/>
+          <a:p>
+            <a:r>
+              <a:rPr lang="de-DE" altLang="de-DE" dirty="0" err="1"/>
+              <a:t>Git</a:t>
+            </a:r>
+            <a:r>
+              <a:rPr lang="de-DE" altLang="de-DE" dirty="0"/>
+              <a:t> – Tags </a:t>
+            </a:r>
+          </a:p>
+        </p:txBody>
+      </p:sp>
+    </p:spTree>
+    <p:extLst>
+      <p:ext uri="{BB962C8B-B14F-4D97-AF65-F5344CB8AC3E}">
         <p14:creationId xmlns:p14="http://schemas.microsoft.com/office/powerpoint/2010/main" val="641179957"/>
       </p:ext>
     </p:extLst>
@@ -6885,7 +7333,7 @@
 </p:sld>
 </file>
 
-<file path=ppt/slides/slide13.xml><?xml version="1.0" encoding="utf-8"?>
+<file path=ppt/slides/slide14.xml><?xml version="1.0" encoding="utf-8"?>
 <p:sld xmlns:a="http://schemas.openxmlformats.org/drawingml/2006/main" xmlns:r="http://schemas.openxmlformats.org/officeDocument/2006/relationships" xmlns:p="http://schemas.openxmlformats.org/presentationml/2006/main">
   <p:cSld>
     <p:spTree>
@@ -6965,7 +7413,7 @@
 </p:sld>
 </file>
 
-<file path=ppt/slides/slide14.xml><?xml version="1.0" encoding="utf-8"?>
+<file path=ppt/slides/slide15.xml><?xml version="1.0" encoding="utf-8"?>
 <p:sld xmlns:a="http://schemas.openxmlformats.org/drawingml/2006/main" xmlns:r="http://schemas.openxmlformats.org/officeDocument/2006/relationships" xmlns:p="http://schemas.openxmlformats.org/presentationml/2006/main">
   <p:cSld>
     <p:spTree>
@@ -7100,7 +7548,7 @@
 </p:sld>
 </file>
 
-<file path=ppt/slides/slide15.xml><?xml version="1.0" encoding="utf-8"?>
+<file path=ppt/slides/slide16.xml><?xml version="1.0" encoding="utf-8"?>
 <p:sld xmlns:a="http://schemas.openxmlformats.org/drawingml/2006/main" xmlns:r="http://schemas.openxmlformats.org/officeDocument/2006/relationships" xmlns:p="http://schemas.openxmlformats.org/presentationml/2006/main">
   <p:cSld>
     <p:spTree>
@@ -7175,7 +7623,7 @@
 </p:sld>
 </file>
 
-<file path=ppt/slides/slide16.xml><?xml version="1.0" encoding="utf-8"?>
+<file path=ppt/slides/slide17.xml><?xml version="1.0" encoding="utf-8"?>
 <p:sld xmlns:a="http://schemas.openxmlformats.org/drawingml/2006/main" xmlns:r="http://schemas.openxmlformats.org/officeDocument/2006/relationships" xmlns:p="http://schemas.openxmlformats.org/presentationml/2006/main">
   <p:cSld>
     <p:spTree>
@@ -7357,7 +7805,7 @@
 </p:sld>
 </file>
 
-<file path=ppt/slides/slide17.xml><?xml version="1.0" encoding="utf-8"?>
+<file path=ppt/slides/slide18.xml><?xml version="1.0" encoding="utf-8"?>
 <p:sld xmlns:a="http://schemas.openxmlformats.org/drawingml/2006/main" xmlns:r="http://schemas.openxmlformats.org/officeDocument/2006/relationships" xmlns:p="http://schemas.openxmlformats.org/presentationml/2006/main">
   <p:cSld>
     <p:spTree>
@@ -7534,7 +7982,132 @@
               <a:buFont typeface="Arial" panose="020B0604020202020204" pitchFamily="34" charset="0"/>
               <a:buChar char="•"/>
             </a:pPr>
-            <a:endParaRPr lang="de-DE" altLang="de-DE" sz="1800" b="1" dirty="0"/>
+            <a:r>
+              <a:rPr lang="de-DE" altLang="de-DE" sz="1800" b="1" dirty="0"/>
+              <a:t>Tag 1 – Einführung in </a:t>
+            </a:r>
+            <a:r>
+              <a:rPr lang="de-DE" altLang="de-DE" sz="1800" b="1" dirty="0" err="1"/>
+              <a:t>Git</a:t>
+            </a:r>
+            <a:r>
+              <a:rPr lang="de-DE" altLang="de-DE" sz="1800" b="1" dirty="0"/>
+              <a:t> und </a:t>
+            </a:r>
+            <a:r>
+              <a:rPr lang="de-DE" altLang="de-DE" sz="1800" b="1" dirty="0" err="1"/>
+              <a:t>GitLab</a:t>
+            </a:r>
+            <a:r>
+              <a:rPr lang="de-DE" altLang="de-DE" sz="1800" b="1" dirty="0"/>
+              <a:t>, </a:t>
+            </a:r>
+            <a:r>
+              <a:rPr lang="de-DE" altLang="de-DE" sz="1800" b="1" dirty="0" err="1"/>
+              <a:t>Git</a:t>
+            </a:r>
+            <a:r>
+              <a:rPr lang="de-DE" altLang="de-DE" sz="1800" b="1" dirty="0"/>
+              <a:t>-Workflow im Team</a:t>
+            </a:r>
+          </a:p>
+          <a:p>
+            <a:pPr lvl="1">
+              <a:buFont typeface="Arial" panose="020B0604020202020204" pitchFamily="34" charset="0"/>
+              <a:buChar char="•"/>
+            </a:pPr>
+            <a:r>
+              <a:rPr lang="de-DE" altLang="de-DE" sz="1400" dirty="0"/>
+              <a:t>Einführung &amp; Kursüberblick</a:t>
+            </a:r>
+          </a:p>
+          <a:p>
+            <a:pPr lvl="1">
+              <a:buFont typeface="Arial" panose="020B0604020202020204" pitchFamily="34" charset="0"/>
+              <a:buChar char="•"/>
+            </a:pPr>
+            <a:r>
+              <a:rPr lang="de-DE" altLang="de-DE" sz="1400" dirty="0"/>
+              <a:t>Grundlagen von </a:t>
+            </a:r>
+            <a:r>
+              <a:rPr lang="de-DE" altLang="de-DE" sz="1400" dirty="0" err="1"/>
+              <a:t>Git</a:t>
+            </a:r>
+            <a:endParaRPr lang="de-DE" altLang="de-DE" sz="1400" dirty="0"/>
+          </a:p>
+          <a:p>
+            <a:pPr lvl="1">
+              <a:buFont typeface="Arial" panose="020B0604020202020204" pitchFamily="34" charset="0"/>
+              <a:buChar char="•"/>
+            </a:pPr>
+            <a:r>
+              <a:rPr lang="de-DE" altLang="de-DE" sz="1400" dirty="0" err="1"/>
+              <a:t>Git</a:t>
+            </a:r>
+            <a:r>
+              <a:rPr lang="de-DE" altLang="de-DE" sz="1400" dirty="0"/>
+              <a:t> </a:t>
+            </a:r>
+            <a:r>
+              <a:rPr lang="de-DE" altLang="de-DE" sz="1400" dirty="0" err="1"/>
+              <a:t>Rebase</a:t>
+            </a:r>
+            <a:r>
+              <a:rPr lang="de-DE" altLang="de-DE" sz="1400" dirty="0"/>
+              <a:t> und </a:t>
+            </a:r>
+            <a:r>
+              <a:rPr lang="de-DE" altLang="de-DE" sz="1400" dirty="0" err="1"/>
+              <a:t>Merge</a:t>
+            </a:r>
+            <a:r>
+              <a:rPr lang="de-DE" altLang="de-DE" sz="1400" dirty="0"/>
+              <a:t>-Strategien</a:t>
+            </a:r>
+          </a:p>
+          <a:p>
+            <a:pPr lvl="1">
+              <a:buFont typeface="Arial" panose="020B0604020202020204" pitchFamily="34" charset="0"/>
+              <a:buChar char="•"/>
+            </a:pPr>
+            <a:r>
+              <a:rPr lang="de-DE" altLang="de-DE" sz="1400" dirty="0" err="1"/>
+              <a:t>Git</a:t>
+            </a:r>
+            <a:r>
+              <a:rPr lang="de-DE" altLang="de-DE" sz="1400" dirty="0"/>
+              <a:t> Remote</a:t>
+            </a:r>
+          </a:p>
+          <a:p>
+            <a:pPr lvl="1">
+              <a:buFont typeface="Arial" panose="020B0604020202020204" pitchFamily="34" charset="0"/>
+              <a:buChar char="•"/>
+            </a:pPr>
+            <a:r>
+              <a:rPr lang="de-DE" altLang="de-DE" sz="1400" dirty="0"/>
+              <a:t>Grundlagen von </a:t>
+            </a:r>
+            <a:r>
+              <a:rPr lang="de-DE" altLang="de-DE" sz="1400" dirty="0" err="1"/>
+              <a:t>GitLab</a:t>
+            </a:r>
+            <a:endParaRPr lang="de-DE" altLang="de-DE" sz="1400" dirty="0"/>
+          </a:p>
+          <a:p>
+            <a:pPr lvl="1">
+              <a:buFont typeface="Arial" panose="020B0604020202020204" pitchFamily="34" charset="0"/>
+              <a:buChar char="•"/>
+            </a:pPr>
+            <a:r>
+              <a:rPr lang="de-DE" altLang="de-DE" sz="1400" dirty="0" err="1"/>
+              <a:t>Git</a:t>
+            </a:r>
+            <a:r>
+              <a:rPr lang="de-DE" altLang="de-DE" sz="1400" dirty="0"/>
+              <a:t>-Workflow im Team</a:t>
+            </a:r>
           </a:p>
           <a:p>
             <a:pPr>
@@ -7543,7 +8116,7 @@
             </a:pPr>
             <a:r>
               <a:rPr lang="de-DE" altLang="de-DE" sz="1800" b="1" dirty="0"/>
-              <a:t>Tag 1 – Einführung in </a:t>
+              <a:t>Tag 2 – Vertiefung </a:t>
             </a:r>
             <a:r>
               <a:rPr lang="de-DE" altLang="de-DE" sz="1800" b="1" dirty="0" err="1"/>
@@ -7551,7 +8124,7 @@
             </a:r>
             <a:r>
               <a:rPr lang="de-DE" altLang="de-DE" sz="1800" b="1" dirty="0"/>
-              <a:t> und </a:t>
+              <a:t>-Workflow, CI/CD &amp; </a:t>
             </a:r>
             <a:r>
               <a:rPr lang="de-DE" altLang="de-DE" sz="1800" b="1" dirty="0" err="1"/>
@@ -7559,15 +8132,7 @@
             </a:r>
             <a:r>
               <a:rPr lang="de-DE" altLang="de-DE" sz="1800" b="1" dirty="0"/>
-              <a:t>, </a:t>
-            </a:r>
-            <a:r>
-              <a:rPr lang="de-DE" altLang="de-DE" sz="1800" b="1" dirty="0" err="1"/>
-              <a:t>Git</a:t>
-            </a:r>
-            <a:r>
-              <a:rPr lang="de-DE" altLang="de-DE" sz="1800" b="1" dirty="0"/>
-              <a:t>-Workflow im Team</a:t>
+              <a:t> CI </a:t>
             </a:r>
           </a:p>
           <a:p>
@@ -7576,8 +8141,12 @@
               <a:buChar char="•"/>
             </a:pPr>
             <a:r>
+              <a:rPr lang="de-DE" altLang="de-DE" sz="1400" dirty="0" err="1"/>
+              <a:t>Gitflow</a:t>
+            </a:r>
+            <a:r>
               <a:rPr lang="de-DE" altLang="de-DE" sz="1400" dirty="0"/>
-              <a:t>Einführung &amp; Kursüberblick</a:t>
+              <a:t>-Workflow</a:t>
             </a:r>
           </a:p>
           <a:p>
@@ -7587,21 +8156,8 @@
             </a:pPr>
             <a:r>
               <a:rPr lang="de-DE" altLang="de-DE" sz="1400" dirty="0"/>
-              <a:t>Grundlagen von </a:t>
-            </a:r>
-            <a:r>
-              <a:rPr lang="de-DE" altLang="de-DE" sz="1400" dirty="0" err="1"/>
-              <a:t>Git</a:t>
-            </a:r>
-            <a:r>
-              <a:rPr lang="de-DE" altLang="de-DE" sz="1400" dirty="0"/>
-              <a:t> und </a:t>
-            </a:r>
-            <a:r>
-              <a:rPr lang="de-DE" altLang="de-DE" sz="1400" dirty="0" err="1"/>
-              <a:t>GitLab</a:t>
-            </a:r>
-            <a:endParaRPr lang="de-DE" altLang="de-DE" sz="1400" dirty="0"/>
+              <a:t>Tags, Releases &amp; deren Verwaltung</a:t>
+            </a:r>
           </a:p>
           <a:p>
             <a:pPr lvl="1">
@@ -7610,27 +8166,11 @@
             </a:pPr>
             <a:r>
               <a:rPr lang="de-DE" altLang="de-DE" sz="1400" dirty="0" err="1"/>
-              <a:t>Git</a:t>
+              <a:t>GitLab</a:t>
             </a:r>
             <a:r>
               <a:rPr lang="de-DE" altLang="de-DE" sz="1400" dirty="0"/>
-              <a:t> </a:t>
-            </a:r>
-            <a:r>
-              <a:rPr lang="de-DE" altLang="de-DE" sz="1400" dirty="0" err="1"/>
-              <a:t>Rebase</a:t>
-            </a:r>
-            <a:r>
-              <a:rPr lang="de-DE" altLang="de-DE" sz="1400" dirty="0"/>
-              <a:t> &amp; </a:t>
-            </a:r>
-            <a:r>
-              <a:rPr lang="de-DE" altLang="de-DE" sz="1400" dirty="0" err="1"/>
-              <a:t>Merge</a:t>
-            </a:r>
-            <a:r>
-              <a:rPr lang="de-DE" altLang="de-DE" sz="1400" dirty="0"/>
-              <a:t>-Strategien</a:t>
+              <a:t>-Runner</a:t>
             </a:r>
           </a:p>
           <a:p>
@@ -7639,12 +8179,47 @@
               <a:buChar char="•"/>
             </a:pPr>
             <a:r>
+              <a:rPr lang="de-DE" altLang="de-DE" sz="1400" dirty="0"/>
+              <a:t>Einführung in </a:t>
+            </a:r>
+            <a:r>
               <a:rPr lang="de-DE" altLang="de-DE" sz="1400" dirty="0" err="1"/>
-              <a:t>Git</a:t>
+              <a:t>GitLab</a:t>
             </a:r>
             <a:r>
               <a:rPr lang="de-DE" altLang="de-DE" sz="1400" dirty="0"/>
-              <a:t>-Workflow im Team</a:t>
+              <a:t> CI/CD &amp; </a:t>
+            </a:r>
+            <a:r>
+              <a:rPr lang="de-DE" altLang="de-DE" sz="1400" dirty="0" err="1"/>
+              <a:t>gitlab.yml</a:t>
+            </a:r>
+            <a:endParaRPr lang="de-DE" altLang="de-DE" sz="1400" dirty="0"/>
+          </a:p>
+          <a:p>
+            <a:pPr>
+              <a:buFont typeface="Arial" panose="020B0604020202020204" pitchFamily="34" charset="0"/>
+              <a:buChar char="•"/>
+            </a:pPr>
+            <a:r>
+              <a:rPr lang="de-DE" altLang="de-DE" sz="1800" b="1" dirty="0"/>
+              <a:t>Tag 3 – </a:t>
+            </a:r>
+            <a:r>
+              <a:rPr lang="de-DE" altLang="de-DE" sz="1800" b="1" dirty="0" err="1"/>
+              <a:t>GitOps</a:t>
+            </a:r>
+            <a:r>
+              <a:rPr lang="de-DE" altLang="de-DE" sz="1800" b="1" dirty="0"/>
+              <a:t>, Docker in der Entwicklung und </a:t>
+            </a:r>
+            <a:r>
+              <a:rPr lang="de-DE" altLang="de-DE" sz="1800" b="1" dirty="0" err="1"/>
+              <a:t>Deployment</a:t>
+            </a:r>
+            <a:r>
+              <a:rPr lang="de-DE" altLang="de-DE" sz="1800" b="1" dirty="0"/>
+              <a:t>-Strategien</a:t>
             </a:r>
           </a:p>
           <a:p>
@@ -7652,30 +8227,14 @@
               <a:buFont typeface="Arial" panose="020B0604020202020204" pitchFamily="34" charset="0"/>
               <a:buChar char="•"/>
             </a:pPr>
-            <a:endParaRPr lang="de-DE" altLang="de-DE" sz="1400" dirty="0"/>
-          </a:p>
-          <a:p>
-            <a:pPr>
-              <a:buFont typeface="Arial" panose="020B0604020202020204" pitchFamily="34" charset="0"/>
-              <a:buChar char="•"/>
-            </a:pPr>
-            <a:r>
-              <a:rPr lang="de-DE" altLang="de-DE" sz="1800" b="1" dirty="0"/>
-              <a:t>Tag 2 – Vertiefung </a:t>
-            </a:r>
-            <a:r>
-              <a:rPr lang="de-DE" altLang="de-DE" sz="1800" b="1" dirty="0" err="1"/>
-              <a:t>Git</a:t>
-            </a:r>
-            <a:r>
-              <a:rPr lang="de-DE" altLang="de-DE" sz="1800" b="1" dirty="0"/>
-              <a:t>-Workflow, CI/CD &amp; </a:t>
-            </a:r>
-            <a:r>
-              <a:rPr lang="de-DE" altLang="de-DE" sz="1800" b="1" dirty="0" err="1"/>
+            <a:r>
+              <a:rPr lang="de-DE" altLang="de-DE" sz="1400" dirty="0" err="1"/>
               <a:t>GitOps</a:t>
             </a:r>
-            <a:endParaRPr lang="de-DE" altLang="de-DE" sz="1800" b="1" dirty="0"/>
+            <a:r>
+              <a:rPr lang="de-DE" altLang="de-DE" sz="1400" dirty="0"/>
+              <a:t> Grundlagen</a:t>
+            </a:r>
           </a:p>
           <a:p>
             <a:pPr lvl="1">
@@ -7683,12 +8242,8 @@
               <a:buChar char="•"/>
             </a:pPr>
             <a:r>
-              <a:rPr lang="de-DE" altLang="de-DE" sz="1400" dirty="0" err="1"/>
-              <a:t>Gitflow</a:t>
-            </a:r>
-            <a:r>
               <a:rPr lang="de-DE" altLang="de-DE" sz="1400" dirty="0"/>
-              <a:t>-Workflow</a:t>
+              <a:t>Lokale Entwicklung mit Docker</a:t>
             </a:r>
           </a:p>
           <a:p>
@@ -7698,7 +8253,7 @@
             </a:pPr>
             <a:r>
               <a:rPr lang="de-DE" altLang="de-DE" sz="1400" dirty="0"/>
-              <a:t>Tags, Releases &amp; deren Verwaltung</a:t>
+              <a:t>Container/Docker-Registry</a:t>
             </a:r>
           </a:p>
           <a:p>
@@ -7708,21 +8263,16 @@
             </a:pPr>
             <a:r>
               <a:rPr lang="de-DE" altLang="de-DE" sz="1400" dirty="0"/>
-              <a:t>Einführung in </a:t>
+              <a:t>Erstellen von Release- und </a:t>
             </a:r>
             <a:r>
               <a:rPr lang="de-DE" altLang="de-DE" sz="1400" dirty="0" err="1"/>
-              <a:t>GitLab</a:t>
+              <a:t>Tagged</a:t>
             </a:r>
             <a:r>
               <a:rPr lang="de-DE" altLang="de-DE" sz="1400" dirty="0"/>
-              <a:t> CI/CD &amp; </a:t>
-            </a:r>
-            <a:r>
-              <a:rPr lang="de-DE" altLang="de-DE" sz="1400" dirty="0" err="1"/>
-              <a:t>gitlab.yml</a:t>
-            </a:r>
-            <a:endParaRPr lang="de-DE" altLang="de-DE" sz="1400" dirty="0"/>
+              <a:t>-Images</a:t>
+            </a:r>
           </a:p>
           <a:p>
             <a:pPr lvl="1">
@@ -7731,105 +8281,25 @@
             </a:pPr>
             <a:r>
               <a:rPr lang="de-DE" altLang="de-DE" sz="1400" dirty="0"/>
-              <a:t>Grundlagen von </a:t>
+              <a:t>Möglichkeiten des </a:t>
             </a:r>
             <a:r>
               <a:rPr lang="de-DE" altLang="de-DE" sz="1400" dirty="0" err="1"/>
-              <a:t>GitOps</a:t>
-            </a:r>
-            <a:endParaRPr lang="de-DE" altLang="de-DE" sz="1400" dirty="0"/>
+              <a:t>Deployments</a:t>
+            </a:r>
+            <a:r>
+              <a:rPr lang="de-DE" altLang="de-DE" sz="1400" dirty="0"/>
+              <a:t> &amp; Verwaltung von Konfiguration</a:t>
+            </a:r>
           </a:p>
           <a:p>
             <a:pPr lvl="1">
               <a:buFont typeface="Arial" panose="020B0604020202020204" pitchFamily="34" charset="0"/>
               <a:buChar char="•"/>
             </a:pPr>
-            <a:endParaRPr lang="de-DE" altLang="de-DE" sz="1400" dirty="0"/>
-          </a:p>
-          <a:p>
-            <a:pPr>
-              <a:buFont typeface="Arial" panose="020B0604020202020204" pitchFamily="34" charset="0"/>
-              <a:buChar char="•"/>
-            </a:pPr>
-            <a:r>
-              <a:rPr lang="de-DE" altLang="de-DE" sz="1800" b="1" dirty="0"/>
-              <a:t>Tag 3 – Docker in der Entwicklung, </a:t>
-            </a:r>
-            <a:r>
-              <a:rPr lang="de-DE" altLang="de-DE" sz="1800" b="1" dirty="0" err="1"/>
-              <a:t>GitLab</a:t>
-            </a:r>
-            <a:r>
-              <a:rPr lang="de-DE" altLang="de-DE" sz="1800" b="1" dirty="0"/>
-              <a:t> CI und </a:t>
-            </a:r>
-            <a:r>
-              <a:rPr lang="de-DE" altLang="de-DE" sz="1800" b="1" dirty="0" err="1"/>
-              <a:t>Deployment</a:t>
-            </a:r>
-            <a:r>
-              <a:rPr lang="de-DE" altLang="de-DE" sz="1800" b="1" dirty="0"/>
-              <a:t>-Strategien</a:t>
-            </a:r>
-          </a:p>
-          <a:p>
-            <a:pPr lvl="1">
-              <a:buFont typeface="Arial" panose="020B0604020202020204" pitchFamily="34" charset="0"/>
-              <a:buChar char="•"/>
-            </a:pPr>
             <a:r>
               <a:rPr lang="de-DE" altLang="de-DE" sz="1400" dirty="0"/>
-              <a:t>Lokale Entwicklung mit Docker</a:t>
-            </a:r>
-          </a:p>
-          <a:p>
-            <a:pPr lvl="1">
-              <a:buFont typeface="Arial" panose="020B0604020202020204" pitchFamily="34" charset="0"/>
-              <a:buChar char="•"/>
-            </a:pPr>
-            <a:r>
-              <a:rPr lang="de-DE" altLang="de-DE" sz="1400" dirty="0" err="1"/>
-              <a:t>GitLab</a:t>
-            </a:r>
-            <a:r>
-              <a:rPr lang="de-DE" altLang="de-DE" sz="1400" dirty="0"/>
-              <a:t>-Runner &amp; Docker-Registry</a:t>
-            </a:r>
-          </a:p>
-          <a:p>
-            <a:pPr lvl="1">
-              <a:buFont typeface="Arial" panose="020B0604020202020204" pitchFamily="34" charset="0"/>
-              <a:buChar char="•"/>
-            </a:pPr>
-            <a:r>
-              <a:rPr lang="de-DE" altLang="de-DE" sz="1400" dirty="0"/>
-              <a:t>Erstellen von Release- und </a:t>
-            </a:r>
-            <a:r>
-              <a:rPr lang="de-DE" altLang="de-DE" sz="1400" dirty="0" err="1"/>
-              <a:t>Tagged</a:t>
-            </a:r>
-            <a:r>
-              <a:rPr lang="de-DE" altLang="de-DE" sz="1400" dirty="0"/>
-              <a:t>-Images</a:t>
-            </a:r>
-          </a:p>
-          <a:p>
-            <a:pPr lvl="1">
-              <a:buFont typeface="Arial" panose="020B0604020202020204" pitchFamily="34" charset="0"/>
-              <a:buChar char="•"/>
-            </a:pPr>
-            <a:r>
-              <a:rPr lang="de-DE" altLang="de-DE" sz="1400" dirty="0"/>
-              <a:t>Möglichkeiten des </a:t>
-            </a:r>
-            <a:r>
-              <a:rPr lang="de-DE" altLang="de-DE" sz="1400" dirty="0" err="1"/>
-              <a:t>Deployments</a:t>
-            </a:r>
-            <a:r>
-              <a:rPr lang="de-DE" altLang="de-DE" sz="1400" dirty="0"/>
-              <a:t> &amp; Verwaltung von Konfiguration</a:t>
+              <a:t>Abschlussübung &amp; Diskussion</a:t>
             </a:r>
           </a:p>
           <a:p>
@@ -7883,6 +8353,498 @@
 </file>
 
 <file path=ppt/slides/slide3.xml><?xml version="1.0" encoding="utf-8"?>
+<p:sld xmlns:a="http://schemas.openxmlformats.org/drawingml/2006/main" xmlns:r="http://schemas.openxmlformats.org/officeDocument/2006/relationships" xmlns:p="http://schemas.openxmlformats.org/presentationml/2006/main">
+  <p:cSld>
+    <p:spTree>
+      <p:nvGrpSpPr>
+        <p:cNvPr id="1" name=""/>
+        <p:cNvGrpSpPr/>
+        <p:nvPr/>
+      </p:nvGrpSpPr>
+      <p:grpSpPr>
+        <a:xfrm>
+          <a:off x="0" y="0"/>
+          <a:ext cx="0" cy="0"/>
+          <a:chOff x="0" y="0"/>
+          <a:chExt cx="0" cy="0"/>
+        </a:xfrm>
+      </p:grpSpPr>
+      <p:sp>
+        <p:nvSpPr>
+          <p:cNvPr id="6146" name="Inhaltsplatzhalter 18">
+            <a:extLst>
+              <a:ext uri="{FF2B5EF4-FFF2-40B4-BE49-F238E27FC236}">
+                <a16:creationId xmlns:a16="http://schemas.microsoft.com/office/drawing/2014/main" id="{BE3C4C95-FD5D-27F0-ED0C-AB8113CAC9F1}"/>
+              </a:ext>
+            </a:extLst>
+          </p:cNvPr>
+          <p:cNvSpPr>
+            <a:spLocks noGrp="1"/>
+          </p:cNvSpPr>
+          <p:nvPr>
+            <p:ph idx="1"/>
+          </p:nvPr>
+        </p:nvSpPr>
+        <p:spPr/>
+        <p:txBody>
+          <a:bodyPr/>
+          <a:lstStyle/>
+          <a:p>
+            <a:pPr>
+              <a:buFont typeface="Arial" panose="020B0604020202020204" pitchFamily="34" charset="0"/>
+              <a:buChar char="•"/>
+            </a:pPr>
+            <a:r>
+              <a:rPr lang="de-DE" altLang="de-DE" sz="1800" b="1" dirty="0"/>
+              <a:t>Tag 1 – Einführung in </a:t>
+            </a:r>
+            <a:r>
+              <a:rPr lang="de-DE" altLang="de-DE" sz="1800" b="1" dirty="0" err="1"/>
+              <a:t>Git</a:t>
+            </a:r>
+            <a:r>
+              <a:rPr lang="de-DE" altLang="de-DE" sz="1800" b="1" dirty="0"/>
+              <a:t> und </a:t>
+            </a:r>
+            <a:r>
+              <a:rPr lang="de-DE" altLang="de-DE" sz="1800" b="1" dirty="0" err="1"/>
+              <a:t>GitLab</a:t>
+            </a:r>
+            <a:r>
+              <a:rPr lang="de-DE" altLang="de-DE" sz="1800" b="1" dirty="0"/>
+              <a:t>, </a:t>
+            </a:r>
+            <a:r>
+              <a:rPr lang="de-DE" altLang="de-DE" sz="1800" b="1" dirty="0" err="1"/>
+              <a:t>Git</a:t>
+            </a:r>
+            <a:r>
+              <a:rPr lang="de-DE" altLang="de-DE" sz="1800" b="1" dirty="0"/>
+              <a:t>-Workflow im Team</a:t>
+            </a:r>
+          </a:p>
+          <a:p>
+            <a:pPr lvl="1">
+              <a:buFont typeface="Arial" panose="020B0604020202020204" pitchFamily="34" charset="0"/>
+              <a:buChar char="•"/>
+            </a:pPr>
+            <a:r>
+              <a:rPr lang="de-DE" altLang="de-DE" sz="1400" dirty="0"/>
+              <a:t>Einführung &amp; Kursüberblick</a:t>
+            </a:r>
+          </a:p>
+          <a:p>
+            <a:pPr lvl="1">
+              <a:buFont typeface="Arial" panose="020B0604020202020204" pitchFamily="34" charset="0"/>
+              <a:buChar char="•"/>
+            </a:pPr>
+            <a:r>
+              <a:rPr lang="de-DE" altLang="de-DE" sz="1400" dirty="0"/>
+              <a:t>Grundlagen von </a:t>
+            </a:r>
+            <a:r>
+              <a:rPr lang="de-DE" altLang="de-DE" sz="1400" dirty="0" err="1"/>
+              <a:t>Git</a:t>
+            </a:r>
+            <a:endParaRPr lang="de-DE" altLang="de-DE" sz="1400" dirty="0"/>
+          </a:p>
+          <a:p>
+            <a:pPr lvl="1">
+              <a:buFont typeface="Arial" panose="020B0604020202020204" pitchFamily="34" charset="0"/>
+              <a:buChar char="•"/>
+            </a:pPr>
+            <a:r>
+              <a:rPr lang="de-DE" altLang="de-DE" sz="1400" dirty="0" err="1"/>
+              <a:t>Git</a:t>
+            </a:r>
+            <a:r>
+              <a:rPr lang="de-DE" altLang="de-DE" sz="1400" dirty="0"/>
+              <a:t> </a:t>
+            </a:r>
+            <a:r>
+              <a:rPr lang="de-DE" altLang="de-DE" sz="1400" dirty="0" err="1"/>
+              <a:t>Rebase</a:t>
+            </a:r>
+            <a:r>
+              <a:rPr lang="de-DE" altLang="de-DE" sz="1400" dirty="0"/>
+              <a:t> und </a:t>
+            </a:r>
+            <a:r>
+              <a:rPr lang="de-DE" altLang="de-DE" sz="1400" dirty="0" err="1"/>
+              <a:t>Merge</a:t>
+            </a:r>
+            <a:r>
+              <a:rPr lang="de-DE" altLang="de-DE" sz="1400" dirty="0"/>
+              <a:t>-Strategien</a:t>
+            </a:r>
+          </a:p>
+          <a:p>
+            <a:pPr lvl="1">
+              <a:buFont typeface="Arial" panose="020B0604020202020204" pitchFamily="34" charset="0"/>
+              <a:buChar char="•"/>
+            </a:pPr>
+            <a:r>
+              <a:rPr lang="de-DE" altLang="de-DE" sz="1400" dirty="0" err="1"/>
+              <a:t>Git</a:t>
+            </a:r>
+            <a:r>
+              <a:rPr lang="de-DE" altLang="de-DE" sz="1400" dirty="0"/>
+              <a:t> Remote</a:t>
+            </a:r>
+          </a:p>
+          <a:p>
+            <a:pPr lvl="1">
+              <a:buFont typeface="Arial" panose="020B0604020202020204" pitchFamily="34" charset="0"/>
+              <a:buChar char="•"/>
+            </a:pPr>
+            <a:r>
+              <a:rPr lang="de-DE" altLang="de-DE" sz="1400" dirty="0"/>
+              <a:t>Grundlagen von </a:t>
+            </a:r>
+            <a:r>
+              <a:rPr lang="de-DE" altLang="de-DE" sz="1400" dirty="0" err="1"/>
+              <a:t>GitLab</a:t>
+            </a:r>
+            <a:endParaRPr lang="de-DE" altLang="de-DE" sz="1400" dirty="0"/>
+          </a:p>
+          <a:p>
+            <a:pPr lvl="1">
+              <a:buFont typeface="Arial" panose="020B0604020202020204" pitchFamily="34" charset="0"/>
+              <a:buChar char="•"/>
+            </a:pPr>
+            <a:r>
+              <a:rPr lang="de-DE" altLang="de-DE" sz="1400" dirty="0" err="1"/>
+              <a:t>Git</a:t>
+            </a:r>
+            <a:r>
+              <a:rPr lang="de-DE" altLang="de-DE" sz="1400" dirty="0"/>
+              <a:t>-Workflow im Team</a:t>
+            </a:r>
+          </a:p>
+          <a:p>
+            <a:pPr>
+              <a:buFont typeface="Arial" panose="020B0604020202020204" pitchFamily="34" charset="0"/>
+              <a:buChar char="•"/>
+            </a:pPr>
+            <a:r>
+              <a:rPr lang="de-DE" altLang="de-DE" sz="1800" b="1" dirty="0"/>
+              <a:t>Tag 2 – Vertiefung </a:t>
+            </a:r>
+            <a:r>
+              <a:rPr lang="de-DE" altLang="de-DE" sz="1800" b="1" dirty="0" err="1"/>
+              <a:t>Git</a:t>
+            </a:r>
+            <a:r>
+              <a:rPr lang="de-DE" altLang="de-DE" sz="1800" b="1" dirty="0"/>
+              <a:t>-Workflow, CI/CD &amp; </a:t>
+            </a:r>
+            <a:r>
+              <a:rPr lang="de-DE" altLang="de-DE" sz="1800" b="1" dirty="0" err="1"/>
+              <a:t>GitLab</a:t>
+            </a:r>
+            <a:r>
+              <a:rPr lang="de-DE" altLang="de-DE" sz="1800" b="1" dirty="0"/>
+              <a:t> CI </a:t>
+            </a:r>
+          </a:p>
+          <a:p>
+            <a:pPr lvl="1">
+              <a:buFont typeface="Arial" panose="020B0604020202020204" pitchFamily="34" charset="0"/>
+              <a:buChar char="•"/>
+            </a:pPr>
+            <a:r>
+              <a:rPr lang="de-DE" altLang="de-DE" sz="1400" dirty="0" err="1"/>
+              <a:t>Gitflow</a:t>
+            </a:r>
+            <a:r>
+              <a:rPr lang="de-DE" altLang="de-DE" sz="1400" dirty="0"/>
+              <a:t>-Workflow</a:t>
+            </a:r>
+          </a:p>
+          <a:p>
+            <a:pPr lvl="1">
+              <a:buFont typeface="Arial" panose="020B0604020202020204" pitchFamily="34" charset="0"/>
+              <a:buChar char="•"/>
+            </a:pPr>
+            <a:r>
+              <a:rPr lang="de-DE" altLang="de-DE" sz="1400" u="sng" dirty="0"/>
+              <a:t>Tags, Releases &amp; deren Verwaltung</a:t>
+            </a:r>
+          </a:p>
+          <a:p>
+            <a:pPr lvl="1">
+              <a:buFont typeface="Arial" panose="020B0604020202020204" pitchFamily="34" charset="0"/>
+              <a:buChar char="•"/>
+            </a:pPr>
+            <a:r>
+              <a:rPr lang="de-DE" altLang="de-DE" sz="1400" dirty="0" err="1"/>
+              <a:t>GitLab</a:t>
+            </a:r>
+            <a:r>
+              <a:rPr lang="de-DE" altLang="de-DE" sz="1400" dirty="0"/>
+              <a:t>-Runner</a:t>
+            </a:r>
+          </a:p>
+          <a:p>
+            <a:pPr lvl="1">
+              <a:buFont typeface="Arial" panose="020B0604020202020204" pitchFamily="34" charset="0"/>
+              <a:buChar char="•"/>
+            </a:pPr>
+            <a:r>
+              <a:rPr lang="de-DE" altLang="de-DE" sz="1400" dirty="0"/>
+              <a:t>Einführung in </a:t>
+            </a:r>
+            <a:r>
+              <a:rPr lang="de-DE" altLang="de-DE" sz="1400" dirty="0" err="1"/>
+              <a:t>GitLab</a:t>
+            </a:r>
+            <a:r>
+              <a:rPr lang="de-DE" altLang="de-DE" sz="1400" dirty="0"/>
+              <a:t> CI/CD &amp; </a:t>
+            </a:r>
+            <a:r>
+              <a:rPr lang="de-DE" altLang="de-DE" sz="1400" dirty="0" err="1"/>
+              <a:t>gitlab.yml</a:t>
+            </a:r>
+            <a:endParaRPr lang="de-DE" altLang="de-DE" sz="1400" dirty="0"/>
+          </a:p>
+          <a:p>
+            <a:pPr>
+              <a:buFont typeface="Arial" panose="020B0604020202020204" pitchFamily="34" charset="0"/>
+              <a:buChar char="•"/>
+            </a:pPr>
+            <a:r>
+              <a:rPr lang="de-DE" altLang="de-DE" sz="1800" b="1" dirty="0"/>
+              <a:t>Tag 3 – </a:t>
+            </a:r>
+            <a:r>
+              <a:rPr lang="de-DE" altLang="de-DE" sz="1800" b="1" dirty="0" err="1"/>
+              <a:t>GitOps</a:t>
+            </a:r>
+            <a:r>
+              <a:rPr lang="de-DE" altLang="de-DE" sz="1800" b="1" dirty="0"/>
+              <a:t>, Docker in der Entwicklung und </a:t>
+            </a:r>
+            <a:r>
+              <a:rPr lang="de-DE" altLang="de-DE" sz="1800" b="1" dirty="0" err="1"/>
+              <a:t>Deployment</a:t>
+            </a:r>
+            <a:r>
+              <a:rPr lang="de-DE" altLang="de-DE" sz="1800" b="1" dirty="0"/>
+              <a:t>-Strategien</a:t>
+            </a:r>
+          </a:p>
+          <a:p>
+            <a:pPr lvl="1">
+              <a:buFont typeface="Arial" panose="020B0604020202020204" pitchFamily="34" charset="0"/>
+              <a:buChar char="•"/>
+            </a:pPr>
+            <a:r>
+              <a:rPr lang="de-DE" altLang="de-DE" sz="1400" dirty="0" err="1"/>
+              <a:t>GitOps</a:t>
+            </a:r>
+            <a:r>
+              <a:rPr lang="de-DE" altLang="de-DE" sz="1400" dirty="0"/>
+              <a:t> Grundlagen</a:t>
+            </a:r>
+          </a:p>
+          <a:p>
+            <a:pPr lvl="1">
+              <a:buFont typeface="Arial" panose="020B0604020202020204" pitchFamily="34" charset="0"/>
+              <a:buChar char="•"/>
+            </a:pPr>
+            <a:r>
+              <a:rPr lang="de-DE" altLang="de-DE" sz="1400" dirty="0"/>
+              <a:t>Lokale Entwicklung mit Docker</a:t>
+            </a:r>
+          </a:p>
+          <a:p>
+            <a:pPr lvl="1">
+              <a:buFont typeface="Arial" panose="020B0604020202020204" pitchFamily="34" charset="0"/>
+              <a:buChar char="•"/>
+            </a:pPr>
+            <a:r>
+              <a:rPr lang="de-DE" altLang="de-DE" sz="1400" dirty="0"/>
+              <a:t>Container/Docker-Registry</a:t>
+            </a:r>
+          </a:p>
+          <a:p>
+            <a:pPr lvl="1">
+              <a:buFont typeface="Arial" panose="020B0604020202020204" pitchFamily="34" charset="0"/>
+              <a:buChar char="•"/>
+            </a:pPr>
+            <a:r>
+              <a:rPr lang="de-DE" altLang="de-DE" sz="1400" dirty="0"/>
+              <a:t>Erstellen von Release- und </a:t>
+            </a:r>
+            <a:r>
+              <a:rPr lang="de-DE" altLang="de-DE" sz="1400" dirty="0" err="1"/>
+              <a:t>Tagged</a:t>
+            </a:r>
+            <a:r>
+              <a:rPr lang="de-DE" altLang="de-DE" sz="1400" dirty="0"/>
+              <a:t>-Images</a:t>
+            </a:r>
+          </a:p>
+          <a:p>
+            <a:pPr lvl="1">
+              <a:buFont typeface="Arial" panose="020B0604020202020204" pitchFamily="34" charset="0"/>
+              <a:buChar char="•"/>
+            </a:pPr>
+            <a:r>
+              <a:rPr lang="de-DE" altLang="de-DE" sz="1400" dirty="0"/>
+              <a:t>Möglichkeiten des </a:t>
+            </a:r>
+            <a:r>
+              <a:rPr lang="de-DE" altLang="de-DE" sz="1400" dirty="0" err="1"/>
+              <a:t>Deployments</a:t>
+            </a:r>
+            <a:r>
+              <a:rPr lang="de-DE" altLang="de-DE" sz="1400" dirty="0"/>
+              <a:t> &amp; Verwaltung von Konfiguration</a:t>
+            </a:r>
+          </a:p>
+          <a:p>
+            <a:pPr lvl="1">
+              <a:buFont typeface="Arial" panose="020B0604020202020204" pitchFamily="34" charset="0"/>
+              <a:buChar char="•"/>
+            </a:pPr>
+            <a:r>
+              <a:rPr lang="de-DE" altLang="de-DE" sz="1400" dirty="0"/>
+              <a:t>Abschlussübung &amp; Diskussion</a:t>
+            </a:r>
+          </a:p>
+          <a:p>
+            <a:pPr lvl="1">
+              <a:buFont typeface="Arial" panose="020B0604020202020204" pitchFamily="34" charset="0"/>
+              <a:buChar char="•"/>
+            </a:pPr>
+            <a:endParaRPr lang="de-DE" altLang="de-DE" sz="1400" dirty="0"/>
+          </a:p>
+        </p:txBody>
+      </p:sp>
+      <p:sp>
+        <p:nvSpPr>
+          <p:cNvPr id="6147" name="Rectangle 1062">
+            <a:extLst>
+              <a:ext uri="{FF2B5EF4-FFF2-40B4-BE49-F238E27FC236}">
+                <a16:creationId xmlns:a16="http://schemas.microsoft.com/office/drawing/2014/main" id="{C46E9340-3256-8D55-A265-94F2F41E288E}"/>
+              </a:ext>
+            </a:extLst>
+          </p:cNvPr>
+          <p:cNvSpPr>
+            <a:spLocks noGrp="1" noChangeArrowheads="1"/>
+          </p:cNvSpPr>
+          <p:nvPr>
+            <p:ph type="title"/>
+          </p:nvPr>
+        </p:nvSpPr>
+        <p:spPr>
+          <a:xfrm>
+            <a:off x="285750" y="142875"/>
+            <a:ext cx="5654675" cy="706438"/>
+          </a:xfrm>
+        </p:spPr>
+        <p:txBody>
+          <a:bodyPr/>
+          <a:lstStyle/>
+          <a:p>
+            <a:r>
+              <a:rPr lang="de-DE" altLang="de-DE" dirty="0"/>
+              <a:t>Agenda</a:t>
+            </a:r>
+          </a:p>
+        </p:txBody>
+      </p:sp>
+    </p:spTree>
+    <p:extLst>
+      <p:ext uri="{BB962C8B-B14F-4D97-AF65-F5344CB8AC3E}">
+        <p14:creationId xmlns:p14="http://schemas.microsoft.com/office/powerpoint/2010/main" val="1235500680"/>
+      </p:ext>
+    </p:extLst>
+  </p:cSld>
+  <p:clrMapOvr>
+    <a:masterClrMapping/>
+  </p:clrMapOvr>
+</p:sld>
+</file>
+
+<file path=ppt/slides/slide4.xml><?xml version="1.0" encoding="utf-8"?>
+<p:sld xmlns:a="http://schemas.openxmlformats.org/drawingml/2006/main" xmlns:r="http://schemas.openxmlformats.org/officeDocument/2006/relationships" xmlns:p="http://schemas.openxmlformats.org/presentationml/2006/main">
+  <p:cSld>
+    <p:spTree>
+      <p:nvGrpSpPr>
+        <p:cNvPr id="1" name=""/>
+        <p:cNvGrpSpPr/>
+        <p:nvPr/>
+      </p:nvGrpSpPr>
+      <p:grpSpPr>
+        <a:xfrm>
+          <a:off x="0" y="0"/>
+          <a:ext cx="0" cy="0"/>
+          <a:chOff x="0" y="0"/>
+          <a:chExt cx="0" cy="0"/>
+        </a:xfrm>
+      </p:grpSpPr>
+      <p:sp>
+        <p:nvSpPr>
+          <p:cNvPr id="2" name="Titel 1"/>
+          <p:cNvSpPr>
+            <a:spLocks noGrp="1"/>
+          </p:cNvSpPr>
+          <p:nvPr>
+            <p:ph type="title"/>
+          </p:nvPr>
+        </p:nvSpPr>
+        <p:spPr/>
+        <p:txBody>
+          <a:bodyPr/>
+          <a:lstStyle/>
+          <a:p>
+            <a:r>
+              <a:rPr lang="de-DE" cap="none" dirty="0"/>
+              <a:t>Tags</a:t>
+            </a:r>
+          </a:p>
+        </p:txBody>
+      </p:sp>
+      <p:sp>
+        <p:nvSpPr>
+          <p:cNvPr id="3" name="Untertitel 2"/>
+          <p:cNvSpPr>
+            <a:spLocks noGrp="1"/>
+          </p:cNvSpPr>
+          <p:nvPr>
+            <p:ph type="body" idx="1"/>
+          </p:nvPr>
+        </p:nvSpPr>
+        <p:spPr/>
+        <p:txBody>
+          <a:bodyPr/>
+          <a:lstStyle/>
+          <a:p>
+            <a:r>
+              <a:rPr lang="de-DE" dirty="0" err="1"/>
+              <a:t>Git</a:t>
+            </a:r>
+            <a:endParaRPr lang="de-DE" dirty="0"/>
+          </a:p>
+        </p:txBody>
+      </p:sp>
+    </p:spTree>
+    <p:extLst>
+      <p:ext uri="{BB962C8B-B14F-4D97-AF65-F5344CB8AC3E}">
+        <p14:creationId xmlns:p14="http://schemas.microsoft.com/office/powerpoint/2010/main" val="3092047359"/>
+      </p:ext>
+    </p:extLst>
+  </p:cSld>
+  <p:clrMapOvr>
+    <a:masterClrMapping/>
+  </p:clrMapOvr>
+</p:sld>
+</file>
+
+<file path=ppt/slides/slide5.xml><?xml version="1.0" encoding="utf-8"?>
 <p:sld xmlns:a="http://schemas.openxmlformats.org/drawingml/2006/main" xmlns:r="http://schemas.openxmlformats.org/officeDocument/2006/relationships" xmlns:p="http://schemas.openxmlformats.org/presentationml/2006/main">
   <p:cSld>
     <p:spTree>
@@ -7926,8 +8888,8 @@
           <a:lstStyle/>
           <a:p>
             <a:r>
-              <a:rPr lang="de-DE" altLang="de-DE"/>
-              <a:t>Inhalt</a:t>
+              <a:rPr lang="de-DE" altLang="de-DE" dirty="0"/>
+              <a:t>Tags &amp; Releases</a:t>
             </a:r>
           </a:p>
         </p:txBody>
@@ -7958,6 +8920,18 @@
           <a:bodyPr/>
           <a:lstStyle/>
           <a:p>
+            <a:pPr marL="0" indent="0">
+              <a:spcBef>
+                <a:spcPts val="300"/>
+              </a:spcBef>
+              <a:buNone/>
+            </a:pPr>
+            <a:r>
+              <a:rPr lang="de-DE" altLang="de-DE" b="1" dirty="0"/>
+              <a:t>Inhalt</a:t>
+            </a:r>
+          </a:p>
+          <a:p>
             <a:pPr>
               <a:spcBef>
                 <a:spcPts val="300"/>
@@ -8070,212 +9044,6 @@
         </p:txBody>
       </p:sp>
     </p:spTree>
-  </p:cSld>
-  <p:clrMapOvr>
-    <a:masterClrMapping/>
-  </p:clrMapOvr>
-</p:sld>
-</file>
-
-<file path=ppt/slides/slide4.xml><?xml version="1.0" encoding="utf-8"?>
-<p:sld xmlns:a="http://schemas.openxmlformats.org/drawingml/2006/main" xmlns:r="http://schemas.openxmlformats.org/officeDocument/2006/relationships" xmlns:p="http://schemas.openxmlformats.org/presentationml/2006/main">
-  <p:cSld>
-    <p:spTree>
-      <p:nvGrpSpPr>
-        <p:cNvPr id="1" name=""/>
-        <p:cNvGrpSpPr/>
-        <p:nvPr/>
-      </p:nvGrpSpPr>
-      <p:grpSpPr>
-        <a:xfrm>
-          <a:off x="0" y="0"/>
-          <a:ext cx="0" cy="0"/>
-          <a:chOff x="0" y="0"/>
-          <a:chExt cx="0" cy="0"/>
-        </a:xfrm>
-      </p:grpSpPr>
-      <p:sp>
-        <p:nvSpPr>
-          <p:cNvPr id="2" name="Titel 1"/>
-          <p:cNvSpPr>
-            <a:spLocks noGrp="1"/>
-          </p:cNvSpPr>
-          <p:nvPr>
-            <p:ph type="title"/>
-          </p:nvPr>
-        </p:nvSpPr>
-        <p:spPr/>
-        <p:txBody>
-          <a:bodyPr/>
-          <a:lstStyle/>
-          <a:p>
-            <a:r>
-              <a:rPr lang="de-DE" cap="none" dirty="0"/>
-              <a:t>Tags</a:t>
-            </a:r>
-          </a:p>
-        </p:txBody>
-      </p:sp>
-      <p:sp>
-        <p:nvSpPr>
-          <p:cNvPr id="3" name="Untertitel 2"/>
-          <p:cNvSpPr>
-            <a:spLocks noGrp="1"/>
-          </p:cNvSpPr>
-          <p:nvPr>
-            <p:ph type="body" idx="1"/>
-          </p:nvPr>
-        </p:nvSpPr>
-        <p:spPr/>
-        <p:txBody>
-          <a:bodyPr/>
-          <a:lstStyle/>
-          <a:p>
-            <a:r>
-              <a:rPr lang="de-DE" dirty="0" err="1"/>
-              <a:t>Git</a:t>
-            </a:r>
-            <a:endParaRPr lang="de-DE" dirty="0"/>
-          </a:p>
-        </p:txBody>
-      </p:sp>
-    </p:spTree>
-    <p:extLst>
-      <p:ext uri="{BB962C8B-B14F-4D97-AF65-F5344CB8AC3E}">
-        <p14:creationId xmlns:p14="http://schemas.microsoft.com/office/powerpoint/2010/main" val="3092047359"/>
-      </p:ext>
-    </p:extLst>
-  </p:cSld>
-  <p:clrMapOvr>
-    <a:masterClrMapping/>
-  </p:clrMapOvr>
-</p:sld>
-</file>
-
-<file path=ppt/slides/slide5.xml><?xml version="1.0" encoding="utf-8"?>
-<p:sld xmlns:a="http://schemas.openxmlformats.org/drawingml/2006/main" xmlns:r="http://schemas.openxmlformats.org/officeDocument/2006/relationships" xmlns:p="http://schemas.openxmlformats.org/presentationml/2006/main">
-  <p:cSld>
-    <p:spTree>
-      <p:nvGrpSpPr>
-        <p:cNvPr id="1" name=""/>
-        <p:cNvGrpSpPr/>
-        <p:nvPr/>
-      </p:nvGrpSpPr>
-      <p:grpSpPr>
-        <a:xfrm>
-          <a:off x="0" y="0"/>
-          <a:ext cx="0" cy="0"/>
-          <a:chOff x="0" y="0"/>
-          <a:chExt cx="0" cy="0"/>
-        </a:xfrm>
-      </p:grpSpPr>
-      <p:sp>
-        <p:nvSpPr>
-          <p:cNvPr id="6146" name="Inhaltsplatzhalter 18">
-            <a:extLst>
-              <a:ext uri="{FF2B5EF4-FFF2-40B4-BE49-F238E27FC236}">
-                <a16:creationId xmlns:a16="http://schemas.microsoft.com/office/drawing/2014/main" id="{BE3C4C95-FD5D-27F0-ED0C-AB8113CAC9F1}"/>
-              </a:ext>
-            </a:extLst>
-          </p:cNvPr>
-          <p:cNvSpPr>
-            <a:spLocks noGrp="1"/>
-          </p:cNvSpPr>
-          <p:nvPr>
-            <p:ph idx="1"/>
-          </p:nvPr>
-        </p:nvSpPr>
-        <p:spPr>
-          <a:xfrm>
-            <a:off x="303214" y="981075"/>
-            <a:ext cx="8517258" cy="5400675"/>
-          </a:xfrm>
-        </p:spPr>
-        <p:txBody>
-          <a:bodyPr/>
-          <a:lstStyle/>
-          <a:p>
-            <a:r>
-              <a:rPr lang="de-DE" altLang="de-DE" dirty="0"/>
-              <a:t>Tagging ist wichtiges Konzept der </a:t>
-            </a:r>
-            <a:r>
-              <a:rPr lang="de-DE" altLang="de-DE" dirty="0" err="1"/>
-              <a:t>Versionverwaltung</a:t>
-            </a:r>
-            <a:endParaRPr lang="de-DE" altLang="de-DE" dirty="0"/>
-          </a:p>
-          <a:p>
-            <a:r>
-              <a:rPr lang="de-DE" altLang="de-DE" dirty="0"/>
-              <a:t>Wird verwendet, um spezifischen Entwicklungsstand zu markieren und mit Label zu versehen</a:t>
-            </a:r>
-          </a:p>
-          <a:p>
-            <a:r>
-              <a:rPr lang="de-DE" altLang="de-DE" dirty="0"/>
-              <a:t>Entwicklungsstand wird als „</a:t>
-            </a:r>
-            <a:r>
-              <a:rPr lang="de-DE" altLang="de-DE" dirty="0" err="1"/>
-              <a:t>snapshot</a:t>
-            </a:r>
-            <a:r>
-              <a:rPr lang="de-DE" altLang="de-DE" dirty="0"/>
-              <a:t>“ bezeichnet</a:t>
-            </a:r>
-          </a:p>
-          <a:p>
-            <a:r>
-              <a:rPr lang="de-DE" altLang="de-DE" dirty="0"/>
-              <a:t>Einsatz häufig, um Releases in Projekt zu markieren </a:t>
-            </a:r>
-          </a:p>
-        </p:txBody>
-      </p:sp>
-      <p:sp>
-        <p:nvSpPr>
-          <p:cNvPr id="6147" name="Rectangle 1062">
-            <a:extLst>
-              <a:ext uri="{FF2B5EF4-FFF2-40B4-BE49-F238E27FC236}">
-                <a16:creationId xmlns:a16="http://schemas.microsoft.com/office/drawing/2014/main" id="{C46E9340-3256-8D55-A265-94F2F41E288E}"/>
-              </a:ext>
-            </a:extLst>
-          </p:cNvPr>
-          <p:cNvSpPr>
-            <a:spLocks noGrp="1" noChangeArrowheads="1"/>
-          </p:cNvSpPr>
-          <p:nvPr>
-            <p:ph type="title"/>
-          </p:nvPr>
-        </p:nvSpPr>
-        <p:spPr>
-          <a:xfrm>
-            <a:off x="285750" y="142875"/>
-            <a:ext cx="5654675" cy="706438"/>
-          </a:xfrm>
-        </p:spPr>
-        <p:txBody>
-          <a:bodyPr/>
-          <a:lstStyle/>
-          <a:p>
-            <a:r>
-              <a:rPr lang="de-DE" altLang="de-DE" dirty="0" err="1"/>
-              <a:t>Git</a:t>
-            </a:r>
-            <a:r>
-              <a:rPr lang="de-DE" altLang="de-DE" dirty="0"/>
-              <a:t> – Tags </a:t>
-            </a:r>
-          </a:p>
-        </p:txBody>
-      </p:sp>
-    </p:spTree>
-    <p:extLst>
-      <p:ext uri="{BB962C8B-B14F-4D97-AF65-F5344CB8AC3E}">
-        <p14:creationId xmlns:p14="http://schemas.microsoft.com/office/powerpoint/2010/main" val="3020803649"/>
-      </p:ext>
-    </p:extLst>
   </p:cSld>
   <p:clrMapOvr>
     <a:masterClrMapping/>
@@ -8327,274 +9095,39 @@
           <a:lstStyle/>
           <a:p>
             <a:r>
-              <a:rPr lang="de-DE" altLang="de-DE" dirty="0" err="1">
-                <a:latin typeface="Consolas" panose="020B0609020204030204" pitchFamily="49" charset="0"/>
-              </a:rPr>
-              <a:t>git</a:t>
-            </a:r>
-            <a:r>
-              <a:rPr lang="de-DE" altLang="de-DE" dirty="0">
-                <a:latin typeface="Consolas" panose="020B0609020204030204" pitchFamily="49" charset="0"/>
-              </a:rPr>
-              <a:t> tag &lt;tag-name&gt; </a:t>
-            </a:r>
-            <a:r>
               <a:rPr lang="de-DE" altLang="de-DE" dirty="0"/>
-              <a:t>um zum letzten </a:t>
+              <a:t>Tagging ist wichtiges Konzept der </a:t>
             </a:r>
             <a:r>
               <a:rPr lang="de-DE" altLang="de-DE" dirty="0" err="1"/>
-              <a:t>Commits</a:t>
-            </a:r>
+              <a:t>Versionverwaltung</a:t>
+            </a:r>
+            <a:endParaRPr lang="de-DE" altLang="de-DE" dirty="0"/>
+          </a:p>
+          <a:p>
             <a:r>
               <a:rPr lang="de-DE" altLang="de-DE" dirty="0"/>
-              <a:t> des aktiven </a:t>
+              <a:t>Wird verwendet, um spezifischen Entwicklungsstand zu markieren und mit Label zu versehen</a:t>
+            </a:r>
+          </a:p>
+          <a:p>
+            <a:r>
+              <a:rPr lang="de-DE" altLang="de-DE" dirty="0"/>
+              <a:t>Entwicklungsstand wird als „</a:t>
             </a:r>
             <a:r>
               <a:rPr lang="de-DE" altLang="de-DE" dirty="0" err="1"/>
-              <a:t>Branches</a:t>
+              <a:t>snapshot</a:t>
             </a:r>
             <a:r>
               <a:rPr lang="de-DE" altLang="de-DE" dirty="0"/>
-              <a:t> ein Tag hinzuzufügen</a:t>
-            </a:r>
-          </a:p>
-          <a:p>
-            <a:pPr marL="457200" lvl="1" indent="0">
-              <a:spcBef>
-                <a:spcPts val="0"/>
-              </a:spcBef>
-              <a:buNone/>
-            </a:pPr>
-            <a:endParaRPr lang="en-US" altLang="de-DE" sz="1200" dirty="0">
-              <a:latin typeface="Consolas" panose="020B0609020204030204" pitchFamily="49" charset="0"/>
-            </a:endParaRPr>
-          </a:p>
-          <a:p>
-            <a:pPr marL="457200" lvl="1" indent="0">
-              <a:spcBef>
-                <a:spcPts val="0"/>
-              </a:spcBef>
-              <a:buNone/>
-            </a:pPr>
-            <a:r>
-              <a:rPr lang="en-US" altLang="de-DE" sz="1200" dirty="0">
-                <a:latin typeface="Consolas" panose="020B0609020204030204" pitchFamily="49" charset="0"/>
-              </a:rPr>
-              <a:t>$ git log --</a:t>
-            </a:r>
-            <a:r>
-              <a:rPr lang="en-US" altLang="de-DE" sz="1200" dirty="0" err="1">
-                <a:latin typeface="Consolas" panose="020B0609020204030204" pitchFamily="49" charset="0"/>
-              </a:rPr>
-              <a:t>oneline</a:t>
-            </a:r>
-            <a:endParaRPr lang="en-US" altLang="de-DE" sz="1200" dirty="0">
-              <a:latin typeface="Consolas" panose="020B0609020204030204" pitchFamily="49" charset="0"/>
-            </a:endParaRPr>
-          </a:p>
-          <a:p>
-            <a:pPr marL="457200" lvl="1" indent="0">
-              <a:spcBef>
-                <a:spcPts val="0"/>
-              </a:spcBef>
-              <a:buNone/>
-            </a:pPr>
-            <a:r>
-              <a:rPr lang="en-US" altLang="de-DE" sz="1200" dirty="0">
-                <a:latin typeface="Consolas" panose="020B0609020204030204" pitchFamily="49" charset="0"/>
-              </a:rPr>
-              <a:t>c3a059e (HEAD -&gt; main) Add </a:t>
-            </a:r>
-            <a:r>
-              <a:rPr lang="en-US" altLang="de-DE" sz="1200" dirty="0" err="1">
-                <a:latin typeface="Consolas" panose="020B0609020204030204" pitchFamily="49" charset="0"/>
-              </a:rPr>
-              <a:t>final_file</a:t>
-            </a:r>
-            <a:endParaRPr lang="en-US" altLang="de-DE" sz="1200" dirty="0">
-              <a:latin typeface="Consolas" panose="020B0609020204030204" pitchFamily="49" charset="0"/>
-            </a:endParaRPr>
-          </a:p>
-          <a:p>
-            <a:pPr marL="457200" lvl="1" indent="0">
-              <a:spcBef>
-                <a:spcPts val="0"/>
-              </a:spcBef>
-              <a:buNone/>
-            </a:pPr>
-            <a:r>
-              <a:rPr lang="en-US" altLang="de-DE" sz="1200" dirty="0">
-                <a:latin typeface="Consolas" panose="020B0609020204030204" pitchFamily="49" charset="0"/>
-              </a:rPr>
-              <a:t>a908be7 Add file3</a:t>
-            </a:r>
-          </a:p>
-          <a:p>
-            <a:pPr marL="457200" lvl="1" indent="0">
-              <a:spcBef>
-                <a:spcPts val="0"/>
-              </a:spcBef>
-              <a:buNone/>
-            </a:pPr>
-            <a:r>
-              <a:rPr lang="en-US" altLang="de-DE" sz="1200" dirty="0">
-                <a:latin typeface="Consolas" panose="020B0609020204030204" pitchFamily="49" charset="0"/>
-              </a:rPr>
-              <a:t>722eaf0 Add file from main</a:t>
-            </a:r>
-          </a:p>
-          <a:p>
-            <a:pPr marL="457200" lvl="1" indent="0">
-              <a:spcBef>
-                <a:spcPts val="0"/>
-              </a:spcBef>
-              <a:buNone/>
-            </a:pPr>
-            <a:r>
-              <a:rPr lang="en-US" altLang="de-DE" sz="1200" dirty="0">
-                <a:latin typeface="Consolas" panose="020B0609020204030204" pitchFamily="49" charset="0"/>
-              </a:rPr>
-              <a:t>c61ef14 Initial commit</a:t>
-            </a:r>
-          </a:p>
-          <a:p>
-            <a:pPr marL="457200" lvl="1" indent="0">
-              <a:spcBef>
-                <a:spcPts val="0"/>
-              </a:spcBef>
-              <a:buNone/>
-            </a:pPr>
-            <a:endParaRPr lang="en-US" altLang="de-DE" sz="1200" dirty="0">
-              <a:latin typeface="Consolas" panose="020B0609020204030204" pitchFamily="49" charset="0"/>
-            </a:endParaRPr>
-          </a:p>
-          <a:p>
-            <a:pPr marL="457200" lvl="1" indent="0">
-              <a:spcBef>
-                <a:spcPts val="0"/>
-              </a:spcBef>
-              <a:buNone/>
-            </a:pPr>
-            <a:r>
-              <a:rPr lang="en-US" altLang="de-DE" sz="1200" dirty="0">
-                <a:latin typeface="Consolas" panose="020B0609020204030204" pitchFamily="49" charset="0"/>
-              </a:rPr>
-              <a:t>$ git tag "release-v0.0.1"</a:t>
-            </a:r>
-          </a:p>
-          <a:p>
-            <a:pPr marL="457200" lvl="1" indent="0">
-              <a:spcBef>
-                <a:spcPts val="0"/>
-              </a:spcBef>
-              <a:buNone/>
-            </a:pPr>
-            <a:endParaRPr lang="en-US" altLang="de-DE" sz="1200" dirty="0">
-              <a:latin typeface="Consolas" panose="020B0609020204030204" pitchFamily="49" charset="0"/>
-            </a:endParaRPr>
-          </a:p>
-          <a:p>
-            <a:pPr marL="457200" lvl="1" indent="0">
-              <a:spcBef>
-                <a:spcPts val="0"/>
-              </a:spcBef>
-              <a:buNone/>
-            </a:pPr>
-            <a:r>
-              <a:rPr lang="en-US" altLang="de-DE" sz="1200" dirty="0">
-                <a:latin typeface="Consolas" panose="020B0609020204030204" pitchFamily="49" charset="0"/>
-              </a:rPr>
-              <a:t>$ git log --</a:t>
-            </a:r>
-            <a:r>
-              <a:rPr lang="en-US" altLang="de-DE" sz="1200" dirty="0" err="1">
-                <a:latin typeface="Consolas" panose="020B0609020204030204" pitchFamily="49" charset="0"/>
-              </a:rPr>
-              <a:t>oneline</a:t>
-            </a:r>
-            <a:endParaRPr lang="en-US" altLang="de-DE" sz="1200" dirty="0">
-              <a:latin typeface="Consolas" panose="020B0609020204030204" pitchFamily="49" charset="0"/>
-            </a:endParaRPr>
-          </a:p>
-          <a:p>
-            <a:pPr marL="457200" lvl="1" indent="0">
-              <a:spcBef>
-                <a:spcPts val="0"/>
-              </a:spcBef>
-              <a:buNone/>
-            </a:pPr>
-            <a:r>
-              <a:rPr lang="en-US" altLang="de-DE" sz="1200" dirty="0">
-                <a:latin typeface="Consolas" panose="020B0609020204030204" pitchFamily="49" charset="0"/>
-              </a:rPr>
-              <a:t>c3a059e (HEAD -&gt; main, tag: release-v0.0.1) Add </a:t>
-            </a:r>
-            <a:r>
-              <a:rPr lang="en-US" altLang="de-DE" sz="1200" dirty="0" err="1">
-                <a:latin typeface="Consolas" panose="020B0609020204030204" pitchFamily="49" charset="0"/>
-              </a:rPr>
-              <a:t>final_file</a:t>
-            </a:r>
-            <a:endParaRPr lang="en-US" altLang="de-DE" sz="1200" dirty="0">
-              <a:latin typeface="Consolas" panose="020B0609020204030204" pitchFamily="49" charset="0"/>
-            </a:endParaRPr>
-          </a:p>
-          <a:p>
-            <a:pPr marL="457200" lvl="1" indent="0">
-              <a:spcBef>
-                <a:spcPts val="0"/>
-              </a:spcBef>
-              <a:buNone/>
-            </a:pPr>
-            <a:r>
-              <a:rPr lang="en-US" altLang="de-DE" sz="1200" dirty="0">
-                <a:latin typeface="Consolas" panose="020B0609020204030204" pitchFamily="49" charset="0"/>
-              </a:rPr>
-              <a:t>a908be7 Add file3</a:t>
-            </a:r>
-          </a:p>
-          <a:p>
-            <a:pPr marL="457200" lvl="1" indent="0">
-              <a:spcBef>
-                <a:spcPts val="0"/>
-              </a:spcBef>
-              <a:buNone/>
-            </a:pPr>
-            <a:r>
-              <a:rPr lang="en-US" altLang="de-DE" sz="1200" dirty="0">
-                <a:latin typeface="Consolas" panose="020B0609020204030204" pitchFamily="49" charset="0"/>
-              </a:rPr>
-              <a:t>722eaf0 Add file from main</a:t>
-            </a:r>
-          </a:p>
-          <a:p>
-            <a:pPr marL="457200" lvl="1" indent="0">
-              <a:spcBef>
-                <a:spcPts val="0"/>
-              </a:spcBef>
-              <a:buNone/>
-            </a:pPr>
-            <a:r>
-              <a:rPr lang="en-US" altLang="de-DE" sz="1200" dirty="0">
-                <a:latin typeface="Consolas" panose="020B0609020204030204" pitchFamily="49" charset="0"/>
-              </a:rPr>
-              <a:t>c61ef14 Initial commit</a:t>
-            </a:r>
-            <a:endParaRPr lang="de-DE" altLang="de-DE" sz="1200" dirty="0">
-              <a:latin typeface="Consolas" panose="020B0609020204030204" pitchFamily="49" charset="0"/>
-            </a:endParaRPr>
+              <a:t>“ bezeichnet</a:t>
+            </a:r>
           </a:p>
           <a:p>
             <a:r>
               <a:rPr lang="de-DE" altLang="de-DE" dirty="0"/>
-              <a:t>Fügt leichtgewichtigen Tag hinzu</a:t>
-            </a:r>
-          </a:p>
-          <a:p>
-            <a:r>
-              <a:rPr lang="de-DE" altLang="de-DE" dirty="0"/>
-              <a:t>Tag wird an allen Files im Repository gesetzt</a:t>
+              <a:t>Einsatz häufig, um Releases in Projekt zu markieren </a:t>
             </a:r>
           </a:p>
         </p:txBody>
@@ -8639,7 +9172,7 @@
     </p:spTree>
     <p:extLst>
       <p:ext uri="{BB962C8B-B14F-4D97-AF65-F5344CB8AC3E}">
-        <p14:creationId xmlns:p14="http://schemas.microsoft.com/office/powerpoint/2010/main" val="95346933"/>
+        <p14:creationId xmlns:p14="http://schemas.microsoft.com/office/powerpoint/2010/main" val="3020803649"/>
       </p:ext>
     </p:extLst>
   </p:cSld>
@@ -8702,11 +9235,27 @@
               <a:rPr lang="de-DE" altLang="de-DE" dirty="0">
                 <a:latin typeface="Consolas" panose="020B0609020204030204" pitchFamily="49" charset="0"/>
               </a:rPr>
-              <a:t> tag </a:t>
+              <a:t> tag &lt;tag-name&gt; </a:t>
             </a:r>
             <a:r>
               <a:rPr lang="de-DE" altLang="de-DE" dirty="0"/>
-              <a:t>zeigt alle Tags im aktuellen Projekt</a:t>
+              <a:t>um zum letzten </a:t>
+            </a:r>
+            <a:r>
+              <a:rPr lang="de-DE" altLang="de-DE" dirty="0" err="1"/>
+              <a:t>Commits</a:t>
+            </a:r>
+            <a:r>
+              <a:rPr lang="de-DE" altLang="de-DE" dirty="0"/>
+              <a:t> des aktiven </a:t>
+            </a:r>
+            <a:r>
+              <a:rPr lang="de-DE" altLang="de-DE" dirty="0" err="1"/>
+              <a:t>Branches</a:t>
+            </a:r>
+            <a:r>
+              <a:rPr lang="de-DE" altLang="de-DE" dirty="0"/>
+              <a:t> ein Tag hinzuzufügen</a:t>
             </a:r>
           </a:p>
           <a:p>
@@ -8731,8 +9280,17 @@
               <a:rPr lang="en-US" altLang="de-DE" sz="1200" dirty="0">
                 <a:latin typeface="Consolas" panose="020B0609020204030204" pitchFamily="49" charset="0"/>
               </a:rPr>
-              <a:t>$ git tag</a:t>
-            </a:r>
+              <a:t>$ git log --</a:t>
+            </a:r>
+            <a:r>
+              <a:rPr lang="en-US" altLang="de-DE" sz="1200" dirty="0" err="1">
+                <a:latin typeface="Consolas" panose="020B0609020204030204" pitchFamily="49" charset="0"/>
+              </a:rPr>
+              <a:t>oneline</a:t>
+            </a:r>
+            <a:endParaRPr lang="en-US" altLang="de-DE" sz="1200" dirty="0">
+              <a:latin typeface="Consolas" panose="020B0609020204030204" pitchFamily="49" charset="0"/>
+            </a:endParaRPr>
           </a:p>
           <a:p>
             <a:pPr marL="457200" lvl="1" indent="0">
@@ -8745,8 +9303,17 @@
               <a:rPr lang="en-US" altLang="de-DE" sz="1200" dirty="0">
                 <a:latin typeface="Consolas" panose="020B0609020204030204" pitchFamily="49" charset="0"/>
               </a:rPr>
-              <a:t>release-v0.0.1</a:t>
-            </a:r>
+              <a:t>c3a059e (HEAD -&gt; main) Add </a:t>
+            </a:r>
+            <a:r>
+              <a:rPr lang="en-US" altLang="de-DE" sz="1200" dirty="0" err="1">
+                <a:latin typeface="Consolas" panose="020B0609020204030204" pitchFamily="49" charset="0"/>
+              </a:rPr>
+              <a:t>final_file</a:t>
+            </a:r>
+            <a:endParaRPr lang="en-US" altLang="de-DE" sz="1200" dirty="0">
+              <a:latin typeface="Consolas" panose="020B0609020204030204" pitchFamily="49" charset="0"/>
+            </a:endParaRPr>
           </a:p>
           <a:p>
             <a:pPr marL="457200" lvl="1" indent="0">
@@ -8759,7 +9326,7 @@
               <a:rPr lang="en-US" altLang="de-DE" sz="1200" dirty="0">
                 <a:latin typeface="Consolas" panose="020B0609020204030204" pitchFamily="49" charset="0"/>
               </a:rPr>
-              <a:t>release-v0.0.2</a:t>
+              <a:t>a908be7 Add file3</a:t>
             </a:r>
           </a:p>
           <a:p>
@@ -8773,40 +9340,7 @@
               <a:rPr lang="en-US" altLang="de-DE" sz="1200" dirty="0">
                 <a:latin typeface="Consolas" panose="020B0609020204030204" pitchFamily="49" charset="0"/>
               </a:rPr>
-              <a:t>release-v1.0.0</a:t>
-            </a:r>
-            <a:endParaRPr lang="de-DE" altLang="de-DE" dirty="0">
-              <a:latin typeface="Consolas" panose="020B0609020204030204" pitchFamily="49" charset="0"/>
-            </a:endParaRPr>
-          </a:p>
-          <a:p>
-            <a:r>
-              <a:rPr lang="de-DE" altLang="de-DE" dirty="0" err="1">
-                <a:latin typeface="Consolas" panose="020B0609020204030204" pitchFamily="49" charset="0"/>
-              </a:rPr>
-              <a:t>git</a:t>
-            </a:r>
-            <a:r>
-              <a:rPr lang="de-DE" altLang="de-DE" dirty="0">
-                <a:latin typeface="Consolas" panose="020B0609020204030204" pitchFamily="49" charset="0"/>
-              </a:rPr>
-              <a:t> </a:t>
-            </a:r>
-            <a:r>
-              <a:rPr lang="de-DE" altLang="de-DE" dirty="0" err="1">
-                <a:latin typeface="Consolas" panose="020B0609020204030204" pitchFamily="49" charset="0"/>
-              </a:rPr>
-              <a:t>show</a:t>
-            </a:r>
-            <a:r>
-              <a:rPr lang="de-DE" altLang="de-DE" dirty="0">
-                <a:latin typeface="Consolas" panose="020B0609020204030204" pitchFamily="49" charset="0"/>
-              </a:rPr>
-              <a:t> &lt;tag-name&gt; </a:t>
-            </a:r>
-            <a:r>
-              <a:rPr lang="de-DE" altLang="de-DE" dirty="0"/>
-              <a:t>zeigt den Commit zum angegebenen Tag</a:t>
+              <a:t>722eaf0 Add file from main</a:t>
             </a:r>
           </a:p>
           <a:p>
@@ -8816,9 +9350,12 @@
               </a:spcBef>
               <a:buNone/>
             </a:pPr>
-            <a:endParaRPr lang="de-DE" altLang="de-DE" sz="1200" dirty="0">
-              <a:latin typeface="Consolas" panose="020B0609020204030204" pitchFamily="49" charset="0"/>
-            </a:endParaRPr>
+            <a:r>
+              <a:rPr lang="en-US" altLang="de-DE" sz="1200" dirty="0">
+                <a:latin typeface="Consolas" panose="020B0609020204030204" pitchFamily="49" charset="0"/>
+              </a:rPr>
+              <a:t>c61ef14 Initial commit</a:t>
+            </a:r>
           </a:p>
           <a:p>
             <a:pPr marL="457200" lvl="1" indent="0">
@@ -8827,36 +9364,9 @@
               </a:spcBef>
               <a:buNone/>
             </a:pPr>
-            <a:r>
-              <a:rPr lang="de-DE" altLang="de-DE" sz="1200" dirty="0">
-                <a:latin typeface="Consolas" panose="020B0609020204030204" pitchFamily="49" charset="0"/>
-              </a:rPr>
-              <a:t>$ </a:t>
-            </a:r>
-            <a:r>
-              <a:rPr lang="de-DE" altLang="de-DE" sz="1200" dirty="0" err="1">
-                <a:latin typeface="Consolas" panose="020B0609020204030204" pitchFamily="49" charset="0"/>
-              </a:rPr>
-              <a:t>git</a:t>
-            </a:r>
-            <a:r>
-              <a:rPr lang="de-DE" altLang="de-DE" sz="1200" dirty="0">
-                <a:latin typeface="Consolas" panose="020B0609020204030204" pitchFamily="49" charset="0"/>
-              </a:rPr>
-              <a:t> </a:t>
-            </a:r>
-            <a:r>
-              <a:rPr lang="de-DE" altLang="de-DE" sz="1200" dirty="0" err="1">
-                <a:latin typeface="Consolas" panose="020B0609020204030204" pitchFamily="49" charset="0"/>
-              </a:rPr>
-              <a:t>show</a:t>
-            </a:r>
-            <a:r>
-              <a:rPr lang="de-DE" altLang="de-DE" sz="1200" dirty="0">
-                <a:latin typeface="Consolas" panose="020B0609020204030204" pitchFamily="49" charset="0"/>
-              </a:rPr>
-              <a:t> release-v0.0.1</a:t>
-            </a:r>
+            <a:endParaRPr lang="en-US" altLang="de-DE" sz="1200" dirty="0">
+              <a:latin typeface="Consolas" panose="020B0609020204030204" pitchFamily="49" charset="0"/>
+            </a:endParaRPr>
           </a:p>
           <a:p>
             <a:pPr marL="457200" lvl="1" indent="0">
@@ -8866,16 +9376,10 @@
               <a:buNone/>
             </a:pPr>
             <a:r>
-              <a:rPr lang="de-DE" altLang="de-DE" sz="1200" dirty="0" err="1">
-                <a:latin typeface="Consolas" panose="020B0609020204030204" pitchFamily="49" charset="0"/>
-              </a:rPr>
-              <a:t>commit</a:t>
-            </a:r>
-            <a:r>
-              <a:rPr lang="de-DE" altLang="de-DE" sz="1200" dirty="0">
-                <a:latin typeface="Consolas" panose="020B0609020204030204" pitchFamily="49" charset="0"/>
-              </a:rPr>
-              <a:t> c3a059e2d6e4acfdca1295104b4d6a55f8bd00e4 (tag: release-v0.0.1)</a:t>
+              <a:rPr lang="en-US" altLang="de-DE" sz="1200" dirty="0">
+                <a:latin typeface="Consolas" panose="020B0609020204030204" pitchFamily="49" charset="0"/>
+              </a:rPr>
+              <a:t>$ git tag "release-v0.0.1"</a:t>
             </a:r>
           </a:p>
           <a:p>
@@ -8885,30 +9389,9 @@
               </a:spcBef>
               <a:buNone/>
             </a:pPr>
-            <a:r>
-              <a:rPr lang="de-DE" altLang="de-DE" sz="1200" dirty="0" err="1">
-                <a:latin typeface="Consolas" panose="020B0609020204030204" pitchFamily="49" charset="0"/>
-              </a:rPr>
-              <a:t>Author</a:t>
-            </a:r>
-            <a:r>
-              <a:rPr lang="de-DE" altLang="de-DE" sz="1200" dirty="0">
-                <a:latin typeface="Consolas" panose="020B0609020204030204" pitchFamily="49" charset="0"/>
-              </a:rPr>
-              <a:t>: </a:t>
-            </a:r>
-            <a:r>
-              <a:rPr lang="de-DE" altLang="de-DE" sz="1200" dirty="0" err="1">
-                <a:latin typeface="Consolas" panose="020B0609020204030204" pitchFamily="49" charset="0"/>
-              </a:rPr>
-              <a:t>Example</a:t>
-            </a:r>
-            <a:r>
-              <a:rPr lang="de-DE" altLang="de-DE" sz="1200" dirty="0">
-                <a:latin typeface="Consolas" panose="020B0609020204030204" pitchFamily="49" charset="0"/>
-              </a:rPr>
-              <a:t> User &lt;example.user@example.de&gt;</a:t>
-            </a:r>
+            <a:endParaRPr lang="en-US" altLang="de-DE" sz="1200" dirty="0">
+              <a:latin typeface="Consolas" panose="020B0609020204030204" pitchFamily="49" charset="0"/>
+            </a:endParaRPr>
           </a:p>
           <a:p>
             <a:pPr marL="457200" lvl="1" indent="0">
@@ -8918,11 +9401,20 @@
               <a:buNone/>
             </a:pPr>
             <a:r>
-              <a:rPr lang="de-DE" altLang="de-DE" sz="1200" dirty="0">
-                <a:latin typeface="Consolas" panose="020B0609020204030204" pitchFamily="49" charset="0"/>
-              </a:rPr>
-              <a:t>Date:   Tue May 28 14:47:28 2024 +0200</a:t>
-            </a:r>
+              <a:rPr lang="en-US" altLang="de-DE" sz="1200" dirty="0">
+                <a:latin typeface="Consolas" panose="020B0609020204030204" pitchFamily="49" charset="0"/>
+              </a:rPr>
+              <a:t>$ git log --</a:t>
+            </a:r>
+            <a:r>
+              <a:rPr lang="en-US" altLang="de-DE" sz="1200" dirty="0" err="1">
+                <a:latin typeface="Consolas" panose="020B0609020204030204" pitchFamily="49" charset="0"/>
+              </a:rPr>
+              <a:t>oneline</a:t>
+            </a:r>
+            <a:endParaRPr lang="en-US" altLang="de-DE" sz="1200" dirty="0">
+              <a:latin typeface="Consolas" panose="020B0609020204030204" pitchFamily="49" charset="0"/>
+            </a:endParaRPr>
           </a:p>
           <a:p>
             <a:pPr marL="457200" lvl="1" indent="0">
@@ -8931,7 +9423,19 @@
               </a:spcBef>
               <a:buNone/>
             </a:pPr>
-            <a:endParaRPr lang="de-DE" altLang="de-DE" sz="1200" dirty="0">
+            <a:r>
+              <a:rPr lang="en-US" altLang="de-DE" sz="1200" dirty="0">
+                <a:latin typeface="Consolas" panose="020B0609020204030204" pitchFamily="49" charset="0"/>
+              </a:rPr>
+              <a:t>c3a059e (HEAD -&gt; main, tag: release-v0.0.1) Add </a:t>
+            </a:r>
+            <a:r>
+              <a:rPr lang="en-US" altLang="de-DE" sz="1200" dirty="0" err="1">
+                <a:latin typeface="Consolas" panose="020B0609020204030204" pitchFamily="49" charset="0"/>
+              </a:rPr>
+              <a:t>final_file</a:t>
+            </a:r>
+            <a:endParaRPr lang="en-US" altLang="de-DE" sz="1200" dirty="0">
               <a:latin typeface="Consolas" panose="020B0609020204030204" pitchFamily="49" charset="0"/>
             </a:endParaRPr>
           </a:p>
@@ -8943,20 +9447,11 @@
               <a:buNone/>
             </a:pPr>
             <a:r>
-              <a:rPr lang="de-DE" altLang="de-DE" sz="1200" dirty="0">
-                <a:latin typeface="Consolas" panose="020B0609020204030204" pitchFamily="49" charset="0"/>
-              </a:rPr>
-              <a:t>    Add </a:t>
-            </a:r>
-            <a:r>
-              <a:rPr lang="de-DE" altLang="de-DE" sz="1200" dirty="0" err="1">
-                <a:latin typeface="Consolas" panose="020B0609020204030204" pitchFamily="49" charset="0"/>
-              </a:rPr>
-              <a:t>final_file</a:t>
-            </a:r>
-            <a:endParaRPr lang="de-DE" altLang="de-DE" sz="1200" dirty="0">
-              <a:latin typeface="Consolas" panose="020B0609020204030204" pitchFamily="49" charset="0"/>
-            </a:endParaRPr>
+              <a:rPr lang="en-US" altLang="de-DE" sz="1200" dirty="0">
+                <a:latin typeface="Consolas" panose="020B0609020204030204" pitchFamily="49" charset="0"/>
+              </a:rPr>
+              <a:t>a908be7 Add file3</a:t>
+            </a:r>
           </a:p>
           <a:p>
             <a:pPr marL="457200" lvl="1" indent="0">
@@ -8965,9 +9460,12 @@
               </a:spcBef>
               <a:buNone/>
             </a:pPr>
-            <a:endParaRPr lang="de-DE" altLang="de-DE" sz="1200" dirty="0">
-              <a:latin typeface="Consolas" panose="020B0609020204030204" pitchFamily="49" charset="0"/>
-            </a:endParaRPr>
+            <a:r>
+              <a:rPr lang="en-US" altLang="de-DE" sz="1200" dirty="0">
+                <a:latin typeface="Consolas" panose="020B0609020204030204" pitchFamily="49" charset="0"/>
+              </a:rPr>
+              <a:t>722eaf0 Add file from main</a:t>
+            </a:r>
           </a:p>
           <a:p>
             <a:pPr marL="457200" lvl="1" indent="0">
@@ -8977,92 +9475,25 @@
               <a:buNone/>
             </a:pPr>
             <a:r>
-              <a:rPr lang="de-DE" altLang="de-DE" sz="1200" dirty="0" err="1">
-                <a:latin typeface="Consolas" panose="020B0609020204030204" pitchFamily="49" charset="0"/>
-              </a:rPr>
-              <a:t>diff</a:t>
-            </a:r>
-            <a:r>
-              <a:rPr lang="de-DE" altLang="de-DE" sz="1200" dirty="0">
-                <a:latin typeface="Consolas" panose="020B0609020204030204" pitchFamily="49" charset="0"/>
-              </a:rPr>
-              <a:t> --</a:t>
-            </a:r>
-            <a:r>
-              <a:rPr lang="de-DE" altLang="de-DE" sz="1200" dirty="0" err="1">
-                <a:latin typeface="Consolas" panose="020B0609020204030204" pitchFamily="49" charset="0"/>
-              </a:rPr>
-              <a:t>git</a:t>
-            </a:r>
-            <a:r>
-              <a:rPr lang="de-DE" altLang="de-DE" sz="1200" dirty="0">
-                <a:latin typeface="Consolas" panose="020B0609020204030204" pitchFamily="49" charset="0"/>
-              </a:rPr>
-              <a:t> a/final_file.txt b/final_file.txt</a:t>
-            </a:r>
-          </a:p>
-          <a:p>
-            <a:pPr marL="457200" lvl="1" indent="0">
-              <a:spcBef>
-                <a:spcPts val="0"/>
-              </a:spcBef>
-              <a:buNone/>
-            </a:pPr>
-            <a:r>
-              <a:rPr lang="de-DE" altLang="de-DE" sz="1200" dirty="0" err="1">
-                <a:latin typeface="Consolas" panose="020B0609020204030204" pitchFamily="49" charset="0"/>
-              </a:rPr>
-              <a:t>new</a:t>
-            </a:r>
-            <a:r>
-              <a:rPr lang="de-DE" altLang="de-DE" sz="1200" dirty="0">
-                <a:latin typeface="Consolas" panose="020B0609020204030204" pitchFamily="49" charset="0"/>
-              </a:rPr>
-              <a:t> </a:t>
-            </a:r>
-            <a:r>
-              <a:rPr lang="de-DE" altLang="de-DE" sz="1200" dirty="0" err="1">
-                <a:latin typeface="Consolas" panose="020B0609020204030204" pitchFamily="49" charset="0"/>
-              </a:rPr>
-              <a:t>file</a:t>
-            </a:r>
-            <a:r>
-              <a:rPr lang="de-DE" altLang="de-DE" sz="1200" dirty="0">
-                <a:latin typeface="Consolas" panose="020B0609020204030204" pitchFamily="49" charset="0"/>
-              </a:rPr>
-              <a:t> </a:t>
-            </a:r>
-            <a:r>
-              <a:rPr lang="de-DE" altLang="de-DE" sz="1200" dirty="0" err="1">
-                <a:latin typeface="Consolas" panose="020B0609020204030204" pitchFamily="49" charset="0"/>
-              </a:rPr>
-              <a:t>mode</a:t>
-            </a:r>
-            <a:r>
-              <a:rPr lang="de-DE" altLang="de-DE" sz="1200" dirty="0">
-                <a:latin typeface="Consolas" panose="020B0609020204030204" pitchFamily="49" charset="0"/>
-              </a:rPr>
-              <a:t> 100644</a:t>
-            </a:r>
-          </a:p>
-          <a:p>
-            <a:pPr marL="457200" lvl="1" indent="0">
-              <a:spcBef>
-                <a:spcPts val="0"/>
-              </a:spcBef>
-              <a:buNone/>
-            </a:pPr>
-            <a:r>
-              <a:rPr lang="de-DE" altLang="de-DE" sz="1200" dirty="0" err="1">
-                <a:latin typeface="Consolas" panose="020B0609020204030204" pitchFamily="49" charset="0"/>
-              </a:rPr>
-              <a:t>index</a:t>
-            </a:r>
-            <a:r>
-              <a:rPr lang="de-DE" altLang="de-DE" sz="1200" dirty="0">
-                <a:latin typeface="Consolas" panose="020B0609020204030204" pitchFamily="49" charset="0"/>
-              </a:rPr>
-              <a:t> 0000000..e69de29</a:t>
+              <a:rPr lang="en-US" altLang="de-DE" sz="1200" dirty="0">
+                <a:latin typeface="Consolas" panose="020B0609020204030204" pitchFamily="49" charset="0"/>
+              </a:rPr>
+              <a:t>c61ef14 Initial commit</a:t>
+            </a:r>
+            <a:endParaRPr lang="de-DE" altLang="de-DE" sz="1200" dirty="0">
+              <a:latin typeface="Consolas" panose="020B0609020204030204" pitchFamily="49" charset="0"/>
+            </a:endParaRPr>
+          </a:p>
+          <a:p>
+            <a:r>
+              <a:rPr lang="de-DE" altLang="de-DE" dirty="0"/>
+              <a:t>Fügt leichtgewichtigen Tag hinzu</a:t>
+            </a:r>
+          </a:p>
+          <a:p>
+            <a:r>
+              <a:rPr lang="de-DE" altLang="de-DE" dirty="0"/>
+              <a:t>Tag wird an allen Files im Repository gesetzt</a:t>
             </a:r>
           </a:p>
         </p:txBody>
@@ -9107,7 +9538,7 @@
     </p:spTree>
     <p:extLst>
       <p:ext uri="{BB962C8B-B14F-4D97-AF65-F5344CB8AC3E}">
-        <p14:creationId xmlns:p14="http://schemas.microsoft.com/office/powerpoint/2010/main" val="3268422799"/>
+        <p14:creationId xmlns:p14="http://schemas.microsoft.com/office/powerpoint/2010/main" val="95346933"/>
       </p:ext>
     </p:extLst>
   </p:cSld>
@@ -9161,8 +9592,20 @@
           <a:lstStyle/>
           <a:p>
             <a:r>
+              <a:rPr lang="de-DE" altLang="de-DE" dirty="0" err="1">
+                <a:latin typeface="Consolas" panose="020B0609020204030204" pitchFamily="49" charset="0"/>
+              </a:rPr>
+              <a:t>git</a:t>
+            </a:r>
+            <a:r>
+              <a:rPr lang="de-DE" altLang="de-DE" dirty="0">
+                <a:latin typeface="Consolas" panose="020B0609020204030204" pitchFamily="49" charset="0"/>
+              </a:rPr>
+              <a:t> tag </a:t>
+            </a:r>
+            <a:r>
               <a:rPr lang="de-DE" altLang="de-DE" dirty="0"/>
-              <a:t>Rückwirkendes Tagging ist mit Angabe der Commit-ID möglich</a:t>
+              <a:t>zeigt alle Tags im aktuellen Projekt</a:t>
             </a:r>
           </a:p>
           <a:p>
@@ -9187,17 +9630,8 @@
               <a:rPr lang="en-US" altLang="de-DE" sz="1200" dirty="0">
                 <a:latin typeface="Consolas" panose="020B0609020204030204" pitchFamily="49" charset="0"/>
               </a:rPr>
-              <a:t>$ git log --</a:t>
-            </a:r>
-            <a:r>
-              <a:rPr lang="en-US" altLang="de-DE" sz="1200" dirty="0" err="1">
-                <a:latin typeface="Consolas" panose="020B0609020204030204" pitchFamily="49" charset="0"/>
-              </a:rPr>
-              <a:t>oneline</a:t>
-            </a:r>
-            <a:endParaRPr lang="en-US" altLang="de-DE" sz="1200" dirty="0">
-              <a:latin typeface="Consolas" panose="020B0609020204030204" pitchFamily="49" charset="0"/>
-            </a:endParaRPr>
+              <a:t>$ git tag</a:t>
+            </a:r>
           </a:p>
           <a:p>
             <a:pPr marL="457200" lvl="1" indent="0">
@@ -9210,7 +9644,7 @@
               <a:rPr lang="en-US" altLang="de-DE" sz="1200" dirty="0">
                 <a:latin typeface="Consolas" panose="020B0609020204030204" pitchFamily="49" charset="0"/>
               </a:rPr>
-              <a:t>89c1108 (HEAD -&gt; main, tag: release-v0.0.2) Add release2_file</a:t>
+              <a:t>release-v0.0.1</a:t>
             </a:r>
           </a:p>
           <a:p>
@@ -9224,17 +9658,8 @@
               <a:rPr lang="en-US" altLang="de-DE" sz="1200" dirty="0">
                 <a:latin typeface="Consolas" panose="020B0609020204030204" pitchFamily="49" charset="0"/>
               </a:rPr>
-              <a:t>c3a059e (tag: release-v0.0.1) Add </a:t>
-            </a:r>
-            <a:r>
-              <a:rPr lang="en-US" altLang="de-DE" sz="1200" dirty="0" err="1">
-                <a:latin typeface="Consolas" panose="020B0609020204030204" pitchFamily="49" charset="0"/>
-              </a:rPr>
-              <a:t>final_file</a:t>
-            </a:r>
-            <a:endParaRPr lang="en-US" altLang="de-DE" sz="1200" dirty="0">
-              <a:latin typeface="Consolas" panose="020B0609020204030204" pitchFamily="49" charset="0"/>
-            </a:endParaRPr>
+              <a:t>release-v0.0.2</a:t>
+            </a:r>
           </a:p>
           <a:p>
             <a:pPr marL="457200" lvl="1" indent="0">
@@ -9247,7 +9672,40 @@
               <a:rPr lang="en-US" altLang="de-DE" sz="1200" dirty="0">
                 <a:latin typeface="Consolas" panose="020B0609020204030204" pitchFamily="49" charset="0"/>
               </a:rPr>
-              <a:t>a908be7 Add file3</a:t>
+              <a:t>release-v1.0.0</a:t>
+            </a:r>
+            <a:endParaRPr lang="de-DE" altLang="de-DE" dirty="0">
+              <a:latin typeface="Consolas" panose="020B0609020204030204" pitchFamily="49" charset="0"/>
+            </a:endParaRPr>
+          </a:p>
+          <a:p>
+            <a:r>
+              <a:rPr lang="de-DE" altLang="de-DE" dirty="0" err="1">
+                <a:latin typeface="Consolas" panose="020B0609020204030204" pitchFamily="49" charset="0"/>
+              </a:rPr>
+              <a:t>git</a:t>
+            </a:r>
+            <a:r>
+              <a:rPr lang="de-DE" altLang="de-DE" dirty="0">
+                <a:latin typeface="Consolas" panose="020B0609020204030204" pitchFamily="49" charset="0"/>
+              </a:rPr>
+              <a:t> </a:t>
+            </a:r>
+            <a:r>
+              <a:rPr lang="de-DE" altLang="de-DE" dirty="0" err="1">
+                <a:latin typeface="Consolas" panose="020B0609020204030204" pitchFamily="49" charset="0"/>
+              </a:rPr>
+              <a:t>show</a:t>
+            </a:r>
+            <a:r>
+              <a:rPr lang="de-DE" altLang="de-DE" dirty="0">
+                <a:latin typeface="Consolas" panose="020B0609020204030204" pitchFamily="49" charset="0"/>
+              </a:rPr>
+              <a:t> &lt;tag-name&gt; </a:t>
+            </a:r>
+            <a:r>
+              <a:rPr lang="de-DE" altLang="de-DE" dirty="0"/>
+              <a:t>zeigt den Commit zum angegebenen Tag</a:t>
             </a:r>
           </a:p>
           <a:p>
@@ -9257,12 +9715,9 @@
               </a:spcBef>
               <a:buNone/>
             </a:pPr>
-            <a:r>
-              <a:rPr lang="en-US" altLang="de-DE" sz="1200" dirty="0">
-                <a:latin typeface="Consolas" panose="020B0609020204030204" pitchFamily="49" charset="0"/>
-              </a:rPr>
-              <a:t>722eaf0 Add file from main</a:t>
-            </a:r>
+            <a:endParaRPr lang="de-DE" altLang="de-DE" sz="1200" dirty="0">
+              <a:latin typeface="Consolas" panose="020B0609020204030204" pitchFamily="49" charset="0"/>
+            </a:endParaRPr>
           </a:p>
           <a:p>
             <a:pPr marL="457200" lvl="1" indent="0">
@@ -9272,10 +9727,34 @@
               <a:buNone/>
             </a:pPr>
             <a:r>
-              <a:rPr lang="en-US" altLang="de-DE" sz="1200" dirty="0">
-                <a:latin typeface="Consolas" panose="020B0609020204030204" pitchFamily="49" charset="0"/>
-              </a:rPr>
-              <a:t>c61ef14 Initial commit</a:t>
+              <a:rPr lang="de-DE" altLang="de-DE" sz="1200" dirty="0">
+                <a:latin typeface="Consolas" panose="020B0609020204030204" pitchFamily="49" charset="0"/>
+              </a:rPr>
+              <a:t>$ </a:t>
+            </a:r>
+            <a:r>
+              <a:rPr lang="de-DE" altLang="de-DE" sz="1200" dirty="0" err="1">
+                <a:latin typeface="Consolas" panose="020B0609020204030204" pitchFamily="49" charset="0"/>
+              </a:rPr>
+              <a:t>git</a:t>
+            </a:r>
+            <a:r>
+              <a:rPr lang="de-DE" altLang="de-DE" sz="1200" dirty="0">
+                <a:latin typeface="Consolas" panose="020B0609020204030204" pitchFamily="49" charset="0"/>
+              </a:rPr>
+              <a:t> </a:t>
+            </a:r>
+            <a:r>
+              <a:rPr lang="de-DE" altLang="de-DE" sz="1200" dirty="0" err="1">
+                <a:latin typeface="Consolas" panose="020B0609020204030204" pitchFamily="49" charset="0"/>
+              </a:rPr>
+              <a:t>show</a:t>
+            </a:r>
+            <a:r>
+              <a:rPr lang="de-DE" altLang="de-DE" sz="1200" dirty="0">
+                <a:latin typeface="Consolas" panose="020B0609020204030204" pitchFamily="49" charset="0"/>
+              </a:rPr>
+              <a:t> release-v0.0.1</a:t>
             </a:r>
           </a:p>
           <a:p>
@@ -9285,9 +9764,18 @@
               </a:spcBef>
               <a:buNone/>
             </a:pPr>
-            <a:endParaRPr lang="en-US" altLang="de-DE" sz="1200" dirty="0">
-              <a:latin typeface="Consolas" panose="020B0609020204030204" pitchFamily="49" charset="0"/>
-            </a:endParaRPr>
+            <a:r>
+              <a:rPr lang="de-DE" altLang="de-DE" sz="1200" dirty="0" err="1">
+                <a:latin typeface="Consolas" panose="020B0609020204030204" pitchFamily="49" charset="0"/>
+              </a:rPr>
+              <a:t>commit</a:t>
+            </a:r>
+            <a:r>
+              <a:rPr lang="de-DE" altLang="de-DE" sz="1200" dirty="0">
+                <a:latin typeface="Consolas" panose="020B0609020204030204" pitchFamily="49" charset="0"/>
+              </a:rPr>
+              <a:t> c3a059e2d6e4acfdca1295104b4d6a55f8bd00e4 (tag: release-v0.0.1)</a:t>
+            </a:r>
           </a:p>
           <a:p>
             <a:pPr marL="457200" lvl="1" indent="0">
@@ -9297,10 +9785,28 @@
               <a:buNone/>
             </a:pPr>
             <a:r>
-              <a:rPr lang="en-US" altLang="de-DE" sz="1200" dirty="0">
-                <a:latin typeface="Consolas" panose="020B0609020204030204" pitchFamily="49" charset="0"/>
-              </a:rPr>
-              <a:t>$ git tag release-v0.0.0 a908be7</a:t>
+              <a:rPr lang="de-DE" altLang="de-DE" sz="1200" dirty="0" err="1">
+                <a:latin typeface="Consolas" panose="020B0609020204030204" pitchFamily="49" charset="0"/>
+              </a:rPr>
+              <a:t>Author</a:t>
+            </a:r>
+            <a:r>
+              <a:rPr lang="de-DE" altLang="de-DE" sz="1200" dirty="0">
+                <a:latin typeface="Consolas" panose="020B0609020204030204" pitchFamily="49" charset="0"/>
+              </a:rPr>
+              <a:t>: </a:t>
+            </a:r>
+            <a:r>
+              <a:rPr lang="de-DE" altLang="de-DE" sz="1200" dirty="0" err="1">
+                <a:latin typeface="Consolas" panose="020B0609020204030204" pitchFamily="49" charset="0"/>
+              </a:rPr>
+              <a:t>Example</a:t>
+            </a:r>
+            <a:r>
+              <a:rPr lang="de-DE" altLang="de-DE" sz="1200" dirty="0">
+                <a:latin typeface="Consolas" panose="020B0609020204030204" pitchFamily="49" charset="0"/>
+              </a:rPr>
+              <a:t> User &lt;example.user@example.de&gt;</a:t>
             </a:r>
           </a:p>
           <a:p>
@@ -9310,9 +9816,12 @@
               </a:spcBef>
               <a:buNone/>
             </a:pPr>
-            <a:endParaRPr lang="en-US" altLang="de-DE" sz="1200" dirty="0">
-              <a:latin typeface="Consolas" panose="020B0609020204030204" pitchFamily="49" charset="0"/>
-            </a:endParaRPr>
+            <a:r>
+              <a:rPr lang="de-DE" altLang="de-DE" sz="1200" dirty="0">
+                <a:latin typeface="Consolas" panose="020B0609020204030204" pitchFamily="49" charset="0"/>
+              </a:rPr>
+              <a:t>Date:   Tue May 28 14:47:28 2024 +0200</a:t>
+            </a:r>
           </a:p>
           <a:p>
             <a:pPr marL="457200" lvl="1" indent="0">
@@ -9321,19 +9830,7 @@
               </a:spcBef>
               <a:buNone/>
             </a:pPr>
-            <a:r>
-              <a:rPr lang="en-US" altLang="de-DE" sz="1200" dirty="0">
-                <a:latin typeface="Consolas" panose="020B0609020204030204" pitchFamily="49" charset="0"/>
-              </a:rPr>
-              <a:t>$ git log --</a:t>
-            </a:r>
-            <a:r>
-              <a:rPr lang="en-US" altLang="de-DE" sz="1200" dirty="0" err="1">
-                <a:latin typeface="Consolas" panose="020B0609020204030204" pitchFamily="49" charset="0"/>
-              </a:rPr>
-              <a:t>oneline</a:t>
-            </a:r>
-            <a:endParaRPr lang="en-US" altLang="de-DE" sz="1200" dirty="0">
+            <a:endParaRPr lang="de-DE" altLang="de-DE" sz="1200" dirty="0">
               <a:latin typeface="Consolas" panose="020B0609020204030204" pitchFamily="49" charset="0"/>
             </a:endParaRPr>
           </a:p>
@@ -9345,11 +9842,20 @@
               <a:buNone/>
             </a:pPr>
             <a:r>
-              <a:rPr lang="en-US" altLang="de-DE" sz="1200" dirty="0">
-                <a:latin typeface="Consolas" panose="020B0609020204030204" pitchFamily="49" charset="0"/>
-              </a:rPr>
-              <a:t>89c1108 (HEAD -&gt; main, tag: release-v0.0.2) Add release2_file</a:t>
-            </a:r>
+              <a:rPr lang="de-DE" altLang="de-DE" sz="1200" dirty="0">
+                <a:latin typeface="Consolas" panose="020B0609020204030204" pitchFamily="49" charset="0"/>
+              </a:rPr>
+              <a:t>    Add </a:t>
+            </a:r>
+            <a:r>
+              <a:rPr lang="de-DE" altLang="de-DE" sz="1200" dirty="0" err="1">
+                <a:latin typeface="Consolas" panose="020B0609020204030204" pitchFamily="49" charset="0"/>
+              </a:rPr>
+              <a:t>final_file</a:t>
+            </a:r>
+            <a:endParaRPr lang="de-DE" altLang="de-DE" sz="1200" dirty="0">
+              <a:latin typeface="Consolas" panose="020B0609020204030204" pitchFamily="49" charset="0"/>
+            </a:endParaRPr>
           </a:p>
           <a:p>
             <a:pPr marL="457200" lvl="1" indent="0">
@@ -9358,19 +9864,7 @@
               </a:spcBef>
               <a:buNone/>
             </a:pPr>
-            <a:r>
-              <a:rPr lang="en-US" altLang="de-DE" sz="1200" dirty="0">
-                <a:latin typeface="Consolas" panose="020B0609020204030204" pitchFamily="49" charset="0"/>
-              </a:rPr>
-              <a:t>c3a059e (tag: release-v0.0.1) Add </a:t>
-            </a:r>
-            <a:r>
-              <a:rPr lang="en-US" altLang="de-DE" sz="1200" dirty="0" err="1">
-                <a:latin typeface="Consolas" panose="020B0609020204030204" pitchFamily="49" charset="0"/>
-              </a:rPr>
-              <a:t>final_file</a:t>
-            </a:r>
-            <a:endParaRPr lang="en-US" altLang="de-DE" sz="1200" dirty="0">
+            <a:endParaRPr lang="de-DE" altLang="de-DE" sz="1200" dirty="0">
               <a:latin typeface="Consolas" panose="020B0609020204030204" pitchFamily="49" charset="0"/>
             </a:endParaRPr>
           </a:p>
@@ -9382,10 +9876,28 @@
               <a:buNone/>
             </a:pPr>
             <a:r>
-              <a:rPr lang="en-US" altLang="de-DE" sz="1200" dirty="0">
-                <a:latin typeface="Consolas" panose="020B0609020204030204" pitchFamily="49" charset="0"/>
-              </a:rPr>
-              <a:t>a908be7 (tag: release-v0.0.0) Add file3</a:t>
+              <a:rPr lang="de-DE" altLang="de-DE" sz="1200" dirty="0" err="1">
+                <a:latin typeface="Consolas" panose="020B0609020204030204" pitchFamily="49" charset="0"/>
+              </a:rPr>
+              <a:t>diff</a:t>
+            </a:r>
+            <a:r>
+              <a:rPr lang="de-DE" altLang="de-DE" sz="1200" dirty="0">
+                <a:latin typeface="Consolas" panose="020B0609020204030204" pitchFamily="49" charset="0"/>
+              </a:rPr>
+              <a:t> --</a:t>
+            </a:r>
+            <a:r>
+              <a:rPr lang="de-DE" altLang="de-DE" sz="1200" dirty="0" err="1">
+                <a:latin typeface="Consolas" panose="020B0609020204030204" pitchFamily="49" charset="0"/>
+              </a:rPr>
+              <a:t>git</a:t>
+            </a:r>
+            <a:r>
+              <a:rPr lang="de-DE" altLang="de-DE" sz="1200" dirty="0">
+                <a:latin typeface="Consolas" panose="020B0609020204030204" pitchFamily="49" charset="0"/>
+              </a:rPr>
+              <a:t> a/final_file.txt b/final_file.txt</a:t>
             </a:r>
           </a:p>
           <a:p>
@@ -9396,10 +9908,40 @@
               <a:buNone/>
             </a:pPr>
             <a:r>
-              <a:rPr lang="en-US" altLang="de-DE" sz="1200" dirty="0">
-                <a:latin typeface="Consolas" panose="020B0609020204030204" pitchFamily="49" charset="0"/>
-              </a:rPr>
-              <a:t>722eaf0 Add file from main</a:t>
+              <a:rPr lang="de-DE" altLang="de-DE" sz="1200" dirty="0" err="1">
+                <a:latin typeface="Consolas" panose="020B0609020204030204" pitchFamily="49" charset="0"/>
+              </a:rPr>
+              <a:t>new</a:t>
+            </a:r>
+            <a:r>
+              <a:rPr lang="de-DE" altLang="de-DE" sz="1200" dirty="0">
+                <a:latin typeface="Consolas" panose="020B0609020204030204" pitchFamily="49" charset="0"/>
+              </a:rPr>
+              <a:t> </a:t>
+            </a:r>
+            <a:r>
+              <a:rPr lang="de-DE" altLang="de-DE" sz="1200" dirty="0" err="1">
+                <a:latin typeface="Consolas" panose="020B0609020204030204" pitchFamily="49" charset="0"/>
+              </a:rPr>
+              <a:t>file</a:t>
+            </a:r>
+            <a:r>
+              <a:rPr lang="de-DE" altLang="de-DE" sz="1200" dirty="0">
+                <a:latin typeface="Consolas" panose="020B0609020204030204" pitchFamily="49" charset="0"/>
+              </a:rPr>
+              <a:t> </a:t>
+            </a:r>
+            <a:r>
+              <a:rPr lang="de-DE" altLang="de-DE" sz="1200" dirty="0" err="1">
+                <a:latin typeface="Consolas" panose="020B0609020204030204" pitchFamily="49" charset="0"/>
+              </a:rPr>
+              <a:t>mode</a:t>
+            </a:r>
+            <a:r>
+              <a:rPr lang="de-DE" altLang="de-DE" sz="1200" dirty="0">
+                <a:latin typeface="Consolas" panose="020B0609020204030204" pitchFamily="49" charset="0"/>
+              </a:rPr>
+              <a:t> 100644</a:t>
             </a:r>
           </a:p>
           <a:p>
@@ -9410,28 +9952,17 @@
               <a:buNone/>
             </a:pPr>
             <a:r>
-              <a:rPr lang="en-US" altLang="de-DE" sz="1200" dirty="0">
-                <a:latin typeface="Consolas" panose="020B0609020204030204" pitchFamily="49" charset="0"/>
-              </a:rPr>
-              <a:t>c61ef14 Initial commit</a:t>
-            </a:r>
-            <a:endParaRPr lang="de-DE" altLang="de-DE" sz="1200" dirty="0">
-              <a:latin typeface="Consolas" panose="020B0609020204030204" pitchFamily="49" charset="0"/>
-            </a:endParaRPr>
-          </a:p>
-          <a:p>
-            <a:pPr marL="457200" lvl="1" indent="0">
-              <a:spcBef>
-                <a:spcPts val="0"/>
-              </a:spcBef>
-              <a:buNone/>
-            </a:pPr>
-            <a:endParaRPr lang="de-DE" altLang="de-DE" sz="1200" dirty="0">
-              <a:latin typeface="Consolas" panose="020B0609020204030204" pitchFamily="49" charset="0"/>
-            </a:endParaRPr>
-          </a:p>
-          <a:p>
-            <a:endParaRPr lang="de-DE" altLang="de-DE" dirty="0"/>
+              <a:rPr lang="de-DE" altLang="de-DE" sz="1200" dirty="0" err="1">
+                <a:latin typeface="Consolas" panose="020B0609020204030204" pitchFamily="49" charset="0"/>
+              </a:rPr>
+              <a:t>index</a:t>
+            </a:r>
+            <a:r>
+              <a:rPr lang="de-DE" altLang="de-DE" sz="1200" dirty="0">
+                <a:latin typeface="Consolas" panose="020B0609020204030204" pitchFamily="49" charset="0"/>
+              </a:rPr>
+              <a:t> 0000000..e69de29</a:t>
+            </a:r>
           </a:p>
         </p:txBody>
       </p:sp>
@@ -9475,7 +10006,7 @@
     </p:spTree>
     <p:extLst>
       <p:ext uri="{BB962C8B-B14F-4D97-AF65-F5344CB8AC3E}">
-        <p14:creationId xmlns:p14="http://schemas.microsoft.com/office/powerpoint/2010/main" val="1475861676"/>
+        <p14:creationId xmlns:p14="http://schemas.microsoft.com/office/powerpoint/2010/main" val="1109548834"/>
       </p:ext>
     </p:extLst>
   </p:cSld>
@@ -9529,32 +10060,8 @@
           <a:lstStyle/>
           <a:p>
             <a:r>
-              <a:rPr lang="de-DE" altLang="de-DE" dirty="0" err="1">
-                <a:latin typeface="Consolas" panose="020B0609020204030204" pitchFamily="49" charset="0"/>
-              </a:rPr>
-              <a:t>git</a:t>
-            </a:r>
-            <a:r>
-              <a:rPr lang="de-DE" altLang="de-DE" dirty="0">
-                <a:latin typeface="Consolas" panose="020B0609020204030204" pitchFamily="49" charset="0"/>
-              </a:rPr>
-              <a:t> </a:t>
-            </a:r>
-            <a:r>
-              <a:rPr lang="de-DE" altLang="de-DE" dirty="0" err="1">
-                <a:latin typeface="Consolas" panose="020B0609020204030204" pitchFamily="49" charset="0"/>
-              </a:rPr>
-              <a:t>checkout</a:t>
-            </a:r>
-            <a:r>
-              <a:rPr lang="de-DE" altLang="de-DE" dirty="0">
-                <a:latin typeface="Consolas" panose="020B0609020204030204" pitchFamily="49" charset="0"/>
-              </a:rPr>
-              <a:t> &lt;tag-name&gt; </a:t>
-            </a:r>
-            <a:r>
               <a:rPr lang="de-DE" altLang="de-DE" dirty="0"/>
-              <a:t>ermöglicht Auschecken eines getaggten Commit</a:t>
+              <a:t>Rückwirkendes Tagging ist mit Angabe der Commit-ID möglich</a:t>
             </a:r>
           </a:p>
           <a:p>
@@ -9579,8 +10086,17 @@
               <a:rPr lang="en-US" altLang="de-DE" sz="1200" dirty="0">
                 <a:latin typeface="Consolas" panose="020B0609020204030204" pitchFamily="49" charset="0"/>
               </a:rPr>
-              <a:t>$ git checkout release-v0.0.1</a:t>
-            </a:r>
+              <a:t>$ git log --</a:t>
+            </a:r>
+            <a:r>
+              <a:rPr lang="en-US" altLang="de-DE" sz="1200" dirty="0" err="1">
+                <a:latin typeface="Consolas" panose="020B0609020204030204" pitchFamily="49" charset="0"/>
+              </a:rPr>
+              <a:t>oneline</a:t>
+            </a:r>
+            <a:endParaRPr lang="en-US" altLang="de-DE" sz="1200" dirty="0">
+              <a:latin typeface="Consolas" panose="020B0609020204030204" pitchFamily="49" charset="0"/>
+            </a:endParaRPr>
           </a:p>
           <a:p>
             <a:pPr marL="457200" lvl="1" indent="0">
@@ -9593,7 +10109,7 @@
               <a:rPr lang="en-US" altLang="de-DE" sz="1200" dirty="0">
                 <a:latin typeface="Consolas" panose="020B0609020204030204" pitchFamily="49" charset="0"/>
               </a:rPr>
-              <a:t>Note: switching to 'release-v0.0.1'.</a:t>
+              <a:t>89c1108 (HEAD -&gt; main, tag: release-v0.0.2) Add release2_file</a:t>
             </a:r>
           </a:p>
           <a:p>
@@ -9603,6 +10119,18 @@
               </a:spcBef>
               <a:buNone/>
             </a:pPr>
+            <a:r>
+              <a:rPr lang="en-US" altLang="de-DE" sz="1200" dirty="0">
+                <a:latin typeface="Consolas" panose="020B0609020204030204" pitchFamily="49" charset="0"/>
+              </a:rPr>
+              <a:t>c3a059e (tag: release-v0.0.1) Add </a:t>
+            </a:r>
+            <a:r>
+              <a:rPr lang="en-US" altLang="de-DE" sz="1200" dirty="0" err="1">
+                <a:latin typeface="Consolas" panose="020B0609020204030204" pitchFamily="49" charset="0"/>
+              </a:rPr>
+              <a:t>final_file</a:t>
+            </a:r>
             <a:endParaRPr lang="en-US" altLang="de-DE" sz="1200" dirty="0">
               <a:latin typeface="Consolas" panose="020B0609020204030204" pitchFamily="49" charset="0"/>
             </a:endParaRPr>
@@ -9618,7 +10146,7 @@
               <a:rPr lang="en-US" altLang="de-DE" sz="1200" dirty="0">
                 <a:latin typeface="Consolas" panose="020B0609020204030204" pitchFamily="49" charset="0"/>
               </a:rPr>
-              <a:t>You are in 'detached HEAD' state. You can look around, make experimental</a:t>
+              <a:t>a908be7 Add file3</a:t>
             </a:r>
           </a:p>
           <a:p>
@@ -9632,7 +10160,7 @@
               <a:rPr lang="en-US" altLang="de-DE" sz="1200" dirty="0">
                 <a:latin typeface="Consolas" panose="020B0609020204030204" pitchFamily="49" charset="0"/>
               </a:rPr>
-              <a:t>changes and commit them, and you can discard any commits you make in this</a:t>
+              <a:t>722eaf0 Add file from main</a:t>
             </a:r>
           </a:p>
           <a:p>
@@ -9646,7 +10174,7 @@
               <a:rPr lang="en-US" altLang="de-DE" sz="1200" dirty="0">
                 <a:latin typeface="Consolas" panose="020B0609020204030204" pitchFamily="49" charset="0"/>
               </a:rPr>
-              <a:t>state without impacting any branches by switching back to a branch.</a:t>
+              <a:t>c61ef14 Initial commit</a:t>
             </a:r>
           </a:p>
           <a:p>
@@ -9671,7 +10199,7 @@
               <a:rPr lang="en-US" altLang="de-DE" sz="1200" dirty="0">
                 <a:latin typeface="Consolas" panose="020B0609020204030204" pitchFamily="49" charset="0"/>
               </a:rPr>
-              <a:t>If you want to create a new branch to retain commits you create, you may</a:t>
+              <a:t>$ git tag release-v0.0.0 a908be7</a:t>
             </a:r>
           </a:p>
           <a:p>
@@ -9681,12 +10209,9 @@
               </a:spcBef>
               <a:buNone/>
             </a:pPr>
-            <a:r>
-              <a:rPr lang="en-US" altLang="de-DE" sz="1200" dirty="0">
-                <a:latin typeface="Consolas" panose="020B0609020204030204" pitchFamily="49" charset="0"/>
-              </a:rPr>
-              <a:t>do so (now or later) by using -c with the switch command. Example:</a:t>
-            </a:r>
+            <a:endParaRPr lang="en-US" altLang="de-DE" sz="1200" dirty="0">
+              <a:latin typeface="Consolas" panose="020B0609020204030204" pitchFamily="49" charset="0"/>
+            </a:endParaRPr>
           </a:p>
           <a:p>
             <a:pPr marL="457200" lvl="1" indent="0">
@@ -9695,6 +10220,18 @@
               </a:spcBef>
               <a:buNone/>
             </a:pPr>
+            <a:r>
+              <a:rPr lang="en-US" altLang="de-DE" sz="1200" dirty="0">
+                <a:latin typeface="Consolas" panose="020B0609020204030204" pitchFamily="49" charset="0"/>
+              </a:rPr>
+              <a:t>$ git log --</a:t>
+            </a:r>
+            <a:r>
+              <a:rPr lang="en-US" altLang="de-DE" sz="1200" dirty="0" err="1">
+                <a:latin typeface="Consolas" panose="020B0609020204030204" pitchFamily="49" charset="0"/>
+              </a:rPr>
+              <a:t>oneline</a:t>
+            </a:r>
             <a:endParaRPr lang="en-US" altLang="de-DE" sz="1200" dirty="0">
               <a:latin typeface="Consolas" panose="020B0609020204030204" pitchFamily="49" charset="0"/>
             </a:endParaRPr>
@@ -9710,7 +10247,7 @@
               <a:rPr lang="en-US" altLang="de-DE" sz="1200" dirty="0">
                 <a:latin typeface="Consolas" panose="020B0609020204030204" pitchFamily="49" charset="0"/>
               </a:rPr>
-              <a:t>  git switch -c &lt;new-branch-name&gt;</a:t>
+              <a:t>89c1108 (HEAD -&gt; main, tag: release-v0.0.2) Add release2_file</a:t>
             </a:r>
           </a:p>
           <a:p>
@@ -9720,6 +10257,18 @@
               </a:spcBef>
               <a:buNone/>
             </a:pPr>
+            <a:r>
+              <a:rPr lang="en-US" altLang="de-DE" sz="1200" dirty="0">
+                <a:latin typeface="Consolas" panose="020B0609020204030204" pitchFamily="49" charset="0"/>
+              </a:rPr>
+              <a:t>c3a059e (tag: release-v0.0.1) Add </a:t>
+            </a:r>
+            <a:r>
+              <a:rPr lang="en-US" altLang="de-DE" sz="1200" dirty="0" err="1">
+                <a:latin typeface="Consolas" panose="020B0609020204030204" pitchFamily="49" charset="0"/>
+              </a:rPr>
+              <a:t>final_file</a:t>
+            </a:r>
             <a:endParaRPr lang="en-US" altLang="de-DE" sz="1200" dirty="0">
               <a:latin typeface="Consolas" panose="020B0609020204030204" pitchFamily="49" charset="0"/>
             </a:endParaRPr>
@@ -9735,7 +10284,7 @@
               <a:rPr lang="en-US" altLang="de-DE" sz="1200" dirty="0">
                 <a:latin typeface="Consolas" panose="020B0609020204030204" pitchFamily="49" charset="0"/>
               </a:rPr>
-              <a:t>Or undo this operation with:</a:t>
+              <a:t>a908be7 (tag: release-v0.0.0) Add file3</a:t>
             </a:r>
           </a:p>
           <a:p>
@@ -9745,9 +10294,12 @@
               </a:spcBef>
               <a:buNone/>
             </a:pPr>
-            <a:endParaRPr lang="en-US" altLang="de-DE" sz="1200" dirty="0">
-              <a:latin typeface="Consolas" panose="020B0609020204030204" pitchFamily="49" charset="0"/>
-            </a:endParaRPr>
+            <a:r>
+              <a:rPr lang="en-US" altLang="de-DE" sz="1200" dirty="0">
+                <a:latin typeface="Consolas" panose="020B0609020204030204" pitchFamily="49" charset="0"/>
+              </a:rPr>
+              <a:t>722eaf0 Add file from main</a:t>
+            </a:r>
           </a:p>
           <a:p>
             <a:pPr marL="457200" lvl="1" indent="0">
@@ -9760,8 +10312,11 @@
               <a:rPr lang="en-US" altLang="de-DE" sz="1200" dirty="0">
                 <a:latin typeface="Consolas" panose="020B0609020204030204" pitchFamily="49" charset="0"/>
               </a:rPr>
-              <a:t>  git switch -</a:t>
-            </a:r>
+              <a:t>c61ef14 Initial commit</a:t>
+            </a:r>
+            <a:endParaRPr lang="de-DE" altLang="de-DE" sz="1200" dirty="0">
+              <a:latin typeface="Consolas" panose="020B0609020204030204" pitchFamily="49" charset="0"/>
+            </a:endParaRPr>
           </a:p>
           <a:p>
             <a:pPr marL="457200" lvl="1" indent="0">
@@ -9770,66 +10325,6 @@
               </a:spcBef>
               <a:buNone/>
             </a:pPr>
-            <a:endParaRPr lang="en-US" altLang="de-DE" sz="1200" dirty="0">
-              <a:latin typeface="Consolas" panose="020B0609020204030204" pitchFamily="49" charset="0"/>
-            </a:endParaRPr>
-          </a:p>
-          <a:p>
-            <a:pPr marL="457200" lvl="1" indent="0">
-              <a:spcBef>
-                <a:spcPts val="0"/>
-              </a:spcBef>
-              <a:buNone/>
-            </a:pPr>
-            <a:r>
-              <a:rPr lang="en-US" altLang="de-DE" sz="1200" dirty="0">
-                <a:latin typeface="Consolas" panose="020B0609020204030204" pitchFamily="49" charset="0"/>
-              </a:rPr>
-              <a:t>Turn off this advice by setting config variable </a:t>
-            </a:r>
-            <a:r>
-              <a:rPr lang="en-US" altLang="de-DE" sz="1200" dirty="0" err="1">
-                <a:latin typeface="Consolas" panose="020B0609020204030204" pitchFamily="49" charset="0"/>
-              </a:rPr>
-              <a:t>advice.detachedHead</a:t>
-            </a:r>
-            <a:r>
-              <a:rPr lang="en-US" altLang="de-DE" sz="1200" dirty="0">
-                <a:latin typeface="Consolas" panose="020B0609020204030204" pitchFamily="49" charset="0"/>
-              </a:rPr>
-              <a:t> to false</a:t>
-            </a:r>
-          </a:p>
-          <a:p>
-            <a:pPr marL="457200" lvl="1" indent="0">
-              <a:spcBef>
-                <a:spcPts val="0"/>
-              </a:spcBef>
-              <a:buNone/>
-            </a:pPr>
-            <a:endParaRPr lang="en-US" altLang="de-DE" sz="1200" dirty="0">
-              <a:latin typeface="Consolas" panose="020B0609020204030204" pitchFamily="49" charset="0"/>
-            </a:endParaRPr>
-          </a:p>
-          <a:p>
-            <a:pPr marL="457200" lvl="1" indent="0">
-              <a:spcBef>
-                <a:spcPts val="0"/>
-              </a:spcBef>
-              <a:buNone/>
-            </a:pPr>
-            <a:r>
-              <a:rPr lang="en-US" altLang="de-DE" sz="1200" dirty="0">
-                <a:latin typeface="Consolas" panose="020B0609020204030204" pitchFamily="49" charset="0"/>
-              </a:rPr>
-              <a:t>HEAD is now at c3a059e Add </a:t>
-            </a:r>
-            <a:r>
-              <a:rPr lang="en-US" altLang="de-DE" sz="1200" dirty="0" err="1">
-                <a:latin typeface="Consolas" panose="020B0609020204030204" pitchFamily="49" charset="0"/>
-              </a:rPr>
-              <a:t>final_file</a:t>
-            </a:r>
             <a:endParaRPr lang="de-DE" altLang="de-DE" sz="1200" dirty="0">
               <a:latin typeface="Consolas" panose="020B0609020204030204" pitchFamily="49" charset="0"/>
             </a:endParaRPr>
@@ -9879,7 +10374,7 @@
     </p:spTree>
     <p:extLst>
       <p:ext uri="{BB962C8B-B14F-4D97-AF65-F5344CB8AC3E}">
-        <p14:creationId xmlns:p14="http://schemas.microsoft.com/office/powerpoint/2010/main" val="1904022772"/>
+        <p14:creationId xmlns:p14="http://schemas.microsoft.com/office/powerpoint/2010/main" val="1475861676"/>
       </p:ext>
     </p:extLst>
   </p:cSld>

</xml_diff>

<commit_message>
Fine tuning for day 2 slides
</commit_message>
<xml_diff>
--- a/slides/Tag-2_2-Tags-und-Releases_Light.pptx
+++ b/slides/Tag-2_2-Tags-und-Releases_Light.pptx
@@ -6209,7 +6209,19 @@
               <a:rPr lang="en-US" altLang="de-DE" sz="1200" dirty="0">
                 <a:latin typeface="Consolas" panose="020B0609020204030204" pitchFamily="49" charset="0"/>
               </a:rPr>
-              <a:t>You are in 'detached HEAD' state. You can look around, make experimental</a:t>
+              <a:t>You are in '</a:t>
+            </a:r>
+            <a:r>
+              <a:rPr lang="en-US" altLang="de-DE" sz="1200" b="1" dirty="0">
+                <a:latin typeface="Consolas" panose="020B0609020204030204" pitchFamily="49" charset="0"/>
+              </a:rPr>
+              <a:t>detached HEAD</a:t>
+            </a:r>
+            <a:r>
+              <a:rPr lang="en-US" altLang="de-DE" sz="1200" dirty="0">
+                <a:latin typeface="Consolas" panose="020B0609020204030204" pitchFamily="49" charset="0"/>
+              </a:rPr>
+              <a:t>' state. You can look around, make experimental</a:t>
             </a:r>
           </a:p>
           <a:p>
@@ -6842,28 +6854,8 @@
           </a:p>
           <a:p>
             <a:r>
-              <a:rPr lang="de-DE" altLang="de-DE" dirty="0" err="1"/>
-              <a:t>Annotated</a:t>
-            </a:r>
-            <a:r>
               <a:rPr lang="de-DE" altLang="de-DE" dirty="0"/>
-              <a:t> Tags sinnvoll bei </a:t>
-            </a:r>
-            <a:r>
-              <a:rPr lang="de-DE" altLang="de-DE" dirty="0" err="1"/>
-              <a:t>Mulit</a:t>
-            </a:r>
-            <a:r>
-              <a:rPr lang="de-DE" altLang="de-DE" dirty="0"/>
-              <a:t>-Developer oder </a:t>
-            </a:r>
-            <a:r>
-              <a:rPr lang="de-DE" altLang="de-DE" dirty="0" err="1"/>
-              <a:t>Mulit</a:t>
-            </a:r>
-            <a:r>
-              <a:rPr lang="de-DE" altLang="de-DE" dirty="0"/>
-              <a:t>-Repository Umgebungen</a:t>
+              <a:t>Sinnvoll, falls detaillierte Protokollierung erforderlich ist</a:t>
             </a:r>
           </a:p>
         </p:txBody>
@@ -7803,7 +7795,7 @@
             <a:pPr lvl="1"/>
             <a:r>
               <a:rPr lang="de-DE" altLang="de-DE" dirty="0"/>
-              <a:t>Einen Snapshot des Source Codes im Repository</a:t>
+              <a:t>Snapshot des Source Codes im Repository</a:t>
             </a:r>
           </a:p>
           <a:p>
@@ -7844,7 +7836,7 @@
             </a:r>
             <a:r>
               <a:rPr lang="de-DE" altLang="de-DE" dirty="0"/>
-              <a:t> erstellt JSON Datei, mit Auflistung von Inhalt (release </a:t>
+              <a:t> erstellt JSON Datei mit Auflistung von Inhalt (release </a:t>
             </a:r>
             <a:r>
               <a:rPr lang="de-DE" altLang="de-DE" dirty="0" err="1"/>
@@ -9204,24 +9196,35 @@
           <a:p>
             <a:r>
               <a:rPr lang="de-DE" altLang="de-DE" dirty="0"/>
-              <a:t>Tagging ist wichtiges Konzept der </a:t>
+              <a:t>Tagging ist ein wichtiges Konzept der Versionsverwaltung</a:t>
+            </a:r>
+          </a:p>
+          <a:p>
+            <a:r>
+              <a:rPr lang="de-DE" altLang="de-DE" dirty="0"/>
+              <a:t>Markierung (“</a:t>
             </a:r>
             <a:r>
               <a:rPr lang="de-DE" altLang="de-DE" dirty="0" err="1"/>
-              <a:t>Versionverwaltung</a:t>
-            </a:r>
-            <a:endParaRPr lang="de-DE" altLang="de-DE" dirty="0"/>
-          </a:p>
-          <a:p>
+              <a:t>Labeling</a:t>
+            </a:r>
             <a:r>
               <a:rPr lang="de-DE" altLang="de-DE" dirty="0"/>
-              <a:t>Wird verwendet, um spezifischen Entwicklungsstand zu markieren und mit Label zu versehen</a:t>
+              <a:t>“) spezifischer Entwicklungsstände</a:t>
             </a:r>
           </a:p>
           <a:p>
             <a:r>
               <a:rPr lang="de-DE" altLang="de-DE" dirty="0"/>
-              <a:t>Entwicklungsstand wird als „</a:t>
+              <a:t>Entwicklungsstand wird bei </a:t>
+            </a:r>
+            <a:r>
+              <a:rPr lang="de-DE" altLang="de-DE" dirty="0" err="1"/>
+              <a:t>Git</a:t>
+            </a:r>
+            <a:r>
+              <a:rPr lang="de-DE" altLang="de-DE" dirty="0"/>
+              <a:t> als „</a:t>
             </a:r>
             <a:r>
               <a:rPr lang="de-DE" altLang="de-DE" dirty="0" err="1"/>
@@ -9235,7 +9238,7 @@
           <a:p>
             <a:r>
               <a:rPr lang="de-DE" altLang="de-DE" dirty="0"/>
-              <a:t>Einsatz häufig, um Releases in Projekt zu markieren </a:t>
+              <a:t>Use Case: Markierung von Releases</a:t>
             </a:r>
           </a:p>
         </p:txBody>
@@ -9595,7 +9598,15 @@
           <a:p>
             <a:r>
               <a:rPr lang="de-DE" altLang="de-DE" dirty="0"/>
-              <a:t>Fügt leichtgewichtigen Tag hinzu</a:t>
+              <a:t>Fügt </a:t>
+            </a:r>
+            <a:r>
+              <a:rPr lang="de-DE" altLang="de-DE" i="1" dirty="0"/>
+              <a:t>leichtgewichtigen</a:t>
+            </a:r>
+            <a:r>
+              <a:rPr lang="de-DE" altLang="de-DE" dirty="0"/>
+              <a:t> Tag hinzu</a:t>
             </a:r>
           </a:p>
           <a:p>
@@ -10169,7 +10180,7 @@
           <a:p>
             <a:r>
               <a:rPr lang="de-DE" altLang="de-DE" dirty="0"/>
-              <a:t>Rückwirkendes Tagging ist mit Angabe der Commit-ID möglich</a:t>
+              <a:t>Rückwirkendes Tagging mit Angabe der Commit-ID möglich</a:t>
             </a:r>
           </a:p>
           <a:p>

</xml_diff>